<commit_message>
facelift to architecture diagram
</commit_message>
<xml_diff>
--- a/Team Deliverable 2/Technical Presentation - FHIRed Up.pptx
+++ b/Team Deliverable 2/Technical Presentation - FHIRed Up.pptx
@@ -110,6 +110,22 @@
       </a:defRPr>
     </a:lvl9pPr>
   </p:defaultTextStyle>
+  <p:extLst>
+    <p:ext uri="{EFAFB233-063F-42B5-8137-9DF3F51BA10A}">
+      <p15:sldGuideLst xmlns:p15="http://schemas.microsoft.com/office/powerpoint/2012/main">
+        <p15:guide id="1" orient="horz" pos="1620">
+          <p15:clr>
+            <a:srgbClr val="A4A3A4"/>
+          </p15:clr>
+        </p15:guide>
+        <p15:guide id="2" pos="2880">
+          <p15:clr>
+            <a:srgbClr val="A4A3A4"/>
+          </p15:clr>
+        </p15:guide>
+      </p15:sldGuideLst>
+    </p:ext>
+  </p:extLst>
 </p:presentation>
 </file>
 
@@ -307,7 +323,7 @@
           <a:p>
             <a:fld id="{3EAEFB75-4DE4-4DFC-B956-52D01254B927}" type="datetimeFigureOut">
               <a:rPr lang="en-US" smtClean="0"/>
-              <a:t>3/3/2016</a:t>
+              <a:t>3/4/2016</a:t>
             </a:fld>
             <a:endParaRPr lang="en-US"/>
           </a:p>
@@ -660,7 +676,7 @@
           <a:p>
             <a:fld id="{3EAEFB75-4DE4-4DFC-B956-52D01254B927}" type="datetimeFigureOut">
               <a:rPr lang="en-US" smtClean="0"/>
-              <a:t>3/3/2016</a:t>
+              <a:t>3/4/2016</a:t>
             </a:fld>
             <a:endParaRPr lang="en-US"/>
           </a:p>
@@ -835,7 +851,7 @@
           <a:p>
             <a:fld id="{3EAEFB75-4DE4-4DFC-B956-52D01254B927}" type="datetimeFigureOut">
               <a:rPr lang="en-US" smtClean="0"/>
-              <a:t>3/3/2016</a:t>
+              <a:t>3/4/2016</a:t>
             </a:fld>
             <a:endParaRPr lang="en-US"/>
           </a:p>
@@ -948,7 +964,7 @@
           <a:p>
             <a:fld id="{3EAEFB75-4DE4-4DFC-B956-52D01254B927}" type="datetimeFigureOut">
               <a:rPr lang="en-US" smtClean="0"/>
-              <a:t>3/3/2016</a:t>
+              <a:t>3/4/2016</a:t>
             </a:fld>
             <a:endParaRPr lang="en-US"/>
           </a:p>
@@ -1306,7 +1322,7 @@
           <a:p>
             <a:fld id="{3EAEFB75-4DE4-4DFC-B956-52D01254B927}" type="datetimeFigureOut">
               <a:rPr lang="en-US" smtClean="0"/>
-              <a:t>3/3/2016</a:t>
+              <a:t>3/4/2016</a:t>
             </a:fld>
             <a:endParaRPr lang="en-US"/>
           </a:p>
@@ -1571,7 +1587,7 @@
           <a:p>
             <a:fld id="{3EAEFB75-4DE4-4DFC-B956-52D01254B927}" type="datetimeFigureOut">
               <a:rPr lang="en-US" smtClean="0"/>
-              <a:t>3/3/2016</a:t>
+              <a:t>3/4/2016</a:t>
             </a:fld>
             <a:endParaRPr lang="en-US"/>
           </a:p>
@@ -1933,7 +1949,7 @@
           <a:p>
             <a:fld id="{3EAEFB75-4DE4-4DFC-B956-52D01254B927}" type="datetimeFigureOut">
               <a:rPr lang="en-US" smtClean="0"/>
-              <a:t>3/3/2016</a:t>
+              <a:t>3/4/2016</a:t>
             </a:fld>
             <a:endParaRPr lang="en-US"/>
           </a:p>
@@ -2160,7 +2176,7 @@
           <a:p>
             <a:fld id="{3EAEFB75-4DE4-4DFC-B956-52D01254B927}" type="datetimeFigureOut">
               <a:rPr lang="en-US" smtClean="0"/>
-              <a:t>3/3/2016</a:t>
+              <a:t>3/4/2016</a:t>
             </a:fld>
             <a:endParaRPr lang="en-US"/>
           </a:p>
@@ -2250,7 +2266,7 @@
           <a:p>
             <a:fld id="{3EAEFB75-4DE4-4DFC-B956-52D01254B927}" type="datetimeFigureOut">
               <a:rPr lang="en-US" smtClean="0"/>
-              <a:t>3/3/2016</a:t>
+              <a:t>3/4/2016</a:t>
             </a:fld>
             <a:endParaRPr lang="en-US"/>
           </a:p>
@@ -2517,7 +2533,7 @@
           <a:p>
             <a:fld id="{3EAEFB75-4DE4-4DFC-B956-52D01254B927}" type="datetimeFigureOut">
               <a:rPr lang="en-US" smtClean="0"/>
-              <a:t>3/3/2016</a:t>
+              <a:t>3/4/2016</a:t>
             </a:fld>
             <a:endParaRPr lang="en-US"/>
           </a:p>
@@ -2745,7 +2761,7 @@
           <a:p>
             <a:fld id="{3EAEFB75-4DE4-4DFC-B956-52D01254B927}" type="datetimeFigureOut">
               <a:rPr lang="en-US" smtClean="0"/>
-              <a:t>3/3/2016</a:t>
+              <a:t>3/4/2016</a:t>
             </a:fld>
             <a:endParaRPr lang="en-US"/>
           </a:p>
@@ -3244,7 +3260,7 @@
           <a:p>
             <a:fld id="{3EAEFB75-4DE4-4DFC-B956-52D01254B927}" type="datetimeFigureOut">
               <a:rPr lang="en-US" smtClean="0"/>
-              <a:t>3/3/2016</a:t>
+              <a:t>3/4/2016</a:t>
             </a:fld>
             <a:endParaRPr lang="en-US"/>
           </a:p>
@@ -4062,192 +4078,186 @@
           <a:chExt cx="0" cy="0"/>
         </a:xfrm>
       </p:grpSpPr>
+      <p:sp>
+        <p:nvSpPr>
+          <p:cNvPr id="2" name="Title 1"/>
+          <p:cNvSpPr>
+            <a:spLocks noGrp="1"/>
+          </p:cNvSpPr>
+          <p:nvPr>
+            <p:ph type="title"/>
+          </p:nvPr>
+        </p:nvSpPr>
+        <p:spPr>
+          <a:xfrm>
+            <a:off x="304800" y="285750"/>
+            <a:ext cx="5105400" cy="762000"/>
+          </a:xfrm>
+        </p:spPr>
+        <p:txBody>
+          <a:bodyPr/>
+          <a:lstStyle/>
+          <a:p>
+            <a:r>
+              <a:rPr lang="en-US" dirty="0" smtClean="0"/>
+              <a:t>Architecture Diagram</a:t>
+            </a:r>
+            <a:endParaRPr lang="en-US" dirty="0"/>
+          </a:p>
+        </p:txBody>
+      </p:sp>
+      <p:sp>
+        <p:nvSpPr>
+          <p:cNvPr id="5" name="TextBox 4"/>
+          <p:cNvSpPr txBox="1"/>
+          <p:nvPr/>
+        </p:nvSpPr>
+        <p:spPr>
+          <a:xfrm>
+            <a:off x="451338" y="1428749"/>
+            <a:ext cx="3739662" cy="2862322"/>
+          </a:xfrm>
+          <a:prstGeom prst="rect">
+            <a:avLst/>
+          </a:prstGeom>
+          <a:noFill/>
+        </p:spPr>
+        <p:txBody>
+          <a:bodyPr wrap="square" rtlCol="0">
+            <a:spAutoFit/>
+          </a:bodyPr>
+          <a:lstStyle/>
+          <a:p>
+            <a:pPr marL="285750" indent="-285750">
+              <a:buFont typeface="Arial" panose="020B0604020202020204" pitchFamily="34" charset="0"/>
+              <a:buChar char="•"/>
+            </a:pPr>
+            <a:r>
+              <a:rPr lang="en-US" dirty="0" smtClean="0"/>
+              <a:t>Three-Tier Architecture</a:t>
+            </a:r>
+          </a:p>
+          <a:p>
+            <a:pPr marL="742950" lvl="1" indent="-285750">
+              <a:buFont typeface="Arial" panose="020B0604020202020204" pitchFamily="34" charset="0"/>
+              <a:buChar char="•"/>
+            </a:pPr>
+            <a:r>
+              <a:rPr lang="en-US" dirty="0" smtClean="0"/>
+              <a:t>Data Tier</a:t>
+            </a:r>
+          </a:p>
+          <a:p>
+            <a:pPr marL="1200150" lvl="2" indent="-285750">
+              <a:buFont typeface="Arial" panose="020B0604020202020204" pitchFamily="34" charset="0"/>
+              <a:buChar char="•"/>
+            </a:pPr>
+            <a:r>
+              <a:rPr lang="en-US" dirty="0" err="1" smtClean="0"/>
+              <a:t>GaTech</a:t>
+            </a:r>
+            <a:r>
+              <a:rPr lang="en-US" dirty="0" smtClean="0"/>
+              <a:t> FHIR Server</a:t>
+            </a:r>
+          </a:p>
+          <a:p>
+            <a:pPr marL="742950" lvl="1" indent="-285750">
+              <a:buFont typeface="Arial" panose="020B0604020202020204" pitchFamily="34" charset="0"/>
+              <a:buChar char="•"/>
+            </a:pPr>
+            <a:r>
+              <a:rPr lang="en-US" dirty="0" smtClean="0"/>
+              <a:t>Application Tier</a:t>
+            </a:r>
+          </a:p>
+          <a:p>
+            <a:pPr marL="1200150" lvl="2" indent="-285750">
+              <a:buFont typeface="Arial" panose="020B0604020202020204" pitchFamily="34" charset="0"/>
+              <a:buChar char="•"/>
+            </a:pPr>
+            <a:r>
+              <a:rPr lang="en-US" dirty="0" smtClean="0"/>
+              <a:t>Python Code</a:t>
+            </a:r>
+          </a:p>
+          <a:p>
+            <a:pPr marL="742950" lvl="1" indent="-285750">
+              <a:buFont typeface="Arial" panose="020B0604020202020204" pitchFamily="34" charset="0"/>
+              <a:buChar char="•"/>
+            </a:pPr>
+            <a:r>
+              <a:rPr lang="en-US" dirty="0" smtClean="0"/>
+              <a:t>Presentation Tier</a:t>
+            </a:r>
+          </a:p>
+          <a:p>
+            <a:pPr marL="1200150" lvl="2" indent="-285750">
+              <a:buFont typeface="Arial" panose="020B0604020202020204" pitchFamily="34" charset="0"/>
+              <a:buChar char="•"/>
+            </a:pPr>
+            <a:r>
+              <a:rPr lang="en-US" dirty="0" smtClean="0"/>
+              <a:t>Google App Engine</a:t>
+            </a:r>
+          </a:p>
+          <a:p>
+            <a:pPr marL="1200150" lvl="2" indent="-285750">
+              <a:buFont typeface="Arial" panose="020B0604020202020204" pitchFamily="34" charset="0"/>
+              <a:buChar char="•"/>
+            </a:pPr>
+            <a:r>
+              <a:rPr lang="en-US" dirty="0" smtClean="0"/>
+              <a:t>HTML5</a:t>
+            </a:r>
+          </a:p>
+          <a:p>
+            <a:pPr marL="1200150" lvl="2" indent="-285750">
+              <a:buFont typeface="Arial" panose="020B0604020202020204" pitchFamily="34" charset="0"/>
+              <a:buChar char="•"/>
+            </a:pPr>
+            <a:r>
+              <a:rPr lang="en-US" dirty="0" smtClean="0"/>
+              <a:t>CSS</a:t>
+            </a:r>
+          </a:p>
+          <a:p>
+            <a:pPr marL="1200150" lvl="2" indent="-285750">
+              <a:buFont typeface="Arial" panose="020B0604020202020204" pitchFamily="34" charset="0"/>
+              <a:buChar char="•"/>
+            </a:pPr>
+            <a:r>
+              <a:rPr lang="en-US" dirty="0" err="1" smtClean="0"/>
+              <a:t>Javascript</a:t>
+            </a:r>
+            <a:endParaRPr lang="en-US" dirty="0"/>
+          </a:p>
+        </p:txBody>
+      </p:sp>
       <p:pic>
         <p:nvPicPr>
-          <p:cNvPr id="4" name="Picture 3"/>
+          <p:cNvPr id="7" name="Picture 6"/>
           <p:cNvPicPr>
             <a:picLocks noChangeAspect="1"/>
           </p:cNvPicPr>
           <p:nvPr/>
         </p:nvPicPr>
         <p:blipFill>
-          <a:blip r:embed="rId2">
-            <a:extLst>
-              <a:ext uri="{28A0092B-C50C-407E-A947-70E740481C1C}">
-                <a14:useLocalDpi xmlns:a14="http://schemas.microsoft.com/office/drawing/2010/main" val="0"/>
-              </a:ext>
-            </a:extLst>
-          </a:blip>
+          <a:blip r:embed="rId2"/>
           <a:stretch>
             <a:fillRect/>
           </a:stretch>
         </p:blipFill>
         <p:spPr>
           <a:xfrm>
-            <a:off x="4343400" y="133350"/>
-            <a:ext cx="4530708" cy="4906079"/>
+            <a:off x="3754885" y="1047750"/>
+            <a:ext cx="5129109" cy="3810000"/>
           </a:xfrm>
           <a:prstGeom prst="rect">
             <a:avLst/>
           </a:prstGeom>
         </p:spPr>
       </p:pic>
-      <p:sp>
-        <p:nvSpPr>
-          <p:cNvPr id="2" name="Title 1"/>
-          <p:cNvSpPr>
-            <a:spLocks noGrp="1"/>
-          </p:cNvSpPr>
-          <p:nvPr>
-            <p:ph type="title"/>
-          </p:nvPr>
-        </p:nvSpPr>
-        <p:spPr>
-          <a:xfrm>
-            <a:off x="304800" y="285750"/>
-            <a:ext cx="5105400" cy="762000"/>
-          </a:xfrm>
-        </p:spPr>
-        <p:txBody>
-          <a:bodyPr/>
-          <a:lstStyle/>
-          <a:p>
-            <a:r>
-              <a:rPr lang="en-US" dirty="0" smtClean="0"/>
-              <a:t>Architecture Diagram</a:t>
-            </a:r>
-            <a:endParaRPr lang="en-US" dirty="0"/>
-          </a:p>
-        </p:txBody>
-      </p:sp>
-      <p:sp>
-        <p:nvSpPr>
-          <p:cNvPr id="5" name="TextBox 4"/>
-          <p:cNvSpPr txBox="1"/>
-          <p:nvPr/>
-        </p:nvSpPr>
-        <p:spPr>
-          <a:xfrm>
-            <a:off x="451338" y="1428749"/>
-            <a:ext cx="3739662" cy="2862322"/>
-          </a:xfrm>
-          <a:prstGeom prst="rect">
-            <a:avLst/>
-          </a:prstGeom>
-          <a:noFill/>
-        </p:spPr>
-        <p:txBody>
-          <a:bodyPr wrap="square" rtlCol="0">
-            <a:spAutoFit/>
-          </a:bodyPr>
-          <a:lstStyle/>
-          <a:p>
-            <a:pPr marL="285750" indent="-285750">
-              <a:buFont typeface="Arial" panose="020B0604020202020204" pitchFamily="34" charset="0"/>
-              <a:buChar char="•"/>
-            </a:pPr>
-            <a:r>
-              <a:rPr lang="en-US" dirty="0" smtClean="0"/>
-              <a:t>Three-Tier Architecture</a:t>
-            </a:r>
-          </a:p>
-          <a:p>
-            <a:pPr marL="742950" lvl="1" indent="-285750">
-              <a:buFont typeface="Arial" panose="020B0604020202020204" pitchFamily="34" charset="0"/>
-              <a:buChar char="•"/>
-            </a:pPr>
-            <a:r>
-              <a:rPr lang="en-US" dirty="0" smtClean="0"/>
-              <a:t>Data Tier</a:t>
-            </a:r>
-          </a:p>
-          <a:p>
-            <a:pPr marL="1200150" lvl="2" indent="-285750">
-              <a:buFont typeface="Arial" panose="020B0604020202020204" pitchFamily="34" charset="0"/>
-              <a:buChar char="•"/>
-            </a:pPr>
-            <a:r>
-              <a:rPr lang="en-US" dirty="0" err="1" smtClean="0"/>
-              <a:t>GaTech</a:t>
-            </a:r>
-            <a:r>
-              <a:rPr lang="en-US" dirty="0" smtClean="0"/>
-              <a:t> FHIR Server</a:t>
-            </a:r>
-          </a:p>
-          <a:p>
-            <a:pPr marL="742950" lvl="1" indent="-285750">
-              <a:buFont typeface="Arial" panose="020B0604020202020204" pitchFamily="34" charset="0"/>
-              <a:buChar char="•"/>
-            </a:pPr>
-            <a:r>
-              <a:rPr lang="en-US" dirty="0" smtClean="0"/>
-              <a:t>Application Tier</a:t>
-            </a:r>
-          </a:p>
-          <a:p>
-            <a:pPr marL="1200150" lvl="2" indent="-285750">
-              <a:buFont typeface="Arial" panose="020B0604020202020204" pitchFamily="34" charset="0"/>
-              <a:buChar char="•"/>
-            </a:pPr>
-            <a:r>
-              <a:rPr lang="en-US" dirty="0" smtClean="0"/>
-              <a:t>Python Code</a:t>
-            </a:r>
-          </a:p>
-          <a:p>
-            <a:pPr marL="742950" lvl="1" indent="-285750">
-              <a:buFont typeface="Arial" panose="020B0604020202020204" pitchFamily="34" charset="0"/>
-              <a:buChar char="•"/>
-            </a:pPr>
-            <a:r>
-              <a:rPr lang="en-US" dirty="0" smtClean="0"/>
-              <a:t>Presentation Tier</a:t>
-            </a:r>
-          </a:p>
-          <a:p>
-            <a:pPr marL="1200150" lvl="2" indent="-285750">
-              <a:buFont typeface="Arial" panose="020B0604020202020204" pitchFamily="34" charset="0"/>
-              <a:buChar char="•"/>
-            </a:pPr>
-            <a:r>
-              <a:rPr lang="en-US" dirty="0" smtClean="0"/>
-              <a:t>Google App Engine</a:t>
-            </a:r>
-          </a:p>
-          <a:p>
-            <a:pPr marL="1200150" lvl="2" indent="-285750">
-              <a:buFont typeface="Arial" panose="020B0604020202020204" pitchFamily="34" charset="0"/>
-              <a:buChar char="•"/>
-            </a:pPr>
-            <a:r>
-              <a:rPr lang="en-US" dirty="0" smtClean="0"/>
-              <a:t>HTML5</a:t>
-            </a:r>
-          </a:p>
-          <a:p>
-            <a:pPr marL="1200150" lvl="2" indent="-285750">
-              <a:buFont typeface="Arial" panose="020B0604020202020204" pitchFamily="34" charset="0"/>
-              <a:buChar char="•"/>
-            </a:pPr>
-            <a:r>
-              <a:rPr lang="en-US" dirty="0" smtClean="0"/>
-              <a:t>CSS</a:t>
-            </a:r>
-          </a:p>
-          <a:p>
-            <a:pPr marL="1200150" lvl="2" indent="-285750">
-              <a:buFont typeface="Arial" panose="020B0604020202020204" pitchFamily="34" charset="0"/>
-              <a:buChar char="•"/>
-            </a:pPr>
-            <a:r>
-              <a:rPr lang="en-US" dirty="0" err="1" smtClean="0"/>
-              <a:t>Javascript</a:t>
-            </a:r>
-            <a:endParaRPr lang="en-US" dirty="0"/>
-          </a:p>
-        </p:txBody>
-      </p:sp>
     </p:spTree>
     <p:extLst>
       <p:ext uri="{BB962C8B-B14F-4D97-AF65-F5344CB8AC3E}">

</xml_diff>

<commit_message>
Minor update to arch diagram
Replaced original *.vsd w/ *.vsdx.  Updated related docs with new arch
diagram.
</commit_message>
<xml_diff>
--- a/Team Deliverable 2/Technical Presentation - FHIRed Up.pptx
+++ b/Team Deliverable 2/Technical Presentation - FHIRed Up.pptx
@@ -112,7 +112,7 @@
   </p:defaultTextStyle>
   <p:extLst>
     <p:ext uri="{EFAFB233-063F-42B5-8137-9DF3F51BA10A}">
-      <p15:sldGuideLst xmlns:p15="http://schemas.microsoft.com/office/powerpoint/2012/main" xmlns="">
+      <p15:sldGuideLst xmlns:p15="http://schemas.microsoft.com/office/powerpoint/2012/main">
         <p15:guide id="1" orient="horz" pos="1620">
           <p15:clr>
             <a:srgbClr val="A4A3A4"/>
@@ -4260,7 +4260,7 @@
       </p:sp>
       <p:pic>
         <p:nvPicPr>
-          <p:cNvPr id="7" name="Picture 6"/>
+          <p:cNvPr id="6" name="Picture 5"/>
           <p:cNvPicPr>
             <a:picLocks noChangeAspect="1"/>
           </p:cNvPicPr>
@@ -4274,8 +4274,8 @@
         </p:blipFill>
         <p:spPr>
           <a:xfrm>
-            <a:off x="3754885" y="1047750"/>
-            <a:ext cx="5129109" cy="3810000"/>
+            <a:off x="3803010" y="1047750"/>
+            <a:ext cx="5060244" cy="3710100"/>
           </a:xfrm>
           <a:prstGeom prst="rect">
             <a:avLst/>

</xml_diff>

<commit_message>
added labels to users for clarity
</commit_message>
<xml_diff>
--- a/Team Deliverable 2/Technical Presentation - FHIRed Up.pptx
+++ b/Team Deliverable 2/Technical Presentation - FHIRed Up.pptx
@@ -112,7 +112,7 @@
   </p:defaultTextStyle>
   <p:extLst>
     <p:ext uri="{EFAFB233-063F-42B5-8137-9DF3F51BA10A}">
-      <p15:sldGuideLst xmlns:p15="http://schemas.microsoft.com/office/powerpoint/2012/main">
+      <p15:sldGuideLst xmlns:p15="http://schemas.microsoft.com/office/powerpoint/2012/main" xmlns="">
         <p15:guide id="1" orient="horz" pos="1620">
           <p15:clr>
             <a:srgbClr val="A4A3A4"/>
@@ -140,15 +140,6 @@
   <p:cm authorId="0" dt="2016-03-05T11:19:12.546" idx="2">
     <p:pos x="10" y="10"/>
     <p:text>add color to use diagram. I have visio 2013 which disables legacy features. </p:text>
-  </p:cm>
-</p:cmLst>
-</file>
-
-<file path=ppt/comments/comment2.xml><?xml version="1.0" encoding="utf-8"?>
-<p:cmLst xmlns:a="http://schemas.openxmlformats.org/drawingml/2006/main" xmlns:r="http://schemas.openxmlformats.org/officeDocument/2006/relationships" xmlns:p="http://schemas.openxmlformats.org/presentationml/2006/main">
-  <p:cm authorId="0" dt="2016-03-05T11:18:42.375" idx="1">
-    <p:pos x="10" y="10"/>
-    <p:text>Can we add labels for doctors, nurses, med assistants and coders? I don't have the orginal file to do so. </p:text>
   </p:cm>
 </p:cmLst>
 </file>
@@ -347,7 +338,7 @@
           <a:p>
             <a:fld id="{3EAEFB75-4DE4-4DFC-B956-52D01254B927}" type="datetimeFigureOut">
               <a:rPr lang="en-US" smtClean="0"/>
-              <a:t>3/5/2016</a:t>
+              <a:t>3/6/2016</a:t>
             </a:fld>
             <a:endParaRPr lang="en-US"/>
           </a:p>
@@ -700,7 +691,7 @@
           <a:p>
             <a:fld id="{3EAEFB75-4DE4-4DFC-B956-52D01254B927}" type="datetimeFigureOut">
               <a:rPr lang="en-US" smtClean="0"/>
-              <a:t>3/5/2016</a:t>
+              <a:t>3/6/2016</a:t>
             </a:fld>
             <a:endParaRPr lang="en-US"/>
           </a:p>
@@ -875,7 +866,7 @@
           <a:p>
             <a:fld id="{3EAEFB75-4DE4-4DFC-B956-52D01254B927}" type="datetimeFigureOut">
               <a:rPr lang="en-US" smtClean="0"/>
-              <a:t>3/5/2016</a:t>
+              <a:t>3/6/2016</a:t>
             </a:fld>
             <a:endParaRPr lang="en-US"/>
           </a:p>
@@ -988,7 +979,7 @@
           <a:p>
             <a:fld id="{3EAEFB75-4DE4-4DFC-B956-52D01254B927}" type="datetimeFigureOut">
               <a:rPr lang="en-US" smtClean="0"/>
-              <a:t>3/5/2016</a:t>
+              <a:t>3/6/2016</a:t>
             </a:fld>
             <a:endParaRPr lang="en-US"/>
           </a:p>
@@ -1346,7 +1337,7 @@
           <a:p>
             <a:fld id="{3EAEFB75-4DE4-4DFC-B956-52D01254B927}" type="datetimeFigureOut">
               <a:rPr lang="en-US" smtClean="0"/>
-              <a:t>3/5/2016</a:t>
+              <a:t>3/6/2016</a:t>
             </a:fld>
             <a:endParaRPr lang="en-US"/>
           </a:p>
@@ -1611,7 +1602,7 @@
           <a:p>
             <a:fld id="{3EAEFB75-4DE4-4DFC-B956-52D01254B927}" type="datetimeFigureOut">
               <a:rPr lang="en-US" smtClean="0"/>
-              <a:t>3/5/2016</a:t>
+              <a:t>3/6/2016</a:t>
             </a:fld>
             <a:endParaRPr lang="en-US"/>
           </a:p>
@@ -1973,7 +1964,7 @@
           <a:p>
             <a:fld id="{3EAEFB75-4DE4-4DFC-B956-52D01254B927}" type="datetimeFigureOut">
               <a:rPr lang="en-US" smtClean="0"/>
-              <a:t>3/5/2016</a:t>
+              <a:t>3/6/2016</a:t>
             </a:fld>
             <a:endParaRPr lang="en-US"/>
           </a:p>
@@ -2200,7 +2191,7 @@
           <a:p>
             <a:fld id="{3EAEFB75-4DE4-4DFC-B956-52D01254B927}" type="datetimeFigureOut">
               <a:rPr lang="en-US" smtClean="0"/>
-              <a:t>3/5/2016</a:t>
+              <a:t>3/6/2016</a:t>
             </a:fld>
             <a:endParaRPr lang="en-US"/>
           </a:p>
@@ -2290,7 +2281,7 @@
           <a:p>
             <a:fld id="{3EAEFB75-4DE4-4DFC-B956-52D01254B927}" type="datetimeFigureOut">
               <a:rPr lang="en-US" smtClean="0"/>
-              <a:t>3/5/2016</a:t>
+              <a:t>3/6/2016</a:t>
             </a:fld>
             <a:endParaRPr lang="en-US"/>
           </a:p>
@@ -2557,7 +2548,7 @@
           <a:p>
             <a:fld id="{3EAEFB75-4DE4-4DFC-B956-52D01254B927}" type="datetimeFigureOut">
               <a:rPr lang="en-US" smtClean="0"/>
-              <a:t>3/5/2016</a:t>
+              <a:t>3/6/2016</a:t>
             </a:fld>
             <a:endParaRPr lang="en-US"/>
           </a:p>
@@ -2785,7 +2776,7 @@
           <a:p>
             <a:fld id="{3EAEFB75-4DE4-4DFC-B956-52D01254B927}" type="datetimeFigureOut">
               <a:rPr lang="en-US" smtClean="0"/>
-              <a:t>3/5/2016</a:t>
+              <a:t>3/6/2016</a:t>
             </a:fld>
             <a:endParaRPr lang="en-US"/>
           </a:p>
@@ -3284,7 +3275,7 @@
           <a:p>
             <a:fld id="{3EAEFB75-4DE4-4DFC-B956-52D01254B927}" type="datetimeFigureOut">
               <a:rPr lang="en-US" smtClean="0"/>
-              <a:t>3/5/2016</a:t>
+              <a:t>3/6/2016</a:t>
             </a:fld>
             <a:endParaRPr lang="en-US"/>
           </a:p>
@@ -4260,22 +4251,28 @@
       </p:sp>
       <p:pic>
         <p:nvPicPr>
-          <p:cNvPr id="6" name="Picture 5"/>
+          <p:cNvPr id="3" name="Picture 2"/>
           <p:cNvPicPr>
             <a:picLocks noChangeAspect="1"/>
           </p:cNvPicPr>
           <p:nvPr/>
         </p:nvPicPr>
         <p:blipFill>
-          <a:blip r:embed="rId2"/>
+          <a:blip r:embed="rId2" cstate="print">
+            <a:extLst>
+              <a:ext uri="{28A0092B-C50C-407E-A947-70E740481C1C}">
+                <a14:useLocalDpi xmlns:a14="http://schemas.microsoft.com/office/drawing/2010/main" val="0"/>
+              </a:ext>
+            </a:extLst>
+          </a:blip>
           <a:stretch>
             <a:fillRect/>
           </a:stretch>
         </p:blipFill>
         <p:spPr>
           <a:xfrm>
-            <a:off x="3803010" y="1047750"/>
-            <a:ext cx="5060244" cy="3710100"/>
+            <a:off x="4114800" y="1123950"/>
+            <a:ext cx="4694327" cy="3699831"/>
           </a:xfrm>
           <a:prstGeom prst="rect">
             <a:avLst/>

</xml_diff>

<commit_message>
added wireframe images to the deliverable 2 presentation
</commit_message>
<xml_diff>
--- a/Team Deliverable 2/Technical Presentation - FHIRed Up.pptx
+++ b/Team Deliverable 2/Technical Presentation - FHIRed Up.pptx
@@ -9,9 +9,13 @@
     <p:sldId id="257" r:id="rId3"/>
     <p:sldId id="258" r:id="rId4"/>
     <p:sldId id="259" r:id="rId5"/>
-    <p:sldId id="260" r:id="rId6"/>
-    <p:sldId id="261" r:id="rId7"/>
-    <p:sldId id="262" r:id="rId8"/>
+    <p:sldId id="261" r:id="rId6"/>
+    <p:sldId id="266" r:id="rId7"/>
+    <p:sldId id="267" r:id="rId8"/>
+    <p:sldId id="263" r:id="rId9"/>
+    <p:sldId id="260" r:id="rId10"/>
+    <p:sldId id="264" r:id="rId11"/>
+    <p:sldId id="262" r:id="rId12"/>
   </p:sldIdLst>
   <p:sldSz cx="9144000" cy="5143500" type="screen16x9"/>
   <p:notesSz cx="6858000" cy="9144000"/>
@@ -112,7 +116,7 @@
   </p:defaultTextStyle>
   <p:extLst>
     <p:ext uri="{EFAFB233-063F-42B5-8137-9DF3F51BA10A}">
-      <p15:sldGuideLst xmlns="" xmlns:p15="http://schemas.microsoft.com/office/powerpoint/2012/main">
+      <p15:sldGuideLst xmlns:p15="http://schemas.microsoft.com/office/powerpoint/2012/main" xmlns="">
         <p15:guide id="1" orient="horz" pos="1620">
           <p15:clr>
             <a:srgbClr val="A4A3A4"/>
@@ -338,7 +342,7 @@
           <a:p>
             <a:fld id="{3EAEFB75-4DE4-4DFC-B956-52D01254B927}" type="datetimeFigureOut">
               <a:rPr lang="en-US" smtClean="0"/>
-              <a:t>3/6/2016</a:t>
+              <a:t>3/7/2016</a:t>
             </a:fld>
             <a:endParaRPr lang="en-US"/>
           </a:p>
@@ -691,7 +695,7 @@
           <a:p>
             <a:fld id="{3EAEFB75-4DE4-4DFC-B956-52D01254B927}" type="datetimeFigureOut">
               <a:rPr lang="en-US" smtClean="0"/>
-              <a:t>3/6/2016</a:t>
+              <a:t>3/7/2016</a:t>
             </a:fld>
             <a:endParaRPr lang="en-US"/>
           </a:p>
@@ -866,7 +870,7 @@
           <a:p>
             <a:fld id="{3EAEFB75-4DE4-4DFC-B956-52D01254B927}" type="datetimeFigureOut">
               <a:rPr lang="en-US" smtClean="0"/>
-              <a:t>3/6/2016</a:t>
+              <a:t>3/7/2016</a:t>
             </a:fld>
             <a:endParaRPr lang="en-US"/>
           </a:p>
@@ -979,7 +983,7 @@
           <a:p>
             <a:fld id="{3EAEFB75-4DE4-4DFC-B956-52D01254B927}" type="datetimeFigureOut">
               <a:rPr lang="en-US" smtClean="0"/>
-              <a:t>3/6/2016</a:t>
+              <a:t>3/7/2016</a:t>
             </a:fld>
             <a:endParaRPr lang="en-US"/>
           </a:p>
@@ -1337,7 +1341,7 @@
           <a:p>
             <a:fld id="{3EAEFB75-4DE4-4DFC-B956-52D01254B927}" type="datetimeFigureOut">
               <a:rPr lang="en-US" smtClean="0"/>
-              <a:t>3/6/2016</a:t>
+              <a:t>3/7/2016</a:t>
             </a:fld>
             <a:endParaRPr lang="en-US"/>
           </a:p>
@@ -1602,7 +1606,7 @@
           <a:p>
             <a:fld id="{3EAEFB75-4DE4-4DFC-B956-52D01254B927}" type="datetimeFigureOut">
               <a:rPr lang="en-US" smtClean="0"/>
-              <a:t>3/6/2016</a:t>
+              <a:t>3/7/2016</a:t>
             </a:fld>
             <a:endParaRPr lang="en-US"/>
           </a:p>
@@ -1964,7 +1968,7 @@
           <a:p>
             <a:fld id="{3EAEFB75-4DE4-4DFC-B956-52D01254B927}" type="datetimeFigureOut">
               <a:rPr lang="en-US" smtClean="0"/>
-              <a:t>3/6/2016</a:t>
+              <a:t>3/7/2016</a:t>
             </a:fld>
             <a:endParaRPr lang="en-US"/>
           </a:p>
@@ -2191,7 +2195,7 @@
           <a:p>
             <a:fld id="{3EAEFB75-4DE4-4DFC-B956-52D01254B927}" type="datetimeFigureOut">
               <a:rPr lang="en-US" smtClean="0"/>
-              <a:t>3/6/2016</a:t>
+              <a:t>3/7/2016</a:t>
             </a:fld>
             <a:endParaRPr lang="en-US"/>
           </a:p>
@@ -2281,7 +2285,7 @@
           <a:p>
             <a:fld id="{3EAEFB75-4DE4-4DFC-B956-52D01254B927}" type="datetimeFigureOut">
               <a:rPr lang="en-US" smtClean="0"/>
-              <a:t>3/6/2016</a:t>
+              <a:t>3/7/2016</a:t>
             </a:fld>
             <a:endParaRPr lang="en-US"/>
           </a:p>
@@ -2548,7 +2552,7 @@
           <a:p>
             <a:fld id="{3EAEFB75-4DE4-4DFC-B956-52D01254B927}" type="datetimeFigureOut">
               <a:rPr lang="en-US" smtClean="0"/>
-              <a:t>3/6/2016</a:t>
+              <a:t>3/7/2016</a:t>
             </a:fld>
             <a:endParaRPr lang="en-US"/>
           </a:p>
@@ -2776,7 +2780,7 @@
           <a:p>
             <a:fld id="{3EAEFB75-4DE4-4DFC-B956-52D01254B927}" type="datetimeFigureOut">
               <a:rPr lang="en-US" smtClean="0"/>
-              <a:t>3/6/2016</a:t>
+              <a:t>3/7/2016</a:t>
             </a:fld>
             <a:endParaRPr lang="en-US"/>
           </a:p>
@@ -3275,7 +3279,7 @@
           <a:p>
             <a:fld id="{3EAEFB75-4DE4-4DFC-B956-52D01254B927}" type="datetimeFigureOut">
               <a:rPr lang="en-US" smtClean="0"/>
-              <a:t>3/6/2016</a:t>
+              <a:t>3/7/2016</a:t>
             </a:fld>
             <a:endParaRPr lang="en-US"/>
           </a:p>
@@ -3910,6 +3914,265 @@
 </p:sld>
 </file>
 
+<file path=ppt/slides/slide10.xml><?xml version="1.0" encoding="utf-8"?>
+<p:sld xmlns:a="http://schemas.openxmlformats.org/drawingml/2006/main" xmlns:r="http://schemas.openxmlformats.org/officeDocument/2006/relationships" xmlns:p="http://schemas.openxmlformats.org/presentationml/2006/main">
+  <p:cSld>
+    <p:spTree>
+      <p:nvGrpSpPr>
+        <p:cNvPr id="1" name=""/>
+        <p:cNvGrpSpPr/>
+        <p:nvPr/>
+      </p:nvGrpSpPr>
+      <p:grpSpPr>
+        <a:xfrm>
+          <a:off x="0" y="0"/>
+          <a:ext cx="0" cy="0"/>
+          <a:chOff x="0" y="0"/>
+          <a:chExt cx="0" cy="0"/>
+        </a:xfrm>
+      </p:grpSpPr>
+      <p:sp>
+        <p:nvSpPr>
+          <p:cNvPr id="2" name="Title 1"/>
+          <p:cNvSpPr>
+            <a:spLocks noGrp="1"/>
+          </p:cNvSpPr>
+          <p:nvPr>
+            <p:ph type="title"/>
+          </p:nvPr>
+        </p:nvSpPr>
+        <p:spPr/>
+        <p:txBody>
+          <a:bodyPr/>
+          <a:lstStyle/>
+          <a:p>
+            <a:r>
+              <a:rPr lang="en-US" dirty="0" smtClean="0"/>
+              <a:t>Concerns &amp; Other Issues</a:t>
+            </a:r>
+            <a:endParaRPr lang="en-US" dirty="0"/>
+          </a:p>
+        </p:txBody>
+      </p:sp>
+      <p:sp>
+        <p:nvSpPr>
+          <p:cNvPr id="3" name="Content Placeholder 2"/>
+          <p:cNvSpPr>
+            <a:spLocks noGrp="1"/>
+          </p:cNvSpPr>
+          <p:nvPr>
+            <p:ph sz="quarter" idx="1"/>
+          </p:nvPr>
+        </p:nvSpPr>
+        <p:spPr/>
+        <p:txBody>
+          <a:bodyPr/>
+          <a:lstStyle/>
+          <a:p>
+            <a:endParaRPr lang="en-US"/>
+          </a:p>
+        </p:txBody>
+      </p:sp>
+    </p:spTree>
+    <p:extLst>
+      <p:ext uri="{BB962C8B-B14F-4D97-AF65-F5344CB8AC3E}">
+        <p14:creationId xmlns:p14="http://schemas.microsoft.com/office/powerpoint/2010/main" val="1604787868"/>
+      </p:ext>
+    </p:extLst>
+  </p:cSld>
+  <p:clrMapOvr>
+    <a:masterClrMapping/>
+  </p:clrMapOvr>
+  <p:timing>
+    <p:tnLst>
+      <p:par>
+        <p:cTn id="1" dur="indefinite" restart="never" nodeType="tmRoot"/>
+      </p:par>
+    </p:tnLst>
+  </p:timing>
+</p:sld>
+</file>
+
+<file path=ppt/slides/slide11.xml><?xml version="1.0" encoding="utf-8"?>
+<p:sld xmlns:a="http://schemas.openxmlformats.org/drawingml/2006/main" xmlns:r="http://schemas.openxmlformats.org/officeDocument/2006/relationships" xmlns:p="http://schemas.openxmlformats.org/presentationml/2006/main">
+  <p:cSld>
+    <p:spTree>
+      <p:nvGrpSpPr>
+        <p:cNvPr id="1" name=""/>
+        <p:cNvGrpSpPr/>
+        <p:nvPr/>
+      </p:nvGrpSpPr>
+      <p:grpSpPr>
+        <a:xfrm>
+          <a:off x="0" y="0"/>
+          <a:ext cx="0" cy="0"/>
+          <a:chOff x="0" y="0"/>
+          <a:chExt cx="0" cy="0"/>
+        </a:xfrm>
+      </p:grpSpPr>
+      <p:sp>
+        <p:nvSpPr>
+          <p:cNvPr id="2" name="Title 1"/>
+          <p:cNvSpPr>
+            <a:spLocks noGrp="1"/>
+          </p:cNvSpPr>
+          <p:nvPr>
+            <p:ph type="title"/>
+          </p:nvPr>
+        </p:nvSpPr>
+        <p:spPr/>
+        <p:txBody>
+          <a:bodyPr/>
+          <a:lstStyle/>
+          <a:p>
+            <a:r>
+              <a:rPr lang="en-US" dirty="0" smtClean="0"/>
+              <a:t>References</a:t>
+            </a:r>
+            <a:endParaRPr lang="en-US" dirty="0"/>
+          </a:p>
+        </p:txBody>
+      </p:sp>
+      <p:sp>
+        <p:nvSpPr>
+          <p:cNvPr id="3" name="Content Placeholder 2"/>
+          <p:cNvSpPr>
+            <a:spLocks noGrp="1"/>
+          </p:cNvSpPr>
+          <p:nvPr>
+            <p:ph sz="quarter" idx="1"/>
+          </p:nvPr>
+        </p:nvSpPr>
+        <p:spPr/>
+        <p:txBody>
+          <a:bodyPr>
+            <a:normAutofit/>
+          </a:bodyPr>
+          <a:lstStyle/>
+          <a:p>
+            <a:r>
+              <a:rPr lang="en-US" sz="1800" dirty="0" smtClean="0"/>
+              <a:t>Slide 3 images are </a:t>
+            </a:r>
+            <a:r>
+              <a:rPr lang="en-US" sz="1800" dirty="0"/>
+              <a:t>from: </a:t>
+            </a:r>
+            <a:endParaRPr lang="en-US" sz="1800" dirty="0" smtClean="0"/>
+          </a:p>
+          <a:p>
+            <a:pPr lvl="1"/>
+            <a:r>
+              <a:rPr lang="en-US" sz="1600" dirty="0" smtClean="0">
+                <a:hlinkClick r:id="rId2"/>
+              </a:rPr>
+              <a:t>http</a:t>
+            </a:r>
+            <a:r>
+              <a:rPr lang="en-US" sz="1600" dirty="0">
+                <a:hlinkClick r:id="rId2"/>
+              </a:rPr>
+              <a:t>://decompressionprosmarketing.com/blogs/decompression-pros/16891112-how-to-ask-for-referrals-from-medical-doctors</a:t>
+            </a:r>
+            <a:endParaRPr lang="en-US" sz="1600" dirty="0"/>
+          </a:p>
+          <a:p>
+            <a:pPr lvl="1"/>
+            <a:r>
+              <a:rPr lang="en-US" sz="1600" dirty="0">
+                <a:hlinkClick r:id="rId3"/>
+              </a:rPr>
+              <a:t>http://www.libertynursingagency.com/</a:t>
+            </a:r>
+            <a:endParaRPr lang="en-US" sz="1600" dirty="0"/>
+          </a:p>
+          <a:p>
+            <a:pPr lvl="1"/>
+            <a:r>
+              <a:rPr lang="en-US" sz="1600" dirty="0">
+                <a:hlinkClick r:id="rId4"/>
+              </a:rPr>
+              <a:t>http://allhealthcare.monster.com/training/articles/1822-5-steps-to-becoming-a-medical-assistant</a:t>
+            </a:r>
+            <a:endParaRPr lang="en-US" sz="1600" dirty="0"/>
+          </a:p>
+          <a:p>
+            <a:pPr lvl="1"/>
+            <a:r>
+              <a:rPr lang="en-US" sz="1600" dirty="0">
+                <a:hlinkClick r:id="rId5"/>
+              </a:rPr>
+              <a:t>http://greenfieldcc.3dcartstores.com/Medical-Coding-and-Billing_p_1058.html</a:t>
+            </a:r>
+            <a:endParaRPr lang="en-US" sz="1600" dirty="0"/>
+          </a:p>
+          <a:p>
+            <a:r>
+              <a:rPr lang="en-US" sz="1800" dirty="0"/>
+              <a:t>Slide 4 Image from:</a:t>
+            </a:r>
+          </a:p>
+          <a:p>
+            <a:pPr lvl="1"/>
+            <a:r>
+              <a:rPr lang="en-US" dirty="0">
+                <a:hlinkClick r:id="rId6"/>
+              </a:rPr>
+              <a:t>https://www.hl7.org/fhir</a:t>
+            </a:r>
+            <a:r>
+              <a:rPr lang="en-US" dirty="0" smtClean="0">
+                <a:hlinkClick r:id="rId6"/>
+              </a:rPr>
+              <a:t>/</a:t>
+            </a:r>
+            <a:endParaRPr lang="en-US" dirty="0" smtClean="0"/>
+          </a:p>
+          <a:p>
+            <a:pPr lvl="1"/>
+            <a:r>
+              <a:rPr lang="en-US" dirty="0">
+                <a:hlinkClick r:id="rId7"/>
+              </a:rPr>
+              <a:t>https://www.python.org</a:t>
+            </a:r>
+            <a:r>
+              <a:rPr lang="en-US" dirty="0" smtClean="0">
+                <a:hlinkClick r:id="rId7"/>
+              </a:rPr>
+              <a:t>/</a:t>
+            </a:r>
+            <a:endParaRPr lang="en-US" dirty="0" smtClean="0"/>
+          </a:p>
+          <a:p>
+            <a:pPr lvl="1"/>
+            <a:endParaRPr lang="en-US" dirty="0" smtClean="0"/>
+          </a:p>
+          <a:p>
+            <a:endParaRPr lang="en-US" dirty="0"/>
+          </a:p>
+        </p:txBody>
+      </p:sp>
+    </p:spTree>
+    <p:extLst>
+      <p:ext uri="{BB962C8B-B14F-4D97-AF65-F5344CB8AC3E}">
+        <p14:creationId xmlns:p14="http://schemas.microsoft.com/office/powerpoint/2010/main" val="2216108734"/>
+      </p:ext>
+    </p:extLst>
+  </p:cSld>
+  <p:clrMapOvr>
+    <a:masterClrMapping/>
+  </p:clrMapOvr>
+  <p:timing>
+    <p:tnLst>
+      <p:par>
+        <p:cTn id="1" dur="indefinite" restart="never" nodeType="tmRoot"/>
+      </p:par>
+    </p:tnLst>
+  </p:timing>
+</p:sld>
+</file>
+
 <file path=ppt/slides/slide2.xml><?xml version="1.0" encoding="utf-8"?>
 <p:sld xmlns:a="http://schemas.openxmlformats.org/drawingml/2006/main" xmlns:r="http://schemas.openxmlformats.org/officeDocument/2006/relationships" xmlns:p="http://schemas.openxmlformats.org/presentationml/2006/main">
   <p:cSld>
@@ -4093,162 +4356,6 @@
           <a:chExt cx="0" cy="0"/>
         </a:xfrm>
       </p:grpSpPr>
-      <p:sp>
-        <p:nvSpPr>
-          <p:cNvPr id="2" name="Title 1"/>
-          <p:cNvSpPr>
-            <a:spLocks noGrp="1"/>
-          </p:cNvSpPr>
-          <p:nvPr>
-            <p:ph type="title"/>
-          </p:nvPr>
-        </p:nvSpPr>
-        <p:spPr>
-          <a:xfrm>
-            <a:off x="304800" y="285750"/>
-            <a:ext cx="5105400" cy="762000"/>
-          </a:xfrm>
-        </p:spPr>
-        <p:txBody>
-          <a:bodyPr/>
-          <a:lstStyle/>
-          <a:p>
-            <a:r>
-              <a:rPr lang="en-US" dirty="0" smtClean="0"/>
-              <a:t>Architecture Diagram</a:t>
-            </a:r>
-            <a:endParaRPr lang="en-US" dirty="0"/>
-          </a:p>
-        </p:txBody>
-      </p:sp>
-      <p:sp>
-        <p:nvSpPr>
-          <p:cNvPr id="5" name="TextBox 4"/>
-          <p:cNvSpPr txBox="1"/>
-          <p:nvPr/>
-        </p:nvSpPr>
-        <p:spPr>
-          <a:xfrm>
-            <a:off x="451338" y="1428749"/>
-            <a:ext cx="3739662" cy="2862322"/>
-          </a:xfrm>
-          <a:prstGeom prst="rect">
-            <a:avLst/>
-          </a:prstGeom>
-          <a:noFill/>
-        </p:spPr>
-        <p:txBody>
-          <a:bodyPr wrap="square" rtlCol="0">
-            <a:spAutoFit/>
-          </a:bodyPr>
-          <a:lstStyle/>
-          <a:p>
-            <a:pPr marL="285750" indent="-285750">
-              <a:buFont typeface="Arial" panose="020B0604020202020204" pitchFamily="34" charset="0"/>
-              <a:buChar char="•"/>
-            </a:pPr>
-            <a:r>
-              <a:rPr lang="en-US" dirty="0" smtClean="0"/>
-              <a:t>Three-Tier Architecture</a:t>
-            </a:r>
-          </a:p>
-          <a:p>
-            <a:pPr marL="742950" lvl="1" indent="-285750">
-              <a:buFont typeface="Arial" panose="020B0604020202020204" pitchFamily="34" charset="0"/>
-              <a:buChar char="•"/>
-            </a:pPr>
-            <a:r>
-              <a:rPr lang="en-US" dirty="0" smtClean="0"/>
-              <a:t>Data Tier</a:t>
-            </a:r>
-          </a:p>
-          <a:p>
-            <a:pPr marL="1200150" lvl="2" indent="-285750">
-              <a:buFont typeface="Arial" panose="020B0604020202020204" pitchFamily="34" charset="0"/>
-              <a:buChar char="•"/>
-            </a:pPr>
-            <a:r>
-              <a:rPr lang="en-US" dirty="0" err="1" smtClean="0"/>
-              <a:t>GaTech</a:t>
-            </a:r>
-            <a:r>
-              <a:rPr lang="en-US" dirty="0" smtClean="0"/>
-              <a:t> FHIR Server</a:t>
-            </a:r>
-          </a:p>
-          <a:p>
-            <a:pPr marL="742950" lvl="1" indent="-285750">
-              <a:buFont typeface="Arial" panose="020B0604020202020204" pitchFamily="34" charset="0"/>
-              <a:buChar char="•"/>
-            </a:pPr>
-            <a:r>
-              <a:rPr lang="en-US" dirty="0" smtClean="0"/>
-              <a:t>Application Tier</a:t>
-            </a:r>
-          </a:p>
-          <a:p>
-            <a:pPr marL="1200150" lvl="2" indent="-285750">
-              <a:buFont typeface="Arial" panose="020B0604020202020204" pitchFamily="34" charset="0"/>
-              <a:buChar char="•"/>
-            </a:pPr>
-            <a:r>
-              <a:rPr lang="en-US" dirty="0" smtClean="0"/>
-              <a:t>Python Code</a:t>
-            </a:r>
-          </a:p>
-          <a:p>
-            <a:pPr marL="742950" lvl="1" indent="-285750">
-              <a:buFont typeface="Arial" panose="020B0604020202020204" pitchFamily="34" charset="0"/>
-              <a:buChar char="•"/>
-            </a:pPr>
-            <a:r>
-              <a:rPr lang="en-US" dirty="0" smtClean="0"/>
-              <a:t>Presentation Tier</a:t>
-            </a:r>
-          </a:p>
-          <a:p>
-            <a:pPr marL="1200150" lvl="2" indent="-285750">
-              <a:buFont typeface="Arial" panose="020B0604020202020204" pitchFamily="34" charset="0"/>
-              <a:buChar char="•"/>
-            </a:pPr>
-            <a:r>
-              <a:rPr lang="en-US" dirty="0" smtClean="0"/>
-              <a:t>Google App Engine</a:t>
-            </a:r>
-          </a:p>
-          <a:p>
-            <a:pPr marL="1200150" lvl="2" indent="-285750">
-              <a:buFont typeface="Arial" panose="020B0604020202020204" pitchFamily="34" charset="0"/>
-              <a:buChar char="•"/>
-            </a:pPr>
-            <a:r>
-              <a:rPr lang="en-US" dirty="0" smtClean="0"/>
-              <a:t>HTML5</a:t>
-            </a:r>
-          </a:p>
-          <a:p>
-            <a:pPr marL="1200150" lvl="2" indent="-285750">
-              <a:buFont typeface="Arial" panose="020B0604020202020204" pitchFamily="34" charset="0"/>
-              <a:buChar char="•"/>
-            </a:pPr>
-            <a:r>
-              <a:rPr lang="en-US" dirty="0" smtClean="0"/>
-              <a:t>CSS</a:t>
-            </a:r>
-          </a:p>
-          <a:p>
-            <a:pPr marL="1200150" lvl="2" indent="-285750">
-              <a:buFont typeface="Arial" panose="020B0604020202020204" pitchFamily="34" charset="0"/>
-              <a:buChar char="•"/>
-            </a:pPr>
-            <a:r>
-              <a:rPr lang="en-US" dirty="0" err="1" smtClean="0"/>
-              <a:t>Javascript</a:t>
-            </a:r>
-            <a:endParaRPr lang="en-US" dirty="0"/>
-          </a:p>
-        </p:txBody>
-      </p:sp>
       <p:pic>
         <p:nvPicPr>
           <p:cNvPr id="3" name="Picture 2"/>
@@ -4271,108 +4378,14 @@
         </p:blipFill>
         <p:spPr>
           <a:xfrm>
-            <a:off x="4114800" y="1123950"/>
-            <a:ext cx="4694327" cy="3699831"/>
+            <a:off x="1371600" y="94806"/>
+            <a:ext cx="6324600" cy="4984729"/>
           </a:xfrm>
           <a:prstGeom prst="rect">
             <a:avLst/>
           </a:prstGeom>
         </p:spPr>
       </p:pic>
-      <p:sp>
-        <p:nvSpPr>
-          <p:cNvPr id="4" name="TextBox 3"/>
-          <p:cNvSpPr txBox="1"/>
-          <p:nvPr/>
-        </p:nvSpPr>
-        <p:spPr>
-          <a:xfrm>
-            <a:off x="198527" y="4248150"/>
-            <a:ext cx="4525873" cy="923330"/>
-          </a:xfrm>
-          <a:prstGeom prst="rect">
-            <a:avLst/>
-          </a:prstGeom>
-          <a:noFill/>
-        </p:spPr>
-        <p:txBody>
-          <a:bodyPr wrap="square" rtlCol="0">
-            <a:spAutoFit/>
-          </a:bodyPr>
-          <a:lstStyle/>
-          <a:p>
-            <a:r>
-              <a:rPr lang="en-US" sz="900" dirty="0" smtClean="0"/>
-              <a:t>Images from</a:t>
-            </a:r>
-            <a:r>
-              <a:rPr lang="en-US" sz="900" dirty="0"/>
-              <a:t>: </a:t>
-            </a:r>
-            <a:r>
-              <a:rPr lang="en-US" sz="900" dirty="0">
-                <a:hlinkClick r:id="rId3"/>
-              </a:rPr>
-              <a:t>http://</a:t>
-            </a:r>
-            <a:r>
-              <a:rPr lang="en-US" sz="900" dirty="0" smtClean="0">
-                <a:hlinkClick r:id="rId3"/>
-              </a:rPr>
-              <a:t>decompressionprosmarketing.com/blogs/decompression-pros/16891112-how-to-ask-for-referrals-from-medical-doctors</a:t>
-            </a:r>
-            <a:endParaRPr lang="en-US" sz="900" dirty="0" smtClean="0"/>
-          </a:p>
-          <a:p>
-            <a:r>
-              <a:rPr lang="en-US" sz="900" dirty="0">
-                <a:hlinkClick r:id="rId4"/>
-              </a:rPr>
-              <a:t>http://www.libertynursingagency.com</a:t>
-            </a:r>
-            <a:r>
-              <a:rPr lang="en-US" sz="900" dirty="0" smtClean="0">
-                <a:hlinkClick r:id="rId4"/>
-              </a:rPr>
-              <a:t>/</a:t>
-            </a:r>
-            <a:endParaRPr lang="en-US" sz="900" dirty="0" smtClean="0"/>
-          </a:p>
-          <a:p>
-            <a:r>
-              <a:rPr lang="en-US" sz="900" dirty="0">
-                <a:hlinkClick r:id="rId5"/>
-              </a:rPr>
-              <a:t>http://</a:t>
-            </a:r>
-            <a:r>
-              <a:rPr lang="en-US" sz="900" dirty="0" smtClean="0">
-                <a:hlinkClick r:id="rId5"/>
-              </a:rPr>
-              <a:t>allhealthcare.monster.com/training/articles/1822-5-steps-to-becoming-a-medical-assistant</a:t>
-            </a:r>
-            <a:endParaRPr lang="en-US" sz="900" dirty="0" smtClean="0"/>
-          </a:p>
-          <a:p>
-            <a:r>
-              <a:rPr lang="en-US" sz="900" dirty="0">
-                <a:hlinkClick r:id="rId6"/>
-              </a:rPr>
-              <a:t>http://</a:t>
-            </a:r>
-            <a:r>
-              <a:rPr lang="en-US" sz="900" dirty="0" smtClean="0">
-                <a:hlinkClick r:id="rId6"/>
-              </a:rPr>
-              <a:t>greenfieldcc.3dcartstores.com/Medical-Coding-and-Billing_p_1058.html</a:t>
-            </a:r>
-            <a:endParaRPr lang="en-US" sz="900" dirty="0" smtClean="0"/>
-          </a:p>
-          <a:p>
-            <a:endParaRPr lang="en-US" sz="900" dirty="0"/>
-          </a:p>
-        </p:txBody>
-      </p:sp>
     </p:spTree>
     <p:extLst>
       <p:ext uri="{BB962C8B-B14F-4D97-AF65-F5344CB8AC3E}">
@@ -4420,34 +4433,332 @@
             <p:ph type="title"/>
           </p:nvPr>
         </p:nvSpPr>
-        <p:spPr/>
-        <p:txBody>
-          <a:bodyPr/>
-          <a:lstStyle/>
-          <a:p>
-            <a:endParaRPr lang="en-US"/>
-          </a:p>
-        </p:txBody>
-      </p:sp>
-      <p:sp>
-        <p:nvSpPr>
-          <p:cNvPr id="3" name="Content Placeholder 2"/>
-          <p:cNvSpPr>
-            <a:spLocks noGrp="1"/>
-          </p:cNvSpPr>
-          <p:nvPr>
-            <p:ph sz="quarter" idx="1"/>
-          </p:nvPr>
-        </p:nvSpPr>
-        <p:spPr/>
-        <p:txBody>
-          <a:bodyPr/>
-          <a:lstStyle/>
-          <a:p>
-            <a:endParaRPr lang="en-US"/>
-          </a:p>
-        </p:txBody>
-      </p:sp>
+        <p:spPr>
+          <a:xfrm>
+            <a:off x="846839" y="41201"/>
+            <a:ext cx="7772400" cy="857250"/>
+          </a:xfrm>
+        </p:spPr>
+        <p:txBody>
+          <a:bodyPr>
+            <a:normAutofit fontScale="90000"/>
+          </a:bodyPr>
+          <a:lstStyle/>
+          <a:p>
+            <a:r>
+              <a:rPr lang="en-US" dirty="0" smtClean="0"/>
+              <a:t>Implementation Tools &amp; Languages</a:t>
+            </a:r>
+            <a:endParaRPr lang="en-US" dirty="0"/>
+          </a:p>
+        </p:txBody>
+      </p:sp>
+      <p:sp>
+        <p:nvSpPr>
+          <p:cNvPr id="4" name="TextBox 3"/>
+          <p:cNvSpPr txBox="1"/>
+          <p:nvPr/>
+        </p:nvSpPr>
+        <p:spPr>
+          <a:xfrm>
+            <a:off x="914400" y="1115089"/>
+            <a:ext cx="3739662" cy="3139321"/>
+          </a:xfrm>
+          <a:prstGeom prst="rect">
+            <a:avLst/>
+          </a:prstGeom>
+          <a:noFill/>
+        </p:spPr>
+        <p:txBody>
+          <a:bodyPr wrap="square" rtlCol="0">
+            <a:spAutoFit/>
+          </a:bodyPr>
+          <a:lstStyle/>
+          <a:p>
+            <a:pPr marL="285750" indent="-285750">
+              <a:buFont typeface="Arial" panose="020B0604020202020204" pitchFamily="34" charset="0"/>
+              <a:buChar char="•"/>
+            </a:pPr>
+            <a:r>
+              <a:rPr lang="en-US" dirty="0" smtClean="0"/>
+              <a:t>Data </a:t>
+            </a:r>
+            <a:r>
+              <a:rPr lang="en-US" dirty="0" smtClean="0"/>
+              <a:t>Tier</a:t>
+            </a:r>
+          </a:p>
+          <a:p>
+            <a:pPr marL="742950" lvl="1" indent="-285750">
+              <a:buFont typeface="Arial" panose="020B0604020202020204" pitchFamily="34" charset="0"/>
+              <a:buChar char="•"/>
+            </a:pPr>
+            <a:r>
+              <a:rPr lang="en-US" dirty="0" err="1" smtClean="0"/>
+              <a:t>GaTech</a:t>
+            </a:r>
+            <a:r>
+              <a:rPr lang="en-US" dirty="0" smtClean="0"/>
+              <a:t> FHIR Server</a:t>
+            </a:r>
+          </a:p>
+          <a:p>
+            <a:pPr marL="285750" indent="-285750">
+              <a:buFont typeface="Arial" panose="020B0604020202020204" pitchFamily="34" charset="0"/>
+              <a:buChar char="•"/>
+            </a:pPr>
+            <a:endParaRPr lang="en-US" dirty="0" smtClean="0"/>
+          </a:p>
+          <a:p>
+            <a:pPr marL="285750" indent="-285750">
+              <a:buFont typeface="Arial" panose="020B0604020202020204" pitchFamily="34" charset="0"/>
+              <a:buChar char="•"/>
+            </a:pPr>
+            <a:r>
+              <a:rPr lang="en-US" dirty="0" smtClean="0"/>
+              <a:t>Application </a:t>
+            </a:r>
+            <a:r>
+              <a:rPr lang="en-US" dirty="0" smtClean="0"/>
+              <a:t>Tier</a:t>
+            </a:r>
+          </a:p>
+          <a:p>
+            <a:pPr marL="742950" lvl="1" indent="-285750">
+              <a:buFont typeface="Arial" panose="020B0604020202020204" pitchFamily="34" charset="0"/>
+              <a:buChar char="•"/>
+            </a:pPr>
+            <a:r>
+              <a:rPr lang="en-US" dirty="0" smtClean="0"/>
+              <a:t>Python Code</a:t>
+            </a:r>
+          </a:p>
+          <a:p>
+            <a:pPr marL="285750" indent="-285750">
+              <a:buFont typeface="Arial" panose="020B0604020202020204" pitchFamily="34" charset="0"/>
+              <a:buChar char="•"/>
+            </a:pPr>
+            <a:endParaRPr lang="en-US" dirty="0" smtClean="0"/>
+          </a:p>
+          <a:p>
+            <a:pPr marL="285750" indent="-285750">
+              <a:buFont typeface="Arial" panose="020B0604020202020204" pitchFamily="34" charset="0"/>
+              <a:buChar char="•"/>
+            </a:pPr>
+            <a:r>
+              <a:rPr lang="en-US" dirty="0" smtClean="0"/>
+              <a:t>Presentation </a:t>
+            </a:r>
+            <a:r>
+              <a:rPr lang="en-US" dirty="0" smtClean="0"/>
+              <a:t>Tier</a:t>
+            </a:r>
+          </a:p>
+          <a:p>
+            <a:pPr marL="742950" lvl="1" indent="-285750">
+              <a:buFont typeface="Arial" panose="020B0604020202020204" pitchFamily="34" charset="0"/>
+              <a:buChar char="•"/>
+            </a:pPr>
+            <a:r>
+              <a:rPr lang="en-US" dirty="0" smtClean="0"/>
+              <a:t>Google App Engine</a:t>
+            </a:r>
+          </a:p>
+          <a:p>
+            <a:pPr marL="742950" lvl="1" indent="-285750">
+              <a:buFont typeface="Arial" panose="020B0604020202020204" pitchFamily="34" charset="0"/>
+              <a:buChar char="•"/>
+            </a:pPr>
+            <a:r>
+              <a:rPr lang="en-US" dirty="0" smtClean="0"/>
+              <a:t>HTML5</a:t>
+            </a:r>
+          </a:p>
+          <a:p>
+            <a:pPr marL="742950" lvl="1" indent="-285750">
+              <a:buFont typeface="Arial" panose="020B0604020202020204" pitchFamily="34" charset="0"/>
+              <a:buChar char="•"/>
+            </a:pPr>
+            <a:r>
+              <a:rPr lang="en-US" dirty="0" smtClean="0"/>
+              <a:t>CSS</a:t>
+            </a:r>
+          </a:p>
+          <a:p>
+            <a:pPr marL="742950" lvl="1" indent="-285750">
+              <a:buFont typeface="Arial" panose="020B0604020202020204" pitchFamily="34" charset="0"/>
+              <a:buChar char="•"/>
+            </a:pPr>
+            <a:r>
+              <a:rPr lang="en-US" dirty="0" smtClean="0"/>
+              <a:t>JavaScript</a:t>
+            </a:r>
+            <a:endParaRPr lang="en-US" dirty="0"/>
+          </a:p>
+        </p:txBody>
+      </p:sp>
+      <p:pic>
+        <p:nvPicPr>
+          <p:cNvPr id="1026" name="Picture 2"/>
+          <p:cNvPicPr>
+            <a:picLocks noChangeAspect="1" noChangeArrowheads="1"/>
+          </p:cNvPicPr>
+          <p:nvPr/>
+        </p:nvPicPr>
+        <p:blipFill>
+          <a:blip r:embed="rId2">
+            <a:extLst>
+              <a:ext uri="{28A0092B-C50C-407E-A947-70E740481C1C}">
+                <a14:useLocalDpi xmlns:a14="http://schemas.microsoft.com/office/drawing/2010/main" val="0"/>
+              </a:ext>
+            </a:extLst>
+          </a:blip>
+          <a:srcRect/>
+          <a:stretch>
+            <a:fillRect/>
+          </a:stretch>
+        </p:blipFill>
+        <p:spPr bwMode="auto">
+          <a:xfrm>
+            <a:off x="4114800" y="1115089"/>
+            <a:ext cx="1685925" cy="742950"/>
+          </a:xfrm>
+          <a:prstGeom prst="rect">
+            <a:avLst/>
+          </a:prstGeom>
+          <a:noFill/>
+          <a:ln>
+            <a:noFill/>
+          </a:ln>
+          <a:extLst>
+            <a:ext uri="{909E8E84-426E-40DD-AFC4-6F175D3DCCD1}">
+              <a14:hiddenFill xmlns:a14="http://schemas.microsoft.com/office/drawing/2010/main">
+                <a:solidFill>
+                  <a:schemeClr val="accent1"/>
+                </a:solidFill>
+              </a14:hiddenFill>
+            </a:ext>
+            <a:ext uri="{91240B29-F687-4F45-9708-019B960494DF}">
+              <a14:hiddenLine xmlns:a14="http://schemas.microsoft.com/office/drawing/2010/main" w="9525">
+                <a:solidFill>
+                  <a:schemeClr val="tx1"/>
+                </a:solidFill>
+                <a:miter lim="800000"/>
+                <a:headEnd/>
+                <a:tailEnd/>
+              </a14:hiddenLine>
+            </a:ext>
+          </a:extLst>
+        </p:spPr>
+      </p:pic>
+      <p:pic>
+        <p:nvPicPr>
+          <p:cNvPr id="1027" name="Picture 3"/>
+          <p:cNvPicPr>
+            <a:picLocks noChangeAspect="1" noChangeArrowheads="1"/>
+          </p:cNvPicPr>
+          <p:nvPr/>
+        </p:nvPicPr>
+        <p:blipFill>
+          <a:blip r:embed="rId3">
+            <a:extLst>
+              <a:ext uri="{28A0092B-C50C-407E-A947-70E740481C1C}">
+                <a14:useLocalDpi xmlns:a14="http://schemas.microsoft.com/office/drawing/2010/main" val="0"/>
+              </a:ext>
+            </a:extLst>
+          </a:blip>
+          <a:srcRect/>
+          <a:stretch>
+            <a:fillRect/>
+          </a:stretch>
+        </p:blipFill>
+        <p:spPr bwMode="auto">
+          <a:xfrm>
+            <a:off x="3628140" y="2114550"/>
+            <a:ext cx="2209799" cy="670465"/>
+          </a:xfrm>
+          <a:prstGeom prst="rect">
+            <a:avLst/>
+          </a:prstGeom>
+          <a:noFill/>
+          <a:ln>
+            <a:noFill/>
+          </a:ln>
+          <a:extLst>
+            <a:ext uri="{909E8E84-426E-40DD-AFC4-6F175D3DCCD1}">
+              <a14:hiddenFill xmlns:a14="http://schemas.microsoft.com/office/drawing/2010/main">
+                <a:solidFill>
+                  <a:schemeClr val="accent1"/>
+                </a:solidFill>
+              </a14:hiddenFill>
+            </a:ext>
+            <a:ext uri="{91240B29-F687-4F45-9708-019B960494DF}">
+              <a14:hiddenLine xmlns:a14="http://schemas.microsoft.com/office/drawing/2010/main" w="9525">
+                <a:solidFill>
+                  <a:schemeClr val="tx1"/>
+                </a:solidFill>
+                <a:miter lim="800000"/>
+                <a:headEnd/>
+                <a:tailEnd/>
+              </a14:hiddenLine>
+            </a:ext>
+          </a:extLst>
+        </p:spPr>
+      </p:pic>
+      <p:pic>
+        <p:nvPicPr>
+          <p:cNvPr id="1028" name="Picture 4"/>
+          <p:cNvPicPr>
+            <a:picLocks noChangeAspect="1" noChangeArrowheads="1"/>
+          </p:cNvPicPr>
+          <p:nvPr/>
+        </p:nvPicPr>
+        <p:blipFill>
+          <a:blip r:embed="rId4">
+            <a:extLst>
+              <a:ext uri="{28A0092B-C50C-407E-A947-70E740481C1C}">
+                <a14:useLocalDpi xmlns:a14="http://schemas.microsoft.com/office/drawing/2010/main" val="0"/>
+              </a:ext>
+            </a:extLst>
+          </a:blip>
+          <a:srcRect/>
+          <a:stretch>
+            <a:fillRect/>
+          </a:stretch>
+        </p:blipFill>
+        <p:spPr bwMode="auto">
+          <a:xfrm>
+            <a:off x="3827721" y="3163343"/>
+            <a:ext cx="4705350" cy="746366"/>
+          </a:xfrm>
+          <a:prstGeom prst="rect">
+            <a:avLst/>
+          </a:prstGeom>
+          <a:noFill/>
+          <a:ln>
+            <a:noFill/>
+          </a:ln>
+          <a:extLst>
+            <a:ext uri="{909E8E84-426E-40DD-AFC4-6F175D3DCCD1}">
+              <a14:hiddenFill xmlns:a14="http://schemas.microsoft.com/office/drawing/2010/main">
+                <a:solidFill>
+                  <a:schemeClr val="accent1"/>
+                </a:solidFill>
+              </a14:hiddenFill>
+            </a:ext>
+            <a:ext uri="{91240B29-F687-4F45-9708-019B960494DF}">
+              <a14:hiddenLine xmlns:a14="http://schemas.microsoft.com/office/drawing/2010/main" w="9525">
+                <a:solidFill>
+                  <a:schemeClr val="tx1"/>
+                </a:solidFill>
+                <a:miter lim="800000"/>
+                <a:headEnd/>
+                <a:tailEnd/>
+              </a14:hiddenLine>
+            </a:ext>
+          </a:extLst>
+        </p:spPr>
+      </p:pic>
     </p:spTree>
     <p:extLst>
       <p:ext uri="{BB962C8B-B14F-4D97-AF65-F5344CB8AC3E}">
@@ -4485,44 +4796,60 @@
           <a:chExt cx="0" cy="0"/>
         </a:xfrm>
       </p:grpSpPr>
-      <p:sp>
-        <p:nvSpPr>
-          <p:cNvPr id="2" name="Title 1"/>
-          <p:cNvSpPr>
-            <a:spLocks noGrp="1"/>
-          </p:cNvSpPr>
-          <p:nvPr>
-            <p:ph type="title"/>
-          </p:nvPr>
-        </p:nvSpPr>
-        <p:spPr/>
-        <p:txBody>
-          <a:bodyPr/>
-          <a:lstStyle/>
-          <a:p>
-            <a:endParaRPr lang="en-US"/>
-          </a:p>
-        </p:txBody>
-      </p:sp>
-      <p:sp>
-        <p:nvSpPr>
-          <p:cNvPr id="3" name="Content Placeholder 2"/>
-          <p:cNvSpPr>
-            <a:spLocks noGrp="1"/>
-          </p:cNvSpPr>
-          <p:nvPr>
-            <p:ph sz="quarter" idx="1"/>
-          </p:nvPr>
-        </p:nvSpPr>
-        <p:spPr/>
-        <p:txBody>
-          <a:bodyPr/>
-          <a:lstStyle/>
-          <a:p>
-            <a:endParaRPr lang="en-US"/>
-          </a:p>
-        </p:txBody>
-      </p:sp>
+      <p:pic>
+        <p:nvPicPr>
+          <p:cNvPr id="2050" name="Picture 2"/>
+          <p:cNvPicPr>
+            <a:picLocks noChangeAspect="1" noChangeArrowheads="1"/>
+          </p:cNvPicPr>
+          <p:nvPr/>
+        </p:nvPicPr>
+        <p:blipFill>
+          <a:blip r:embed="rId2">
+            <a:extLst>
+              <a:ext uri="{28A0092B-C50C-407E-A947-70E740481C1C}">
+                <a14:useLocalDpi xmlns:a14="http://schemas.microsoft.com/office/drawing/2010/main" val="0"/>
+              </a:ext>
+            </a:extLst>
+          </a:blip>
+          <a:srcRect/>
+          <a:stretch>
+            <a:fillRect/>
+          </a:stretch>
+        </p:blipFill>
+        <p:spPr bwMode="auto">
+          <a:xfrm>
+            <a:off x="1689538" y="140576"/>
+            <a:ext cx="6159062" cy="4835355"/>
+          </a:xfrm>
+          <a:prstGeom prst="rect">
+            <a:avLst/>
+          </a:prstGeom>
+          <a:noFill/>
+          <a:ln>
+            <a:noFill/>
+          </a:ln>
+          <a:extLst>
+            <a:ext uri="{909E8E84-426E-40DD-AFC4-6F175D3DCCD1}">
+              <a14:hiddenFill xmlns:a14="http://schemas.microsoft.com/office/drawing/2010/main">
+                <a:solidFill>
+                  <a:schemeClr val="accent1"/>
+                </a:solidFill>
+              </a14:hiddenFill>
+            </a:ext>
+            <a:ext uri="{91240B29-F687-4F45-9708-019B960494DF}">
+              <a14:hiddenLine xmlns:a14="http://schemas.microsoft.com/office/drawing/2010/main" w="9525">
+                <a:solidFill>
+                  <a:schemeClr val="tx1"/>
+                </a:solidFill>
+                <a:miter lim="800000"/>
+                <a:headEnd/>
+                <a:tailEnd/>
+              </a14:hiddenLine>
+            </a:ext>
+          </a:extLst>
+        </p:spPr>
+      </p:pic>
     </p:spTree>
     <p:extLst>
       <p:ext uri="{BB962C8B-B14F-4D97-AF65-F5344CB8AC3E}">
@@ -4560,48 +4887,64 @@
           <a:chExt cx="0" cy="0"/>
         </a:xfrm>
       </p:grpSpPr>
-      <p:sp>
-        <p:nvSpPr>
-          <p:cNvPr id="2" name="Title 1"/>
-          <p:cNvSpPr>
-            <a:spLocks noGrp="1"/>
-          </p:cNvSpPr>
-          <p:nvPr>
-            <p:ph type="title"/>
-          </p:nvPr>
-        </p:nvSpPr>
-        <p:spPr/>
-        <p:txBody>
-          <a:bodyPr/>
-          <a:lstStyle/>
-          <a:p>
-            <a:endParaRPr lang="en-US"/>
-          </a:p>
-        </p:txBody>
-      </p:sp>
-      <p:sp>
-        <p:nvSpPr>
-          <p:cNvPr id="3" name="Content Placeholder 2"/>
-          <p:cNvSpPr>
-            <a:spLocks noGrp="1"/>
-          </p:cNvSpPr>
-          <p:nvPr>
-            <p:ph sz="quarter" idx="1"/>
-          </p:nvPr>
-        </p:nvSpPr>
-        <p:spPr/>
-        <p:txBody>
-          <a:bodyPr/>
-          <a:lstStyle/>
-          <a:p>
-            <a:endParaRPr lang="en-US"/>
-          </a:p>
-        </p:txBody>
-      </p:sp>
+      <p:pic>
+        <p:nvPicPr>
+          <p:cNvPr id="3074" name="Picture 2"/>
+          <p:cNvPicPr>
+            <a:picLocks noChangeAspect="1" noChangeArrowheads="1"/>
+          </p:cNvPicPr>
+          <p:nvPr/>
+        </p:nvPicPr>
+        <p:blipFill>
+          <a:blip r:embed="rId2">
+            <a:extLst>
+              <a:ext uri="{28A0092B-C50C-407E-A947-70E740481C1C}">
+                <a14:useLocalDpi xmlns:a14="http://schemas.microsoft.com/office/drawing/2010/main" val="0"/>
+              </a:ext>
+            </a:extLst>
+          </a:blip>
+          <a:srcRect/>
+          <a:stretch>
+            <a:fillRect/>
+          </a:stretch>
+        </p:blipFill>
+        <p:spPr bwMode="auto">
+          <a:xfrm>
+            <a:off x="1371600" y="67003"/>
+            <a:ext cx="6477000" cy="5008109"/>
+          </a:xfrm>
+          <a:prstGeom prst="rect">
+            <a:avLst/>
+          </a:prstGeom>
+          <a:noFill/>
+          <a:ln>
+            <a:noFill/>
+          </a:ln>
+          <a:extLst>
+            <a:ext uri="{909E8E84-426E-40DD-AFC4-6F175D3DCCD1}">
+              <a14:hiddenFill xmlns:a14="http://schemas.microsoft.com/office/drawing/2010/main">
+                <a:solidFill>
+                  <a:schemeClr val="accent1"/>
+                </a:solidFill>
+              </a14:hiddenFill>
+            </a:ext>
+            <a:ext uri="{91240B29-F687-4F45-9708-019B960494DF}">
+              <a14:hiddenLine xmlns:a14="http://schemas.microsoft.com/office/drawing/2010/main" w="9525">
+                <a:solidFill>
+                  <a:schemeClr val="tx1"/>
+                </a:solidFill>
+                <a:miter lim="800000"/>
+                <a:headEnd/>
+                <a:tailEnd/>
+              </a14:hiddenLine>
+            </a:ext>
+          </a:extLst>
+        </p:spPr>
+      </p:pic>
     </p:spTree>
     <p:extLst>
       <p:ext uri="{BB962C8B-B14F-4D97-AF65-F5344CB8AC3E}">
-        <p14:creationId xmlns:p14="http://schemas.microsoft.com/office/powerpoint/2010/main" val="2216108734"/>
+        <p14:creationId xmlns:p14="http://schemas.microsoft.com/office/powerpoint/2010/main" val="2110889011"/>
       </p:ext>
     </p:extLst>
   </p:cSld>
@@ -4635,6 +4978,188 @@
           <a:chExt cx="0" cy="0"/>
         </a:xfrm>
       </p:grpSpPr>
+      <p:pic>
+        <p:nvPicPr>
+          <p:cNvPr id="4098" name="Picture 2"/>
+          <p:cNvPicPr>
+            <a:picLocks noChangeAspect="1" noChangeArrowheads="1"/>
+          </p:cNvPicPr>
+          <p:nvPr/>
+        </p:nvPicPr>
+        <p:blipFill>
+          <a:blip r:embed="rId2">
+            <a:extLst>
+              <a:ext uri="{28A0092B-C50C-407E-A947-70E740481C1C}">
+                <a14:useLocalDpi xmlns:a14="http://schemas.microsoft.com/office/drawing/2010/main" val="0"/>
+              </a:ext>
+            </a:extLst>
+          </a:blip>
+          <a:srcRect/>
+          <a:stretch>
+            <a:fillRect/>
+          </a:stretch>
+        </p:blipFill>
+        <p:spPr bwMode="auto">
+          <a:xfrm>
+            <a:off x="1295400" y="70712"/>
+            <a:ext cx="6400800" cy="4951022"/>
+          </a:xfrm>
+          <a:prstGeom prst="rect">
+            <a:avLst/>
+          </a:prstGeom>
+          <a:noFill/>
+          <a:ln>
+            <a:noFill/>
+          </a:ln>
+          <a:extLst>
+            <a:ext uri="{909E8E84-426E-40DD-AFC4-6F175D3DCCD1}">
+              <a14:hiddenFill xmlns:a14="http://schemas.microsoft.com/office/drawing/2010/main">
+                <a:solidFill>
+                  <a:schemeClr val="accent1"/>
+                </a:solidFill>
+              </a14:hiddenFill>
+            </a:ext>
+            <a:ext uri="{91240B29-F687-4F45-9708-019B960494DF}">
+              <a14:hiddenLine xmlns:a14="http://schemas.microsoft.com/office/drawing/2010/main" w="9525">
+                <a:solidFill>
+                  <a:schemeClr val="tx1"/>
+                </a:solidFill>
+                <a:miter lim="800000"/>
+                <a:headEnd/>
+                <a:tailEnd/>
+              </a14:hiddenLine>
+            </a:ext>
+          </a:extLst>
+        </p:spPr>
+      </p:pic>
+    </p:spTree>
+    <p:extLst>
+      <p:ext uri="{BB962C8B-B14F-4D97-AF65-F5344CB8AC3E}">
+        <p14:creationId xmlns:p14="http://schemas.microsoft.com/office/powerpoint/2010/main" val="2110889011"/>
+      </p:ext>
+    </p:extLst>
+  </p:cSld>
+  <p:clrMapOvr>
+    <a:masterClrMapping/>
+  </p:clrMapOvr>
+  <p:timing>
+    <p:tnLst>
+      <p:par>
+        <p:cTn id="1" dur="indefinite" restart="never" nodeType="tmRoot"/>
+      </p:par>
+    </p:tnLst>
+  </p:timing>
+</p:sld>
+</file>
+
+<file path=ppt/slides/slide8.xml><?xml version="1.0" encoding="utf-8"?>
+<p:sld xmlns:a="http://schemas.openxmlformats.org/drawingml/2006/main" xmlns:r="http://schemas.openxmlformats.org/officeDocument/2006/relationships" xmlns:p="http://schemas.openxmlformats.org/presentationml/2006/main">
+  <p:cSld>
+    <p:spTree>
+      <p:nvGrpSpPr>
+        <p:cNvPr id="1" name=""/>
+        <p:cNvGrpSpPr/>
+        <p:nvPr/>
+      </p:nvGrpSpPr>
+      <p:grpSpPr>
+        <a:xfrm>
+          <a:off x="0" y="0"/>
+          <a:ext cx="0" cy="0"/>
+          <a:chOff x="0" y="0"/>
+          <a:chExt cx="0" cy="0"/>
+        </a:xfrm>
+      </p:grpSpPr>
+      <p:pic>
+        <p:nvPicPr>
+          <p:cNvPr id="5122" name="Picture 2"/>
+          <p:cNvPicPr>
+            <a:picLocks noChangeAspect="1" noChangeArrowheads="1"/>
+          </p:cNvPicPr>
+          <p:nvPr/>
+        </p:nvPicPr>
+        <p:blipFill>
+          <a:blip r:embed="rId2">
+            <a:extLst>
+              <a:ext uri="{28A0092B-C50C-407E-A947-70E740481C1C}">
+                <a14:useLocalDpi xmlns:a14="http://schemas.microsoft.com/office/drawing/2010/main" val="0"/>
+              </a:ext>
+            </a:extLst>
+          </a:blip>
+          <a:srcRect/>
+          <a:stretch>
+            <a:fillRect/>
+          </a:stretch>
+        </p:blipFill>
+        <p:spPr bwMode="auto">
+          <a:xfrm>
+            <a:off x="1371600" y="133350"/>
+            <a:ext cx="6082576" cy="4781550"/>
+          </a:xfrm>
+          <a:prstGeom prst="rect">
+            <a:avLst/>
+          </a:prstGeom>
+          <a:noFill/>
+          <a:ln>
+            <a:noFill/>
+          </a:ln>
+          <a:extLst>
+            <a:ext uri="{909E8E84-426E-40DD-AFC4-6F175D3DCCD1}">
+              <a14:hiddenFill xmlns:a14="http://schemas.microsoft.com/office/drawing/2010/main">
+                <a:solidFill>
+                  <a:schemeClr val="accent1"/>
+                </a:solidFill>
+              </a14:hiddenFill>
+            </a:ext>
+            <a:ext uri="{91240B29-F687-4F45-9708-019B960494DF}">
+              <a14:hiddenLine xmlns:a14="http://schemas.microsoft.com/office/drawing/2010/main" w="9525">
+                <a:solidFill>
+                  <a:schemeClr val="tx1"/>
+                </a:solidFill>
+                <a:miter lim="800000"/>
+                <a:headEnd/>
+                <a:tailEnd/>
+              </a14:hiddenLine>
+            </a:ext>
+          </a:extLst>
+        </p:spPr>
+      </p:pic>
+    </p:spTree>
+    <p:extLst>
+      <p:ext uri="{BB962C8B-B14F-4D97-AF65-F5344CB8AC3E}">
+        <p14:creationId xmlns:p14="http://schemas.microsoft.com/office/powerpoint/2010/main" val="1604787868"/>
+      </p:ext>
+    </p:extLst>
+  </p:cSld>
+  <p:clrMapOvr>
+    <a:masterClrMapping/>
+  </p:clrMapOvr>
+  <p:timing>
+    <p:tnLst>
+      <p:par>
+        <p:cTn id="1" dur="indefinite" restart="never" nodeType="tmRoot"/>
+      </p:par>
+    </p:tnLst>
+  </p:timing>
+</p:sld>
+</file>
+
+<file path=ppt/slides/slide9.xml><?xml version="1.0" encoding="utf-8"?>
+<p:sld xmlns:a="http://schemas.openxmlformats.org/drawingml/2006/main" xmlns:r="http://schemas.openxmlformats.org/officeDocument/2006/relationships" xmlns:p="http://schemas.openxmlformats.org/presentationml/2006/main">
+  <p:cSld>
+    <p:spTree>
+      <p:nvGrpSpPr>
+        <p:cNvPr id="1" name=""/>
+        <p:cNvGrpSpPr/>
+        <p:nvPr/>
+      </p:nvGrpSpPr>
+      <p:grpSpPr>
+        <a:xfrm>
+          <a:off x="0" y="0"/>
+          <a:ext cx="0" cy="0"/>
+          <a:chOff x="0" y="0"/>
+          <a:chExt cx="0" cy="0"/>
+        </a:xfrm>
+      </p:grpSpPr>
       <p:sp>
         <p:nvSpPr>
           <p:cNvPr id="2" name="Title 1"/>
@@ -4650,7 +5175,11 @@
           <a:bodyPr/>
           <a:lstStyle/>
           <a:p>
-            <a:endParaRPr lang="en-US"/>
+            <a:r>
+              <a:rPr lang="en-US" dirty="0" smtClean="0"/>
+              <a:t>Updated Gantt Chart</a:t>
+            </a:r>
+            <a:endParaRPr lang="en-US" dirty="0"/>
           </a:p>
         </p:txBody>
       </p:sp>

</xml_diff>

<commit_message>
update with Gantt Chart
</commit_message>
<xml_diff>
--- a/Team Deliverable 2/Technical Presentation - FHIRed Up.pptx
+++ b/Team Deliverable 2/Technical Presentation - FHIRed Up.pptx
@@ -116,7 +116,7 @@
   </p:defaultTextStyle>
   <p:extLst>
     <p:ext uri="{EFAFB233-063F-42B5-8137-9DF3F51BA10A}">
-      <p15:sldGuideLst xmlns:p15="http://schemas.microsoft.com/office/powerpoint/2012/main" xmlns="">
+      <p15:sldGuideLst xmlns="" xmlns:p15="http://schemas.microsoft.com/office/powerpoint/2012/main">
         <p15:guide id="1" orient="horz" pos="1620">
           <p15:clr>
             <a:srgbClr val="A4A3A4"/>
@@ -137,6 +137,1330 @@
 <p:cmAuthorLst xmlns:a="http://schemas.openxmlformats.org/drawingml/2006/main" xmlns:r="http://schemas.openxmlformats.org/officeDocument/2006/relationships" xmlns:p="http://schemas.openxmlformats.org/presentationml/2006/main">
   <p:cmAuthor id="0" name="Tala M. Suidan" initials="TMS" lastIdx="2" clrIdx="0"/>
 </p:cmAuthorLst>
+</file>
+
+<file path=ppt/charts/chart1.xml><?xml version="1.0" encoding="utf-8"?>
+<c:chartSpace xmlns:c="http://schemas.openxmlformats.org/drawingml/2006/chart" xmlns:a="http://schemas.openxmlformats.org/drawingml/2006/main" xmlns:r="http://schemas.openxmlformats.org/officeDocument/2006/relationships">
+  <c:date1904 val="0"/>
+  <c:lang val="en-US"/>
+  <c:roundedCorners val="0"/>
+  <mc:AlternateContent xmlns:mc="http://schemas.openxmlformats.org/markup-compatibility/2006">
+    <mc:Choice xmlns:c14="http://schemas.microsoft.com/office/drawing/2007/8/2/chart" Requires="c14">
+      <c14:style val="102"/>
+    </mc:Choice>
+    <mc:Fallback>
+      <c:style val="2"/>
+    </mc:Fallback>
+  </mc:AlternateContent>
+  <c:chart>
+    <c:autoTitleDeleted val="0"/>
+    <c:plotArea>
+      <c:layout>
+        <c:manualLayout>
+          <c:layoutTarget val="inner"/>
+          <c:xMode val="edge"/>
+          <c:yMode val="edge"/>
+          <c:x val="1.6865992026985587E-2"/>
+          <c:y val="3.0128731854286498E-2"/>
+          <c:w val="0.96626801594602885"/>
+          <c:h val="0.79717432609337968"/>
+        </c:manualLayout>
+      </c:layout>
+      <c:scatterChart>
+        <c:scatterStyle val="lineMarker"/>
+        <c:varyColors val="0"/>
+        <c:ser>
+          <c:idx val="0"/>
+          <c:order val="0"/>
+          <c:tx>
+            <c:strRef>
+              <c:f>Sheet1!$A$4</c:f>
+              <c:strCache>
+                <c:ptCount val="1"/>
+                <c:pt idx="0">
+                  <c:v>   Scope</c:v>
+                </c:pt>
+              </c:strCache>
+            </c:strRef>
+          </c:tx>
+          <c:spPr>
+            <a:ln w="50800">
+              <a:solidFill>
+                <a:srgbClr val="7030A0"/>
+              </a:solidFill>
+            </a:ln>
+          </c:spPr>
+          <c:marker>
+            <c:symbol val="none"/>
+          </c:marker>
+          <c:dLbls>
+            <c:dLbl>
+              <c:idx val="0"/>
+              <c:layout/>
+              <c:tx>
+                <c:rich>
+                  <a:bodyPr/>
+                  <a:lstStyle/>
+                  <a:p>
+                    <a:r>
+                      <a:rPr lang="en-US"/>
+                      <a:t>   </a:t>
+                    </a:r>
+                    <a:r>
+                      <a:rPr lang="en-US" smtClean="0"/>
+                      <a:t>Scope </a:t>
+                    </a:r>
+                    <a:r>
+                      <a:rPr lang="en-US" sz="1200" b="0" i="0" u="none" strike="noStrike" baseline="0" smtClean="0">
+                        <a:effectLst/>
+                      </a:rPr>
+                      <a:t>*</a:t>
+                    </a:r>
+                    <a:endParaRPr lang="en-US"/>
+                  </a:p>
+                </c:rich>
+              </c:tx>
+              <c:dLblPos val="t"/>
+              <c:showLegendKey val="0"/>
+              <c:showVal val="0"/>
+              <c:showCatName val="0"/>
+              <c:showSerName val="1"/>
+              <c:showPercent val="0"/>
+              <c:showBubbleSize val="0"/>
+            </c:dLbl>
+            <c:dLbl>
+              <c:idx val="1"/>
+              <c:delete val="1"/>
+            </c:dLbl>
+            <c:dLblPos val="t"/>
+            <c:showLegendKey val="0"/>
+            <c:showVal val="0"/>
+            <c:showCatName val="0"/>
+            <c:showSerName val="1"/>
+            <c:showPercent val="0"/>
+            <c:showBubbleSize val="0"/>
+            <c:showLeaderLines val="0"/>
+          </c:dLbls>
+          <c:xVal>
+            <c:numRef>
+              <c:f>(Sheet1!$C$4,Sheet1!$E$4)</c:f>
+              <c:numCache>
+                <c:formatCode>m/d/yyyy</c:formatCode>
+                <c:ptCount val="2"/>
+                <c:pt idx="0">
+                  <c:v>42415</c:v>
+                </c:pt>
+                <c:pt idx="1">
+                  <c:v>42417</c:v>
+                </c:pt>
+              </c:numCache>
+            </c:numRef>
+          </c:xVal>
+          <c:yVal>
+            <c:numRef>
+              <c:f>(Sheet1!$D$4,Sheet1!$F$4)</c:f>
+              <c:numCache>
+                <c:formatCode>0.00</c:formatCode>
+                <c:ptCount val="2"/>
+                <c:pt idx="0">
+                  <c:v>6</c:v>
+                </c:pt>
+                <c:pt idx="1">
+                  <c:v>6</c:v>
+                </c:pt>
+              </c:numCache>
+            </c:numRef>
+          </c:yVal>
+          <c:smooth val="0"/>
+        </c:ser>
+        <c:ser>
+          <c:idx val="1"/>
+          <c:order val="1"/>
+          <c:tx>
+            <c:strRef>
+              <c:f>Sheet1!$A$5</c:f>
+              <c:strCache>
+                <c:ptCount val="1"/>
+                <c:pt idx="0">
+                  <c:v>   Analysis/Software Requirements</c:v>
+                </c:pt>
+              </c:strCache>
+            </c:strRef>
+          </c:tx>
+          <c:spPr>
+            <a:ln w="50800">
+              <a:solidFill>
+                <a:srgbClr val="00B0F0"/>
+              </a:solidFill>
+            </a:ln>
+          </c:spPr>
+          <c:marker>
+            <c:symbol val="none"/>
+          </c:marker>
+          <c:dLbls>
+            <c:dLbl>
+              <c:idx val="0"/>
+              <c:layout>
+                <c:manualLayout>
+                  <c:x val="-2.688984829058284E-2"/>
+                  <c:y val="-7.0622716278112299E-2"/>
+                </c:manualLayout>
+              </c:layout>
+              <c:tx>
+                <c:rich>
+                  <a:bodyPr/>
+                  <a:lstStyle/>
+                  <a:p>
+                    <a:r>
+                      <a:rPr lang="en-US" dirty="0"/>
+                      <a:t>   Analysis/Software </a:t>
+                    </a:r>
+                    <a:r>
+                      <a:rPr lang="en-US" dirty="0" smtClean="0"/>
+                      <a:t>Requirements </a:t>
+                    </a:r>
+                    <a:r>
+                      <a:rPr lang="en-US" sz="1200" b="0" i="0" u="none" strike="noStrike" baseline="0" dirty="0" smtClean="0">
+                        <a:effectLst/>
+                      </a:rPr>
+                      <a:t>‡</a:t>
+                    </a:r>
+                    <a:endParaRPr lang="en-US" dirty="0"/>
+                  </a:p>
+                </c:rich>
+              </c:tx>
+              <c:dLblPos val="r"/>
+              <c:showLegendKey val="0"/>
+              <c:showVal val="0"/>
+              <c:showCatName val="0"/>
+              <c:showSerName val="1"/>
+              <c:showPercent val="0"/>
+              <c:showBubbleSize val="0"/>
+            </c:dLbl>
+            <c:dLbl>
+              <c:idx val="1"/>
+              <c:delete val="1"/>
+            </c:dLbl>
+            <c:dLblPos val="t"/>
+            <c:showLegendKey val="0"/>
+            <c:showVal val="0"/>
+            <c:showCatName val="0"/>
+            <c:showSerName val="1"/>
+            <c:showPercent val="0"/>
+            <c:showBubbleSize val="0"/>
+            <c:showLeaderLines val="0"/>
+          </c:dLbls>
+          <c:xVal>
+            <c:numRef>
+              <c:f>(Sheet1!$C$5,Sheet1!$E$5)</c:f>
+              <c:numCache>
+                <c:formatCode>m/d/yyyy</c:formatCode>
+                <c:ptCount val="2"/>
+                <c:pt idx="0">
+                  <c:v>42432</c:v>
+                </c:pt>
+                <c:pt idx="1">
+                  <c:v>42462</c:v>
+                </c:pt>
+              </c:numCache>
+            </c:numRef>
+          </c:xVal>
+          <c:yVal>
+            <c:numRef>
+              <c:f>(Sheet1!$D$5,Sheet1!$F$5)</c:f>
+              <c:numCache>
+                <c:formatCode>0.00</c:formatCode>
+                <c:ptCount val="2"/>
+                <c:pt idx="0">
+                  <c:v>5</c:v>
+                </c:pt>
+                <c:pt idx="1">
+                  <c:v>5</c:v>
+                </c:pt>
+              </c:numCache>
+            </c:numRef>
+          </c:yVal>
+          <c:smooth val="0"/>
+        </c:ser>
+        <c:ser>
+          <c:idx val="3"/>
+          <c:order val="2"/>
+          <c:tx>
+            <c:strRef>
+              <c:f>Sheet1!$A$8</c:f>
+              <c:strCache>
+                <c:ptCount val="1"/>
+                <c:pt idx="0">
+                  <c:v>   Design, Development, &amp; Testing in four 2-week sprints</c:v>
+                </c:pt>
+              </c:strCache>
+            </c:strRef>
+          </c:tx>
+          <c:spPr>
+            <a:ln w="50800">
+              <a:solidFill>
+                <a:srgbClr val="00B0F0"/>
+              </a:solidFill>
+            </a:ln>
+          </c:spPr>
+          <c:marker>
+            <c:symbol val="none"/>
+          </c:marker>
+          <c:dLbls>
+            <c:dLbl>
+              <c:idx val="0"/>
+              <c:delete val="1"/>
+            </c:dLbl>
+            <c:dLbl>
+              <c:idx val="1"/>
+              <c:layout>
+                <c:manualLayout>
+                  <c:x val="-0.12975706693517036"/>
+                  <c:y val="-8.2014049714373968E-2"/>
+                </c:manualLayout>
+              </c:layout>
+              <c:tx>
+                <c:rich>
+                  <a:bodyPr/>
+                  <a:lstStyle/>
+                  <a:p>
+                    <a:r>
+                      <a:rPr lang="en-US" dirty="0"/>
+                      <a:t>   Design, Development, &amp; Testing in four 2-week </a:t>
+                    </a:r>
+                    <a:r>
+                      <a:rPr lang="en-US" dirty="0" smtClean="0"/>
+                      <a:t>sprints </a:t>
+                    </a:r>
+                    <a:r>
+                      <a:rPr lang="en-US" sz="1200" b="0" i="0" u="none" strike="noStrike" baseline="0" dirty="0" smtClean="0">
+                        <a:effectLst/>
+                      </a:rPr>
+                      <a:t>† </a:t>
+                    </a:r>
+                    <a:endParaRPr lang="en-US" dirty="0"/>
+                  </a:p>
+                </c:rich>
+              </c:tx>
+              <c:dLblPos val="r"/>
+              <c:showLegendKey val="0"/>
+              <c:showVal val="0"/>
+              <c:showCatName val="0"/>
+              <c:showSerName val="1"/>
+              <c:showPercent val="0"/>
+              <c:showBubbleSize val="0"/>
+            </c:dLbl>
+            <c:dLblPos val="t"/>
+            <c:showLegendKey val="0"/>
+            <c:showVal val="0"/>
+            <c:showCatName val="0"/>
+            <c:showSerName val="1"/>
+            <c:showPercent val="0"/>
+            <c:showBubbleSize val="0"/>
+            <c:showLeaderLines val="0"/>
+          </c:dLbls>
+          <c:xVal>
+            <c:numRef>
+              <c:f>(Sheet1!$C$8,Sheet1!$E$8)</c:f>
+              <c:numCache>
+                <c:formatCode>m/d/yyyy</c:formatCode>
+                <c:ptCount val="2"/>
+                <c:pt idx="0">
+                  <c:v>42440</c:v>
+                </c:pt>
+                <c:pt idx="1">
+                  <c:v>42474</c:v>
+                </c:pt>
+              </c:numCache>
+            </c:numRef>
+          </c:xVal>
+          <c:yVal>
+            <c:numRef>
+              <c:f>(Sheet1!$D$8,Sheet1!$F$8)</c:f>
+              <c:numCache>
+                <c:formatCode>0.00</c:formatCode>
+                <c:ptCount val="2"/>
+                <c:pt idx="0">
+                  <c:v>4</c:v>
+                </c:pt>
+                <c:pt idx="1">
+                  <c:v>4</c:v>
+                </c:pt>
+              </c:numCache>
+            </c:numRef>
+          </c:yVal>
+          <c:smooth val="0"/>
+        </c:ser>
+        <c:ser>
+          <c:idx val="5"/>
+          <c:order val="3"/>
+          <c:tx>
+            <c:strRef>
+              <c:f>Sheet1!$A$11</c:f>
+              <c:strCache>
+                <c:ptCount val="1"/>
+                <c:pt idx="0">
+                  <c:v>   Documentation</c:v>
+                </c:pt>
+              </c:strCache>
+            </c:strRef>
+          </c:tx>
+          <c:spPr>
+            <a:ln w="50800">
+              <a:solidFill>
+                <a:srgbClr val="00B0F0"/>
+              </a:solidFill>
+            </a:ln>
+          </c:spPr>
+          <c:marker>
+            <c:symbol val="none"/>
+          </c:marker>
+          <c:dLbls>
+            <c:dLbl>
+              <c:idx val="0"/>
+              <c:layout>
+                <c:manualLayout>
+                  <c:x val="2.6659736760135951E-2"/>
+                  <c:y val="-4.1365433264966778E-2"/>
+                </c:manualLayout>
+              </c:layout>
+              <c:tx>
+                <c:rich>
+                  <a:bodyPr/>
+                  <a:lstStyle/>
+                  <a:p>
+                    <a:r>
+                      <a:rPr lang="en-US" dirty="0"/>
+                      <a:t>   </a:t>
+                    </a:r>
+                    <a:r>
+                      <a:rPr lang="en-US" dirty="0" smtClean="0"/>
+                      <a:t>Documentation </a:t>
+                    </a:r>
+                    <a:r>
+                      <a:rPr lang="en-US" sz="1200" b="0" i="0" u="none" strike="noStrike" baseline="0" dirty="0" smtClean="0">
+                        <a:effectLst/>
+                      </a:rPr>
+                      <a:t>‡</a:t>
+                    </a:r>
+                    <a:endParaRPr lang="en-US" dirty="0"/>
+                  </a:p>
+                </c:rich>
+              </c:tx>
+              <c:dLblPos val="r"/>
+              <c:showLegendKey val="0"/>
+              <c:showVal val="0"/>
+              <c:showCatName val="0"/>
+              <c:showSerName val="1"/>
+              <c:showPercent val="0"/>
+              <c:showBubbleSize val="0"/>
+            </c:dLbl>
+            <c:dLbl>
+              <c:idx val="1"/>
+              <c:delete val="1"/>
+            </c:dLbl>
+            <c:dLblPos val="t"/>
+            <c:showLegendKey val="0"/>
+            <c:showVal val="0"/>
+            <c:showCatName val="0"/>
+            <c:showSerName val="1"/>
+            <c:showPercent val="0"/>
+            <c:showBubbleSize val="0"/>
+            <c:showLeaderLines val="0"/>
+          </c:dLbls>
+          <c:xVal>
+            <c:numRef>
+              <c:f>(Sheet1!$C$11,Sheet1!$E$11)</c:f>
+              <c:numCache>
+                <c:formatCode>m/d/yyyy</c:formatCode>
+                <c:ptCount val="2"/>
+                <c:pt idx="0">
+                  <c:v>42452</c:v>
+                </c:pt>
+                <c:pt idx="1">
+                  <c:v>42478</c:v>
+                </c:pt>
+              </c:numCache>
+            </c:numRef>
+          </c:xVal>
+          <c:yVal>
+            <c:numRef>
+              <c:f>(Sheet1!$D$11,Sheet1!$F$11)</c:f>
+              <c:numCache>
+                <c:formatCode>0.00</c:formatCode>
+                <c:ptCount val="2"/>
+                <c:pt idx="0">
+                  <c:v>3</c:v>
+                </c:pt>
+                <c:pt idx="1">
+                  <c:v>3</c:v>
+                </c:pt>
+              </c:numCache>
+            </c:numRef>
+          </c:yVal>
+          <c:smooth val="0"/>
+        </c:ser>
+        <c:ser>
+          <c:idx val="7"/>
+          <c:order val="4"/>
+          <c:tx>
+            <c:strRef>
+              <c:f>Sheet1!$A$13</c:f>
+              <c:strCache>
+                <c:ptCount val="1"/>
+                <c:pt idx="0">
+                  <c:v>   Deployment</c:v>
+                </c:pt>
+              </c:strCache>
+            </c:strRef>
+          </c:tx>
+          <c:spPr>
+            <a:ln w="50800">
+              <a:solidFill>
+                <a:srgbClr val="00B0F0"/>
+              </a:solidFill>
+            </a:ln>
+          </c:spPr>
+          <c:marker>
+            <c:symbol val="none"/>
+          </c:marker>
+          <c:dLbls>
+            <c:dLbl>
+              <c:idx val="0"/>
+              <c:layout>
+                <c:manualLayout>
+                  <c:x val="-4.2797484950995716E-2"/>
+                  <c:y val="-3.8626457641849819E-2"/>
+                </c:manualLayout>
+              </c:layout>
+              <c:tx>
+                <c:rich>
+                  <a:bodyPr/>
+                  <a:lstStyle/>
+                  <a:p>
+                    <a:r>
+                      <a:rPr lang="en-US" dirty="0"/>
+                      <a:t>   </a:t>
+                    </a:r>
+                    <a:r>
+                      <a:rPr lang="en-US" dirty="0" smtClean="0"/>
+                      <a:t>Deployment </a:t>
+                    </a:r>
+                    <a:r>
+                      <a:rPr lang="en-US" sz="1200" b="0" i="0" u="none" strike="noStrike" baseline="0" dirty="0" smtClean="0">
+                        <a:effectLst/>
+                      </a:rPr>
+                      <a:t>*</a:t>
+                    </a:r>
+                    <a:endParaRPr lang="en-US" dirty="0"/>
+                  </a:p>
+                </c:rich>
+              </c:tx>
+              <c:dLblPos val="r"/>
+              <c:showLegendKey val="0"/>
+              <c:showVal val="0"/>
+              <c:showCatName val="0"/>
+              <c:showSerName val="1"/>
+              <c:showPercent val="0"/>
+              <c:showBubbleSize val="0"/>
+            </c:dLbl>
+            <c:dLbl>
+              <c:idx val="1"/>
+              <c:delete val="1"/>
+            </c:dLbl>
+            <c:dLblPos val="t"/>
+            <c:showLegendKey val="0"/>
+            <c:showVal val="0"/>
+            <c:showCatName val="0"/>
+            <c:showSerName val="1"/>
+            <c:showPercent val="0"/>
+            <c:showBubbleSize val="0"/>
+            <c:showLeaderLines val="0"/>
+          </c:dLbls>
+          <c:xVal>
+            <c:numRef>
+              <c:f>(Sheet1!$C$13,Sheet1!$E$13)</c:f>
+              <c:numCache>
+                <c:formatCode>m/d/yyyy</c:formatCode>
+                <c:ptCount val="2"/>
+                <c:pt idx="0">
+                  <c:v>42479</c:v>
+                </c:pt>
+                <c:pt idx="1">
+                  <c:v>42483</c:v>
+                </c:pt>
+              </c:numCache>
+            </c:numRef>
+          </c:xVal>
+          <c:yVal>
+            <c:numRef>
+              <c:f>(Sheet1!$D$13,Sheet1!$F$13)</c:f>
+              <c:numCache>
+                <c:formatCode>0.00</c:formatCode>
+                <c:ptCount val="2"/>
+                <c:pt idx="0">
+                  <c:v>2</c:v>
+                </c:pt>
+                <c:pt idx="1">
+                  <c:v>2</c:v>
+                </c:pt>
+              </c:numCache>
+            </c:numRef>
+          </c:yVal>
+          <c:smooth val="0"/>
+        </c:ser>
+        <c:ser>
+          <c:idx val="8"/>
+          <c:order val="5"/>
+          <c:tx>
+            <c:strRef>
+              <c:f>Sheet1!$A$14</c:f>
+              <c:strCache>
+                <c:ptCount val="1"/>
+                <c:pt idx="0">
+                  <c:v>   Post Implementation Review</c:v>
+                </c:pt>
+              </c:strCache>
+            </c:strRef>
+          </c:tx>
+          <c:spPr>
+            <a:ln w="50800">
+              <a:solidFill>
+                <a:srgbClr val="00B0F0"/>
+              </a:solidFill>
+            </a:ln>
+          </c:spPr>
+          <c:marker>
+            <c:symbol val="none"/>
+          </c:marker>
+          <c:dLbls>
+            <c:dLbl>
+              <c:idx val="0"/>
+              <c:delete val="1"/>
+            </c:dLbl>
+            <c:dLbl>
+              <c:idx val="1"/>
+              <c:layout/>
+              <c:tx>
+                <c:rich>
+                  <a:bodyPr/>
+                  <a:lstStyle/>
+                  <a:p>
+                    <a:r>
+                      <a:rPr lang="en-US"/>
+                      <a:t>   Post </a:t>
+                    </a:r>
+                    <a:r>
+                      <a:rPr lang="en-US"/>
+                      <a:t>Implementation </a:t>
+                    </a:r>
+                    <a:r>
+                      <a:rPr lang="en-US" smtClean="0"/>
+                      <a:t>Review </a:t>
+                    </a:r>
+                    <a:r>
+                      <a:rPr lang="en-US" sz="1200" b="0" i="0" u="none" strike="noStrike" baseline="0" smtClean="0">
+                        <a:effectLst/>
+                      </a:rPr>
+                      <a:t>*</a:t>
+                    </a:r>
+                    <a:endParaRPr lang="en-US"/>
+                  </a:p>
+                </c:rich>
+              </c:tx>
+              <c:dLblPos val="t"/>
+              <c:showLegendKey val="0"/>
+              <c:showVal val="0"/>
+              <c:showCatName val="0"/>
+              <c:showSerName val="1"/>
+              <c:showPercent val="0"/>
+              <c:showBubbleSize val="0"/>
+            </c:dLbl>
+            <c:dLblPos val="t"/>
+            <c:showLegendKey val="0"/>
+            <c:showVal val="0"/>
+            <c:showCatName val="0"/>
+            <c:showSerName val="1"/>
+            <c:showPercent val="0"/>
+            <c:showBubbleSize val="0"/>
+            <c:showLeaderLines val="0"/>
+          </c:dLbls>
+          <c:xVal>
+            <c:numRef>
+              <c:f>(Sheet1!$C$14,Sheet1!$E$14)</c:f>
+              <c:numCache>
+                <c:formatCode>m/d/yyyy</c:formatCode>
+                <c:ptCount val="2"/>
+                <c:pt idx="0">
+                  <c:v>42483</c:v>
+                </c:pt>
+                <c:pt idx="1">
+                  <c:v>42486</c:v>
+                </c:pt>
+              </c:numCache>
+            </c:numRef>
+          </c:xVal>
+          <c:yVal>
+            <c:numRef>
+              <c:f>(Sheet1!$D$14,Sheet1!$F$14)</c:f>
+              <c:numCache>
+                <c:formatCode>0.00</c:formatCode>
+                <c:ptCount val="2"/>
+                <c:pt idx="0">
+                  <c:v>1</c:v>
+                </c:pt>
+                <c:pt idx="1">
+                  <c:v>1</c:v>
+                </c:pt>
+              </c:numCache>
+            </c:numRef>
+          </c:yVal>
+          <c:smooth val="0"/>
+        </c:ser>
+        <c:ser>
+          <c:idx val="9"/>
+          <c:order val="6"/>
+          <c:tx>
+            <c:strRef>
+              <c:f>Sheet1!$A$15</c:f>
+              <c:strCache>
+                <c:ptCount val="1"/>
+                <c:pt idx="0">
+                  <c:v>   Project Due</c:v>
+                </c:pt>
+              </c:strCache>
+            </c:strRef>
+          </c:tx>
+          <c:spPr>
+            <a:ln>
+              <a:noFill/>
+            </a:ln>
+          </c:spPr>
+          <c:marker>
+            <c:symbol val="diamond"/>
+            <c:size val="9"/>
+            <c:spPr>
+              <a:solidFill>
+                <a:srgbClr val="00B050"/>
+              </a:solidFill>
+            </c:spPr>
+          </c:marker>
+          <c:dLbls>
+            <c:dLbl>
+              <c:idx val="0"/>
+              <c:layout>
+                <c:manualLayout>
+                  <c:x val="-6.3857036269730424E-2"/>
+                  <c:y val="4.3542811051658803E-2"/>
+                </c:manualLayout>
+              </c:layout>
+              <c:tx>
+                <c:rich>
+                  <a:bodyPr/>
+                  <a:lstStyle/>
+                  <a:p>
+                    <a:r>
+                      <a:rPr lang="en-US" dirty="0"/>
+                      <a:t>   Project </a:t>
+                    </a:r>
+                    <a:r>
+                      <a:rPr lang="en-US" dirty="0" smtClean="0"/>
+                      <a:t>Due </a:t>
+                    </a:r>
+                    <a:r>
+                      <a:rPr lang="en-US" sz="1200" b="0" i="0" u="none" strike="noStrike" baseline="0" dirty="0" smtClean="0">
+                        <a:effectLst/>
+                      </a:rPr>
+                      <a:t>*</a:t>
+                    </a:r>
+                    <a:endParaRPr lang="en-US" dirty="0"/>
+                  </a:p>
+                </c:rich>
+              </c:tx>
+              <c:dLblPos val="r"/>
+              <c:showLegendKey val="0"/>
+              <c:showVal val="0"/>
+              <c:showCatName val="0"/>
+              <c:showSerName val="1"/>
+              <c:showPercent val="0"/>
+              <c:showBubbleSize val="0"/>
+            </c:dLbl>
+            <c:dLbl>
+              <c:idx val="1"/>
+              <c:delete val="1"/>
+            </c:dLbl>
+            <c:dLblPos val="t"/>
+            <c:showLegendKey val="0"/>
+            <c:showVal val="0"/>
+            <c:showCatName val="0"/>
+            <c:showSerName val="1"/>
+            <c:showPercent val="0"/>
+            <c:showBubbleSize val="0"/>
+            <c:showLeaderLines val="0"/>
+          </c:dLbls>
+          <c:xVal>
+            <c:numRef>
+              <c:f>(Sheet1!$C$15,Sheet1!$E$15)</c:f>
+              <c:numCache>
+                <c:formatCode>m/d/yyyy</c:formatCode>
+                <c:ptCount val="2"/>
+                <c:pt idx="0">
+                  <c:v>42490</c:v>
+                </c:pt>
+                <c:pt idx="1">
+                  <c:v>42490</c:v>
+                </c:pt>
+              </c:numCache>
+            </c:numRef>
+          </c:xVal>
+          <c:yVal>
+            <c:numRef>
+              <c:f>(Sheet1!$D$15,Sheet1!$F$15)</c:f>
+              <c:numCache>
+                <c:formatCode>0.00</c:formatCode>
+                <c:ptCount val="2"/>
+                <c:pt idx="0">
+                  <c:v>1</c:v>
+                </c:pt>
+                <c:pt idx="1">
+                  <c:v>1</c:v>
+                </c:pt>
+              </c:numCache>
+            </c:numRef>
+          </c:yVal>
+          <c:smooth val="0"/>
+        </c:ser>
+        <c:ser>
+          <c:idx val="10"/>
+          <c:order val="7"/>
+          <c:tx>
+            <c:strRef>
+              <c:f>Sheet1!$A$6</c:f>
+              <c:strCache>
+                <c:ptCount val="1"/>
+                <c:pt idx="0">
+                  <c:v>   Analysis/Software Requirements</c:v>
+                </c:pt>
+              </c:strCache>
+            </c:strRef>
+          </c:tx>
+          <c:spPr>
+            <a:ln w="50800">
+              <a:solidFill>
+                <a:srgbClr val="7030A0"/>
+              </a:solidFill>
+            </a:ln>
+          </c:spPr>
+          <c:marker>
+            <c:symbol val="none"/>
+          </c:marker>
+          <c:dLbls>
+            <c:delete val="1"/>
+          </c:dLbls>
+          <c:xVal>
+            <c:numRef>
+              <c:f>(Sheet1!$C$6,Sheet1!$E$6)</c:f>
+              <c:numCache>
+                <c:formatCode>m/d/yyyy</c:formatCode>
+                <c:ptCount val="2"/>
+                <c:pt idx="0">
+                  <c:v>42418</c:v>
+                </c:pt>
+                <c:pt idx="1">
+                  <c:v>42432</c:v>
+                </c:pt>
+              </c:numCache>
+            </c:numRef>
+          </c:xVal>
+          <c:yVal>
+            <c:numRef>
+              <c:f>(Sheet1!$D$7,Sheet1!$F$7)</c:f>
+              <c:numCache>
+                <c:formatCode>0.00</c:formatCode>
+                <c:ptCount val="2"/>
+                <c:pt idx="0">
+                  <c:v>5</c:v>
+                </c:pt>
+                <c:pt idx="1">
+                  <c:v>5</c:v>
+                </c:pt>
+              </c:numCache>
+            </c:numRef>
+          </c:yVal>
+          <c:smooth val="0"/>
+        </c:ser>
+        <c:ser>
+          <c:idx val="2"/>
+          <c:order val="8"/>
+          <c:tx>
+            <c:strRef>
+              <c:f>Sheet1!$A$7</c:f>
+              <c:strCache>
+                <c:ptCount val="1"/>
+                <c:pt idx="0">
+                  <c:v>   Project Topic Presentation Due</c:v>
+                </c:pt>
+              </c:strCache>
+            </c:strRef>
+          </c:tx>
+          <c:marker>
+            <c:symbol val="diamond"/>
+            <c:size val="11"/>
+            <c:spPr>
+              <a:solidFill>
+                <a:srgbClr val="002060"/>
+              </a:solidFill>
+            </c:spPr>
+          </c:marker>
+          <c:dLbls>
+            <c:dLbl>
+              <c:idx val="0"/>
+              <c:delete val="1"/>
+            </c:dLbl>
+            <c:dLbl>
+              <c:idx val="1"/>
+              <c:layout>
+                <c:manualLayout>
+                  <c:x val="-8.7960072148295168E-2"/>
+                  <c:y val="4.9020762297892713E-2"/>
+                </c:manualLayout>
+              </c:layout>
+              <c:tx>
+                <c:rich>
+                  <a:bodyPr/>
+                  <a:lstStyle/>
+                  <a:p>
+                    <a:r>
+                      <a:rPr lang="en-US" dirty="0"/>
+                      <a:t>   Project Topic Presentation </a:t>
+                    </a:r>
+                    <a:r>
+                      <a:rPr lang="en-US" dirty="0" smtClean="0"/>
+                      <a:t>Due </a:t>
+                    </a:r>
+                    <a:r>
+                      <a:rPr lang="en-US" sz="1200" b="0" i="0" u="none" strike="noStrike" baseline="0" dirty="0" smtClean="0">
+                        <a:effectLst/>
+                      </a:rPr>
+                      <a:t>*</a:t>
+                    </a:r>
+                    <a:endParaRPr lang="en-US" dirty="0"/>
+                  </a:p>
+                </c:rich>
+              </c:tx>
+              <c:dLblPos val="r"/>
+              <c:showLegendKey val="0"/>
+              <c:showVal val="0"/>
+              <c:showCatName val="0"/>
+              <c:showSerName val="1"/>
+              <c:showPercent val="0"/>
+              <c:showBubbleSize val="0"/>
+            </c:dLbl>
+            <c:dLblPos val="t"/>
+            <c:showLegendKey val="0"/>
+            <c:showVal val="0"/>
+            <c:showCatName val="0"/>
+            <c:showSerName val="1"/>
+            <c:showPercent val="0"/>
+            <c:showBubbleSize val="0"/>
+            <c:showLeaderLines val="0"/>
+          </c:dLbls>
+          <c:xVal>
+            <c:numRef>
+              <c:f>(Sheet1!$C$7,Sheet1!$E$7)</c:f>
+              <c:numCache>
+                <c:formatCode>m/d/yyyy</c:formatCode>
+                <c:ptCount val="2"/>
+                <c:pt idx="0">
+                  <c:v>42421</c:v>
+                </c:pt>
+                <c:pt idx="1">
+                  <c:v>42421</c:v>
+                </c:pt>
+              </c:numCache>
+            </c:numRef>
+          </c:xVal>
+          <c:yVal>
+            <c:numRef>
+              <c:f>(Sheet1!$D$7,Sheet1!$F$7)</c:f>
+              <c:numCache>
+                <c:formatCode>0.00</c:formatCode>
+                <c:ptCount val="2"/>
+                <c:pt idx="0">
+                  <c:v>5</c:v>
+                </c:pt>
+                <c:pt idx="1">
+                  <c:v>5</c:v>
+                </c:pt>
+              </c:numCache>
+            </c:numRef>
+          </c:yVal>
+          <c:smooth val="0"/>
+        </c:ser>
+        <c:ser>
+          <c:idx val="11"/>
+          <c:order val="9"/>
+          <c:tx>
+            <c:strRef>
+              <c:f>Sheet1!$A$9</c:f>
+              <c:strCache>
+                <c:ptCount val="1"/>
+                <c:pt idx="0">
+                  <c:v>   Design, Development, &amp; Testing in four 2-week sprints - complete</c:v>
+                </c:pt>
+              </c:strCache>
+            </c:strRef>
+          </c:tx>
+          <c:spPr>
+            <a:ln w="50800">
+              <a:solidFill>
+                <a:srgbClr val="7030A0"/>
+              </a:solidFill>
+            </a:ln>
+          </c:spPr>
+          <c:marker>
+            <c:symbol val="none"/>
+          </c:marker>
+          <c:dLbls>
+            <c:delete val="1"/>
+          </c:dLbls>
+          <c:xVal>
+            <c:numRef>
+              <c:f>(Sheet1!$C$9,Sheet1!$E$9)</c:f>
+              <c:numCache>
+                <c:formatCode>m/d/yyyy</c:formatCode>
+                <c:ptCount val="2"/>
+                <c:pt idx="0">
+                  <c:v>42425</c:v>
+                </c:pt>
+                <c:pt idx="1">
+                  <c:v>42440</c:v>
+                </c:pt>
+              </c:numCache>
+            </c:numRef>
+          </c:xVal>
+          <c:yVal>
+            <c:numRef>
+              <c:f>(Sheet1!$D$9,Sheet1!$F$9)</c:f>
+              <c:numCache>
+                <c:formatCode>0.00</c:formatCode>
+                <c:ptCount val="2"/>
+                <c:pt idx="0">
+                  <c:v>4</c:v>
+                </c:pt>
+                <c:pt idx="1">
+                  <c:v>4</c:v>
+                </c:pt>
+              </c:numCache>
+            </c:numRef>
+          </c:yVal>
+          <c:smooth val="0"/>
+        </c:ser>
+        <c:ser>
+          <c:idx val="4"/>
+          <c:order val="10"/>
+          <c:tx>
+            <c:strRef>
+              <c:f>Sheet1!$A$10</c:f>
+              <c:strCache>
+                <c:ptCount val="1"/>
+                <c:pt idx="0">
+                  <c:v>   Project Progress Report Due</c:v>
+                </c:pt>
+              </c:strCache>
+            </c:strRef>
+          </c:tx>
+          <c:marker>
+            <c:symbol val="diamond"/>
+            <c:size val="11"/>
+            <c:spPr>
+              <a:solidFill>
+                <a:srgbClr val="002060"/>
+              </a:solidFill>
+            </c:spPr>
+          </c:marker>
+          <c:dLbls>
+            <c:dLbl>
+              <c:idx val="0"/>
+              <c:delete val="1"/>
+            </c:dLbl>
+            <c:dLbl>
+              <c:idx val="1"/>
+              <c:layout>
+                <c:manualLayout>
+                  <c:x val="-8.3176384230719977E-2"/>
+                  <c:y val="8.7084555607019706E-2"/>
+                </c:manualLayout>
+              </c:layout>
+              <c:tx>
+                <c:rich>
+                  <a:bodyPr/>
+                  <a:lstStyle/>
+                  <a:p>
+                    <a:r>
+                      <a:rPr lang="en-US" dirty="0"/>
+                      <a:t>   Project Progress Report </a:t>
+                    </a:r>
+                    <a:r>
+                      <a:rPr lang="en-US" dirty="0" smtClean="0"/>
+                      <a:t>Due </a:t>
+                    </a:r>
+                    <a:r>
+                      <a:rPr lang="en-US" sz="1200" b="0" i="0" u="none" strike="noStrike" baseline="0" dirty="0" smtClean="0">
+                        <a:effectLst/>
+                      </a:rPr>
+                      <a:t>*</a:t>
+                    </a:r>
+                    <a:endParaRPr lang="en-US" dirty="0"/>
+                  </a:p>
+                </c:rich>
+              </c:tx>
+              <c:dLblPos val="r"/>
+              <c:showLegendKey val="0"/>
+              <c:showVal val="0"/>
+              <c:showCatName val="0"/>
+              <c:showSerName val="1"/>
+              <c:showPercent val="0"/>
+              <c:showBubbleSize val="0"/>
+            </c:dLbl>
+            <c:dLblPos val="t"/>
+            <c:showLegendKey val="0"/>
+            <c:showVal val="0"/>
+            <c:showCatName val="0"/>
+            <c:showSerName val="1"/>
+            <c:showPercent val="0"/>
+            <c:showBubbleSize val="0"/>
+            <c:showLeaderLines val="0"/>
+          </c:dLbls>
+          <c:xVal>
+            <c:numRef>
+              <c:f>(Sheet1!$C$10,Sheet1!$E$10)</c:f>
+              <c:numCache>
+                <c:formatCode>m/d/yyyy</c:formatCode>
+                <c:ptCount val="2"/>
+                <c:pt idx="0">
+                  <c:v>42435</c:v>
+                </c:pt>
+                <c:pt idx="1">
+                  <c:v>42435</c:v>
+                </c:pt>
+              </c:numCache>
+            </c:numRef>
+          </c:xVal>
+          <c:yVal>
+            <c:numRef>
+              <c:f>(Sheet1!$D$10,Sheet1!$F$10)</c:f>
+              <c:numCache>
+                <c:formatCode>0.00</c:formatCode>
+                <c:ptCount val="2"/>
+                <c:pt idx="0">
+                  <c:v>4</c:v>
+                </c:pt>
+                <c:pt idx="1">
+                  <c:v>4</c:v>
+                </c:pt>
+              </c:numCache>
+            </c:numRef>
+          </c:yVal>
+          <c:smooth val="0"/>
+        </c:ser>
+        <c:ser>
+          <c:idx val="6"/>
+          <c:order val="11"/>
+          <c:tx>
+            <c:strRef>
+              <c:f>Sheet1!$A$12</c:f>
+              <c:strCache>
+                <c:ptCount val="1"/>
+                <c:pt idx="0">
+                  <c:v>   Project Progress Report Due</c:v>
+                </c:pt>
+              </c:strCache>
+            </c:strRef>
+          </c:tx>
+          <c:marker>
+            <c:symbol val="diamond"/>
+            <c:size val="9"/>
+            <c:spPr>
+              <a:solidFill>
+                <a:srgbClr val="00B050"/>
+              </a:solidFill>
+            </c:spPr>
+          </c:marker>
+          <c:dLbls>
+            <c:dLbl>
+              <c:idx val="0"/>
+              <c:delete val="1"/>
+            </c:dLbl>
+            <c:dLbl>
+              <c:idx val="1"/>
+              <c:layout>
+                <c:manualLayout>
+                  <c:x val="-8.6243048965705407E-2"/>
+                  <c:y val="7.1273223200041175E-2"/>
+                </c:manualLayout>
+              </c:layout>
+              <c:tx>
+                <c:rich>
+                  <a:bodyPr/>
+                  <a:lstStyle/>
+                  <a:p>
+                    <a:r>
+                      <a:rPr lang="en-US" dirty="0"/>
+                      <a:t>   Project Progress Report </a:t>
+                    </a:r>
+                    <a:r>
+                      <a:rPr lang="en-US" dirty="0" smtClean="0"/>
+                      <a:t>Due </a:t>
+                    </a:r>
+                    <a:r>
+                      <a:rPr lang="en-US" sz="1200" b="0" i="0" u="none" strike="noStrike" baseline="0" dirty="0" smtClean="0">
+                        <a:effectLst/>
+                      </a:rPr>
+                      <a:t>*</a:t>
+                    </a:r>
+                    <a:endParaRPr lang="en-US" dirty="0"/>
+                  </a:p>
+                </c:rich>
+              </c:tx>
+              <c:dLblPos val="r"/>
+              <c:showLegendKey val="0"/>
+              <c:showVal val="0"/>
+              <c:showCatName val="0"/>
+              <c:showSerName val="1"/>
+              <c:showPercent val="0"/>
+              <c:showBubbleSize val="0"/>
+            </c:dLbl>
+            <c:dLblPos val="t"/>
+            <c:showLegendKey val="0"/>
+            <c:showVal val="0"/>
+            <c:showCatName val="0"/>
+            <c:showSerName val="1"/>
+            <c:showPercent val="0"/>
+            <c:showBubbleSize val="0"/>
+            <c:showLeaderLines val="0"/>
+          </c:dLbls>
+          <c:xVal>
+            <c:numRef>
+              <c:f>(Sheet1!$C$12,Sheet1!$E$12)</c:f>
+              <c:numCache>
+                <c:formatCode>m/d/yyyy</c:formatCode>
+                <c:ptCount val="2"/>
+                <c:pt idx="0">
+                  <c:v>42463</c:v>
+                </c:pt>
+                <c:pt idx="1">
+                  <c:v>42463</c:v>
+                </c:pt>
+              </c:numCache>
+            </c:numRef>
+          </c:xVal>
+          <c:yVal>
+            <c:numRef>
+              <c:f>(Sheet1!$D$12,Sheet1!$F$12)</c:f>
+              <c:numCache>
+                <c:formatCode>0.00</c:formatCode>
+                <c:ptCount val="2"/>
+                <c:pt idx="0">
+                  <c:v>3</c:v>
+                </c:pt>
+                <c:pt idx="1">
+                  <c:v>3</c:v>
+                </c:pt>
+              </c:numCache>
+            </c:numRef>
+          </c:yVal>
+          <c:smooth val="0"/>
+        </c:ser>
+        <c:dLbls>
+          <c:dLblPos val="t"/>
+          <c:showLegendKey val="0"/>
+          <c:showVal val="1"/>
+          <c:showCatName val="0"/>
+          <c:showSerName val="0"/>
+          <c:showPercent val="0"/>
+          <c:showBubbleSize val="0"/>
+        </c:dLbls>
+        <c:axId val="7909888"/>
+        <c:axId val="7910464"/>
+      </c:scatterChart>
+      <c:valAx>
+        <c:axId val="7909888"/>
+        <c:scaling>
+          <c:orientation val="minMax"/>
+        </c:scaling>
+        <c:delete val="0"/>
+        <c:axPos val="b"/>
+        <c:numFmt formatCode="m/d/yyyy" sourceLinked="1"/>
+        <c:majorTickMark val="out"/>
+        <c:minorTickMark val="none"/>
+        <c:tickLblPos val="nextTo"/>
+        <c:spPr>
+          <a:noFill/>
+        </c:spPr>
+        <c:txPr>
+          <a:bodyPr rot="5400000" vert="horz"/>
+          <a:lstStyle/>
+          <a:p>
+            <a:pPr>
+              <a:defRPr sz="900"/>
+            </a:pPr>
+            <a:endParaRPr lang="en-US"/>
+          </a:p>
+        </c:txPr>
+        <c:crossAx val="7910464"/>
+        <c:crosses val="autoZero"/>
+        <c:crossBetween val="midCat"/>
+      </c:valAx>
+      <c:valAx>
+        <c:axId val="7910464"/>
+        <c:scaling>
+          <c:orientation val="minMax"/>
+        </c:scaling>
+        <c:delete val="1"/>
+        <c:axPos val="l"/>
+        <c:majorGridlines>
+          <c:spPr>
+            <a:ln>
+              <a:noFill/>
+            </a:ln>
+          </c:spPr>
+        </c:majorGridlines>
+        <c:numFmt formatCode="0.00" sourceLinked="1"/>
+        <c:majorTickMark val="out"/>
+        <c:minorTickMark val="none"/>
+        <c:tickLblPos val="nextTo"/>
+        <c:crossAx val="7909888"/>
+        <c:crosses val="autoZero"/>
+        <c:crossBetween val="midCat"/>
+      </c:valAx>
+      <c:spPr>
+        <a:noFill/>
+        <a:ln>
+          <a:noFill/>
+        </a:ln>
+      </c:spPr>
+    </c:plotArea>
+    <c:plotVisOnly val="1"/>
+    <c:dispBlanksAs val="gap"/>
+    <c:showDLblsOverMax val="0"/>
+  </c:chart>
+  <c:txPr>
+    <a:bodyPr/>
+    <a:lstStyle/>
+    <a:p>
+      <a:pPr>
+        <a:defRPr sz="1200">
+          <a:latin typeface="+mj-lt"/>
+        </a:defRPr>
+      </a:pPr>
+      <a:endParaRPr lang="en-US"/>
+    </a:p>
+  </c:txPr>
+  <c:externalData r:id="rId1">
+    <c:autoUpdate val="0"/>
+  </c:externalData>
+</c:chartSpace>
 </file>
 
 <file path=ppt/comments/comment1.xml><?xml version="1.0" encoding="utf-8"?>
@@ -4378,8 +5702,8 @@
         </p:blipFill>
         <p:spPr>
           <a:xfrm>
-            <a:off x="1371600" y="94806"/>
-            <a:ext cx="6324600" cy="4984729"/>
+            <a:off x="2971800" y="209550"/>
+            <a:ext cx="5820965" cy="4587790"/>
           </a:xfrm>
           <a:prstGeom prst="rect">
             <a:avLst/>
@@ -4441,7 +5765,7 @@
         </p:spPr>
         <p:txBody>
           <a:bodyPr>
-            <a:normAutofit fontScale="90000"/>
+            <a:normAutofit/>
           </a:bodyPr>
           <a:lstStyle/>
           <a:p>
@@ -4481,11 +5805,7 @@
             </a:pPr>
             <a:r>
               <a:rPr lang="en-US" dirty="0" smtClean="0"/>
-              <a:t>Data </a:t>
-            </a:r>
-            <a:r>
-              <a:rPr lang="en-US" dirty="0" smtClean="0"/>
-              <a:t>Tier</a:t>
+              <a:t>Data Tier</a:t>
             </a:r>
           </a:p>
           <a:p>
@@ -4516,11 +5836,7 @@
             </a:pPr>
             <a:r>
               <a:rPr lang="en-US" dirty="0" smtClean="0"/>
-              <a:t>Application </a:t>
-            </a:r>
-            <a:r>
-              <a:rPr lang="en-US" dirty="0" smtClean="0"/>
-              <a:t>Tier</a:t>
+              <a:t>Application Tier</a:t>
             </a:r>
           </a:p>
           <a:p>
@@ -4547,11 +5863,7 @@
             </a:pPr>
             <a:r>
               <a:rPr lang="en-US" dirty="0" smtClean="0"/>
-              <a:t>Presentation </a:t>
-            </a:r>
-            <a:r>
-              <a:rPr lang="en-US" dirty="0" smtClean="0"/>
-              <a:t>Tier</a:t>
+              <a:t>Presentation Tier</a:t>
             </a:r>
           </a:p>
           <a:p>
@@ -5170,7 +6482,12 @@
             <p:ph type="title"/>
           </p:nvPr>
         </p:nvSpPr>
-        <p:spPr/>
+        <p:spPr>
+          <a:xfrm>
+            <a:off x="762000" y="-95250"/>
+            <a:ext cx="7772400" cy="857250"/>
+          </a:xfrm>
+        </p:spPr>
         <p:txBody>
           <a:bodyPr/>
           <a:lstStyle/>
@@ -5185,23 +6502,142 @@
       </p:sp>
       <p:sp>
         <p:nvSpPr>
-          <p:cNvPr id="3" name="Content Placeholder 2"/>
-          <p:cNvSpPr>
-            <a:spLocks noGrp="1"/>
-          </p:cNvSpPr>
-          <p:nvPr>
-            <p:ph sz="quarter" idx="1"/>
-          </p:nvPr>
-        </p:nvSpPr>
-        <p:spPr/>
-        <p:txBody>
-          <a:bodyPr/>
-          <a:lstStyle/>
-          <a:p>
-            <a:endParaRPr lang="en-US"/>
-          </a:p>
-        </p:txBody>
-      </p:sp>
+          <p:cNvPr id="5" name="TextBox 4"/>
+          <p:cNvSpPr txBox="1"/>
+          <p:nvPr/>
+        </p:nvSpPr>
+        <p:spPr>
+          <a:xfrm>
+            <a:off x="152400" y="4369662"/>
+            <a:ext cx="8991600" cy="584775"/>
+          </a:xfrm>
+          <a:prstGeom prst="rect">
+            <a:avLst/>
+          </a:prstGeom>
+          <a:noFill/>
+        </p:spPr>
+        <p:txBody>
+          <a:bodyPr wrap="square" rtlCol="0">
+            <a:spAutoFit/>
+          </a:bodyPr>
+          <a:lstStyle/>
+          <a:p>
+            <a:r>
+              <a:rPr lang="en-US" sz="1600" dirty="0" smtClean="0">
+                <a:latin typeface="+mj-lt"/>
+              </a:rPr>
+              <a:t>*  </a:t>
+            </a:r>
+            <a:r>
+              <a:rPr lang="en-US" sz="1600" dirty="0" smtClean="0">
+                <a:latin typeface="+mj-lt"/>
+              </a:rPr>
+              <a:t>All team members </a:t>
+            </a:r>
+            <a:r>
+              <a:rPr lang="en-US" sz="1600" dirty="0" smtClean="0">
+                <a:latin typeface="+mj-lt"/>
+              </a:rPr>
+              <a:t>involved 	† </a:t>
+            </a:r>
+            <a:r>
+              <a:rPr lang="en-US" sz="1600" dirty="0" smtClean="0">
+                <a:latin typeface="+mj-lt"/>
+              </a:rPr>
+              <a:t>- Developers and testers </a:t>
+            </a:r>
+            <a:r>
+              <a:rPr lang="en-US" sz="1600" dirty="0" smtClean="0">
+                <a:latin typeface="+mj-lt"/>
+              </a:rPr>
+              <a:t>involved      ‡ </a:t>
+            </a:r>
+            <a:r>
+              <a:rPr lang="en-US" sz="1600" dirty="0" smtClean="0">
+                <a:latin typeface="+mj-lt"/>
+              </a:rPr>
+              <a:t>- Business Analysts </a:t>
+            </a:r>
+            <a:r>
+              <a:rPr lang="en-US" sz="1600" dirty="0" smtClean="0">
+                <a:latin typeface="+mj-lt"/>
+              </a:rPr>
+              <a:t>involved</a:t>
+            </a:r>
+          </a:p>
+          <a:p>
+            <a:r>
+              <a:rPr lang="en-US" sz="1600" dirty="0" smtClean="0">
+                <a:latin typeface="+mj-lt"/>
+              </a:rPr>
+              <a:t>Milestones and tasks in </a:t>
+            </a:r>
+            <a:r>
+              <a:rPr lang="en-US" sz="1600" dirty="0" smtClean="0">
+                <a:solidFill>
+                  <a:srgbClr val="7030A0"/>
+                </a:solidFill>
+                <a:latin typeface="+mj-lt"/>
+              </a:rPr>
+              <a:t>purple</a:t>
+            </a:r>
+            <a:r>
+              <a:rPr lang="en-US" sz="1600" dirty="0" smtClean="0">
+                <a:latin typeface="+mj-lt"/>
+              </a:rPr>
+              <a:t> and </a:t>
+            </a:r>
+            <a:r>
+              <a:rPr lang="en-US" sz="1600" dirty="0" smtClean="0">
+                <a:solidFill>
+                  <a:srgbClr val="002060"/>
+                </a:solidFill>
+                <a:latin typeface="+mj-lt"/>
+              </a:rPr>
+              <a:t>dark blue</a:t>
+            </a:r>
+            <a:r>
+              <a:rPr lang="en-US" sz="1600" dirty="0" smtClean="0">
+                <a:latin typeface="+mj-lt"/>
+              </a:rPr>
+              <a:t> are complete. Remainder are in progress or </a:t>
+            </a:r>
+            <a:r>
+              <a:rPr lang="en-US" sz="1600" dirty="0">
+                <a:latin typeface="+mj-lt"/>
+              </a:rPr>
+              <a:t>in the future</a:t>
+            </a:r>
+            <a:endParaRPr lang="en-US" sz="1600" dirty="0">
+              <a:latin typeface="+mj-lt"/>
+            </a:endParaRPr>
+          </a:p>
+        </p:txBody>
+      </p:sp>
+      <p:graphicFrame>
+        <p:nvGraphicFramePr>
+          <p:cNvPr id="6" name="Chart 5"/>
+          <p:cNvGraphicFramePr>
+            <a:graphicFrameLocks/>
+          </p:cNvGraphicFramePr>
+          <p:nvPr>
+            <p:extLst>
+              <p:ext uri="{D42A27DB-BD31-4B8C-83A1-F6EECF244321}">
+                <p14:modId xmlns:p14="http://schemas.microsoft.com/office/powerpoint/2010/main" val="339660164"/>
+              </p:ext>
+            </p:extLst>
+          </p:nvPr>
+        </p:nvGraphicFramePr>
+        <p:xfrm>
+          <a:off x="430530" y="361950"/>
+          <a:ext cx="8282940" cy="3886200"/>
+        </p:xfrm>
+        <a:graphic>
+          <a:graphicData uri="http://schemas.openxmlformats.org/drawingml/2006/chart">
+            <c:chart xmlns:c="http://schemas.openxmlformats.org/drawingml/2006/chart" xmlns:r="http://schemas.openxmlformats.org/officeDocument/2006/relationships" r:id="rId2"/>
+          </a:graphicData>
+        </a:graphic>
+      </p:graphicFrame>
     </p:spTree>
     <p:extLst>
       <p:ext uri="{BB962C8B-B14F-4D97-AF65-F5344CB8AC3E}">

</xml_diff>

<commit_message>
Updated Arch Diagram with Color-Coded Statuses
</commit_message>
<xml_diff>
--- a/Team Deliverable 2/Technical Presentation - FHIRed Up.pptx
+++ b/Team Deliverable 2/Technical Presentation - FHIRed Up.pptx
@@ -198,7 +198,6 @@
           <c:dLbls>
             <c:dLbl>
               <c:idx val="0"/>
-              <c:layout/>
               <c:tx>
                 <c:rich>
                   <a:bodyPr/>
@@ -230,9 +229,7 @@
               <c:showPercent val="0"/>
               <c:showBubbleSize val="0"/>
               <c:extLst>
-                <c:ext xmlns:c15="http://schemas.microsoft.com/office/drawing/2012/chart" uri="{CE6537A1-D6FC-4f65-9D91-7224C49458BB}">
-                  <c15:layout/>
-                </c:ext>
+                <c:ext xmlns:c15="http://schemas.microsoft.com/office/drawing/2012/chart" uri="{CE6537A1-D6FC-4f65-9D91-7224C49458BB}"/>
               </c:extLst>
             </c:dLbl>
             <c:dLbl>
@@ -359,9 +356,7 @@
               <c:showPercent val="0"/>
               <c:showBubbleSize val="0"/>
               <c:extLst>
-                <c:ext xmlns:c15="http://schemas.microsoft.com/office/drawing/2012/chart" uri="{CE6537A1-D6FC-4f65-9D91-7224C49458BB}">
-                  <c15:layout/>
-                </c:ext>
+                <c:ext xmlns:c15="http://schemas.microsoft.com/office/drawing/2012/chart" uri="{CE6537A1-D6FC-4f65-9D91-7224C49458BB}"/>
               </c:extLst>
             </c:dLbl>
             <c:dLbl>
@@ -495,9 +490,7 @@
               <c:showPercent val="0"/>
               <c:showBubbleSize val="0"/>
               <c:extLst>
-                <c:ext xmlns:c15="http://schemas.microsoft.com/office/drawing/2012/chart" uri="{CE6537A1-D6FC-4f65-9D91-7224C49458BB}">
-                  <c15:layout/>
-                </c:ext>
+                <c:ext xmlns:c15="http://schemas.microsoft.com/office/drawing/2012/chart" uri="{CE6537A1-D6FC-4f65-9D91-7224C49458BB}"/>
               </c:extLst>
             </c:dLbl>
             <c:spPr>
@@ -617,9 +610,7 @@
               <c:showPercent val="0"/>
               <c:showBubbleSize val="0"/>
               <c:extLst>
-                <c:ext xmlns:c15="http://schemas.microsoft.com/office/drawing/2012/chart" uri="{CE6537A1-D6FC-4f65-9D91-7224C49458BB}">
-                  <c15:layout/>
-                </c:ext>
+                <c:ext xmlns:c15="http://schemas.microsoft.com/office/drawing/2012/chart" uri="{CE6537A1-D6FC-4f65-9D91-7224C49458BB}"/>
               </c:extLst>
             </c:dLbl>
             <c:dLbl>
@@ -746,9 +737,7 @@
               <c:showPercent val="0"/>
               <c:showBubbleSize val="0"/>
               <c:extLst>
-                <c:ext xmlns:c15="http://schemas.microsoft.com/office/drawing/2012/chart" uri="{CE6537A1-D6FC-4f65-9D91-7224C49458BB}">
-                  <c15:layout/>
-                </c:ext>
+                <c:ext xmlns:c15="http://schemas.microsoft.com/office/drawing/2012/chart" uri="{CE6537A1-D6FC-4f65-9D91-7224C49458BB}"/>
               </c:extLst>
             </c:dLbl>
             <c:dLbl>
@@ -845,7 +834,6 @@
             </c:dLbl>
             <c:dLbl>
               <c:idx val="1"/>
-              <c:layout/>
               <c:tx>
                 <c:rich>
                   <a:bodyPr/>
@@ -877,9 +865,7 @@
               <c:showPercent val="0"/>
               <c:showBubbleSize val="0"/>
               <c:extLst>
-                <c:ext xmlns:c15="http://schemas.microsoft.com/office/drawing/2012/chart" uri="{CE6537A1-D6FC-4f65-9D91-7224C49458BB}">
-                  <c15:layout/>
-                </c:ext>
+                <c:ext xmlns:c15="http://schemas.microsoft.com/office/drawing/2012/chart" uri="{CE6537A1-D6FC-4f65-9D91-7224C49458BB}"/>
               </c:extLst>
             </c:dLbl>
             <c:spPr>
@@ -1003,9 +989,7 @@
               <c:showPercent val="0"/>
               <c:showBubbleSize val="0"/>
               <c:extLst>
-                <c:ext xmlns:c15="http://schemas.microsoft.com/office/drawing/2012/chart" uri="{CE6537A1-D6FC-4f65-9D91-7224C49458BB}">
-                  <c15:layout/>
-                </c:ext>
+                <c:ext xmlns:c15="http://schemas.microsoft.com/office/drawing/2012/chart" uri="{CE6537A1-D6FC-4f65-9D91-7224C49458BB}"/>
               </c:extLst>
             </c:dLbl>
             <c:dLbl>
@@ -1197,9 +1181,7 @@
               <c:showPercent val="0"/>
               <c:showBubbleSize val="0"/>
               <c:extLst>
-                <c:ext xmlns:c15="http://schemas.microsoft.com/office/drawing/2012/chart" uri="{CE6537A1-D6FC-4f65-9D91-7224C49458BB}">
-                  <c15:layout/>
-                </c:ext>
+                <c:ext xmlns:c15="http://schemas.microsoft.com/office/drawing/2012/chart" uri="{CE6537A1-D6FC-4f65-9D91-7224C49458BB}"/>
               </c:extLst>
             </c:dLbl>
             <c:spPr>
@@ -1384,9 +1366,7 @@
               <c:showPercent val="0"/>
               <c:showBubbleSize val="0"/>
               <c:extLst>
-                <c:ext xmlns:c15="http://schemas.microsoft.com/office/drawing/2012/chart" uri="{CE6537A1-D6FC-4f65-9D91-7224C49458BB}">
-                  <c15:layout/>
-                </c:ext>
+                <c:ext xmlns:c15="http://schemas.microsoft.com/office/drawing/2012/chart" uri="{CE6537A1-D6FC-4f65-9D91-7224C49458BB}"/>
               </c:extLst>
             </c:dLbl>
             <c:spPr>
@@ -1512,9 +1492,7 @@
               <c:showPercent val="0"/>
               <c:showBubbleSize val="0"/>
               <c:extLst>
-                <c:ext xmlns:c15="http://schemas.microsoft.com/office/drawing/2012/chart" uri="{CE6537A1-D6FC-4f65-9D91-7224C49458BB}">
-                  <c15:layout/>
-                </c:ext>
+                <c:ext xmlns:c15="http://schemas.microsoft.com/office/drawing/2012/chart" uri="{CE6537A1-D6FC-4f65-9D91-7224C49458BB}"/>
               </c:extLst>
             </c:dLbl>
             <c:spPr>
@@ -1579,11 +1557,11 @@
           <c:showPercent val="0"/>
           <c:showBubbleSize val="0"/>
         </c:dLbls>
-        <c:axId val="1173693616"/>
-        <c:axId val="1173691440"/>
+        <c:axId val="811628192"/>
+        <c:axId val="811639072"/>
       </c:scatterChart>
       <c:valAx>
-        <c:axId val="1173693616"/>
+        <c:axId val="811628192"/>
         <c:scaling>
           <c:orientation val="minMax"/>
         </c:scaling>
@@ -1606,12 +1584,12 @@
             <a:endParaRPr lang="en-US"/>
           </a:p>
         </c:txPr>
-        <c:crossAx val="1173691440"/>
+        <c:crossAx val="811639072"/>
         <c:crosses val="autoZero"/>
         <c:crossBetween val="midCat"/>
       </c:valAx>
       <c:valAx>
-        <c:axId val="1173691440"/>
+        <c:axId val="811639072"/>
         <c:scaling>
           <c:orientation val="minMax"/>
         </c:scaling>
@@ -1628,7 +1606,7 @@
         <c:majorTickMark val="out"/>
         <c:minorTickMark val="none"/>
         <c:tickLblPos val="nextTo"/>
-        <c:crossAx val="1173693616"/>
+        <c:crossAx val="811628192"/>
         <c:crosses val="autoZero"/>
         <c:crossBetween val="midCat"/>
       </c:valAx>
@@ -1864,7 +1842,7 @@
           <a:p>
             <a:fld id="{3EAEFB75-4DE4-4DFC-B956-52D01254B927}" type="datetimeFigureOut">
               <a:rPr lang="en-US" smtClean="0"/>
-              <a:t>3/8/2016</a:t>
+              <a:t>3/10/2016</a:t>
             </a:fld>
             <a:endParaRPr lang="en-US"/>
           </a:p>
@@ -2217,7 +2195,7 @@
           <a:p>
             <a:fld id="{3EAEFB75-4DE4-4DFC-B956-52D01254B927}" type="datetimeFigureOut">
               <a:rPr lang="en-US" smtClean="0"/>
-              <a:t>3/8/2016</a:t>
+              <a:t>3/10/2016</a:t>
             </a:fld>
             <a:endParaRPr lang="en-US"/>
           </a:p>
@@ -2392,7 +2370,7 @@
           <a:p>
             <a:fld id="{3EAEFB75-4DE4-4DFC-B956-52D01254B927}" type="datetimeFigureOut">
               <a:rPr lang="en-US" smtClean="0"/>
-              <a:t>3/8/2016</a:t>
+              <a:t>3/10/2016</a:t>
             </a:fld>
             <a:endParaRPr lang="en-US"/>
           </a:p>
@@ -2505,7 +2483,7 @@
           <a:p>
             <a:fld id="{3EAEFB75-4DE4-4DFC-B956-52D01254B927}" type="datetimeFigureOut">
               <a:rPr lang="en-US" smtClean="0"/>
-              <a:t>3/8/2016</a:t>
+              <a:t>3/10/2016</a:t>
             </a:fld>
             <a:endParaRPr lang="en-US"/>
           </a:p>
@@ -2863,7 +2841,7 @@
           <a:p>
             <a:fld id="{3EAEFB75-4DE4-4DFC-B956-52D01254B927}" type="datetimeFigureOut">
               <a:rPr lang="en-US" smtClean="0"/>
-              <a:t>3/8/2016</a:t>
+              <a:t>3/10/2016</a:t>
             </a:fld>
             <a:endParaRPr lang="en-US"/>
           </a:p>
@@ -3128,7 +3106,7 @@
           <a:p>
             <a:fld id="{3EAEFB75-4DE4-4DFC-B956-52D01254B927}" type="datetimeFigureOut">
               <a:rPr lang="en-US" smtClean="0"/>
-              <a:t>3/8/2016</a:t>
+              <a:t>3/10/2016</a:t>
             </a:fld>
             <a:endParaRPr lang="en-US"/>
           </a:p>
@@ -3490,7 +3468,7 @@
           <a:p>
             <a:fld id="{3EAEFB75-4DE4-4DFC-B956-52D01254B927}" type="datetimeFigureOut">
               <a:rPr lang="en-US" smtClean="0"/>
-              <a:t>3/8/2016</a:t>
+              <a:t>3/10/2016</a:t>
             </a:fld>
             <a:endParaRPr lang="en-US"/>
           </a:p>
@@ -3717,7 +3695,7 @@
           <a:p>
             <a:fld id="{3EAEFB75-4DE4-4DFC-B956-52D01254B927}" type="datetimeFigureOut">
               <a:rPr lang="en-US" smtClean="0"/>
-              <a:t>3/8/2016</a:t>
+              <a:t>3/10/2016</a:t>
             </a:fld>
             <a:endParaRPr lang="en-US"/>
           </a:p>
@@ -3807,7 +3785,7 @@
           <a:p>
             <a:fld id="{3EAEFB75-4DE4-4DFC-B956-52D01254B927}" type="datetimeFigureOut">
               <a:rPr lang="en-US" smtClean="0"/>
-              <a:t>3/8/2016</a:t>
+              <a:t>3/10/2016</a:t>
             </a:fld>
             <a:endParaRPr lang="en-US"/>
           </a:p>
@@ -4074,7 +4052,7 @@
           <a:p>
             <a:fld id="{3EAEFB75-4DE4-4DFC-B956-52D01254B927}" type="datetimeFigureOut">
               <a:rPr lang="en-US" smtClean="0"/>
-              <a:t>3/8/2016</a:t>
+              <a:t>3/10/2016</a:t>
             </a:fld>
             <a:endParaRPr lang="en-US"/>
           </a:p>
@@ -4302,7 +4280,7 @@
           <a:p>
             <a:fld id="{3EAEFB75-4DE4-4DFC-B956-52D01254B927}" type="datetimeFigureOut">
               <a:rPr lang="en-US" smtClean="0"/>
-              <a:t>3/8/2016</a:t>
+              <a:t>3/10/2016</a:t>
             </a:fld>
             <a:endParaRPr lang="en-US"/>
           </a:p>
@@ -4801,7 +4779,7 @@
           <a:p>
             <a:fld id="{3EAEFB75-4DE4-4DFC-B956-52D01254B927}" type="datetimeFigureOut">
               <a:rPr lang="en-US" smtClean="0"/>
-              <a:t>3/8/2016</a:t>
+              <a:t>3/10/2016</a:t>
             </a:fld>
             <a:endParaRPr lang="en-US"/>
           </a:p>
@@ -5838,13 +5816,7 @@
               <a:rPr lang="en-US" sz="1600" dirty="0">
                 <a:latin typeface="+mj-lt"/>
               </a:rPr>
-              <a:t> are complete. Remainder are in progress or </a:t>
-            </a:r>
-            <a:r>
-              <a:rPr lang="en-US" sz="1600" dirty="0">
-                <a:latin typeface="+mj-lt"/>
-              </a:rPr>
-              <a:t>in the future</a:t>
+              <a:t> are complete. Remainder are in progress or in the future</a:t>
             </a:r>
           </a:p>
         </p:txBody>
@@ -6119,13 +6091,8 @@
           <a:p>
             <a:r>
               <a:rPr lang="en-US" sz="1800" dirty="0"/>
-              <a:t>Slide 3 images are </a:t>
-            </a:r>
-            <a:r>
-              <a:rPr lang="en-US" sz="1800" dirty="0"/>
-              <a:t>from: </a:t>
-            </a:r>
-            <a:endParaRPr lang="en-US" sz="1800" dirty="0"/>
+              <a:t>Slide 3 images are from: </a:t>
+            </a:r>
           </a:p>
           <a:p>
             <a:pPr lvl="1"/>
@@ -6133,13 +6100,7 @@
               <a:rPr lang="en-US" sz="1600" dirty="0">
                 <a:hlinkClick r:id="rId2"/>
               </a:rPr>
-              <a:t>http</a:t>
-            </a:r>
-            <a:r>
-              <a:rPr lang="en-US" sz="1600" dirty="0">
-                <a:hlinkClick r:id="rId2"/>
-              </a:rPr>
-              <a:t>://decompressionprosmarketing.com/blogs/decompression-pros/16891112-how-to-ask-for-referrals-from-medical-doctors</a:t>
+              <a:t>http://decompressionprosmarketing.com/blogs/decompression-pros/16891112-how-to-ask-for-referrals-from-medical-doctors</a:t>
             </a:r>
             <a:endParaRPr lang="en-US" sz="1600" dirty="0"/>
           </a:p>
@@ -6444,36 +6405,6 @@
           <a:chExt cx="0" cy="0"/>
         </a:xfrm>
       </p:grpSpPr>
-      <p:pic>
-        <p:nvPicPr>
-          <p:cNvPr id="3" name="Picture 2"/>
-          <p:cNvPicPr>
-            <a:picLocks noChangeAspect="1"/>
-          </p:cNvPicPr>
-          <p:nvPr/>
-        </p:nvPicPr>
-        <p:blipFill>
-          <a:blip r:embed="rId2" cstate="print">
-            <a:extLst>
-              <a:ext uri="{28A0092B-C50C-407E-A947-70E740481C1C}">
-                <a14:useLocalDpi xmlns:a14="http://schemas.microsoft.com/office/drawing/2010/main" val="0"/>
-              </a:ext>
-            </a:extLst>
-          </a:blip>
-          <a:stretch>
-            <a:fillRect/>
-          </a:stretch>
-        </p:blipFill>
-        <p:spPr>
-          <a:xfrm>
-            <a:off x="2971801" y="495300"/>
-            <a:ext cx="5820965" cy="4587790"/>
-          </a:xfrm>
-          <a:prstGeom prst="rect">
-            <a:avLst/>
-          </a:prstGeom>
-        </p:spPr>
-      </p:pic>
       <p:sp>
         <p:nvSpPr>
           <p:cNvPr id="4" name="Title 1"/>
@@ -6507,6 +6438,30 @@
           </a:p>
         </p:txBody>
       </p:sp>
+      <p:pic>
+        <p:nvPicPr>
+          <p:cNvPr id="5" name="Picture 4"/>
+          <p:cNvPicPr>
+            <a:picLocks noChangeAspect="1"/>
+          </p:cNvPicPr>
+          <p:nvPr/>
+        </p:nvPicPr>
+        <p:blipFill>
+          <a:blip r:embed="rId2"/>
+          <a:stretch>
+            <a:fillRect/>
+          </a:stretch>
+        </p:blipFill>
+        <p:spPr>
+          <a:xfrm>
+            <a:off x="1524000" y="1028700"/>
+            <a:ext cx="6303864" cy="4494660"/>
+          </a:xfrm>
+          <a:prstGeom prst="rect">
+            <a:avLst/>
+          </a:prstGeom>
+        </p:spPr>
+      </p:pic>
     </p:spTree>
     <p:extLst>
       <p:ext uri="{BB962C8B-B14F-4D97-AF65-F5344CB8AC3E}">
@@ -6672,7 +6627,6 @@
               <a:rPr lang="en-US" dirty="0"/>
               <a:t>JavaScript</a:t>
             </a:r>
-            <a:endParaRPr lang="en-US" dirty="0"/>
           </a:p>
         </p:txBody>
       </p:sp>

</xml_diff>

<commit_message>
updated deliverable 2 powerpoint with use case diagram
</commit_message>
<xml_diff>
--- a/Team Deliverable 2/Technical Presentation - FHIRed Up.pptx
+++ b/Team Deliverable 2/Technical Presentation - FHIRed Up.pptx
@@ -142,7 +142,7 @@
 </file>
 
 <file path=ppt/charts/chart1.xml><?xml version="1.0" encoding="utf-8"?>
-<c:chartSpace xmlns:c="http://schemas.openxmlformats.org/drawingml/2006/chart" xmlns:a="http://schemas.openxmlformats.org/drawingml/2006/main" xmlns:r="http://schemas.openxmlformats.org/officeDocument/2006/relationships">
+<c:chartSpace xmlns:c="http://schemas.openxmlformats.org/drawingml/2006/chart" xmlns:a="http://schemas.openxmlformats.org/drawingml/2006/main" xmlns:r="http://schemas.openxmlformats.org/officeDocument/2006/relationships" xmlns:c16r2="http://schemas.microsoft.com/office/drawing/2015/06/chart">
   <c:date1904 val="0"/>
   <c:lang val="en-US"/>
   <c:roundedCorners val="0"/>
@@ -198,7 +198,6 @@
           <c:dLbls>
             <c:dLbl>
               <c:idx val="0"/>
-              <c:layout/>
               <c:tx>
                 <c:rich>
                   <a:bodyPr/>
@@ -230,8 +229,9 @@
               <c:showPercent val="0"/>
               <c:showBubbleSize val="0"/>
               <c:extLst>
-                <c:ext xmlns:c15="http://schemas.microsoft.com/office/drawing/2012/chart" uri="{CE6537A1-D6FC-4f65-9D91-7224C49458BB}">
-                  <c15:layout/>
+                <c:ext xmlns:c15="http://schemas.microsoft.com/office/drawing/2012/chart" uri="{CE6537A1-D6FC-4f65-9D91-7224C49458BB}"/>
+                <c:ext xmlns:c16="http://schemas.microsoft.com/office/drawing/2014/chart" uri="{C3380CC4-5D6E-409C-BE32-E72D297353CC}">
+                  <c16:uniqueId val="{00000000-CBD6-47AD-B68C-CF16D1E4DC04}"/>
                 </c:ext>
               </c:extLst>
             </c:dLbl>
@@ -240,6 +240,9 @@
               <c:delete val="1"/>
               <c:extLst>
                 <c:ext xmlns:c15="http://schemas.microsoft.com/office/drawing/2012/chart" uri="{CE6537A1-D6FC-4f65-9D91-7224C49458BB}"/>
+                <c:ext xmlns:c16="http://schemas.microsoft.com/office/drawing/2014/chart" uri="{C3380CC4-5D6E-409C-BE32-E72D297353CC}">
+                  <c16:uniqueId val="{00000001-CBD6-47AD-B68C-CF16D1E4DC04}"/>
+                </c:ext>
               </c:extLst>
             </c:dLbl>
             <c:spPr>
@@ -294,6 +297,11 @@
             </c:numRef>
           </c:yVal>
           <c:smooth val="0"/>
+          <c:extLst>
+            <c:ext xmlns:c16="http://schemas.microsoft.com/office/drawing/2014/chart" uri="{C3380CC4-5D6E-409C-BE32-E72D297353CC}">
+              <c16:uniqueId val="{00000002-CBD6-47AD-B68C-CF16D1E4DC04}"/>
+            </c:ext>
+          </c:extLst>
         </c:ser>
         <c:ser>
           <c:idx val="1"/>
@@ -359,8 +367,9 @@
               <c:showPercent val="0"/>
               <c:showBubbleSize val="0"/>
               <c:extLst>
-                <c:ext xmlns:c15="http://schemas.microsoft.com/office/drawing/2012/chart" uri="{CE6537A1-D6FC-4f65-9D91-7224C49458BB}">
-                  <c15:layout/>
+                <c:ext xmlns:c15="http://schemas.microsoft.com/office/drawing/2012/chart" uri="{CE6537A1-D6FC-4f65-9D91-7224C49458BB}"/>
+                <c:ext xmlns:c16="http://schemas.microsoft.com/office/drawing/2014/chart" uri="{C3380CC4-5D6E-409C-BE32-E72D297353CC}">
+                  <c16:uniqueId val="{00000003-CBD6-47AD-B68C-CF16D1E4DC04}"/>
                 </c:ext>
               </c:extLst>
             </c:dLbl>
@@ -369,6 +378,9 @@
               <c:delete val="1"/>
               <c:extLst>
                 <c:ext xmlns:c15="http://schemas.microsoft.com/office/drawing/2012/chart" uri="{CE6537A1-D6FC-4f65-9D91-7224C49458BB}"/>
+                <c:ext xmlns:c16="http://schemas.microsoft.com/office/drawing/2014/chart" uri="{C3380CC4-5D6E-409C-BE32-E72D297353CC}">
+                  <c16:uniqueId val="{00000004-CBD6-47AD-B68C-CF16D1E4DC04}"/>
+                </c:ext>
               </c:extLst>
             </c:dLbl>
             <c:spPr>
@@ -423,6 +435,11 @@
             </c:numRef>
           </c:yVal>
           <c:smooth val="0"/>
+          <c:extLst>
+            <c:ext xmlns:c16="http://schemas.microsoft.com/office/drawing/2014/chart" uri="{C3380CC4-5D6E-409C-BE32-E72D297353CC}">
+              <c16:uniqueId val="{00000005-CBD6-47AD-B68C-CF16D1E4DC04}"/>
+            </c:ext>
+          </c:extLst>
         </c:ser>
         <c:ser>
           <c:idx val="3"/>
@@ -454,6 +471,9 @@
               <c:delete val="1"/>
               <c:extLst>
                 <c:ext xmlns:c15="http://schemas.microsoft.com/office/drawing/2012/chart" uri="{CE6537A1-D6FC-4f65-9D91-7224C49458BB}"/>
+                <c:ext xmlns:c16="http://schemas.microsoft.com/office/drawing/2014/chart" uri="{C3380CC4-5D6E-409C-BE32-E72D297353CC}">
+                  <c16:uniqueId val="{00000006-CBD6-47AD-B68C-CF16D1E4DC04}"/>
+                </c:ext>
               </c:extLst>
             </c:dLbl>
             <c:dLbl>
@@ -495,8 +515,9 @@
               <c:showPercent val="0"/>
               <c:showBubbleSize val="0"/>
               <c:extLst>
-                <c:ext xmlns:c15="http://schemas.microsoft.com/office/drawing/2012/chart" uri="{CE6537A1-D6FC-4f65-9D91-7224C49458BB}">
-                  <c15:layout/>
+                <c:ext xmlns:c15="http://schemas.microsoft.com/office/drawing/2012/chart" uri="{CE6537A1-D6FC-4f65-9D91-7224C49458BB}"/>
+                <c:ext xmlns:c16="http://schemas.microsoft.com/office/drawing/2014/chart" uri="{C3380CC4-5D6E-409C-BE32-E72D297353CC}">
+                  <c16:uniqueId val="{00000007-CBD6-47AD-B68C-CF16D1E4DC04}"/>
                 </c:ext>
               </c:extLst>
             </c:dLbl>
@@ -552,6 +573,11 @@
             </c:numRef>
           </c:yVal>
           <c:smooth val="0"/>
+          <c:extLst>
+            <c:ext xmlns:c16="http://schemas.microsoft.com/office/drawing/2014/chart" uri="{C3380CC4-5D6E-409C-BE32-E72D297353CC}">
+              <c16:uniqueId val="{00000008-CBD6-47AD-B68C-CF16D1E4DC04}"/>
+            </c:ext>
+          </c:extLst>
         </c:ser>
         <c:ser>
           <c:idx val="5"/>
@@ -617,8 +643,9 @@
               <c:showPercent val="0"/>
               <c:showBubbleSize val="0"/>
               <c:extLst>
-                <c:ext xmlns:c15="http://schemas.microsoft.com/office/drawing/2012/chart" uri="{CE6537A1-D6FC-4f65-9D91-7224C49458BB}">
-                  <c15:layout/>
+                <c:ext xmlns:c15="http://schemas.microsoft.com/office/drawing/2012/chart" uri="{CE6537A1-D6FC-4f65-9D91-7224C49458BB}"/>
+                <c:ext xmlns:c16="http://schemas.microsoft.com/office/drawing/2014/chart" uri="{C3380CC4-5D6E-409C-BE32-E72D297353CC}">
+                  <c16:uniqueId val="{00000009-CBD6-47AD-B68C-CF16D1E4DC04}"/>
                 </c:ext>
               </c:extLst>
             </c:dLbl>
@@ -627,6 +654,9 @@
               <c:delete val="1"/>
               <c:extLst>
                 <c:ext xmlns:c15="http://schemas.microsoft.com/office/drawing/2012/chart" uri="{CE6537A1-D6FC-4f65-9D91-7224C49458BB}"/>
+                <c:ext xmlns:c16="http://schemas.microsoft.com/office/drawing/2014/chart" uri="{C3380CC4-5D6E-409C-BE32-E72D297353CC}">
+                  <c16:uniqueId val="{0000000A-CBD6-47AD-B68C-CF16D1E4DC04}"/>
+                </c:ext>
               </c:extLst>
             </c:dLbl>
             <c:spPr>
@@ -681,6 +711,11 @@
             </c:numRef>
           </c:yVal>
           <c:smooth val="0"/>
+          <c:extLst>
+            <c:ext xmlns:c16="http://schemas.microsoft.com/office/drawing/2014/chart" uri="{C3380CC4-5D6E-409C-BE32-E72D297353CC}">
+              <c16:uniqueId val="{0000000B-CBD6-47AD-B68C-CF16D1E4DC04}"/>
+            </c:ext>
+          </c:extLst>
         </c:ser>
         <c:ser>
           <c:idx val="7"/>
@@ -746,8 +781,9 @@
               <c:showPercent val="0"/>
               <c:showBubbleSize val="0"/>
               <c:extLst>
-                <c:ext xmlns:c15="http://schemas.microsoft.com/office/drawing/2012/chart" uri="{CE6537A1-D6FC-4f65-9D91-7224C49458BB}">
-                  <c15:layout/>
+                <c:ext xmlns:c15="http://schemas.microsoft.com/office/drawing/2012/chart" uri="{CE6537A1-D6FC-4f65-9D91-7224C49458BB}"/>
+                <c:ext xmlns:c16="http://schemas.microsoft.com/office/drawing/2014/chart" uri="{C3380CC4-5D6E-409C-BE32-E72D297353CC}">
+                  <c16:uniqueId val="{0000000C-CBD6-47AD-B68C-CF16D1E4DC04}"/>
                 </c:ext>
               </c:extLst>
             </c:dLbl>
@@ -756,6 +792,9 @@
               <c:delete val="1"/>
               <c:extLst>
                 <c:ext xmlns:c15="http://schemas.microsoft.com/office/drawing/2012/chart" uri="{CE6537A1-D6FC-4f65-9D91-7224C49458BB}"/>
+                <c:ext xmlns:c16="http://schemas.microsoft.com/office/drawing/2014/chart" uri="{C3380CC4-5D6E-409C-BE32-E72D297353CC}">
+                  <c16:uniqueId val="{0000000D-CBD6-47AD-B68C-CF16D1E4DC04}"/>
+                </c:ext>
               </c:extLst>
             </c:dLbl>
             <c:spPr>
@@ -810,6 +849,11 @@
             </c:numRef>
           </c:yVal>
           <c:smooth val="0"/>
+          <c:extLst>
+            <c:ext xmlns:c16="http://schemas.microsoft.com/office/drawing/2014/chart" uri="{C3380CC4-5D6E-409C-BE32-E72D297353CC}">
+              <c16:uniqueId val="{0000000E-CBD6-47AD-B68C-CF16D1E4DC04}"/>
+            </c:ext>
+          </c:extLst>
         </c:ser>
         <c:ser>
           <c:idx val="8"/>
@@ -841,11 +885,13 @@
               <c:delete val="1"/>
               <c:extLst>
                 <c:ext xmlns:c15="http://schemas.microsoft.com/office/drawing/2012/chart" uri="{CE6537A1-D6FC-4f65-9D91-7224C49458BB}"/>
+                <c:ext xmlns:c16="http://schemas.microsoft.com/office/drawing/2014/chart" uri="{C3380CC4-5D6E-409C-BE32-E72D297353CC}">
+                  <c16:uniqueId val="{0000000F-CBD6-47AD-B68C-CF16D1E4DC04}"/>
+                </c:ext>
               </c:extLst>
             </c:dLbl>
             <c:dLbl>
               <c:idx val="1"/>
-              <c:layout/>
               <c:tx>
                 <c:rich>
                   <a:bodyPr/>
@@ -877,8 +923,9 @@
               <c:showPercent val="0"/>
               <c:showBubbleSize val="0"/>
               <c:extLst>
-                <c:ext xmlns:c15="http://schemas.microsoft.com/office/drawing/2012/chart" uri="{CE6537A1-D6FC-4f65-9D91-7224C49458BB}">
-                  <c15:layout/>
+                <c:ext xmlns:c15="http://schemas.microsoft.com/office/drawing/2012/chart" uri="{CE6537A1-D6FC-4f65-9D91-7224C49458BB}"/>
+                <c:ext xmlns:c16="http://schemas.microsoft.com/office/drawing/2014/chart" uri="{C3380CC4-5D6E-409C-BE32-E72D297353CC}">
+                  <c16:uniqueId val="{00000010-CBD6-47AD-B68C-CF16D1E4DC04}"/>
                 </c:ext>
               </c:extLst>
             </c:dLbl>
@@ -934,6 +981,11 @@
             </c:numRef>
           </c:yVal>
           <c:smooth val="0"/>
+          <c:extLst>
+            <c:ext xmlns:c16="http://schemas.microsoft.com/office/drawing/2014/chart" uri="{C3380CC4-5D6E-409C-BE32-E72D297353CC}">
+              <c16:uniqueId val="{00000011-CBD6-47AD-B68C-CF16D1E4DC04}"/>
+            </c:ext>
+          </c:extLst>
         </c:ser>
         <c:ser>
           <c:idx val="9"/>
@@ -1003,8 +1055,9 @@
               <c:showPercent val="0"/>
               <c:showBubbleSize val="0"/>
               <c:extLst>
-                <c:ext xmlns:c15="http://schemas.microsoft.com/office/drawing/2012/chart" uri="{CE6537A1-D6FC-4f65-9D91-7224C49458BB}">
-                  <c15:layout/>
+                <c:ext xmlns:c15="http://schemas.microsoft.com/office/drawing/2012/chart" uri="{CE6537A1-D6FC-4f65-9D91-7224C49458BB}"/>
+                <c:ext xmlns:c16="http://schemas.microsoft.com/office/drawing/2014/chart" uri="{C3380CC4-5D6E-409C-BE32-E72D297353CC}">
+                  <c16:uniqueId val="{00000012-CBD6-47AD-B68C-CF16D1E4DC04}"/>
                 </c:ext>
               </c:extLst>
             </c:dLbl>
@@ -1013,6 +1066,9 @@
               <c:delete val="1"/>
               <c:extLst>
                 <c:ext xmlns:c15="http://schemas.microsoft.com/office/drawing/2012/chart" uri="{CE6537A1-D6FC-4f65-9D91-7224C49458BB}"/>
+                <c:ext xmlns:c16="http://schemas.microsoft.com/office/drawing/2014/chart" uri="{C3380CC4-5D6E-409C-BE32-E72D297353CC}">
+                  <c16:uniqueId val="{00000013-CBD6-47AD-B68C-CF16D1E4DC04}"/>
+                </c:ext>
               </c:extLst>
             </c:dLbl>
             <c:spPr>
@@ -1067,6 +1123,11 @@
             </c:numRef>
           </c:yVal>
           <c:smooth val="0"/>
+          <c:extLst>
+            <c:ext xmlns:c16="http://schemas.microsoft.com/office/drawing/2014/chart" uri="{C3380CC4-5D6E-409C-BE32-E72D297353CC}">
+              <c16:uniqueId val="{00000014-CBD6-47AD-B68C-CF16D1E4DC04}"/>
+            </c:ext>
+          </c:extLst>
         </c:ser>
         <c:ser>
           <c:idx val="10"/>
@@ -1126,6 +1187,11 @@
             </c:numRef>
           </c:yVal>
           <c:smooth val="0"/>
+          <c:extLst>
+            <c:ext xmlns:c16="http://schemas.microsoft.com/office/drawing/2014/chart" uri="{C3380CC4-5D6E-409C-BE32-E72D297353CC}">
+              <c16:uniqueId val="{00000015-CBD6-47AD-B68C-CF16D1E4DC04}"/>
+            </c:ext>
+          </c:extLst>
         </c:ser>
         <c:ser>
           <c:idx val="2"/>
@@ -1156,6 +1222,9 @@
               <c:delete val="1"/>
               <c:extLst>
                 <c:ext xmlns:c15="http://schemas.microsoft.com/office/drawing/2012/chart" uri="{CE6537A1-D6FC-4f65-9D91-7224C49458BB}"/>
+                <c:ext xmlns:c16="http://schemas.microsoft.com/office/drawing/2014/chart" uri="{C3380CC4-5D6E-409C-BE32-E72D297353CC}">
+                  <c16:uniqueId val="{00000016-CBD6-47AD-B68C-CF16D1E4DC04}"/>
+                </c:ext>
               </c:extLst>
             </c:dLbl>
             <c:dLbl>
@@ -1197,8 +1266,9 @@
               <c:showPercent val="0"/>
               <c:showBubbleSize val="0"/>
               <c:extLst>
-                <c:ext xmlns:c15="http://schemas.microsoft.com/office/drawing/2012/chart" uri="{CE6537A1-D6FC-4f65-9D91-7224C49458BB}">
-                  <c15:layout/>
+                <c:ext xmlns:c15="http://schemas.microsoft.com/office/drawing/2012/chart" uri="{CE6537A1-D6FC-4f65-9D91-7224C49458BB}"/>
+                <c:ext xmlns:c16="http://schemas.microsoft.com/office/drawing/2014/chart" uri="{C3380CC4-5D6E-409C-BE32-E72D297353CC}">
+                  <c16:uniqueId val="{00000017-CBD6-47AD-B68C-CF16D1E4DC04}"/>
                 </c:ext>
               </c:extLst>
             </c:dLbl>
@@ -1254,6 +1324,11 @@
             </c:numRef>
           </c:yVal>
           <c:smooth val="0"/>
+          <c:extLst>
+            <c:ext xmlns:c16="http://schemas.microsoft.com/office/drawing/2014/chart" uri="{C3380CC4-5D6E-409C-BE32-E72D297353CC}">
+              <c16:uniqueId val="{00000018-CBD6-47AD-B68C-CF16D1E4DC04}"/>
+            </c:ext>
+          </c:extLst>
         </c:ser>
         <c:ser>
           <c:idx val="11"/>
@@ -1313,6 +1388,11 @@
             </c:numRef>
           </c:yVal>
           <c:smooth val="0"/>
+          <c:extLst>
+            <c:ext xmlns:c16="http://schemas.microsoft.com/office/drawing/2014/chart" uri="{C3380CC4-5D6E-409C-BE32-E72D297353CC}">
+              <c16:uniqueId val="{00000019-CBD6-47AD-B68C-CF16D1E4DC04}"/>
+            </c:ext>
+          </c:extLst>
         </c:ser>
         <c:ser>
           <c:idx val="4"/>
@@ -1343,6 +1423,9 @@
               <c:delete val="1"/>
               <c:extLst>
                 <c:ext xmlns:c15="http://schemas.microsoft.com/office/drawing/2012/chart" uri="{CE6537A1-D6FC-4f65-9D91-7224C49458BB}"/>
+                <c:ext xmlns:c16="http://schemas.microsoft.com/office/drawing/2014/chart" uri="{C3380CC4-5D6E-409C-BE32-E72D297353CC}">
+                  <c16:uniqueId val="{0000001A-CBD6-47AD-B68C-CF16D1E4DC04}"/>
+                </c:ext>
               </c:extLst>
             </c:dLbl>
             <c:dLbl>
@@ -1384,8 +1467,9 @@
               <c:showPercent val="0"/>
               <c:showBubbleSize val="0"/>
               <c:extLst>
-                <c:ext xmlns:c15="http://schemas.microsoft.com/office/drawing/2012/chart" uri="{CE6537A1-D6FC-4f65-9D91-7224C49458BB}">
-                  <c15:layout/>
+                <c:ext xmlns:c15="http://schemas.microsoft.com/office/drawing/2012/chart" uri="{CE6537A1-D6FC-4f65-9D91-7224C49458BB}"/>
+                <c:ext xmlns:c16="http://schemas.microsoft.com/office/drawing/2014/chart" uri="{C3380CC4-5D6E-409C-BE32-E72D297353CC}">
+                  <c16:uniqueId val="{0000001B-CBD6-47AD-B68C-CF16D1E4DC04}"/>
                 </c:ext>
               </c:extLst>
             </c:dLbl>
@@ -1441,6 +1525,11 @@
             </c:numRef>
           </c:yVal>
           <c:smooth val="0"/>
+          <c:extLst>
+            <c:ext xmlns:c16="http://schemas.microsoft.com/office/drawing/2014/chart" uri="{C3380CC4-5D6E-409C-BE32-E72D297353CC}">
+              <c16:uniqueId val="{0000001C-CBD6-47AD-B68C-CF16D1E4DC04}"/>
+            </c:ext>
+          </c:extLst>
         </c:ser>
         <c:ser>
           <c:idx val="6"/>
@@ -1471,6 +1560,9 @@
               <c:delete val="1"/>
               <c:extLst>
                 <c:ext xmlns:c15="http://schemas.microsoft.com/office/drawing/2012/chart" uri="{CE6537A1-D6FC-4f65-9D91-7224C49458BB}"/>
+                <c:ext xmlns:c16="http://schemas.microsoft.com/office/drawing/2014/chart" uri="{C3380CC4-5D6E-409C-BE32-E72D297353CC}">
+                  <c16:uniqueId val="{0000001D-CBD6-47AD-B68C-CF16D1E4DC04}"/>
+                </c:ext>
               </c:extLst>
             </c:dLbl>
             <c:dLbl>
@@ -1512,8 +1604,9 @@
               <c:showPercent val="0"/>
               <c:showBubbleSize val="0"/>
               <c:extLst>
-                <c:ext xmlns:c15="http://schemas.microsoft.com/office/drawing/2012/chart" uri="{CE6537A1-D6FC-4f65-9D91-7224C49458BB}">
-                  <c15:layout/>
+                <c:ext xmlns:c15="http://schemas.microsoft.com/office/drawing/2012/chart" uri="{CE6537A1-D6FC-4f65-9D91-7224C49458BB}"/>
+                <c:ext xmlns:c16="http://schemas.microsoft.com/office/drawing/2014/chart" uri="{C3380CC4-5D6E-409C-BE32-E72D297353CC}">
+                  <c16:uniqueId val="{0000001E-CBD6-47AD-B68C-CF16D1E4DC04}"/>
                 </c:ext>
               </c:extLst>
             </c:dLbl>
@@ -1569,6 +1662,11 @@
             </c:numRef>
           </c:yVal>
           <c:smooth val="0"/>
+          <c:extLst>
+            <c:ext xmlns:c16="http://schemas.microsoft.com/office/drawing/2014/chart" uri="{C3380CC4-5D6E-409C-BE32-E72D297353CC}">
+              <c16:uniqueId val="{0000001F-CBD6-47AD-B68C-CF16D1E4DC04}"/>
+            </c:ext>
+          </c:extLst>
         </c:ser>
         <c:dLbls>
           <c:dLblPos val="t"/>
@@ -1864,7 +1962,7 @@
           <a:p>
             <a:fld id="{3EAEFB75-4DE4-4DFC-B956-52D01254B927}" type="datetimeFigureOut">
               <a:rPr lang="en-US" smtClean="0"/>
-              <a:t>3/8/2016</a:t>
+              <a:t>3/10/2016</a:t>
             </a:fld>
             <a:endParaRPr lang="en-US"/>
           </a:p>
@@ -2217,7 +2315,7 @@
           <a:p>
             <a:fld id="{3EAEFB75-4DE4-4DFC-B956-52D01254B927}" type="datetimeFigureOut">
               <a:rPr lang="en-US" smtClean="0"/>
-              <a:t>3/8/2016</a:t>
+              <a:t>3/10/2016</a:t>
             </a:fld>
             <a:endParaRPr lang="en-US"/>
           </a:p>
@@ -2392,7 +2490,7 @@
           <a:p>
             <a:fld id="{3EAEFB75-4DE4-4DFC-B956-52D01254B927}" type="datetimeFigureOut">
               <a:rPr lang="en-US" smtClean="0"/>
-              <a:t>3/8/2016</a:t>
+              <a:t>3/10/2016</a:t>
             </a:fld>
             <a:endParaRPr lang="en-US"/>
           </a:p>
@@ -2505,7 +2603,7 @@
           <a:p>
             <a:fld id="{3EAEFB75-4DE4-4DFC-B956-52D01254B927}" type="datetimeFigureOut">
               <a:rPr lang="en-US" smtClean="0"/>
-              <a:t>3/8/2016</a:t>
+              <a:t>3/10/2016</a:t>
             </a:fld>
             <a:endParaRPr lang="en-US"/>
           </a:p>
@@ -2863,7 +2961,7 @@
           <a:p>
             <a:fld id="{3EAEFB75-4DE4-4DFC-B956-52D01254B927}" type="datetimeFigureOut">
               <a:rPr lang="en-US" smtClean="0"/>
-              <a:t>3/8/2016</a:t>
+              <a:t>3/10/2016</a:t>
             </a:fld>
             <a:endParaRPr lang="en-US"/>
           </a:p>
@@ -3128,7 +3226,7 @@
           <a:p>
             <a:fld id="{3EAEFB75-4DE4-4DFC-B956-52D01254B927}" type="datetimeFigureOut">
               <a:rPr lang="en-US" smtClean="0"/>
-              <a:t>3/8/2016</a:t>
+              <a:t>3/10/2016</a:t>
             </a:fld>
             <a:endParaRPr lang="en-US"/>
           </a:p>
@@ -3490,7 +3588,7 @@
           <a:p>
             <a:fld id="{3EAEFB75-4DE4-4DFC-B956-52D01254B927}" type="datetimeFigureOut">
               <a:rPr lang="en-US" smtClean="0"/>
-              <a:t>3/8/2016</a:t>
+              <a:t>3/10/2016</a:t>
             </a:fld>
             <a:endParaRPr lang="en-US"/>
           </a:p>
@@ -3717,7 +3815,7 @@
           <a:p>
             <a:fld id="{3EAEFB75-4DE4-4DFC-B956-52D01254B927}" type="datetimeFigureOut">
               <a:rPr lang="en-US" smtClean="0"/>
-              <a:t>3/8/2016</a:t>
+              <a:t>3/10/2016</a:t>
             </a:fld>
             <a:endParaRPr lang="en-US"/>
           </a:p>
@@ -3807,7 +3905,7 @@
           <a:p>
             <a:fld id="{3EAEFB75-4DE4-4DFC-B956-52D01254B927}" type="datetimeFigureOut">
               <a:rPr lang="en-US" smtClean="0"/>
-              <a:t>3/8/2016</a:t>
+              <a:t>3/10/2016</a:t>
             </a:fld>
             <a:endParaRPr lang="en-US"/>
           </a:p>
@@ -4074,7 +4172,7 @@
           <a:p>
             <a:fld id="{3EAEFB75-4DE4-4DFC-B956-52D01254B927}" type="datetimeFigureOut">
               <a:rPr lang="en-US" smtClean="0"/>
-              <a:t>3/8/2016</a:t>
+              <a:t>3/10/2016</a:t>
             </a:fld>
             <a:endParaRPr lang="en-US"/>
           </a:p>
@@ -4302,7 +4400,7 @@
           <a:p>
             <a:fld id="{3EAEFB75-4DE4-4DFC-B956-52D01254B927}" type="datetimeFigureOut">
               <a:rPr lang="en-US" smtClean="0"/>
-              <a:t>3/8/2016</a:t>
+              <a:t>3/10/2016</a:t>
             </a:fld>
             <a:endParaRPr lang="en-US"/>
           </a:p>
@@ -4801,7 +4899,7 @@
           <a:p>
             <a:fld id="{3EAEFB75-4DE4-4DFC-B956-52D01254B927}" type="datetimeFigureOut">
               <a:rPr lang="en-US" smtClean="0"/>
-              <a:t>3/8/2016</a:t>
+              <a:t>3/10/2016</a:t>
             </a:fld>
             <a:endParaRPr lang="en-US"/>
           </a:p>
@@ -5838,13 +5936,7 @@
               <a:rPr lang="en-US" sz="1600" dirty="0">
                 <a:latin typeface="+mj-lt"/>
               </a:rPr>
-              <a:t> are complete. Remainder are in progress or </a:t>
-            </a:r>
-            <a:r>
-              <a:rPr lang="en-US" sz="1600" dirty="0">
-                <a:latin typeface="+mj-lt"/>
-              </a:rPr>
-              <a:t>in the future</a:t>
+              <a:t> are complete. Remainder are in progress or in the future</a:t>
             </a:r>
           </a:p>
         </p:txBody>
@@ -6119,13 +6211,8 @@
           <a:p>
             <a:r>
               <a:rPr lang="en-US" sz="1800" dirty="0"/>
-              <a:t>Slide 3 images are </a:t>
-            </a:r>
-            <a:r>
-              <a:rPr lang="en-US" sz="1800" dirty="0"/>
-              <a:t>from: </a:t>
-            </a:r>
-            <a:endParaRPr lang="en-US" sz="1800" dirty="0"/>
+              <a:t>Slide 3 images are from: </a:t>
+            </a:r>
           </a:p>
           <a:p>
             <a:pPr lvl="1"/>
@@ -6133,13 +6220,7 @@
               <a:rPr lang="en-US" sz="1600" dirty="0">
                 <a:hlinkClick r:id="rId2"/>
               </a:rPr>
-              <a:t>http</a:t>
-            </a:r>
-            <a:r>
-              <a:rPr lang="en-US" sz="1600" dirty="0">
-                <a:hlinkClick r:id="rId2"/>
-              </a:rPr>
-              <a:t>://decompressionprosmarketing.com/blogs/decompression-pros/16891112-how-to-ask-for-referrals-from-medical-doctors</a:t>
+              <a:t>http://decompressionprosmarketing.com/blogs/decompression-pros/16891112-how-to-ask-for-referrals-from-medical-doctors</a:t>
             </a:r>
             <a:endParaRPr lang="en-US" sz="1600" dirty="0"/>
           </a:p>
@@ -6328,9 +6409,58 @@
           </a:p>
         </p:txBody>
       </p:sp>
+      <p:sp>
+        <p:nvSpPr>
+          <p:cNvPr id="8" name="Title 1"/>
+          <p:cNvSpPr txBox="1">
+            <a:spLocks/>
+          </p:cNvSpPr>
+          <p:nvPr/>
+        </p:nvSpPr>
+        <p:spPr>
+          <a:xfrm>
+            <a:off x="762000" y="190500"/>
+            <a:ext cx="8153400" cy="609600"/>
+          </a:xfrm>
+          <a:prstGeom prst="rect">
+            <a:avLst/>
+          </a:prstGeom>
+          <a:solidFill>
+            <a:schemeClr val="bg1"/>
+          </a:solidFill>
+        </p:spPr>
+        <p:txBody>
+          <a:bodyPr bIns="91440" anchor="b" anchorCtr="0">
+            <a:noAutofit/>
+          </a:bodyPr>
+          <a:lstStyle>
+            <a:lvl1pPr algn="l" rtl="0" eaLnBrk="1" latinLnBrk="0" hangingPunct="1">
+              <a:spcBef>
+                <a:spcPct val="0"/>
+              </a:spcBef>
+              <a:buNone/>
+              <a:defRPr kumimoji="0" sz="4000" kern="1200">
+                <a:solidFill>
+                  <a:schemeClr val="tx2"/>
+                </a:solidFill>
+                <a:latin typeface="+mj-lt"/>
+                <a:ea typeface="+mj-ea"/>
+                <a:cs typeface="+mj-cs"/>
+              </a:defRPr>
+            </a:lvl1pPr>
+          </a:lstStyle>
+          <a:p>
+            <a:r>
+              <a:rPr lang="en-US" sz="3600" dirty="0" smtClean="0"/>
+              <a:t>Use Case Diagram</a:t>
+            </a:r>
+            <a:endParaRPr lang="en-US" sz="3600" dirty="0"/>
+          </a:p>
+        </p:txBody>
+      </p:sp>
       <p:pic>
         <p:nvPicPr>
-          <p:cNvPr id="7" name="Picture 6"/>
+          <p:cNvPr id="2" name="Picture 1"/>
           <p:cNvPicPr>
             <a:picLocks noChangeAspect="1"/>
           </p:cNvPicPr>
@@ -6350,63 +6480,14 @@
         </p:blipFill>
         <p:spPr>
           <a:xfrm>
-            <a:off x="3317631" y="1562101"/>
-            <a:ext cx="5568990" cy="3154463"/>
+            <a:off x="3151894" y="800100"/>
+            <a:ext cx="5801606" cy="4615530"/>
           </a:xfrm>
           <a:prstGeom prst="rect">
             <a:avLst/>
           </a:prstGeom>
         </p:spPr>
       </p:pic>
-      <p:sp>
-        <p:nvSpPr>
-          <p:cNvPr id="8" name="Title 1"/>
-          <p:cNvSpPr txBox="1">
-            <a:spLocks/>
-          </p:cNvSpPr>
-          <p:nvPr/>
-        </p:nvSpPr>
-        <p:spPr>
-          <a:xfrm>
-            <a:off x="762000" y="190500"/>
-            <a:ext cx="8153400" cy="609600"/>
-          </a:xfrm>
-          <a:prstGeom prst="rect">
-            <a:avLst/>
-          </a:prstGeom>
-          <a:solidFill>
-            <a:schemeClr val="bg1"/>
-          </a:solidFill>
-        </p:spPr>
-        <p:txBody>
-          <a:bodyPr bIns="91440" anchor="b" anchorCtr="0">
-            <a:noAutofit/>
-          </a:bodyPr>
-          <a:lstStyle>
-            <a:lvl1pPr algn="l" rtl="0" eaLnBrk="1" latinLnBrk="0" hangingPunct="1">
-              <a:spcBef>
-                <a:spcPct val="0"/>
-              </a:spcBef>
-              <a:buNone/>
-              <a:defRPr kumimoji="0" sz="4000" kern="1200">
-                <a:solidFill>
-                  <a:schemeClr val="tx2"/>
-                </a:solidFill>
-                <a:latin typeface="+mj-lt"/>
-                <a:ea typeface="+mj-ea"/>
-                <a:cs typeface="+mj-cs"/>
-              </a:defRPr>
-            </a:lvl1pPr>
-          </a:lstStyle>
-          <a:p>
-            <a:r>
-              <a:rPr lang="en-US" sz="3600" dirty="0" smtClean="0"/>
-              <a:t>Use Case Diagram</a:t>
-            </a:r>
-            <a:endParaRPr lang="en-US" sz="3600" dirty="0"/>
-          </a:p>
-        </p:txBody>
-      </p:sp>
     </p:spTree>
     <p:extLst>
       <p:ext uri="{BB962C8B-B14F-4D97-AF65-F5344CB8AC3E}">
@@ -6672,7 +6753,6 @@
               <a:rPr lang="en-US" dirty="0"/>
               <a:t>JavaScript</a:t>
             </a:r>
-            <a:endParaRPr lang="en-US" dirty="0"/>
           </a:p>
         </p:txBody>
       </p:sp>

</xml_diff>

<commit_message>
Updated powerpoint with new use case and architectural diagrams
</commit_message>
<xml_diff>
--- a/Team Deliverable 2/Technical Presentation - FHIRed Up.pptx
+++ b/Team Deliverable 2/Technical Presentation - FHIRed Up.pptx
@@ -6527,14 +6527,14 @@
       </p:grpSpPr>
       <p:pic>
         <p:nvPicPr>
-          <p:cNvPr id="3" name="Picture 2"/>
+          <p:cNvPr id="2" name="Picture 1"/>
           <p:cNvPicPr>
             <a:picLocks noChangeAspect="1"/>
           </p:cNvPicPr>
           <p:nvPr/>
         </p:nvPicPr>
         <p:blipFill>
-          <a:blip r:embed="rId2" cstate="print">
+          <a:blip r:embed="rId2">
             <a:extLst>
               <a:ext uri="{28A0092B-C50C-407E-A947-70E740481C1C}">
                 <a14:useLocalDpi xmlns:a14="http://schemas.microsoft.com/office/drawing/2010/main" val="0"/>
@@ -6547,47 +6547,14 @@
         </p:blipFill>
         <p:spPr>
           <a:xfrm>
-            <a:off x="2971801" y="495300"/>
-            <a:ext cx="5820965" cy="4587790"/>
+            <a:off x="762000" y="114300"/>
+            <a:ext cx="7199419" cy="5418712"/>
           </a:xfrm>
           <a:prstGeom prst="rect">
             <a:avLst/>
           </a:prstGeom>
         </p:spPr>
       </p:pic>
-      <p:sp>
-        <p:nvSpPr>
-          <p:cNvPr id="4" name="Title 1"/>
-          <p:cNvSpPr>
-            <a:spLocks noGrp="1"/>
-          </p:cNvSpPr>
-          <p:nvPr>
-            <p:ph type="title"/>
-          </p:nvPr>
-        </p:nvSpPr>
-        <p:spPr>
-          <a:xfrm>
-            <a:off x="762000" y="190500"/>
-            <a:ext cx="8153400" cy="609600"/>
-          </a:xfrm>
-          <a:solidFill>
-            <a:schemeClr val="bg1"/>
-          </a:solidFill>
-        </p:spPr>
-        <p:txBody>
-          <a:bodyPr>
-            <a:noAutofit/>
-          </a:bodyPr>
-          <a:lstStyle/>
-          <a:p>
-            <a:r>
-              <a:rPr lang="en-US" sz="3600" dirty="0" smtClean="0"/>
-              <a:t>RADV Architecture</a:t>
-            </a:r>
-            <a:endParaRPr lang="en-US" sz="3600" dirty="0"/>
-          </a:p>
-        </p:txBody>
-      </p:sp>
     </p:spTree>
     <p:extLst>
       <p:ext uri="{BB962C8B-B14F-4D97-AF65-F5344CB8AC3E}">

</xml_diff>

<commit_message>
updated powerpoint to include narrations
</commit_message>
<xml_diff>
--- a/Team Deliverable 2/Technical Presentation - FHIRed Up.pptx
+++ b/Team Deliverable 2/Technical Presentation - FHIRed Up.pptx
@@ -4,11 +4,14 @@
   <p:sldMasterIdLst>
     <p:sldMasterId id="2147483684" r:id="rId1"/>
   </p:sldMasterIdLst>
+  <p:notesMasterIdLst>
+    <p:notesMasterId r:id="rId15"/>
+  </p:notesMasterIdLst>
   <p:sldIdLst>
     <p:sldId id="256" r:id="rId2"/>
     <p:sldId id="257" r:id="rId3"/>
-    <p:sldId id="258" r:id="rId4"/>
-    <p:sldId id="259" r:id="rId5"/>
+    <p:sldId id="259" r:id="rId4"/>
+    <p:sldId id="258" r:id="rId5"/>
     <p:sldId id="261" r:id="rId6"/>
     <p:sldId id="266" r:id="rId7"/>
     <p:sldId id="267" r:id="rId8"/>
@@ -131,6 +134,9 @@
         </p15:guide>
       </p15:sldGuideLst>
     </p:ext>
+    <p:ext uri="{2D200454-40CA-4A62-9FC3-DE9A4176ACB9}">
+      <p15:notesGuideLst xmlns:p15="http://schemas.microsoft.com/office/powerpoint/2012/main"/>
+    </p:ext>
   </p:extLst>
 </p:presentation>
 </file>
@@ -198,6 +204,7 @@
           <c:dLbls>
             <c:dLbl>
               <c:idx val="0"/>
+              <c:layout/>
               <c:tx>
                 <c:rich>
                   <a:bodyPr/>
@@ -229,7 +236,9 @@
               <c:showPercent val="0"/>
               <c:showBubbleSize val="0"/>
               <c:extLst>
-                <c:ext xmlns:c15="http://schemas.microsoft.com/office/drawing/2012/chart" uri="{CE6537A1-D6FC-4f65-9D91-7224C49458BB}"/>
+                <c:ext xmlns:c15="http://schemas.microsoft.com/office/drawing/2012/chart" uri="{CE6537A1-D6FC-4f65-9D91-7224C49458BB}">
+                  <c15:layout/>
+                </c:ext>
                 <c:ext xmlns:c16="http://schemas.microsoft.com/office/drawing/2014/chart" uri="{C3380CC4-5D6E-409C-BE32-E72D297353CC}">
                   <c16:uniqueId val="{00000000-CBD6-47AD-B68C-CF16D1E4DC04}"/>
                 </c:ext>
@@ -367,7 +376,9 @@
               <c:showPercent val="0"/>
               <c:showBubbleSize val="0"/>
               <c:extLst>
-                <c:ext xmlns:c15="http://schemas.microsoft.com/office/drawing/2012/chart" uri="{CE6537A1-D6FC-4f65-9D91-7224C49458BB}"/>
+                <c:ext xmlns:c15="http://schemas.microsoft.com/office/drawing/2012/chart" uri="{CE6537A1-D6FC-4f65-9D91-7224C49458BB}">
+                  <c15:layout/>
+                </c:ext>
                 <c:ext xmlns:c16="http://schemas.microsoft.com/office/drawing/2014/chart" uri="{C3380CC4-5D6E-409C-BE32-E72D297353CC}">
                   <c16:uniqueId val="{00000003-CBD6-47AD-B68C-CF16D1E4DC04}"/>
                 </c:ext>
@@ -515,7 +526,9 @@
               <c:showPercent val="0"/>
               <c:showBubbleSize val="0"/>
               <c:extLst>
-                <c:ext xmlns:c15="http://schemas.microsoft.com/office/drawing/2012/chart" uri="{CE6537A1-D6FC-4f65-9D91-7224C49458BB}"/>
+                <c:ext xmlns:c15="http://schemas.microsoft.com/office/drawing/2012/chart" uri="{CE6537A1-D6FC-4f65-9D91-7224C49458BB}">
+                  <c15:layout/>
+                </c:ext>
                 <c:ext xmlns:c16="http://schemas.microsoft.com/office/drawing/2014/chart" uri="{C3380CC4-5D6E-409C-BE32-E72D297353CC}">
                   <c16:uniqueId val="{00000007-CBD6-47AD-B68C-CF16D1E4DC04}"/>
                 </c:ext>
@@ -643,7 +656,9 @@
               <c:showPercent val="0"/>
               <c:showBubbleSize val="0"/>
               <c:extLst>
-                <c:ext xmlns:c15="http://schemas.microsoft.com/office/drawing/2012/chart" uri="{CE6537A1-D6FC-4f65-9D91-7224C49458BB}"/>
+                <c:ext xmlns:c15="http://schemas.microsoft.com/office/drawing/2012/chart" uri="{CE6537A1-D6FC-4f65-9D91-7224C49458BB}">
+                  <c15:layout/>
+                </c:ext>
                 <c:ext xmlns:c16="http://schemas.microsoft.com/office/drawing/2014/chart" uri="{C3380CC4-5D6E-409C-BE32-E72D297353CC}">
                   <c16:uniqueId val="{00000009-CBD6-47AD-B68C-CF16D1E4DC04}"/>
                 </c:ext>
@@ -781,7 +796,9 @@
               <c:showPercent val="0"/>
               <c:showBubbleSize val="0"/>
               <c:extLst>
-                <c:ext xmlns:c15="http://schemas.microsoft.com/office/drawing/2012/chart" uri="{CE6537A1-D6FC-4f65-9D91-7224C49458BB}"/>
+                <c:ext xmlns:c15="http://schemas.microsoft.com/office/drawing/2012/chart" uri="{CE6537A1-D6FC-4f65-9D91-7224C49458BB}">
+                  <c15:layout/>
+                </c:ext>
                 <c:ext xmlns:c16="http://schemas.microsoft.com/office/drawing/2014/chart" uri="{C3380CC4-5D6E-409C-BE32-E72D297353CC}">
                   <c16:uniqueId val="{0000000C-CBD6-47AD-B68C-CF16D1E4DC04}"/>
                 </c:ext>
@@ -892,6 +909,7 @@
             </c:dLbl>
             <c:dLbl>
               <c:idx val="1"/>
+              <c:layout/>
               <c:tx>
                 <c:rich>
                   <a:bodyPr/>
@@ -923,7 +941,9 @@
               <c:showPercent val="0"/>
               <c:showBubbleSize val="0"/>
               <c:extLst>
-                <c:ext xmlns:c15="http://schemas.microsoft.com/office/drawing/2012/chart" uri="{CE6537A1-D6FC-4f65-9D91-7224C49458BB}"/>
+                <c:ext xmlns:c15="http://schemas.microsoft.com/office/drawing/2012/chart" uri="{CE6537A1-D6FC-4f65-9D91-7224C49458BB}">
+                  <c15:layout/>
+                </c:ext>
                 <c:ext xmlns:c16="http://schemas.microsoft.com/office/drawing/2014/chart" uri="{C3380CC4-5D6E-409C-BE32-E72D297353CC}">
                   <c16:uniqueId val="{00000010-CBD6-47AD-B68C-CF16D1E4DC04}"/>
                 </c:ext>
@@ -1055,7 +1075,9 @@
               <c:showPercent val="0"/>
               <c:showBubbleSize val="0"/>
               <c:extLst>
-                <c:ext xmlns:c15="http://schemas.microsoft.com/office/drawing/2012/chart" uri="{CE6537A1-D6FC-4f65-9D91-7224C49458BB}"/>
+                <c:ext xmlns:c15="http://schemas.microsoft.com/office/drawing/2012/chart" uri="{CE6537A1-D6FC-4f65-9D91-7224C49458BB}">
+                  <c15:layout/>
+                </c:ext>
                 <c:ext xmlns:c16="http://schemas.microsoft.com/office/drawing/2014/chart" uri="{C3380CC4-5D6E-409C-BE32-E72D297353CC}">
                   <c16:uniqueId val="{00000012-CBD6-47AD-B68C-CF16D1E4DC04}"/>
                 </c:ext>
@@ -1266,7 +1288,9 @@
               <c:showPercent val="0"/>
               <c:showBubbleSize val="0"/>
               <c:extLst>
-                <c:ext xmlns:c15="http://schemas.microsoft.com/office/drawing/2012/chart" uri="{CE6537A1-D6FC-4f65-9D91-7224C49458BB}"/>
+                <c:ext xmlns:c15="http://schemas.microsoft.com/office/drawing/2012/chart" uri="{CE6537A1-D6FC-4f65-9D91-7224C49458BB}">
+                  <c15:layout/>
+                </c:ext>
                 <c:ext xmlns:c16="http://schemas.microsoft.com/office/drawing/2014/chart" uri="{C3380CC4-5D6E-409C-BE32-E72D297353CC}">
                   <c16:uniqueId val="{00000017-CBD6-47AD-B68C-CF16D1E4DC04}"/>
                 </c:ext>
@@ -1467,7 +1491,9 @@
               <c:showPercent val="0"/>
               <c:showBubbleSize val="0"/>
               <c:extLst>
-                <c:ext xmlns:c15="http://schemas.microsoft.com/office/drawing/2012/chart" uri="{CE6537A1-D6FC-4f65-9D91-7224C49458BB}"/>
+                <c:ext xmlns:c15="http://schemas.microsoft.com/office/drawing/2012/chart" uri="{CE6537A1-D6FC-4f65-9D91-7224C49458BB}">
+                  <c15:layout/>
+                </c:ext>
                 <c:ext xmlns:c16="http://schemas.microsoft.com/office/drawing/2014/chart" uri="{C3380CC4-5D6E-409C-BE32-E72D297353CC}">
                   <c16:uniqueId val="{0000001B-CBD6-47AD-B68C-CF16D1E4DC04}"/>
                 </c:ext>
@@ -1604,7 +1630,9 @@
               <c:showPercent val="0"/>
               <c:showBubbleSize val="0"/>
               <c:extLst>
-                <c:ext xmlns:c15="http://schemas.microsoft.com/office/drawing/2012/chart" uri="{CE6537A1-D6FC-4f65-9D91-7224C49458BB}"/>
+                <c:ext xmlns:c15="http://schemas.microsoft.com/office/drawing/2012/chart" uri="{CE6537A1-D6FC-4f65-9D91-7224C49458BB}">
+                  <c15:layout/>
+                </c:ext>
                 <c:ext xmlns:c16="http://schemas.microsoft.com/office/drawing/2014/chart" uri="{C3380CC4-5D6E-409C-BE32-E72D297353CC}">
                   <c16:uniqueId val="{0000001E-CBD6-47AD-B68C-CF16D1E4DC04}"/>
                 </c:ext>
@@ -1766,6 +1794,1496 @@
     <p:text>add color to use diagram. I have visio 2013 which disables legacy features. </p:text>
   </p:cm>
 </p:cmLst>
+</file>
+
+<file path=ppt/notesMasters/notesMaster1.xml><?xml version="1.0" encoding="utf-8"?>
+<p:notesMaster xmlns:a="http://schemas.openxmlformats.org/drawingml/2006/main" xmlns:r="http://schemas.openxmlformats.org/officeDocument/2006/relationships" xmlns:p="http://schemas.openxmlformats.org/presentationml/2006/main">
+  <p:cSld>
+    <p:bg>
+      <p:bgRef idx="1001">
+        <a:schemeClr val="bg1"/>
+      </p:bgRef>
+    </p:bg>
+    <p:spTree>
+      <p:nvGrpSpPr>
+        <p:cNvPr id="1" name=""/>
+        <p:cNvGrpSpPr/>
+        <p:nvPr/>
+      </p:nvGrpSpPr>
+      <p:grpSpPr>
+        <a:xfrm>
+          <a:off x="0" y="0"/>
+          <a:ext cx="0" cy="0"/>
+          <a:chOff x="0" y="0"/>
+          <a:chExt cx="0" cy="0"/>
+        </a:xfrm>
+      </p:grpSpPr>
+      <p:sp>
+        <p:nvSpPr>
+          <p:cNvPr id="2" name="Header Placeholder 1"/>
+          <p:cNvSpPr>
+            <a:spLocks noGrp="1"/>
+          </p:cNvSpPr>
+          <p:nvPr>
+            <p:ph type="hdr" sz="quarter"/>
+          </p:nvPr>
+        </p:nvSpPr>
+        <p:spPr>
+          <a:xfrm>
+            <a:off x="0" y="0"/>
+            <a:ext cx="2971800" cy="458788"/>
+          </a:xfrm>
+          <a:prstGeom prst="rect">
+            <a:avLst/>
+          </a:prstGeom>
+        </p:spPr>
+        <p:txBody>
+          <a:bodyPr vert="horz" lIns="91440" tIns="45720" rIns="91440" bIns="45720" rtlCol="0"/>
+          <a:lstStyle>
+            <a:lvl1pPr algn="l">
+              <a:defRPr sz="1200"/>
+            </a:lvl1pPr>
+          </a:lstStyle>
+          <a:p>
+            <a:endParaRPr lang="en-US"/>
+          </a:p>
+        </p:txBody>
+      </p:sp>
+      <p:sp>
+        <p:nvSpPr>
+          <p:cNvPr id="3" name="Date Placeholder 2"/>
+          <p:cNvSpPr>
+            <a:spLocks noGrp="1"/>
+          </p:cNvSpPr>
+          <p:nvPr>
+            <p:ph type="dt" idx="1"/>
+          </p:nvPr>
+        </p:nvSpPr>
+        <p:spPr>
+          <a:xfrm>
+            <a:off x="3884613" y="0"/>
+            <a:ext cx="2971800" cy="458788"/>
+          </a:xfrm>
+          <a:prstGeom prst="rect">
+            <a:avLst/>
+          </a:prstGeom>
+        </p:spPr>
+        <p:txBody>
+          <a:bodyPr vert="horz" lIns="91440" tIns="45720" rIns="91440" bIns="45720" rtlCol="0"/>
+          <a:lstStyle>
+            <a:lvl1pPr algn="r">
+              <a:defRPr sz="1200"/>
+            </a:lvl1pPr>
+          </a:lstStyle>
+          <a:p>
+            <a:fld id="{82AF1EC4-0AE9-4ABA-827F-84879B727577}" type="datetimeFigureOut">
+              <a:rPr lang="en-US" smtClean="0"/>
+              <a:t>3/10/2016</a:t>
+            </a:fld>
+            <a:endParaRPr lang="en-US"/>
+          </a:p>
+        </p:txBody>
+      </p:sp>
+      <p:sp>
+        <p:nvSpPr>
+          <p:cNvPr id="4" name="Slide Image Placeholder 3"/>
+          <p:cNvSpPr>
+            <a:spLocks noGrp="1" noRot="1" noChangeAspect="1"/>
+          </p:cNvSpPr>
+          <p:nvPr>
+            <p:ph type="sldImg" idx="2"/>
+          </p:nvPr>
+        </p:nvSpPr>
+        <p:spPr>
+          <a:xfrm>
+            <a:off x="960438" y="1143000"/>
+            <a:ext cx="4937125" cy="3086100"/>
+          </a:xfrm>
+          <a:prstGeom prst="rect">
+            <a:avLst/>
+          </a:prstGeom>
+          <a:noFill/>
+          <a:ln w="12700">
+            <a:solidFill>
+              <a:prstClr val="black"/>
+            </a:solidFill>
+          </a:ln>
+        </p:spPr>
+        <p:txBody>
+          <a:bodyPr vert="horz" lIns="91440" tIns="45720" rIns="91440" bIns="45720" rtlCol="0" anchor="ctr"/>
+          <a:lstStyle/>
+          <a:p>
+            <a:endParaRPr lang="en-US"/>
+          </a:p>
+        </p:txBody>
+      </p:sp>
+      <p:sp>
+        <p:nvSpPr>
+          <p:cNvPr id="5" name="Notes Placeholder 4"/>
+          <p:cNvSpPr>
+            <a:spLocks noGrp="1"/>
+          </p:cNvSpPr>
+          <p:nvPr>
+            <p:ph type="body" sz="quarter" idx="3"/>
+          </p:nvPr>
+        </p:nvSpPr>
+        <p:spPr>
+          <a:xfrm>
+            <a:off x="685800" y="4400550"/>
+            <a:ext cx="5486400" cy="3600450"/>
+          </a:xfrm>
+          <a:prstGeom prst="rect">
+            <a:avLst/>
+          </a:prstGeom>
+        </p:spPr>
+        <p:txBody>
+          <a:bodyPr vert="horz" lIns="91440" tIns="45720" rIns="91440" bIns="45720" rtlCol="0"/>
+          <a:lstStyle/>
+          <a:p>
+            <a:pPr lvl="0"/>
+            <a:r>
+              <a:rPr lang="en-US" smtClean="0"/>
+              <a:t>Edit Master text styles</a:t>
+            </a:r>
+          </a:p>
+          <a:p>
+            <a:pPr lvl="1"/>
+            <a:r>
+              <a:rPr lang="en-US" smtClean="0"/>
+              <a:t>Second level</a:t>
+            </a:r>
+          </a:p>
+          <a:p>
+            <a:pPr lvl="2"/>
+            <a:r>
+              <a:rPr lang="en-US" smtClean="0"/>
+              <a:t>Third level</a:t>
+            </a:r>
+          </a:p>
+          <a:p>
+            <a:pPr lvl="3"/>
+            <a:r>
+              <a:rPr lang="en-US" smtClean="0"/>
+              <a:t>Fourth level</a:t>
+            </a:r>
+          </a:p>
+          <a:p>
+            <a:pPr lvl="4"/>
+            <a:r>
+              <a:rPr lang="en-US" smtClean="0"/>
+              <a:t>Fifth level</a:t>
+            </a:r>
+            <a:endParaRPr lang="en-US"/>
+          </a:p>
+        </p:txBody>
+      </p:sp>
+      <p:sp>
+        <p:nvSpPr>
+          <p:cNvPr id="6" name="Footer Placeholder 5"/>
+          <p:cNvSpPr>
+            <a:spLocks noGrp="1"/>
+          </p:cNvSpPr>
+          <p:nvPr>
+            <p:ph type="ftr" sz="quarter" idx="4"/>
+          </p:nvPr>
+        </p:nvSpPr>
+        <p:spPr>
+          <a:xfrm>
+            <a:off x="0" y="8685213"/>
+            <a:ext cx="2971800" cy="458787"/>
+          </a:xfrm>
+          <a:prstGeom prst="rect">
+            <a:avLst/>
+          </a:prstGeom>
+        </p:spPr>
+        <p:txBody>
+          <a:bodyPr vert="horz" lIns="91440" tIns="45720" rIns="91440" bIns="45720" rtlCol="0" anchor="b"/>
+          <a:lstStyle>
+            <a:lvl1pPr algn="l">
+              <a:defRPr sz="1200"/>
+            </a:lvl1pPr>
+          </a:lstStyle>
+          <a:p>
+            <a:endParaRPr lang="en-US"/>
+          </a:p>
+        </p:txBody>
+      </p:sp>
+      <p:sp>
+        <p:nvSpPr>
+          <p:cNvPr id="7" name="Slide Number Placeholder 6"/>
+          <p:cNvSpPr>
+            <a:spLocks noGrp="1"/>
+          </p:cNvSpPr>
+          <p:nvPr>
+            <p:ph type="sldNum" sz="quarter" idx="5"/>
+          </p:nvPr>
+        </p:nvSpPr>
+        <p:spPr>
+          <a:xfrm>
+            <a:off x="3884613" y="8685213"/>
+            <a:ext cx="2971800" cy="458787"/>
+          </a:xfrm>
+          <a:prstGeom prst="rect">
+            <a:avLst/>
+          </a:prstGeom>
+        </p:spPr>
+        <p:txBody>
+          <a:bodyPr vert="horz" lIns="91440" tIns="45720" rIns="91440" bIns="45720" rtlCol="0" anchor="b"/>
+          <a:lstStyle>
+            <a:lvl1pPr algn="r">
+              <a:defRPr sz="1200"/>
+            </a:lvl1pPr>
+          </a:lstStyle>
+          <a:p>
+            <a:fld id="{64DBF1C4-A8A4-46A4-960B-68980B6D50C1}" type="slidenum">
+              <a:rPr lang="en-US" smtClean="0"/>
+              <a:t>‹#›</a:t>
+            </a:fld>
+            <a:endParaRPr lang="en-US"/>
+          </a:p>
+        </p:txBody>
+      </p:sp>
+    </p:spTree>
+    <p:extLst>
+      <p:ext uri="{BB962C8B-B14F-4D97-AF65-F5344CB8AC3E}">
+        <p14:creationId xmlns:p14="http://schemas.microsoft.com/office/powerpoint/2010/main" val="2976403687"/>
+      </p:ext>
+    </p:extLst>
+  </p:cSld>
+  <p:clrMap bg1="lt1" tx1="dk1" bg2="lt2" tx2="dk2" accent1="accent1" accent2="accent2" accent3="accent3" accent4="accent4" accent5="accent5" accent6="accent6" hlink="hlink" folHlink="folHlink"/>
+  <p:notesStyle>
+    <a:lvl1pPr marL="0" algn="l" defTabSz="914400" rtl="0" eaLnBrk="1" latinLnBrk="0" hangingPunct="1">
+      <a:defRPr sz="1200" kern="1200">
+        <a:solidFill>
+          <a:schemeClr val="tx1"/>
+        </a:solidFill>
+        <a:latin typeface="+mn-lt"/>
+        <a:ea typeface="+mn-ea"/>
+        <a:cs typeface="+mn-cs"/>
+      </a:defRPr>
+    </a:lvl1pPr>
+    <a:lvl2pPr marL="457200" algn="l" defTabSz="914400" rtl="0" eaLnBrk="1" latinLnBrk="0" hangingPunct="1">
+      <a:defRPr sz="1200" kern="1200">
+        <a:solidFill>
+          <a:schemeClr val="tx1"/>
+        </a:solidFill>
+        <a:latin typeface="+mn-lt"/>
+        <a:ea typeface="+mn-ea"/>
+        <a:cs typeface="+mn-cs"/>
+      </a:defRPr>
+    </a:lvl2pPr>
+    <a:lvl3pPr marL="914400" algn="l" defTabSz="914400" rtl="0" eaLnBrk="1" latinLnBrk="0" hangingPunct="1">
+      <a:defRPr sz="1200" kern="1200">
+        <a:solidFill>
+          <a:schemeClr val="tx1"/>
+        </a:solidFill>
+        <a:latin typeface="+mn-lt"/>
+        <a:ea typeface="+mn-ea"/>
+        <a:cs typeface="+mn-cs"/>
+      </a:defRPr>
+    </a:lvl3pPr>
+    <a:lvl4pPr marL="1371600" algn="l" defTabSz="914400" rtl="0" eaLnBrk="1" latinLnBrk="0" hangingPunct="1">
+      <a:defRPr sz="1200" kern="1200">
+        <a:solidFill>
+          <a:schemeClr val="tx1"/>
+        </a:solidFill>
+        <a:latin typeface="+mn-lt"/>
+        <a:ea typeface="+mn-ea"/>
+        <a:cs typeface="+mn-cs"/>
+      </a:defRPr>
+    </a:lvl4pPr>
+    <a:lvl5pPr marL="1828800" algn="l" defTabSz="914400" rtl="0" eaLnBrk="1" latinLnBrk="0" hangingPunct="1">
+      <a:defRPr sz="1200" kern="1200">
+        <a:solidFill>
+          <a:schemeClr val="tx1"/>
+        </a:solidFill>
+        <a:latin typeface="+mn-lt"/>
+        <a:ea typeface="+mn-ea"/>
+        <a:cs typeface="+mn-cs"/>
+      </a:defRPr>
+    </a:lvl5pPr>
+    <a:lvl6pPr marL="2286000" algn="l" defTabSz="914400" rtl="0" eaLnBrk="1" latinLnBrk="0" hangingPunct="1">
+      <a:defRPr sz="1200" kern="1200">
+        <a:solidFill>
+          <a:schemeClr val="tx1"/>
+        </a:solidFill>
+        <a:latin typeface="+mn-lt"/>
+        <a:ea typeface="+mn-ea"/>
+        <a:cs typeface="+mn-cs"/>
+      </a:defRPr>
+    </a:lvl6pPr>
+    <a:lvl7pPr marL="2743200" algn="l" defTabSz="914400" rtl="0" eaLnBrk="1" latinLnBrk="0" hangingPunct="1">
+      <a:defRPr sz="1200" kern="1200">
+        <a:solidFill>
+          <a:schemeClr val="tx1"/>
+        </a:solidFill>
+        <a:latin typeface="+mn-lt"/>
+        <a:ea typeface="+mn-ea"/>
+        <a:cs typeface="+mn-cs"/>
+      </a:defRPr>
+    </a:lvl7pPr>
+    <a:lvl8pPr marL="3200400" algn="l" defTabSz="914400" rtl="0" eaLnBrk="1" latinLnBrk="0" hangingPunct="1">
+      <a:defRPr sz="1200" kern="1200">
+        <a:solidFill>
+          <a:schemeClr val="tx1"/>
+        </a:solidFill>
+        <a:latin typeface="+mn-lt"/>
+        <a:ea typeface="+mn-ea"/>
+        <a:cs typeface="+mn-cs"/>
+      </a:defRPr>
+    </a:lvl8pPr>
+    <a:lvl9pPr marL="3657600" algn="l" defTabSz="914400" rtl="0" eaLnBrk="1" latinLnBrk="0" hangingPunct="1">
+      <a:defRPr sz="1200" kern="1200">
+        <a:solidFill>
+          <a:schemeClr val="tx1"/>
+        </a:solidFill>
+        <a:latin typeface="+mn-lt"/>
+        <a:ea typeface="+mn-ea"/>
+        <a:cs typeface="+mn-cs"/>
+      </a:defRPr>
+    </a:lvl9pPr>
+  </p:notesStyle>
+</p:notesMaster>
+</file>
+
+<file path=ppt/notesSlides/notesSlide1.xml><?xml version="1.0" encoding="utf-8"?>
+<p:notes xmlns:a="http://schemas.openxmlformats.org/drawingml/2006/main" xmlns:r="http://schemas.openxmlformats.org/officeDocument/2006/relationships" xmlns:p="http://schemas.openxmlformats.org/presentationml/2006/main">
+  <p:cSld>
+    <p:spTree>
+      <p:nvGrpSpPr>
+        <p:cNvPr id="1" name=""/>
+        <p:cNvGrpSpPr/>
+        <p:nvPr/>
+      </p:nvGrpSpPr>
+      <p:grpSpPr>
+        <a:xfrm>
+          <a:off x="0" y="0"/>
+          <a:ext cx="0" cy="0"/>
+          <a:chOff x="0" y="0"/>
+          <a:chExt cx="0" cy="0"/>
+        </a:xfrm>
+      </p:grpSpPr>
+      <p:sp>
+        <p:nvSpPr>
+          <p:cNvPr id="2" name="Slide Image Placeholder 1"/>
+          <p:cNvSpPr>
+            <a:spLocks noGrp="1" noRot="1" noChangeAspect="1"/>
+          </p:cNvSpPr>
+          <p:nvPr>
+            <p:ph type="sldImg"/>
+          </p:nvPr>
+        </p:nvSpPr>
+        <p:spPr/>
+      </p:sp>
+      <p:sp>
+        <p:nvSpPr>
+          <p:cNvPr id="3" name="Notes Placeholder 2"/>
+          <p:cNvSpPr>
+            <a:spLocks noGrp="1"/>
+          </p:cNvSpPr>
+          <p:nvPr>
+            <p:ph type="body" idx="1"/>
+          </p:nvPr>
+        </p:nvSpPr>
+        <p:spPr/>
+        <p:txBody>
+          <a:bodyPr/>
+          <a:lstStyle/>
+          <a:p>
+            <a:r>
+              <a:rPr lang="en-US" dirty="0" smtClean="0"/>
+              <a:t>This presentation discusses the architecture</a:t>
+            </a:r>
+            <a:r>
+              <a:rPr lang="en-US" baseline="0" dirty="0" smtClean="0"/>
+              <a:t> and design of RADV, the risk adjustment data validation tool created by Team </a:t>
+            </a:r>
+            <a:r>
+              <a:rPr lang="en-US" baseline="0" dirty="0" err="1" smtClean="0"/>
+              <a:t>FHIRed</a:t>
+            </a:r>
+            <a:r>
+              <a:rPr lang="en-US" baseline="0" dirty="0" smtClean="0"/>
+              <a:t> Up.</a:t>
+            </a:r>
+            <a:endParaRPr lang="en-US" dirty="0"/>
+          </a:p>
+        </p:txBody>
+      </p:sp>
+      <p:sp>
+        <p:nvSpPr>
+          <p:cNvPr id="4" name="Slide Number Placeholder 3"/>
+          <p:cNvSpPr>
+            <a:spLocks noGrp="1"/>
+          </p:cNvSpPr>
+          <p:nvPr>
+            <p:ph type="sldNum" sz="quarter" idx="10"/>
+          </p:nvPr>
+        </p:nvSpPr>
+        <p:spPr/>
+        <p:txBody>
+          <a:bodyPr/>
+          <a:lstStyle/>
+          <a:p>
+            <a:fld id="{64DBF1C4-A8A4-46A4-960B-68980B6D50C1}" type="slidenum">
+              <a:rPr lang="en-US" smtClean="0"/>
+              <a:t>1</a:t>
+            </a:fld>
+            <a:endParaRPr lang="en-US"/>
+          </a:p>
+        </p:txBody>
+      </p:sp>
+    </p:spTree>
+    <p:extLst>
+      <p:ext uri="{BB962C8B-B14F-4D97-AF65-F5344CB8AC3E}">
+        <p14:creationId xmlns:p14="http://schemas.microsoft.com/office/powerpoint/2010/main" val="4127373235"/>
+      </p:ext>
+    </p:extLst>
+  </p:cSld>
+  <p:clrMapOvr>
+    <a:masterClrMapping/>
+  </p:clrMapOvr>
+</p:notes>
+</file>
+
+<file path=ppt/notesSlides/notesSlide10.xml><?xml version="1.0" encoding="utf-8"?>
+<p:notes xmlns:a="http://schemas.openxmlformats.org/drawingml/2006/main" xmlns:r="http://schemas.openxmlformats.org/officeDocument/2006/relationships" xmlns:p="http://schemas.openxmlformats.org/presentationml/2006/main">
+  <p:cSld>
+    <p:spTree>
+      <p:nvGrpSpPr>
+        <p:cNvPr id="1" name=""/>
+        <p:cNvGrpSpPr/>
+        <p:nvPr/>
+      </p:nvGrpSpPr>
+      <p:grpSpPr>
+        <a:xfrm>
+          <a:off x="0" y="0"/>
+          <a:ext cx="0" cy="0"/>
+          <a:chOff x="0" y="0"/>
+          <a:chExt cx="0" cy="0"/>
+        </a:xfrm>
+      </p:grpSpPr>
+      <p:sp>
+        <p:nvSpPr>
+          <p:cNvPr id="2" name="Slide Image Placeholder 1"/>
+          <p:cNvSpPr>
+            <a:spLocks noGrp="1" noRot="1" noChangeAspect="1"/>
+          </p:cNvSpPr>
+          <p:nvPr>
+            <p:ph type="sldImg"/>
+          </p:nvPr>
+        </p:nvSpPr>
+        <p:spPr/>
+      </p:sp>
+      <p:sp>
+        <p:nvSpPr>
+          <p:cNvPr id="3" name="Notes Placeholder 2"/>
+          <p:cNvSpPr>
+            <a:spLocks noGrp="1"/>
+          </p:cNvSpPr>
+          <p:nvPr>
+            <p:ph type="body" idx="1"/>
+          </p:nvPr>
+        </p:nvSpPr>
+        <p:spPr/>
+        <p:txBody>
+          <a:bodyPr/>
+          <a:lstStyle/>
+          <a:p>
+            <a:endParaRPr lang="en-US"/>
+          </a:p>
+        </p:txBody>
+      </p:sp>
+      <p:sp>
+        <p:nvSpPr>
+          <p:cNvPr id="4" name="Slide Number Placeholder 3"/>
+          <p:cNvSpPr>
+            <a:spLocks noGrp="1"/>
+          </p:cNvSpPr>
+          <p:nvPr>
+            <p:ph type="sldNum" sz="quarter" idx="10"/>
+          </p:nvPr>
+        </p:nvSpPr>
+        <p:spPr/>
+        <p:txBody>
+          <a:bodyPr/>
+          <a:lstStyle/>
+          <a:p>
+            <a:fld id="{64DBF1C4-A8A4-46A4-960B-68980B6D50C1}" type="slidenum">
+              <a:rPr lang="en-US" smtClean="0"/>
+              <a:t>10</a:t>
+            </a:fld>
+            <a:endParaRPr lang="en-US"/>
+          </a:p>
+        </p:txBody>
+      </p:sp>
+    </p:spTree>
+    <p:extLst>
+      <p:ext uri="{BB962C8B-B14F-4D97-AF65-F5344CB8AC3E}">
+        <p14:creationId xmlns:p14="http://schemas.microsoft.com/office/powerpoint/2010/main" val="3269226043"/>
+      </p:ext>
+    </p:extLst>
+  </p:cSld>
+  <p:clrMapOvr>
+    <a:masterClrMapping/>
+  </p:clrMapOvr>
+</p:notes>
+</file>
+
+<file path=ppt/notesSlides/notesSlide11.xml><?xml version="1.0" encoding="utf-8"?>
+<p:notes xmlns:a="http://schemas.openxmlformats.org/drawingml/2006/main" xmlns:r="http://schemas.openxmlformats.org/officeDocument/2006/relationships" xmlns:p="http://schemas.openxmlformats.org/presentationml/2006/main">
+  <p:cSld>
+    <p:spTree>
+      <p:nvGrpSpPr>
+        <p:cNvPr id="1" name=""/>
+        <p:cNvGrpSpPr/>
+        <p:nvPr/>
+      </p:nvGrpSpPr>
+      <p:grpSpPr>
+        <a:xfrm>
+          <a:off x="0" y="0"/>
+          <a:ext cx="0" cy="0"/>
+          <a:chOff x="0" y="0"/>
+          <a:chExt cx="0" cy="0"/>
+        </a:xfrm>
+      </p:grpSpPr>
+      <p:sp>
+        <p:nvSpPr>
+          <p:cNvPr id="2" name="Slide Image Placeholder 1"/>
+          <p:cNvSpPr>
+            <a:spLocks noGrp="1" noRot="1" noChangeAspect="1"/>
+          </p:cNvSpPr>
+          <p:nvPr>
+            <p:ph type="sldImg"/>
+          </p:nvPr>
+        </p:nvSpPr>
+        <p:spPr/>
+      </p:sp>
+      <p:sp>
+        <p:nvSpPr>
+          <p:cNvPr id="3" name="Notes Placeholder 2"/>
+          <p:cNvSpPr>
+            <a:spLocks noGrp="1"/>
+          </p:cNvSpPr>
+          <p:nvPr>
+            <p:ph type="body" idx="1"/>
+          </p:nvPr>
+        </p:nvSpPr>
+        <p:spPr/>
+        <p:txBody>
+          <a:bodyPr/>
+          <a:lstStyle/>
+          <a:p>
+            <a:endParaRPr lang="en-US"/>
+          </a:p>
+        </p:txBody>
+      </p:sp>
+      <p:sp>
+        <p:nvSpPr>
+          <p:cNvPr id="4" name="Slide Number Placeholder 3"/>
+          <p:cNvSpPr>
+            <a:spLocks noGrp="1"/>
+          </p:cNvSpPr>
+          <p:nvPr>
+            <p:ph type="sldNum" sz="quarter" idx="10"/>
+          </p:nvPr>
+        </p:nvSpPr>
+        <p:spPr/>
+        <p:txBody>
+          <a:bodyPr/>
+          <a:lstStyle/>
+          <a:p>
+            <a:fld id="{64DBF1C4-A8A4-46A4-960B-68980B6D50C1}" type="slidenum">
+              <a:rPr lang="en-US" smtClean="0"/>
+              <a:t>11</a:t>
+            </a:fld>
+            <a:endParaRPr lang="en-US"/>
+          </a:p>
+        </p:txBody>
+      </p:sp>
+    </p:spTree>
+    <p:extLst>
+      <p:ext uri="{BB962C8B-B14F-4D97-AF65-F5344CB8AC3E}">
+        <p14:creationId xmlns:p14="http://schemas.microsoft.com/office/powerpoint/2010/main" val="785281650"/>
+      </p:ext>
+    </p:extLst>
+  </p:cSld>
+  <p:clrMapOvr>
+    <a:masterClrMapping/>
+  </p:clrMapOvr>
+</p:notes>
+</file>
+
+<file path=ppt/notesSlides/notesSlide12.xml><?xml version="1.0" encoding="utf-8"?>
+<p:notes xmlns:a="http://schemas.openxmlformats.org/drawingml/2006/main" xmlns:r="http://schemas.openxmlformats.org/officeDocument/2006/relationships" xmlns:p="http://schemas.openxmlformats.org/presentationml/2006/main">
+  <p:cSld>
+    <p:spTree>
+      <p:nvGrpSpPr>
+        <p:cNvPr id="1" name=""/>
+        <p:cNvGrpSpPr/>
+        <p:nvPr/>
+      </p:nvGrpSpPr>
+      <p:grpSpPr>
+        <a:xfrm>
+          <a:off x="0" y="0"/>
+          <a:ext cx="0" cy="0"/>
+          <a:chOff x="0" y="0"/>
+          <a:chExt cx="0" cy="0"/>
+        </a:xfrm>
+      </p:grpSpPr>
+      <p:sp>
+        <p:nvSpPr>
+          <p:cNvPr id="2" name="Slide Image Placeholder 1"/>
+          <p:cNvSpPr>
+            <a:spLocks noGrp="1" noRot="1" noChangeAspect="1"/>
+          </p:cNvSpPr>
+          <p:nvPr>
+            <p:ph type="sldImg"/>
+          </p:nvPr>
+        </p:nvSpPr>
+        <p:spPr/>
+      </p:sp>
+      <p:sp>
+        <p:nvSpPr>
+          <p:cNvPr id="3" name="Notes Placeholder 2"/>
+          <p:cNvSpPr>
+            <a:spLocks noGrp="1"/>
+          </p:cNvSpPr>
+          <p:nvPr>
+            <p:ph type="body" idx="1"/>
+          </p:nvPr>
+        </p:nvSpPr>
+        <p:spPr/>
+        <p:txBody>
+          <a:bodyPr/>
+          <a:lstStyle/>
+          <a:p>
+            <a:endParaRPr lang="en-US"/>
+          </a:p>
+        </p:txBody>
+      </p:sp>
+      <p:sp>
+        <p:nvSpPr>
+          <p:cNvPr id="4" name="Slide Number Placeholder 3"/>
+          <p:cNvSpPr>
+            <a:spLocks noGrp="1"/>
+          </p:cNvSpPr>
+          <p:nvPr>
+            <p:ph type="sldNum" sz="quarter" idx="10"/>
+          </p:nvPr>
+        </p:nvSpPr>
+        <p:spPr/>
+        <p:txBody>
+          <a:bodyPr/>
+          <a:lstStyle/>
+          <a:p>
+            <a:fld id="{64DBF1C4-A8A4-46A4-960B-68980B6D50C1}" type="slidenum">
+              <a:rPr lang="en-US" smtClean="0"/>
+              <a:t>12</a:t>
+            </a:fld>
+            <a:endParaRPr lang="en-US"/>
+          </a:p>
+        </p:txBody>
+      </p:sp>
+    </p:spTree>
+    <p:extLst>
+      <p:ext uri="{BB962C8B-B14F-4D97-AF65-F5344CB8AC3E}">
+        <p14:creationId xmlns:p14="http://schemas.microsoft.com/office/powerpoint/2010/main" val="3225854499"/>
+      </p:ext>
+    </p:extLst>
+  </p:cSld>
+  <p:clrMapOvr>
+    <a:masterClrMapping/>
+  </p:clrMapOvr>
+</p:notes>
+</file>
+
+<file path=ppt/notesSlides/notesSlide13.xml><?xml version="1.0" encoding="utf-8"?>
+<p:notes xmlns:a="http://schemas.openxmlformats.org/drawingml/2006/main" xmlns:r="http://schemas.openxmlformats.org/officeDocument/2006/relationships" xmlns:p="http://schemas.openxmlformats.org/presentationml/2006/main">
+  <p:cSld>
+    <p:spTree>
+      <p:nvGrpSpPr>
+        <p:cNvPr id="1" name=""/>
+        <p:cNvGrpSpPr/>
+        <p:nvPr/>
+      </p:nvGrpSpPr>
+      <p:grpSpPr>
+        <a:xfrm>
+          <a:off x="0" y="0"/>
+          <a:ext cx="0" cy="0"/>
+          <a:chOff x="0" y="0"/>
+          <a:chExt cx="0" cy="0"/>
+        </a:xfrm>
+      </p:grpSpPr>
+      <p:sp>
+        <p:nvSpPr>
+          <p:cNvPr id="2" name="Slide Image Placeholder 1"/>
+          <p:cNvSpPr>
+            <a:spLocks noGrp="1" noRot="1" noChangeAspect="1"/>
+          </p:cNvSpPr>
+          <p:nvPr>
+            <p:ph type="sldImg"/>
+          </p:nvPr>
+        </p:nvSpPr>
+        <p:spPr/>
+      </p:sp>
+      <p:sp>
+        <p:nvSpPr>
+          <p:cNvPr id="3" name="Notes Placeholder 2"/>
+          <p:cNvSpPr>
+            <a:spLocks noGrp="1"/>
+          </p:cNvSpPr>
+          <p:nvPr>
+            <p:ph type="body" idx="1"/>
+          </p:nvPr>
+        </p:nvSpPr>
+        <p:spPr/>
+        <p:txBody>
+          <a:bodyPr/>
+          <a:lstStyle/>
+          <a:p>
+            <a:endParaRPr lang="en-US"/>
+          </a:p>
+        </p:txBody>
+      </p:sp>
+      <p:sp>
+        <p:nvSpPr>
+          <p:cNvPr id="4" name="Slide Number Placeholder 3"/>
+          <p:cNvSpPr>
+            <a:spLocks noGrp="1"/>
+          </p:cNvSpPr>
+          <p:nvPr>
+            <p:ph type="sldNum" sz="quarter" idx="10"/>
+          </p:nvPr>
+        </p:nvSpPr>
+        <p:spPr/>
+        <p:txBody>
+          <a:bodyPr/>
+          <a:lstStyle/>
+          <a:p>
+            <a:fld id="{64DBF1C4-A8A4-46A4-960B-68980B6D50C1}" type="slidenum">
+              <a:rPr lang="en-US" smtClean="0"/>
+              <a:t>13</a:t>
+            </a:fld>
+            <a:endParaRPr lang="en-US"/>
+          </a:p>
+        </p:txBody>
+      </p:sp>
+    </p:spTree>
+    <p:extLst>
+      <p:ext uri="{BB962C8B-B14F-4D97-AF65-F5344CB8AC3E}">
+        <p14:creationId xmlns:p14="http://schemas.microsoft.com/office/powerpoint/2010/main" val="3969157877"/>
+      </p:ext>
+    </p:extLst>
+  </p:cSld>
+  <p:clrMapOvr>
+    <a:masterClrMapping/>
+  </p:clrMapOvr>
+</p:notes>
+</file>
+
+<file path=ppt/notesSlides/notesSlide2.xml><?xml version="1.0" encoding="utf-8"?>
+<p:notes xmlns:a="http://schemas.openxmlformats.org/drawingml/2006/main" xmlns:r="http://schemas.openxmlformats.org/officeDocument/2006/relationships" xmlns:p="http://schemas.openxmlformats.org/presentationml/2006/main">
+  <p:cSld>
+    <p:spTree>
+      <p:nvGrpSpPr>
+        <p:cNvPr id="1" name=""/>
+        <p:cNvGrpSpPr/>
+        <p:nvPr/>
+      </p:nvGrpSpPr>
+      <p:grpSpPr>
+        <a:xfrm>
+          <a:off x="0" y="0"/>
+          <a:ext cx="0" cy="0"/>
+          <a:chOff x="0" y="0"/>
+          <a:chExt cx="0" cy="0"/>
+        </a:xfrm>
+      </p:grpSpPr>
+      <p:sp>
+        <p:nvSpPr>
+          <p:cNvPr id="2" name="Slide Image Placeholder 1"/>
+          <p:cNvSpPr>
+            <a:spLocks noGrp="1" noRot="1" noChangeAspect="1"/>
+          </p:cNvSpPr>
+          <p:nvPr>
+            <p:ph type="sldImg"/>
+          </p:nvPr>
+        </p:nvSpPr>
+        <p:spPr/>
+      </p:sp>
+      <p:sp>
+        <p:nvSpPr>
+          <p:cNvPr id="3" name="Notes Placeholder 2"/>
+          <p:cNvSpPr>
+            <a:spLocks noGrp="1"/>
+          </p:cNvSpPr>
+          <p:nvPr>
+            <p:ph type="body" idx="1"/>
+          </p:nvPr>
+        </p:nvSpPr>
+        <p:spPr/>
+        <p:txBody>
+          <a:bodyPr/>
+          <a:lstStyle/>
+          <a:p>
+            <a:r>
+              <a:rPr lang="en-US" dirty="0" smtClean="0"/>
+              <a:t>RADV is designed to help Doctor’s, Hospitals and Insurance Companies maximize</a:t>
+            </a:r>
+            <a:r>
+              <a:rPr lang="en-US" baseline="0" dirty="0" smtClean="0"/>
+              <a:t> their risk adjusted reimbursements.  Risk adjustment uses a patients medical history to determine their level of health.  Providers who are caring for “sicker than average populations” receive greater payments.  This use case diagram identifies users of the RADV system.  Doctors and patients use the system to review a patients medical history.  The doctor will then verify any existing diagnoses.  The system then provides medical coders with data required to identify missing diagnoses and update the insurance claims data.  Hospitals and insurance companies then use this corrected data to maximize their reimbursements.</a:t>
+            </a:r>
+            <a:endParaRPr lang="en-US" dirty="0"/>
+          </a:p>
+        </p:txBody>
+      </p:sp>
+      <p:sp>
+        <p:nvSpPr>
+          <p:cNvPr id="4" name="Slide Number Placeholder 3"/>
+          <p:cNvSpPr>
+            <a:spLocks noGrp="1"/>
+          </p:cNvSpPr>
+          <p:nvPr>
+            <p:ph type="sldNum" sz="quarter" idx="10"/>
+          </p:nvPr>
+        </p:nvSpPr>
+        <p:spPr/>
+        <p:txBody>
+          <a:bodyPr/>
+          <a:lstStyle/>
+          <a:p>
+            <a:fld id="{64DBF1C4-A8A4-46A4-960B-68980B6D50C1}" type="slidenum">
+              <a:rPr lang="en-US" smtClean="0"/>
+              <a:t>2</a:t>
+            </a:fld>
+            <a:endParaRPr lang="en-US"/>
+          </a:p>
+        </p:txBody>
+      </p:sp>
+    </p:spTree>
+    <p:extLst>
+      <p:ext uri="{BB962C8B-B14F-4D97-AF65-F5344CB8AC3E}">
+        <p14:creationId xmlns:p14="http://schemas.microsoft.com/office/powerpoint/2010/main" val="2941487035"/>
+      </p:ext>
+    </p:extLst>
+  </p:cSld>
+  <p:clrMapOvr>
+    <a:masterClrMapping/>
+  </p:clrMapOvr>
+</p:notes>
+</file>
+
+<file path=ppt/notesSlides/notesSlide3.xml><?xml version="1.0" encoding="utf-8"?>
+<p:notes xmlns:a="http://schemas.openxmlformats.org/drawingml/2006/main" xmlns:r="http://schemas.openxmlformats.org/officeDocument/2006/relationships" xmlns:p="http://schemas.openxmlformats.org/presentationml/2006/main">
+  <p:cSld>
+    <p:spTree>
+      <p:nvGrpSpPr>
+        <p:cNvPr id="1" name=""/>
+        <p:cNvGrpSpPr/>
+        <p:nvPr/>
+      </p:nvGrpSpPr>
+      <p:grpSpPr>
+        <a:xfrm>
+          <a:off x="0" y="0"/>
+          <a:ext cx="0" cy="0"/>
+          <a:chOff x="0" y="0"/>
+          <a:chExt cx="0" cy="0"/>
+        </a:xfrm>
+      </p:grpSpPr>
+      <p:sp>
+        <p:nvSpPr>
+          <p:cNvPr id="2" name="Slide Image Placeholder 1"/>
+          <p:cNvSpPr>
+            <a:spLocks noGrp="1" noRot="1" noChangeAspect="1"/>
+          </p:cNvSpPr>
+          <p:nvPr>
+            <p:ph type="sldImg"/>
+          </p:nvPr>
+        </p:nvSpPr>
+        <p:spPr/>
+      </p:sp>
+      <p:sp>
+        <p:nvSpPr>
+          <p:cNvPr id="3" name="Notes Placeholder 2"/>
+          <p:cNvSpPr>
+            <a:spLocks noGrp="1"/>
+          </p:cNvSpPr>
+          <p:nvPr>
+            <p:ph type="body" idx="1"/>
+          </p:nvPr>
+        </p:nvSpPr>
+        <p:spPr/>
+        <p:txBody>
+          <a:bodyPr/>
+          <a:lstStyle/>
+          <a:p>
+            <a:r>
+              <a:rPr lang="en-US" dirty="0" smtClean="0"/>
+              <a:t>The RADV tool follows the standard three-tier architecture.  The data tier is Georgia Tech’s </a:t>
+            </a:r>
+            <a:r>
+              <a:rPr lang="en-US" baseline="0" dirty="0" smtClean="0"/>
+              <a:t>FHIR server.  The application tier consists of business logic coded in the Python language.  The presentation tier is and HTML5 website hosted on the Google App Engine platform.  CSS was used to format the page, and JavaScript code was written to interact with the Application tier.</a:t>
+            </a:r>
+            <a:endParaRPr lang="en-US" dirty="0"/>
+          </a:p>
+        </p:txBody>
+      </p:sp>
+      <p:sp>
+        <p:nvSpPr>
+          <p:cNvPr id="4" name="Slide Number Placeholder 3"/>
+          <p:cNvSpPr>
+            <a:spLocks noGrp="1"/>
+          </p:cNvSpPr>
+          <p:nvPr>
+            <p:ph type="sldNum" sz="quarter" idx="10"/>
+          </p:nvPr>
+        </p:nvSpPr>
+        <p:spPr/>
+        <p:txBody>
+          <a:bodyPr/>
+          <a:lstStyle/>
+          <a:p>
+            <a:fld id="{64DBF1C4-A8A4-46A4-960B-68980B6D50C1}" type="slidenum">
+              <a:rPr lang="en-US" smtClean="0"/>
+              <a:t>3</a:t>
+            </a:fld>
+            <a:endParaRPr lang="en-US"/>
+          </a:p>
+        </p:txBody>
+      </p:sp>
+    </p:spTree>
+    <p:extLst>
+      <p:ext uri="{BB962C8B-B14F-4D97-AF65-F5344CB8AC3E}">
+        <p14:creationId xmlns:p14="http://schemas.microsoft.com/office/powerpoint/2010/main" val="1861773998"/>
+      </p:ext>
+    </p:extLst>
+  </p:cSld>
+  <p:clrMapOvr>
+    <a:masterClrMapping/>
+  </p:clrMapOvr>
+</p:notes>
+</file>
+
+<file path=ppt/notesSlides/notesSlide4.xml><?xml version="1.0" encoding="utf-8"?>
+<p:notes xmlns:a="http://schemas.openxmlformats.org/drawingml/2006/main" xmlns:r="http://schemas.openxmlformats.org/officeDocument/2006/relationships" xmlns:p="http://schemas.openxmlformats.org/presentationml/2006/main">
+  <p:cSld>
+    <p:spTree>
+      <p:nvGrpSpPr>
+        <p:cNvPr id="1" name=""/>
+        <p:cNvGrpSpPr/>
+        <p:nvPr/>
+      </p:nvGrpSpPr>
+      <p:grpSpPr>
+        <a:xfrm>
+          <a:off x="0" y="0"/>
+          <a:ext cx="0" cy="0"/>
+          <a:chOff x="0" y="0"/>
+          <a:chExt cx="0" cy="0"/>
+        </a:xfrm>
+      </p:grpSpPr>
+      <p:sp>
+        <p:nvSpPr>
+          <p:cNvPr id="2" name="Slide Image Placeholder 1"/>
+          <p:cNvSpPr>
+            <a:spLocks noGrp="1" noRot="1" noChangeAspect="1"/>
+          </p:cNvSpPr>
+          <p:nvPr>
+            <p:ph type="sldImg"/>
+          </p:nvPr>
+        </p:nvSpPr>
+        <p:spPr/>
+      </p:sp>
+      <p:sp>
+        <p:nvSpPr>
+          <p:cNvPr id="3" name="Notes Placeholder 2"/>
+          <p:cNvSpPr>
+            <a:spLocks noGrp="1"/>
+          </p:cNvSpPr>
+          <p:nvPr>
+            <p:ph type="body" idx="1"/>
+          </p:nvPr>
+        </p:nvSpPr>
+        <p:spPr/>
+        <p:txBody>
+          <a:bodyPr/>
+          <a:lstStyle/>
+          <a:p>
+            <a:r>
+              <a:rPr lang="en-US" dirty="0" smtClean="0"/>
+              <a:t>This slide </a:t>
+            </a:r>
+            <a:r>
+              <a:rPr lang="en-US" dirty="0" smtClean="0"/>
+              <a:t>provides more details about </a:t>
+            </a:r>
+            <a:r>
+              <a:rPr lang="en-US" dirty="0" smtClean="0"/>
+              <a:t>the architecture of the</a:t>
+            </a:r>
+            <a:r>
+              <a:rPr lang="en-US" baseline="0" dirty="0" smtClean="0"/>
+              <a:t> RADV system.  Data is stored and requested from Georgia Techs FHIR Server.  A web server merges the FHIR data with reference tables and business logic.  This produces information and data visualizations which are viewed by the end user through a website.</a:t>
+            </a:r>
+            <a:endParaRPr lang="en-US" dirty="0"/>
+          </a:p>
+        </p:txBody>
+      </p:sp>
+      <p:sp>
+        <p:nvSpPr>
+          <p:cNvPr id="4" name="Slide Number Placeholder 3"/>
+          <p:cNvSpPr>
+            <a:spLocks noGrp="1"/>
+          </p:cNvSpPr>
+          <p:nvPr>
+            <p:ph type="sldNum" sz="quarter" idx="10"/>
+          </p:nvPr>
+        </p:nvSpPr>
+        <p:spPr/>
+        <p:txBody>
+          <a:bodyPr/>
+          <a:lstStyle/>
+          <a:p>
+            <a:fld id="{64DBF1C4-A8A4-46A4-960B-68980B6D50C1}" type="slidenum">
+              <a:rPr lang="en-US" smtClean="0"/>
+              <a:t>4</a:t>
+            </a:fld>
+            <a:endParaRPr lang="en-US"/>
+          </a:p>
+        </p:txBody>
+      </p:sp>
+    </p:spTree>
+    <p:extLst>
+      <p:ext uri="{BB962C8B-B14F-4D97-AF65-F5344CB8AC3E}">
+        <p14:creationId xmlns:p14="http://schemas.microsoft.com/office/powerpoint/2010/main" val="3859383329"/>
+      </p:ext>
+    </p:extLst>
+  </p:cSld>
+  <p:clrMapOvr>
+    <a:masterClrMapping/>
+  </p:clrMapOvr>
+</p:notes>
+</file>
+
+<file path=ppt/notesSlides/notesSlide5.xml><?xml version="1.0" encoding="utf-8"?>
+<p:notes xmlns:a="http://schemas.openxmlformats.org/drawingml/2006/main" xmlns:r="http://schemas.openxmlformats.org/officeDocument/2006/relationships" xmlns:p="http://schemas.openxmlformats.org/presentationml/2006/main">
+  <p:cSld>
+    <p:spTree>
+      <p:nvGrpSpPr>
+        <p:cNvPr id="1" name=""/>
+        <p:cNvGrpSpPr/>
+        <p:nvPr/>
+      </p:nvGrpSpPr>
+      <p:grpSpPr>
+        <a:xfrm>
+          <a:off x="0" y="0"/>
+          <a:ext cx="0" cy="0"/>
+          <a:chOff x="0" y="0"/>
+          <a:chExt cx="0" cy="0"/>
+        </a:xfrm>
+      </p:grpSpPr>
+      <p:sp>
+        <p:nvSpPr>
+          <p:cNvPr id="2" name="Slide Image Placeholder 1"/>
+          <p:cNvSpPr>
+            <a:spLocks noGrp="1" noRot="1" noChangeAspect="1"/>
+          </p:cNvSpPr>
+          <p:nvPr>
+            <p:ph type="sldImg"/>
+          </p:nvPr>
+        </p:nvSpPr>
+        <p:spPr/>
+      </p:sp>
+      <p:sp>
+        <p:nvSpPr>
+          <p:cNvPr id="3" name="Notes Placeholder 2"/>
+          <p:cNvSpPr>
+            <a:spLocks noGrp="1"/>
+          </p:cNvSpPr>
+          <p:nvPr>
+            <p:ph type="body" idx="1"/>
+          </p:nvPr>
+        </p:nvSpPr>
+        <p:spPr/>
+        <p:txBody>
+          <a:bodyPr/>
+          <a:lstStyle/>
+          <a:p>
+            <a:endParaRPr lang="en-US"/>
+          </a:p>
+        </p:txBody>
+      </p:sp>
+      <p:sp>
+        <p:nvSpPr>
+          <p:cNvPr id="4" name="Slide Number Placeholder 3"/>
+          <p:cNvSpPr>
+            <a:spLocks noGrp="1"/>
+          </p:cNvSpPr>
+          <p:nvPr>
+            <p:ph type="sldNum" sz="quarter" idx="10"/>
+          </p:nvPr>
+        </p:nvSpPr>
+        <p:spPr/>
+        <p:txBody>
+          <a:bodyPr/>
+          <a:lstStyle/>
+          <a:p>
+            <a:fld id="{64DBF1C4-A8A4-46A4-960B-68980B6D50C1}" type="slidenum">
+              <a:rPr lang="en-US" smtClean="0"/>
+              <a:t>5</a:t>
+            </a:fld>
+            <a:endParaRPr lang="en-US"/>
+          </a:p>
+        </p:txBody>
+      </p:sp>
+    </p:spTree>
+    <p:extLst>
+      <p:ext uri="{BB962C8B-B14F-4D97-AF65-F5344CB8AC3E}">
+        <p14:creationId xmlns:p14="http://schemas.microsoft.com/office/powerpoint/2010/main" val="1392891120"/>
+      </p:ext>
+    </p:extLst>
+  </p:cSld>
+  <p:clrMapOvr>
+    <a:masterClrMapping/>
+  </p:clrMapOvr>
+</p:notes>
+</file>
+
+<file path=ppt/notesSlides/notesSlide6.xml><?xml version="1.0" encoding="utf-8"?>
+<p:notes xmlns:a="http://schemas.openxmlformats.org/drawingml/2006/main" xmlns:r="http://schemas.openxmlformats.org/officeDocument/2006/relationships" xmlns:p="http://schemas.openxmlformats.org/presentationml/2006/main">
+  <p:cSld>
+    <p:spTree>
+      <p:nvGrpSpPr>
+        <p:cNvPr id="1" name=""/>
+        <p:cNvGrpSpPr/>
+        <p:nvPr/>
+      </p:nvGrpSpPr>
+      <p:grpSpPr>
+        <a:xfrm>
+          <a:off x="0" y="0"/>
+          <a:ext cx="0" cy="0"/>
+          <a:chOff x="0" y="0"/>
+          <a:chExt cx="0" cy="0"/>
+        </a:xfrm>
+      </p:grpSpPr>
+      <p:sp>
+        <p:nvSpPr>
+          <p:cNvPr id="2" name="Slide Image Placeholder 1"/>
+          <p:cNvSpPr>
+            <a:spLocks noGrp="1" noRot="1" noChangeAspect="1"/>
+          </p:cNvSpPr>
+          <p:nvPr>
+            <p:ph type="sldImg"/>
+          </p:nvPr>
+        </p:nvSpPr>
+        <p:spPr/>
+      </p:sp>
+      <p:sp>
+        <p:nvSpPr>
+          <p:cNvPr id="3" name="Notes Placeholder 2"/>
+          <p:cNvSpPr>
+            <a:spLocks noGrp="1"/>
+          </p:cNvSpPr>
+          <p:nvPr>
+            <p:ph type="body" idx="1"/>
+          </p:nvPr>
+        </p:nvSpPr>
+        <p:spPr/>
+        <p:txBody>
+          <a:bodyPr/>
+          <a:lstStyle/>
+          <a:p>
+            <a:endParaRPr lang="en-US"/>
+          </a:p>
+        </p:txBody>
+      </p:sp>
+      <p:sp>
+        <p:nvSpPr>
+          <p:cNvPr id="4" name="Slide Number Placeholder 3"/>
+          <p:cNvSpPr>
+            <a:spLocks noGrp="1"/>
+          </p:cNvSpPr>
+          <p:nvPr>
+            <p:ph type="sldNum" sz="quarter" idx="10"/>
+          </p:nvPr>
+        </p:nvSpPr>
+        <p:spPr/>
+        <p:txBody>
+          <a:bodyPr/>
+          <a:lstStyle/>
+          <a:p>
+            <a:fld id="{64DBF1C4-A8A4-46A4-960B-68980B6D50C1}" type="slidenum">
+              <a:rPr lang="en-US" smtClean="0"/>
+              <a:t>6</a:t>
+            </a:fld>
+            <a:endParaRPr lang="en-US"/>
+          </a:p>
+        </p:txBody>
+      </p:sp>
+    </p:spTree>
+    <p:extLst>
+      <p:ext uri="{BB962C8B-B14F-4D97-AF65-F5344CB8AC3E}">
+        <p14:creationId xmlns:p14="http://schemas.microsoft.com/office/powerpoint/2010/main" val="2687240764"/>
+      </p:ext>
+    </p:extLst>
+  </p:cSld>
+  <p:clrMapOvr>
+    <a:masterClrMapping/>
+  </p:clrMapOvr>
+</p:notes>
+</file>
+
+<file path=ppt/notesSlides/notesSlide7.xml><?xml version="1.0" encoding="utf-8"?>
+<p:notes xmlns:a="http://schemas.openxmlformats.org/drawingml/2006/main" xmlns:r="http://schemas.openxmlformats.org/officeDocument/2006/relationships" xmlns:p="http://schemas.openxmlformats.org/presentationml/2006/main">
+  <p:cSld>
+    <p:spTree>
+      <p:nvGrpSpPr>
+        <p:cNvPr id="1" name=""/>
+        <p:cNvGrpSpPr/>
+        <p:nvPr/>
+      </p:nvGrpSpPr>
+      <p:grpSpPr>
+        <a:xfrm>
+          <a:off x="0" y="0"/>
+          <a:ext cx="0" cy="0"/>
+          <a:chOff x="0" y="0"/>
+          <a:chExt cx="0" cy="0"/>
+        </a:xfrm>
+      </p:grpSpPr>
+      <p:sp>
+        <p:nvSpPr>
+          <p:cNvPr id="2" name="Slide Image Placeholder 1"/>
+          <p:cNvSpPr>
+            <a:spLocks noGrp="1" noRot="1" noChangeAspect="1"/>
+          </p:cNvSpPr>
+          <p:nvPr>
+            <p:ph type="sldImg"/>
+          </p:nvPr>
+        </p:nvSpPr>
+        <p:spPr/>
+      </p:sp>
+      <p:sp>
+        <p:nvSpPr>
+          <p:cNvPr id="3" name="Notes Placeholder 2"/>
+          <p:cNvSpPr>
+            <a:spLocks noGrp="1"/>
+          </p:cNvSpPr>
+          <p:nvPr>
+            <p:ph type="body" idx="1"/>
+          </p:nvPr>
+        </p:nvSpPr>
+        <p:spPr/>
+        <p:txBody>
+          <a:bodyPr/>
+          <a:lstStyle/>
+          <a:p>
+            <a:endParaRPr lang="en-US"/>
+          </a:p>
+        </p:txBody>
+      </p:sp>
+      <p:sp>
+        <p:nvSpPr>
+          <p:cNvPr id="4" name="Slide Number Placeholder 3"/>
+          <p:cNvSpPr>
+            <a:spLocks noGrp="1"/>
+          </p:cNvSpPr>
+          <p:nvPr>
+            <p:ph type="sldNum" sz="quarter" idx="10"/>
+          </p:nvPr>
+        </p:nvSpPr>
+        <p:spPr/>
+        <p:txBody>
+          <a:bodyPr/>
+          <a:lstStyle/>
+          <a:p>
+            <a:fld id="{64DBF1C4-A8A4-46A4-960B-68980B6D50C1}" type="slidenum">
+              <a:rPr lang="en-US" smtClean="0"/>
+              <a:t>7</a:t>
+            </a:fld>
+            <a:endParaRPr lang="en-US"/>
+          </a:p>
+        </p:txBody>
+      </p:sp>
+    </p:spTree>
+    <p:extLst>
+      <p:ext uri="{BB962C8B-B14F-4D97-AF65-F5344CB8AC3E}">
+        <p14:creationId xmlns:p14="http://schemas.microsoft.com/office/powerpoint/2010/main" val="422093379"/>
+      </p:ext>
+    </p:extLst>
+  </p:cSld>
+  <p:clrMapOvr>
+    <a:masterClrMapping/>
+  </p:clrMapOvr>
+</p:notes>
+</file>
+
+<file path=ppt/notesSlides/notesSlide8.xml><?xml version="1.0" encoding="utf-8"?>
+<p:notes xmlns:a="http://schemas.openxmlformats.org/drawingml/2006/main" xmlns:r="http://schemas.openxmlformats.org/officeDocument/2006/relationships" xmlns:p="http://schemas.openxmlformats.org/presentationml/2006/main">
+  <p:cSld>
+    <p:spTree>
+      <p:nvGrpSpPr>
+        <p:cNvPr id="1" name=""/>
+        <p:cNvGrpSpPr/>
+        <p:nvPr/>
+      </p:nvGrpSpPr>
+      <p:grpSpPr>
+        <a:xfrm>
+          <a:off x="0" y="0"/>
+          <a:ext cx="0" cy="0"/>
+          <a:chOff x="0" y="0"/>
+          <a:chExt cx="0" cy="0"/>
+        </a:xfrm>
+      </p:grpSpPr>
+      <p:sp>
+        <p:nvSpPr>
+          <p:cNvPr id="2" name="Slide Image Placeholder 1"/>
+          <p:cNvSpPr>
+            <a:spLocks noGrp="1" noRot="1" noChangeAspect="1"/>
+          </p:cNvSpPr>
+          <p:nvPr>
+            <p:ph type="sldImg"/>
+          </p:nvPr>
+        </p:nvSpPr>
+        <p:spPr/>
+      </p:sp>
+      <p:sp>
+        <p:nvSpPr>
+          <p:cNvPr id="3" name="Notes Placeholder 2"/>
+          <p:cNvSpPr>
+            <a:spLocks noGrp="1"/>
+          </p:cNvSpPr>
+          <p:nvPr>
+            <p:ph type="body" idx="1"/>
+          </p:nvPr>
+        </p:nvSpPr>
+        <p:spPr/>
+        <p:txBody>
+          <a:bodyPr/>
+          <a:lstStyle/>
+          <a:p>
+            <a:endParaRPr lang="en-US"/>
+          </a:p>
+        </p:txBody>
+      </p:sp>
+      <p:sp>
+        <p:nvSpPr>
+          <p:cNvPr id="4" name="Slide Number Placeholder 3"/>
+          <p:cNvSpPr>
+            <a:spLocks noGrp="1"/>
+          </p:cNvSpPr>
+          <p:nvPr>
+            <p:ph type="sldNum" sz="quarter" idx="10"/>
+          </p:nvPr>
+        </p:nvSpPr>
+        <p:spPr/>
+        <p:txBody>
+          <a:bodyPr/>
+          <a:lstStyle/>
+          <a:p>
+            <a:fld id="{64DBF1C4-A8A4-46A4-960B-68980B6D50C1}" type="slidenum">
+              <a:rPr lang="en-US" smtClean="0"/>
+              <a:t>8</a:t>
+            </a:fld>
+            <a:endParaRPr lang="en-US"/>
+          </a:p>
+        </p:txBody>
+      </p:sp>
+    </p:spTree>
+    <p:extLst>
+      <p:ext uri="{BB962C8B-B14F-4D97-AF65-F5344CB8AC3E}">
+        <p14:creationId xmlns:p14="http://schemas.microsoft.com/office/powerpoint/2010/main" val="1131099348"/>
+      </p:ext>
+    </p:extLst>
+  </p:cSld>
+  <p:clrMapOvr>
+    <a:masterClrMapping/>
+  </p:clrMapOvr>
+</p:notes>
+</file>
+
+<file path=ppt/notesSlides/notesSlide9.xml><?xml version="1.0" encoding="utf-8"?>
+<p:notes xmlns:a="http://schemas.openxmlformats.org/drawingml/2006/main" xmlns:r="http://schemas.openxmlformats.org/officeDocument/2006/relationships" xmlns:p="http://schemas.openxmlformats.org/presentationml/2006/main">
+  <p:cSld>
+    <p:spTree>
+      <p:nvGrpSpPr>
+        <p:cNvPr id="1" name=""/>
+        <p:cNvGrpSpPr/>
+        <p:nvPr/>
+      </p:nvGrpSpPr>
+      <p:grpSpPr>
+        <a:xfrm>
+          <a:off x="0" y="0"/>
+          <a:ext cx="0" cy="0"/>
+          <a:chOff x="0" y="0"/>
+          <a:chExt cx="0" cy="0"/>
+        </a:xfrm>
+      </p:grpSpPr>
+      <p:sp>
+        <p:nvSpPr>
+          <p:cNvPr id="2" name="Slide Image Placeholder 1"/>
+          <p:cNvSpPr>
+            <a:spLocks noGrp="1" noRot="1" noChangeAspect="1"/>
+          </p:cNvSpPr>
+          <p:nvPr>
+            <p:ph type="sldImg"/>
+          </p:nvPr>
+        </p:nvSpPr>
+        <p:spPr/>
+      </p:sp>
+      <p:sp>
+        <p:nvSpPr>
+          <p:cNvPr id="3" name="Notes Placeholder 2"/>
+          <p:cNvSpPr>
+            <a:spLocks noGrp="1"/>
+          </p:cNvSpPr>
+          <p:nvPr>
+            <p:ph type="body" idx="1"/>
+          </p:nvPr>
+        </p:nvSpPr>
+        <p:spPr/>
+        <p:txBody>
+          <a:bodyPr/>
+          <a:lstStyle/>
+          <a:p>
+            <a:endParaRPr lang="en-US"/>
+          </a:p>
+        </p:txBody>
+      </p:sp>
+      <p:sp>
+        <p:nvSpPr>
+          <p:cNvPr id="4" name="Slide Number Placeholder 3"/>
+          <p:cNvSpPr>
+            <a:spLocks noGrp="1"/>
+          </p:cNvSpPr>
+          <p:nvPr>
+            <p:ph type="sldNum" sz="quarter" idx="10"/>
+          </p:nvPr>
+        </p:nvSpPr>
+        <p:spPr/>
+        <p:txBody>
+          <a:bodyPr/>
+          <a:lstStyle/>
+          <a:p>
+            <a:fld id="{64DBF1C4-A8A4-46A4-960B-68980B6D50C1}" type="slidenum">
+              <a:rPr lang="en-US" smtClean="0"/>
+              <a:t>9</a:t>
+            </a:fld>
+            <a:endParaRPr lang="en-US"/>
+          </a:p>
+        </p:txBody>
+      </p:sp>
+    </p:spTree>
+    <p:extLst>
+      <p:ext uri="{BB962C8B-B14F-4D97-AF65-F5344CB8AC3E}">
+        <p14:creationId xmlns:p14="http://schemas.microsoft.com/office/powerpoint/2010/main" val="324657054"/>
+      </p:ext>
+    </p:extLst>
+  </p:cSld>
+  <p:clrMapOvr>
+    <a:masterClrMapping/>
+  </p:clrMapOvr>
+</p:notes>
 </file>
 
 <file path=ppt/slideLayouts/slideLayout1.xml><?xml version="1.0" encoding="utf-8"?>
@@ -5345,7 +6863,7 @@
             </a:r>
             <a:r>
               <a:rPr lang="en-US" dirty="0" smtClean="0">
-                <a:hlinkClick r:id="rId2"/>
+                <a:hlinkClick r:id="rId5"/>
               </a:rPr>
               <a:t>aburgos3@gatech.edu</a:t>
             </a:r>
@@ -5366,7 +6884,7 @@
             </a:r>
             <a:r>
               <a:rPr lang="en-US" dirty="0" smtClean="0">
-                <a:hlinkClick r:id="rId3"/>
+                <a:hlinkClick r:id="rId6"/>
               </a:rPr>
               <a:t>spiroganas@gmail.com</a:t>
             </a:r>
@@ -5387,7 +6905,7 @@
             </a:r>
             <a:r>
               <a:rPr lang="en-US" dirty="0" smtClean="0">
-                <a:hlinkClick r:id="rId4"/>
+                <a:hlinkClick r:id="rId7"/>
               </a:rPr>
               <a:t>anjag1993@gmail.com</a:t>
             </a:r>
@@ -5412,7 +6930,7 @@
             </a:r>
             <a:r>
               <a:rPr lang="en-US" dirty="0" smtClean="0">
-                <a:hlinkClick r:id="rId5"/>
+                <a:hlinkClick r:id="rId8"/>
               </a:rPr>
               <a:t>jrichgels3@gatech.edu</a:t>
             </a:r>
@@ -5437,7 +6955,7 @@
             </a:r>
             <a:r>
               <a:rPr lang="en-US" dirty="0" smtClean="0">
-                <a:hlinkClick r:id="rId6"/>
+                <a:hlinkClick r:id="rId9"/>
               </a:rPr>
               <a:t>dstoneburner3@gatech.edu</a:t>
             </a:r>
@@ -5462,7 +6980,7 @@
             </a:r>
             <a:r>
               <a:rPr lang="en-US" dirty="0" smtClean="0">
-                <a:hlinkClick r:id="rId7"/>
+                <a:hlinkClick r:id="rId10"/>
               </a:rPr>
               <a:t>tmsuidan@gatech.edu</a:t>
             </a:r>
@@ -5514,6 +7032,39 @@
           </a:p>
         </p:txBody>
       </p:sp>
+      <p:pic>
+        <p:nvPicPr>
+          <p:cNvPr id="5" name="Audio 4">
+            <a:hlinkClick r:id="" action="ppaction://media"/>
+          </p:cNvPr>
+          <p:cNvPicPr>
+            <a:picLocks noChangeAspect="1"/>
+          </p:cNvPicPr>
+          <p:nvPr>
+            <a:audioFile r:link="rId2"/>
+            <p:extLst>
+              <p:ext uri="{DAA4B4D4-6D71-4841-9C94-3DE7FCFB9230}">
+                <p14:media xmlns:p14="http://schemas.microsoft.com/office/powerpoint/2010/main" r:embed="rId1"/>
+              </p:ext>
+            </p:extLst>
+          </p:nvPr>
+        </p:nvPicPr>
+        <p:blipFill>
+          <a:blip r:embed="rId11"/>
+          <a:stretch>
+            <a:fillRect/>
+          </a:stretch>
+        </p:blipFill>
+        <p:spPr>
+          <a:xfrm>
+            <a:off x="9372600" y="4991100"/>
+            <a:ext cx="609600" cy="609600"/>
+          </a:xfrm>
+          <a:prstGeom prst="rect">
+            <a:avLst/>
+          </a:prstGeom>
+        </p:spPr>
+      </p:pic>
     </p:spTree>
     <p:extLst>
       <p:ext uri="{BB962C8B-B14F-4D97-AF65-F5344CB8AC3E}">
@@ -5524,10 +7075,98 @@
   <p:clrMapOvr>
     <a:masterClrMapping/>
   </p:clrMapOvr>
+  <mc:AlternateContent xmlns:mc="http://schemas.openxmlformats.org/markup-compatibility/2006">
+    <mc:Choice xmlns:p14="http://schemas.microsoft.com/office/powerpoint/2010/main" Requires="p14">
+      <p:transition spd="slow" p14:dur="2000" advTm="10873"/>
+    </mc:Choice>
+    <mc:Fallback>
+      <p:transition spd="slow" advTm="10873"/>
+    </mc:Fallback>
+  </mc:AlternateContent>
   <p:timing>
     <p:tnLst>
       <p:par>
-        <p:cTn id="1" dur="indefinite" restart="never" nodeType="tmRoot"/>
+        <p:cTn id="1" dur="indefinite" restart="never" nodeType="tmRoot">
+          <p:childTnLst>
+            <p:seq concurrent="1" nextAc="seek">
+              <p:cTn id="2" dur="indefinite" nodeType="mainSeq">
+                <p:childTnLst>
+                  <p:par>
+                    <p:cTn id="3" fill="hold">
+                      <p:stCondLst>
+                        <p:cond delay="indefinite"/>
+                        <p:cond evt="onBegin" delay="0">
+                          <p:tn val="2"/>
+                        </p:cond>
+                      </p:stCondLst>
+                      <p:childTnLst>
+                        <p:par>
+                          <p:cTn id="4" fill="hold">
+                            <p:stCondLst>
+                              <p:cond delay="0"/>
+                            </p:stCondLst>
+                            <p:childTnLst>
+                              <p:par>
+                                <p:cTn id="5" presetID="1" presetClass="mediacall" presetSubtype="0" fill="hold" nodeType="afterEffect">
+                                  <p:stCondLst>
+                                    <p:cond delay="0"/>
+                                  </p:stCondLst>
+                                  <p:childTnLst>
+                                    <p:cmd type="call" cmd="playFrom(0.0)">
+                                      <p:cBhvr>
+                                        <p:cTn id="6" dur="1" fill="hold"/>
+                                        <p:tgtEl>
+                                          <p:spTgt spid="5"/>
+                                        </p:tgtEl>
+                                      </p:cBhvr>
+                                    </p:cmd>
+                                  </p:childTnLst>
+                                </p:cTn>
+                              </p:par>
+                            </p:childTnLst>
+                          </p:cTn>
+                        </p:par>
+                      </p:childTnLst>
+                    </p:cTn>
+                  </p:par>
+                </p:childTnLst>
+              </p:cTn>
+              <p:prevCondLst>
+                <p:cond evt="onPrev" delay="0">
+                  <p:tgtEl>
+                    <p:sldTgt/>
+                  </p:tgtEl>
+                </p:cond>
+              </p:prevCondLst>
+              <p:nextCondLst>
+                <p:cond evt="onNext" delay="0">
+                  <p:tgtEl>
+                    <p:sldTgt/>
+                  </p:tgtEl>
+                </p:cond>
+              </p:nextCondLst>
+            </p:seq>
+            <p:audio isNarration="1">
+              <p:cMediaNode vol="80000" showWhenStopped="0">
+                <p:cTn id="7" fill="hold" display="0">
+                  <p:stCondLst>
+                    <p:cond delay="indefinite"/>
+                  </p:stCondLst>
+                  <p:endCondLst>
+                    <p:cond evt="onStopAudio" delay="0">
+                      <p:tgtEl>
+                        <p:sldTgt/>
+                      </p:tgtEl>
+                    </p:cond>
+                  </p:endCondLst>
+                </p:cTn>
+                <p:tgtEl>
+                  <p:spTgt spid="5"/>
+                </p:tgtEl>
+              </p:cMediaNode>
+            </p:audio>
+          </p:childTnLst>
+        </p:cTn>
       </p:par>
     </p:tnLst>
   </p:timing>
@@ -5560,7 +7199,7 @@
           <p:nvPr/>
         </p:nvPicPr>
         <p:blipFill>
-          <a:blip r:embed="rId2"/>
+          <a:blip r:embed="rId3"/>
           <a:stretch>
             <a:fillRect/>
           </a:stretch>
@@ -5584,7 +7223,7 @@
           <p:nvPr/>
         </p:nvPicPr>
         <p:blipFill>
-          <a:blip r:embed="rId3"/>
+          <a:blip r:embed="rId4"/>
           <a:stretch>
             <a:fillRect/>
           </a:stretch>
@@ -5608,7 +7247,7 @@
           <p:nvPr/>
         </p:nvPicPr>
         <p:blipFill>
-          <a:blip r:embed="rId4"/>
+          <a:blip r:embed="rId5"/>
           <a:stretch>
             <a:fillRect/>
           </a:stretch>
@@ -5961,7 +7600,7 @@
         </p:xfrm>
         <a:graphic>
           <a:graphicData uri="http://schemas.openxmlformats.org/drawingml/2006/chart">
-            <c:chart xmlns:c="http://schemas.openxmlformats.org/drawingml/2006/chart" xmlns:r="http://schemas.openxmlformats.org/officeDocument/2006/relationships" r:id="rId2"/>
+            <c:chart xmlns:c="http://schemas.openxmlformats.org/drawingml/2006/chart" xmlns:r="http://schemas.openxmlformats.org/officeDocument/2006/relationships" r:id="rId3"/>
           </a:graphicData>
         </a:graphic>
       </p:graphicFrame>
@@ -6211,18 +7850,8 @@
           <a:p>
             <a:r>
               <a:rPr lang="en-US" sz="1800" dirty="0"/>
-              <a:t>Slide 3 images are from: </a:t>
-            </a:r>
-          </a:p>
-          <a:p>
-            <a:pPr lvl="1"/>
-            <a:r>
-              <a:rPr lang="en-US" sz="1600" dirty="0">
-                <a:hlinkClick r:id="rId2"/>
-              </a:rPr>
-              <a:t>http://decompressionprosmarketing.com/blogs/decompression-pros/16891112-how-to-ask-for-referrals-from-medical-doctors</a:t>
-            </a:r>
-            <a:endParaRPr lang="en-US" sz="1600" dirty="0"/>
+              <a:t>Slide 3 Image from:</a:t>
+            </a:r>
           </a:p>
           <a:p>
             <a:pPr lvl="1"/>
@@ -6230,7 +7859,7 @@
               <a:rPr lang="en-US" sz="1600" dirty="0">
                 <a:hlinkClick r:id="rId3"/>
               </a:rPr>
-              <a:t>http://www.libertynursingagency.com/</a:t>
+              <a:t>https://www.hl7.org/fhir/</a:t>
             </a:r>
             <a:endParaRPr lang="en-US" sz="1600" dirty="0"/>
           </a:p>
@@ -6240,7 +7869,7 @@
               <a:rPr lang="en-US" sz="1600" dirty="0">
                 <a:hlinkClick r:id="rId4"/>
               </a:rPr>
-              <a:t>http://allhealthcare.monster.com/training/articles/1822-5-steps-to-becoming-a-medical-assistant</a:t>
+              <a:t>https://www.python.org/</a:t>
             </a:r>
             <a:endParaRPr lang="en-US" sz="1600" dirty="0"/>
           </a:p>
@@ -6250,51 +7879,77 @@
               <a:rPr lang="en-US" sz="1600" dirty="0">
                 <a:hlinkClick r:id="rId5"/>
               </a:rPr>
-              <a:t>http://greenfieldcc.3dcartstores.com/Medical-Coding-and-Billing_p_1058.html</a:t>
-            </a:r>
-            <a:endParaRPr lang="en-US" sz="1600" dirty="0"/>
-          </a:p>
-          <a:p>
+              <a:t>https://</a:t>
+            </a:r>
+            <a:r>
+              <a:rPr lang="en-US" sz="1600" dirty="0" smtClean="0">
+                <a:hlinkClick r:id="rId5"/>
+              </a:rPr>
+              <a:t>cloud.google.com/appengine</a:t>
+            </a:r>
+            <a:endParaRPr lang="en-US" sz="1600" dirty="0" smtClean="0"/>
+          </a:p>
+          <a:p>
+            <a:r>
+              <a:rPr lang="en-US" sz="1800" dirty="0" smtClean="0"/>
+              <a:t>Slide 4 </a:t>
+            </a:r>
             <a:r>
               <a:rPr lang="en-US" sz="1800" dirty="0"/>
-              <a:t>Slide 4 Image from:</a:t>
+              <a:t>images </a:t>
+            </a:r>
+            <a:r>
+              <a:rPr lang="en-US" sz="1800" dirty="0" smtClean="0"/>
+              <a:t>from</a:t>
+            </a:r>
+            <a:r>
+              <a:rPr lang="en-US" sz="1800" dirty="0"/>
+              <a:t>: </a:t>
             </a:r>
           </a:p>
           <a:p>
             <a:pPr lvl="1"/>
             <a:r>
-              <a:rPr lang="en-US" dirty="0">
+              <a:rPr lang="en-US" sz="1600" dirty="0">
                 <a:hlinkClick r:id="rId6"/>
               </a:rPr>
-              <a:t>https://www.hl7.org/fhir</a:t>
-            </a:r>
-            <a:r>
-              <a:rPr lang="en-US" dirty="0" smtClean="0">
-                <a:hlinkClick r:id="rId6"/>
-              </a:rPr>
-              <a:t>/</a:t>
-            </a:r>
-            <a:endParaRPr lang="en-US" dirty="0" smtClean="0"/>
+              <a:t>http://decompressionprosmarketing.com/blogs/decompression-pros/16891112-how-to-ask-for-referrals-from-medical-doctors</a:t>
+            </a:r>
+            <a:endParaRPr lang="en-US" sz="1600" dirty="0"/>
           </a:p>
           <a:p>
             <a:pPr lvl="1"/>
             <a:r>
-              <a:rPr lang="en-US" dirty="0">
+              <a:rPr lang="en-US" sz="1600" dirty="0">
                 <a:hlinkClick r:id="rId7"/>
               </a:rPr>
-              <a:t>https://www.python.org</a:t>
-            </a:r>
-            <a:r>
-              <a:rPr lang="en-US" dirty="0" smtClean="0">
-                <a:hlinkClick r:id="rId7"/>
+              <a:t>http://www.libertynursingagency.com/</a:t>
+            </a:r>
+            <a:endParaRPr lang="en-US" sz="1600" dirty="0"/>
+          </a:p>
+          <a:p>
+            <a:pPr lvl="1"/>
+            <a:r>
+              <a:rPr lang="en-US" sz="1600" dirty="0">
+                <a:hlinkClick r:id="rId8"/>
               </a:rPr>
-              <a:t>/</a:t>
-            </a:r>
-            <a:endParaRPr lang="en-US" dirty="0" smtClean="0"/>
+              <a:t>http://allhealthcare.monster.com/training/articles/1822-5-steps-to-becoming-a-medical-assistant</a:t>
+            </a:r>
+            <a:endParaRPr lang="en-US" sz="1600" dirty="0"/>
           </a:p>
           <a:p>
             <a:pPr lvl="1"/>
-            <a:endParaRPr lang="en-US" dirty="0" smtClean="0"/>
+            <a:r>
+              <a:rPr lang="en-US" sz="1600" dirty="0">
+                <a:hlinkClick r:id="rId9"/>
+              </a:rPr>
+              <a:t>http://greenfieldcc.3dcartstores.com/Medical-Coding-and-Billing_p_1058.html</a:t>
+            </a:r>
+            <a:endParaRPr lang="en-US" sz="1600" dirty="0"/>
+          </a:p>
+          <a:p>
+            <a:pPr lvl="1"/>
+            <a:endParaRPr lang="en-US" sz="1600" dirty="0"/>
           </a:p>
           <a:p>
             <a:endParaRPr lang="en-US" dirty="0"/>
@@ -6338,136 +7993,16 @@
           <a:chExt cx="0" cy="0"/>
         </a:xfrm>
       </p:grpSpPr>
-      <p:sp>
-        <p:nvSpPr>
-          <p:cNvPr id="5" name="TextBox 4"/>
-          <p:cNvSpPr txBox="1"/>
-          <p:nvPr/>
-        </p:nvSpPr>
-        <p:spPr>
-          <a:xfrm>
-            <a:off x="304800" y="1257300"/>
-            <a:ext cx="3200400" cy="2862322"/>
-          </a:xfrm>
-          <a:prstGeom prst="rect">
-            <a:avLst/>
-          </a:prstGeom>
-          <a:noFill/>
-        </p:spPr>
-        <p:txBody>
-          <a:bodyPr wrap="square" rtlCol="0">
-            <a:spAutoFit/>
-          </a:bodyPr>
-          <a:lstStyle/>
-          <a:p>
-            <a:r>
-              <a:rPr lang="en-US" dirty="0"/>
-              <a:t>Key Goals:</a:t>
-            </a:r>
-          </a:p>
-          <a:p>
-            <a:endParaRPr lang="en-US" dirty="0"/>
-          </a:p>
-          <a:p>
-            <a:pPr marL="342900" indent="-342900">
-              <a:buAutoNum type="arabicPeriod"/>
-            </a:pPr>
-            <a:r>
-              <a:rPr lang="en-US" dirty="0"/>
-              <a:t>Verify diagnoses </a:t>
-            </a:r>
-          </a:p>
-          <a:p>
-            <a:pPr marL="342900" indent="-342900">
-              <a:buAutoNum type="arabicPeriod"/>
-            </a:pPr>
-            <a:r>
-              <a:rPr lang="en-US" dirty="0"/>
-              <a:t>Identify past conditions that need to be reviewed</a:t>
-            </a:r>
-          </a:p>
-          <a:p>
-            <a:pPr marL="342900" indent="-342900">
-              <a:buAutoNum type="arabicPeriod"/>
-            </a:pPr>
-            <a:r>
-              <a:rPr lang="en-US" dirty="0"/>
-              <a:t>Improve payments from the ACA risk adjustment process</a:t>
-            </a:r>
-          </a:p>
-          <a:p>
-            <a:pPr marL="342900" indent="-342900">
-              <a:buAutoNum type="arabicPeriod"/>
-            </a:pPr>
-            <a:r>
-              <a:rPr lang="en-US" dirty="0"/>
-              <a:t>Improve medical record data quality</a:t>
-            </a:r>
-          </a:p>
-          <a:p>
-            <a:endParaRPr lang="en-US" dirty="0"/>
-          </a:p>
-        </p:txBody>
-      </p:sp>
-      <p:sp>
-        <p:nvSpPr>
-          <p:cNvPr id="8" name="Title 1"/>
-          <p:cNvSpPr txBox="1">
-            <a:spLocks/>
-          </p:cNvSpPr>
-          <p:nvPr/>
-        </p:nvSpPr>
-        <p:spPr>
-          <a:xfrm>
-            <a:off x="762000" y="190500"/>
-            <a:ext cx="8153400" cy="609600"/>
-          </a:xfrm>
-          <a:prstGeom prst="rect">
-            <a:avLst/>
-          </a:prstGeom>
-          <a:solidFill>
-            <a:schemeClr val="bg1"/>
-          </a:solidFill>
-        </p:spPr>
-        <p:txBody>
-          <a:bodyPr bIns="91440" anchor="b" anchorCtr="0">
-            <a:noAutofit/>
-          </a:bodyPr>
-          <a:lstStyle>
-            <a:lvl1pPr algn="l" rtl="0" eaLnBrk="1" latinLnBrk="0" hangingPunct="1">
-              <a:spcBef>
-                <a:spcPct val="0"/>
-              </a:spcBef>
-              <a:buNone/>
-              <a:defRPr kumimoji="0" sz="4000" kern="1200">
-                <a:solidFill>
-                  <a:schemeClr val="tx2"/>
-                </a:solidFill>
-                <a:latin typeface="+mj-lt"/>
-                <a:ea typeface="+mj-ea"/>
-                <a:cs typeface="+mj-cs"/>
-              </a:defRPr>
-            </a:lvl1pPr>
-          </a:lstStyle>
-          <a:p>
-            <a:r>
-              <a:rPr lang="en-US" sz="3600" dirty="0" smtClean="0"/>
-              <a:t>Use Case Diagram</a:t>
-            </a:r>
-            <a:endParaRPr lang="en-US" sz="3600" dirty="0"/>
-          </a:p>
-        </p:txBody>
-      </p:sp>
       <p:pic>
         <p:nvPicPr>
-          <p:cNvPr id="2" name="Picture 1"/>
+          <p:cNvPr id="3" name="Picture 2"/>
           <p:cNvPicPr>
             <a:picLocks noChangeAspect="1"/>
           </p:cNvPicPr>
           <p:nvPr/>
         </p:nvPicPr>
         <p:blipFill>
-          <a:blip r:embed="rId2">
+          <a:blip r:embed="rId5">
             <a:extLst>
               <a:ext uri="{28A0092B-C50C-407E-A947-70E740481C1C}">
                 <a14:useLocalDpi xmlns:a14="http://schemas.microsoft.com/office/drawing/2010/main" val="0"/>
@@ -6480,8 +8015,41 @@
         </p:blipFill>
         <p:spPr>
           <a:xfrm>
-            <a:off x="3151894" y="800100"/>
-            <a:ext cx="5801606" cy="4615530"/>
+            <a:off x="1371600" y="114300"/>
+            <a:ext cx="6781800" cy="5395334"/>
+          </a:xfrm>
+          <a:prstGeom prst="rect">
+            <a:avLst/>
+          </a:prstGeom>
+        </p:spPr>
+      </p:pic>
+      <p:pic>
+        <p:nvPicPr>
+          <p:cNvPr id="2" name="Audio 1">
+            <a:hlinkClick r:id="" action="ppaction://media"/>
+          </p:cNvPr>
+          <p:cNvPicPr>
+            <a:picLocks noChangeAspect="1"/>
+          </p:cNvPicPr>
+          <p:nvPr>
+            <a:audioFile r:link="rId2"/>
+            <p:extLst>
+              <p:ext uri="{DAA4B4D4-6D71-4841-9C94-3DE7FCFB9230}">
+                <p14:media xmlns:p14="http://schemas.microsoft.com/office/powerpoint/2010/main" r:embed="rId1"/>
+              </p:ext>
+            </p:extLst>
+          </p:nvPr>
+        </p:nvPicPr>
+        <p:blipFill>
+          <a:blip r:embed="rId6"/>
+          <a:stretch>
+            <a:fillRect/>
+          </a:stretch>
+        </p:blipFill>
+        <p:spPr>
+          <a:xfrm>
+            <a:off x="9372600" y="4899684"/>
+            <a:ext cx="609600" cy="609600"/>
           </a:xfrm>
           <a:prstGeom prst="rect">
             <a:avLst/>
@@ -6498,10 +8066,98 @@
   <p:clrMapOvr>
     <a:masterClrMapping/>
   </p:clrMapOvr>
+  <mc:AlternateContent xmlns:mc="http://schemas.openxmlformats.org/markup-compatibility/2006">
+    <mc:Choice xmlns:p14="http://schemas.microsoft.com/office/powerpoint/2010/main" Requires="p14">
+      <p:transition spd="slow" p14:dur="2000" advTm="56674"/>
+    </mc:Choice>
+    <mc:Fallback>
+      <p:transition spd="slow" advTm="56674"/>
+    </mc:Fallback>
+  </mc:AlternateContent>
   <p:timing>
     <p:tnLst>
       <p:par>
-        <p:cTn id="1" dur="indefinite" restart="never" nodeType="tmRoot"/>
+        <p:cTn id="1" dur="indefinite" restart="never" nodeType="tmRoot">
+          <p:childTnLst>
+            <p:seq concurrent="1" nextAc="seek">
+              <p:cTn id="2" dur="indefinite" nodeType="mainSeq">
+                <p:childTnLst>
+                  <p:par>
+                    <p:cTn id="3" fill="hold">
+                      <p:stCondLst>
+                        <p:cond delay="indefinite"/>
+                        <p:cond evt="onBegin" delay="0">
+                          <p:tn val="2"/>
+                        </p:cond>
+                      </p:stCondLst>
+                      <p:childTnLst>
+                        <p:par>
+                          <p:cTn id="4" fill="hold">
+                            <p:stCondLst>
+                              <p:cond delay="0"/>
+                            </p:stCondLst>
+                            <p:childTnLst>
+                              <p:par>
+                                <p:cTn id="5" presetID="1" presetClass="mediacall" presetSubtype="0" fill="hold" nodeType="afterEffect">
+                                  <p:stCondLst>
+                                    <p:cond delay="0"/>
+                                  </p:stCondLst>
+                                  <p:childTnLst>
+                                    <p:cmd type="call" cmd="playFrom(0.0)">
+                                      <p:cBhvr>
+                                        <p:cTn id="6" dur="1" fill="hold"/>
+                                        <p:tgtEl>
+                                          <p:spTgt spid="2"/>
+                                        </p:tgtEl>
+                                      </p:cBhvr>
+                                    </p:cmd>
+                                  </p:childTnLst>
+                                </p:cTn>
+                              </p:par>
+                            </p:childTnLst>
+                          </p:cTn>
+                        </p:par>
+                      </p:childTnLst>
+                    </p:cTn>
+                  </p:par>
+                </p:childTnLst>
+              </p:cTn>
+              <p:prevCondLst>
+                <p:cond evt="onPrev" delay="0">
+                  <p:tgtEl>
+                    <p:sldTgt/>
+                  </p:tgtEl>
+                </p:cond>
+              </p:prevCondLst>
+              <p:nextCondLst>
+                <p:cond evt="onNext" delay="0">
+                  <p:tgtEl>
+                    <p:sldTgt/>
+                  </p:tgtEl>
+                </p:cond>
+              </p:nextCondLst>
+            </p:seq>
+            <p:audio isNarration="1">
+              <p:cMediaNode vol="80000" showWhenStopped="0">
+                <p:cTn id="7" fill="hold" display="0">
+                  <p:stCondLst>
+                    <p:cond delay="indefinite"/>
+                  </p:stCondLst>
+                  <p:endCondLst>
+                    <p:cond evt="onStopAudio" delay="0">
+                      <p:tgtEl>
+                        <p:sldTgt/>
+                      </p:tgtEl>
+                    </p:cond>
+                  </p:endCondLst>
+                </p:cTn>
+                <p:tgtEl>
+                  <p:spTgt spid="2"/>
+                </p:tgtEl>
+              </p:cMediaNode>
+            </p:audio>
+          </p:childTnLst>
+        </p:cTn>
       </p:par>
     </p:tnLst>
   </p:timing>
@@ -6525,73 +8181,6 @@
           <a:chExt cx="0" cy="0"/>
         </a:xfrm>
       </p:grpSpPr>
-      <p:pic>
-        <p:nvPicPr>
-          <p:cNvPr id="2" name="Picture 1"/>
-          <p:cNvPicPr>
-            <a:picLocks noChangeAspect="1"/>
-          </p:cNvPicPr>
-          <p:nvPr/>
-        </p:nvPicPr>
-        <p:blipFill>
-          <a:blip r:embed="rId2">
-            <a:extLst>
-              <a:ext uri="{28A0092B-C50C-407E-A947-70E740481C1C}">
-                <a14:useLocalDpi xmlns:a14="http://schemas.microsoft.com/office/drawing/2010/main" val="0"/>
-              </a:ext>
-            </a:extLst>
-          </a:blip>
-          <a:stretch>
-            <a:fillRect/>
-          </a:stretch>
-        </p:blipFill>
-        <p:spPr>
-          <a:xfrm>
-            <a:off x="762000" y="114300"/>
-            <a:ext cx="7199419" cy="5418712"/>
-          </a:xfrm>
-          <a:prstGeom prst="rect">
-            <a:avLst/>
-          </a:prstGeom>
-        </p:spPr>
-      </p:pic>
-    </p:spTree>
-    <p:extLst>
-      <p:ext uri="{BB962C8B-B14F-4D97-AF65-F5344CB8AC3E}">
-        <p14:creationId xmlns:p14="http://schemas.microsoft.com/office/powerpoint/2010/main" val="767505757"/>
-      </p:ext>
-    </p:extLst>
-  </p:cSld>
-  <p:clrMapOvr>
-    <a:masterClrMapping/>
-  </p:clrMapOvr>
-  <p:timing>
-    <p:tnLst>
-      <p:par>
-        <p:cTn id="1" dur="indefinite" restart="never" nodeType="tmRoot"/>
-      </p:par>
-    </p:tnLst>
-  </p:timing>
-</p:sld>
-</file>
-
-<file path=ppt/slides/slide4.xml><?xml version="1.0" encoding="utf-8"?>
-<p:sld xmlns:a="http://schemas.openxmlformats.org/drawingml/2006/main" xmlns:r="http://schemas.openxmlformats.org/officeDocument/2006/relationships" xmlns:p="http://schemas.openxmlformats.org/presentationml/2006/main">
-  <p:cSld>
-    <p:spTree>
-      <p:nvGrpSpPr>
-        <p:cNvPr id="1" name=""/>
-        <p:cNvGrpSpPr/>
-        <p:nvPr/>
-      </p:nvGrpSpPr>
-      <p:grpSpPr>
-        <a:xfrm>
-          <a:off x="0" y="0"/>
-          <a:ext cx="0" cy="0"/>
-          <a:chOff x="0" y="0"/>
-          <a:chExt cx="0" cy="0"/>
-        </a:xfrm>
-      </p:grpSpPr>
       <p:sp>
         <p:nvSpPr>
           <p:cNvPr id="4" name="TextBox 3"/>
@@ -6732,7 +8321,7 @@
           <p:nvPr/>
         </p:nvPicPr>
         <p:blipFill>
-          <a:blip r:embed="rId2">
+          <a:blip r:embed="rId5">
             <a:extLst>
               <a:ext uri="{28A0092B-C50C-407E-A947-70E740481C1C}">
                 <a14:useLocalDpi xmlns:a14="http://schemas.microsoft.com/office/drawing/2010/main" val="0"/>
@@ -6786,7 +8375,7 @@
           <p:nvPr/>
         </p:nvPicPr>
         <p:blipFill>
-          <a:blip r:embed="rId3">
+          <a:blip r:embed="rId6">
             <a:extLst>
               <a:ext uri="{28A0092B-C50C-407E-A947-70E740481C1C}">
                 <a14:useLocalDpi xmlns:a14="http://schemas.microsoft.com/office/drawing/2010/main" val="0"/>
@@ -6840,7 +8429,7 @@
           <p:nvPr/>
         </p:nvPicPr>
         <p:blipFill>
-          <a:blip r:embed="rId4">
+          <a:blip r:embed="rId7">
             <a:extLst>
               <a:ext uri="{28A0092B-C50C-407E-A947-70E740481C1C}">
                 <a14:useLocalDpi xmlns:a14="http://schemas.microsoft.com/office/drawing/2010/main" val="0"/>
@@ -6934,6 +8523,39 @@
           </a:p>
         </p:txBody>
       </p:sp>
+      <p:pic>
+        <p:nvPicPr>
+          <p:cNvPr id="3" name="Audio 2">
+            <a:hlinkClick r:id="" action="ppaction://media"/>
+          </p:cNvPr>
+          <p:cNvPicPr>
+            <a:picLocks noChangeAspect="1"/>
+          </p:cNvPicPr>
+          <p:nvPr>
+            <a:audioFile r:link="rId2"/>
+            <p:extLst>
+              <p:ext uri="{DAA4B4D4-6D71-4841-9C94-3DE7FCFB9230}">
+                <p14:media xmlns:p14="http://schemas.microsoft.com/office/powerpoint/2010/main" r:embed="rId1"/>
+              </p:ext>
+            </p:extLst>
+          </p:nvPr>
+        </p:nvPicPr>
+        <p:blipFill>
+          <a:blip r:embed="rId8"/>
+          <a:stretch>
+            <a:fillRect/>
+          </a:stretch>
+        </p:blipFill>
+        <p:spPr>
+          <a:xfrm>
+            <a:off x="9525000" y="4914900"/>
+            <a:ext cx="609600" cy="609600"/>
+          </a:xfrm>
+          <a:prstGeom prst="rect">
+            <a:avLst/>
+          </a:prstGeom>
+        </p:spPr>
+      </p:pic>
     </p:spTree>
     <p:extLst>
       <p:ext uri="{BB962C8B-B14F-4D97-AF65-F5344CB8AC3E}">
@@ -6944,10 +8566,286 @@
   <p:clrMapOvr>
     <a:masterClrMapping/>
   </p:clrMapOvr>
+  <mc:AlternateContent xmlns:mc="http://schemas.openxmlformats.org/markup-compatibility/2006">
+    <mc:Choice xmlns:p14="http://schemas.microsoft.com/office/powerpoint/2010/main" Requires="p14">
+      <p:transition spd="slow" p14:dur="2000" advTm="30565"/>
+    </mc:Choice>
+    <mc:Fallback>
+      <p:transition spd="slow" advTm="30565"/>
+    </mc:Fallback>
+  </mc:AlternateContent>
   <p:timing>
     <p:tnLst>
       <p:par>
-        <p:cTn id="1" dur="indefinite" restart="never" nodeType="tmRoot"/>
+        <p:cTn id="1" dur="indefinite" restart="never" nodeType="tmRoot">
+          <p:childTnLst>
+            <p:seq concurrent="1" nextAc="seek">
+              <p:cTn id="2" dur="indefinite" nodeType="mainSeq">
+                <p:childTnLst>
+                  <p:par>
+                    <p:cTn id="3" fill="hold">
+                      <p:stCondLst>
+                        <p:cond delay="indefinite"/>
+                        <p:cond evt="onBegin" delay="0">
+                          <p:tn val="2"/>
+                        </p:cond>
+                      </p:stCondLst>
+                      <p:childTnLst>
+                        <p:par>
+                          <p:cTn id="4" fill="hold">
+                            <p:stCondLst>
+                              <p:cond delay="0"/>
+                            </p:stCondLst>
+                            <p:childTnLst>
+                              <p:par>
+                                <p:cTn id="5" presetID="1" presetClass="mediacall" presetSubtype="0" fill="hold" nodeType="afterEffect">
+                                  <p:stCondLst>
+                                    <p:cond delay="0"/>
+                                  </p:stCondLst>
+                                  <p:childTnLst>
+                                    <p:cmd type="call" cmd="playFrom(0.0)">
+                                      <p:cBhvr>
+                                        <p:cTn id="6" dur="1" fill="hold"/>
+                                        <p:tgtEl>
+                                          <p:spTgt spid="3"/>
+                                        </p:tgtEl>
+                                      </p:cBhvr>
+                                    </p:cmd>
+                                  </p:childTnLst>
+                                </p:cTn>
+                              </p:par>
+                            </p:childTnLst>
+                          </p:cTn>
+                        </p:par>
+                      </p:childTnLst>
+                    </p:cTn>
+                  </p:par>
+                </p:childTnLst>
+              </p:cTn>
+              <p:prevCondLst>
+                <p:cond evt="onPrev" delay="0">
+                  <p:tgtEl>
+                    <p:sldTgt/>
+                  </p:tgtEl>
+                </p:cond>
+              </p:prevCondLst>
+              <p:nextCondLst>
+                <p:cond evt="onNext" delay="0">
+                  <p:tgtEl>
+                    <p:sldTgt/>
+                  </p:tgtEl>
+                </p:cond>
+              </p:nextCondLst>
+            </p:seq>
+            <p:audio isNarration="1">
+              <p:cMediaNode vol="80000" showWhenStopped="0">
+                <p:cTn id="7" fill="hold" display="0">
+                  <p:stCondLst>
+                    <p:cond delay="indefinite"/>
+                  </p:stCondLst>
+                  <p:endCondLst>
+                    <p:cond evt="onStopAudio" delay="0">
+                      <p:tgtEl>
+                        <p:sldTgt/>
+                      </p:tgtEl>
+                    </p:cond>
+                  </p:endCondLst>
+                </p:cTn>
+                <p:tgtEl>
+                  <p:spTgt spid="3"/>
+                </p:tgtEl>
+              </p:cMediaNode>
+            </p:audio>
+          </p:childTnLst>
+        </p:cTn>
+      </p:par>
+    </p:tnLst>
+  </p:timing>
+</p:sld>
+</file>
+
+<file path=ppt/slides/slide4.xml><?xml version="1.0" encoding="utf-8"?>
+<p:sld xmlns:a="http://schemas.openxmlformats.org/drawingml/2006/main" xmlns:r="http://schemas.openxmlformats.org/officeDocument/2006/relationships" xmlns:p="http://schemas.openxmlformats.org/presentationml/2006/main">
+  <p:cSld>
+    <p:spTree>
+      <p:nvGrpSpPr>
+        <p:cNvPr id="1" name=""/>
+        <p:cNvGrpSpPr/>
+        <p:nvPr/>
+      </p:nvGrpSpPr>
+      <p:grpSpPr>
+        <a:xfrm>
+          <a:off x="0" y="0"/>
+          <a:ext cx="0" cy="0"/>
+          <a:chOff x="0" y="0"/>
+          <a:chExt cx="0" cy="0"/>
+        </a:xfrm>
+      </p:grpSpPr>
+      <p:pic>
+        <p:nvPicPr>
+          <p:cNvPr id="2" name="Picture 1"/>
+          <p:cNvPicPr>
+            <a:picLocks noChangeAspect="1"/>
+          </p:cNvPicPr>
+          <p:nvPr/>
+        </p:nvPicPr>
+        <p:blipFill>
+          <a:blip r:embed="rId5">
+            <a:extLst>
+              <a:ext uri="{28A0092B-C50C-407E-A947-70E740481C1C}">
+                <a14:useLocalDpi xmlns:a14="http://schemas.microsoft.com/office/drawing/2010/main" val="0"/>
+              </a:ext>
+            </a:extLst>
+          </a:blip>
+          <a:stretch>
+            <a:fillRect/>
+          </a:stretch>
+        </p:blipFill>
+        <p:spPr>
+          <a:xfrm>
+            <a:off x="762000" y="114300"/>
+            <a:ext cx="7199419" cy="5418712"/>
+          </a:xfrm>
+          <a:prstGeom prst="rect">
+            <a:avLst/>
+          </a:prstGeom>
+        </p:spPr>
+      </p:pic>
+      <p:pic>
+        <p:nvPicPr>
+          <p:cNvPr id="4" name="Audio 3">
+            <a:hlinkClick r:id="" action="ppaction://media"/>
+          </p:cNvPr>
+          <p:cNvPicPr>
+            <a:picLocks noChangeAspect="1"/>
+          </p:cNvPicPr>
+          <p:nvPr>
+            <a:audioFile r:link="rId2"/>
+            <p:extLst>
+              <p:ext uri="{DAA4B4D4-6D71-4841-9C94-3DE7FCFB9230}">
+                <p14:media xmlns:p14="http://schemas.microsoft.com/office/powerpoint/2010/main" r:embed="rId1"/>
+              </p:ext>
+            </p:extLst>
+          </p:nvPr>
+        </p:nvPicPr>
+        <p:blipFill>
+          <a:blip r:embed="rId6"/>
+          <a:stretch>
+            <a:fillRect/>
+          </a:stretch>
+        </p:blipFill>
+        <p:spPr>
+          <a:xfrm>
+            <a:off x="9448800" y="4838700"/>
+            <a:ext cx="609600" cy="609600"/>
+          </a:xfrm>
+          <a:prstGeom prst="rect">
+            <a:avLst/>
+          </a:prstGeom>
+        </p:spPr>
+      </p:pic>
+    </p:spTree>
+    <p:extLst>
+      <p:ext uri="{BB962C8B-B14F-4D97-AF65-F5344CB8AC3E}">
+        <p14:creationId xmlns:p14="http://schemas.microsoft.com/office/powerpoint/2010/main" val="767505757"/>
+      </p:ext>
+    </p:extLst>
+  </p:cSld>
+  <p:clrMapOvr>
+    <a:masterClrMapping/>
+  </p:clrMapOvr>
+  <mc:AlternateContent xmlns:mc="http://schemas.openxmlformats.org/markup-compatibility/2006">
+    <mc:Choice xmlns:p14="http://schemas.microsoft.com/office/powerpoint/2010/main" Requires="p14">
+      <p:transition spd="slow" p14:dur="2000" advTm="46683"/>
+    </mc:Choice>
+    <mc:Fallback>
+      <p:transition spd="slow" advTm="46683"/>
+    </mc:Fallback>
+  </mc:AlternateContent>
+  <p:timing>
+    <p:tnLst>
+      <p:par>
+        <p:cTn id="1" dur="indefinite" restart="never" nodeType="tmRoot">
+          <p:childTnLst>
+            <p:seq concurrent="1" nextAc="seek">
+              <p:cTn id="2" dur="indefinite" nodeType="mainSeq">
+                <p:childTnLst>
+                  <p:par>
+                    <p:cTn id="3" fill="hold">
+                      <p:stCondLst>
+                        <p:cond delay="indefinite"/>
+                        <p:cond evt="onBegin" delay="0">
+                          <p:tn val="2"/>
+                        </p:cond>
+                      </p:stCondLst>
+                      <p:childTnLst>
+                        <p:par>
+                          <p:cTn id="4" fill="hold">
+                            <p:stCondLst>
+                              <p:cond delay="0"/>
+                            </p:stCondLst>
+                            <p:childTnLst>
+                              <p:par>
+                                <p:cTn id="5" presetID="1" presetClass="mediacall" presetSubtype="0" fill="hold" nodeType="afterEffect">
+                                  <p:stCondLst>
+                                    <p:cond delay="0"/>
+                                  </p:stCondLst>
+                                  <p:childTnLst>
+                                    <p:cmd type="call" cmd="playFrom(0.0)">
+                                      <p:cBhvr>
+                                        <p:cTn id="6" dur="1" fill="hold"/>
+                                        <p:tgtEl>
+                                          <p:spTgt spid="4"/>
+                                        </p:tgtEl>
+                                      </p:cBhvr>
+                                    </p:cmd>
+                                  </p:childTnLst>
+                                </p:cTn>
+                              </p:par>
+                            </p:childTnLst>
+                          </p:cTn>
+                        </p:par>
+                      </p:childTnLst>
+                    </p:cTn>
+                  </p:par>
+                </p:childTnLst>
+              </p:cTn>
+              <p:prevCondLst>
+                <p:cond evt="onPrev" delay="0">
+                  <p:tgtEl>
+                    <p:sldTgt/>
+                  </p:tgtEl>
+                </p:cond>
+              </p:prevCondLst>
+              <p:nextCondLst>
+                <p:cond evt="onNext" delay="0">
+                  <p:tgtEl>
+                    <p:sldTgt/>
+                  </p:tgtEl>
+                </p:cond>
+              </p:nextCondLst>
+            </p:seq>
+            <p:audio isNarration="1">
+              <p:cMediaNode vol="80000" showWhenStopped="0">
+                <p:cTn id="7" fill="hold" display="0">
+                  <p:stCondLst>
+                    <p:cond delay="indefinite"/>
+                  </p:stCondLst>
+                  <p:endCondLst>
+                    <p:cond evt="onStopAudio" delay="0">
+                      <p:tgtEl>
+                        <p:sldTgt/>
+                      </p:tgtEl>
+                    </p:cond>
+                  </p:endCondLst>
+                </p:cTn>
+                <p:tgtEl>
+                  <p:spTgt spid="4"/>
+                </p:tgtEl>
+              </p:cMediaNode>
+            </p:audio>
+          </p:childTnLst>
+        </p:cTn>
       </p:par>
     </p:tnLst>
   </p:timing>
@@ -6980,7 +8878,7 @@
           <p:nvPr/>
         </p:nvPicPr>
         <p:blipFill>
-          <a:blip r:embed="rId2">
+          <a:blip r:embed="rId3">
             <a:extLst>
               <a:ext uri="{28A0092B-C50C-407E-A947-70E740481C1C}">
                 <a14:useLocalDpi xmlns:a14="http://schemas.microsoft.com/office/drawing/2010/main" val="0"/>
@@ -7048,6 +8946,14 @@
   <p:clrMapOvr>
     <a:masterClrMapping/>
   </p:clrMapOvr>
+  <mc:AlternateContent xmlns:mc="http://schemas.openxmlformats.org/markup-compatibility/2006">
+    <mc:Choice xmlns:p14="http://schemas.microsoft.com/office/powerpoint/2010/main" Requires="p14">
+      <p:transition spd="slow" p14:dur="2000" advTm="1309"/>
+    </mc:Choice>
+    <mc:Fallback>
+      <p:transition spd="slow" advTm="1309"/>
+    </mc:Fallback>
+  </mc:AlternateContent>
   <p:timing>
     <p:tnLst>
       <p:par>
@@ -7084,7 +8990,7 @@
           <p:nvPr/>
         </p:nvPicPr>
         <p:blipFill>
-          <a:blip r:embed="rId2">
+          <a:blip r:embed="rId3">
             <a:extLst>
               <a:ext uri="{28A0092B-C50C-407E-A947-70E740481C1C}">
                 <a14:useLocalDpi xmlns:a14="http://schemas.microsoft.com/office/drawing/2010/main" val="0"/>
@@ -7152,6 +9058,14 @@
   <p:clrMapOvr>
     <a:masterClrMapping/>
   </p:clrMapOvr>
+  <mc:AlternateContent xmlns:mc="http://schemas.openxmlformats.org/markup-compatibility/2006" xmlns:p14="http://schemas.microsoft.com/office/powerpoint/2010/main">
+    <mc:Choice Requires="p14">
+      <p:transition spd="slow" p14:dur="2000" advTm="1180"/>
+    </mc:Choice>
+    <mc:Fallback xmlns="">
+      <p:transition spd="slow" advTm="1180"/>
+    </mc:Fallback>
+  </mc:AlternateContent>
   <p:timing>
     <p:tnLst>
       <p:par>
@@ -7188,7 +9102,7 @@
           <p:nvPr/>
         </p:nvPicPr>
         <p:blipFill>
-          <a:blip r:embed="rId2">
+          <a:blip r:embed="rId3">
             <a:extLst>
               <a:ext uri="{28A0092B-C50C-407E-A947-70E740481C1C}">
                 <a14:useLocalDpi xmlns:a14="http://schemas.microsoft.com/office/drawing/2010/main" val="0"/>
@@ -7292,7 +9206,7 @@
           <p:nvPr/>
         </p:nvPicPr>
         <p:blipFill>
-          <a:blip r:embed="rId2">
+          <a:blip r:embed="rId3">
             <a:extLst>
               <a:ext uri="{28A0092B-C50C-407E-A947-70E740481C1C}">
                 <a14:useLocalDpi xmlns:a14="http://schemas.microsoft.com/office/drawing/2010/main" val="0"/>
@@ -7396,7 +9310,7 @@
           <p:nvPr/>
         </p:nvPicPr>
         <p:blipFill>
-          <a:blip r:embed="rId2">
+          <a:blip r:embed="rId3">
             <a:extLst>
               <a:ext uri="{28A0092B-C50C-407E-A947-70E740481C1C}">
                 <a14:useLocalDpi xmlns:a14="http://schemas.microsoft.com/office/drawing/2010/main" val="0"/>
@@ -7744,4 +9658,265 @@
   <a:objectDefaults/>
   <a:extraClrSchemeLst/>
 </a:theme>
+</file>
+
+<file path=ppt/theme/theme2.xml><?xml version="1.0" encoding="utf-8"?>
+<a:theme xmlns:a="http://schemas.openxmlformats.org/drawingml/2006/main" name="Office Theme">
+  <a:themeElements>
+    <a:clrScheme name="Office">
+      <a:dk1>
+        <a:sysClr val="windowText" lastClr="000000"/>
+      </a:dk1>
+      <a:lt1>
+        <a:sysClr val="window" lastClr="FFFFFF"/>
+      </a:lt1>
+      <a:dk2>
+        <a:srgbClr val="44546A"/>
+      </a:dk2>
+      <a:lt2>
+        <a:srgbClr val="E7E6E6"/>
+      </a:lt2>
+      <a:accent1>
+        <a:srgbClr val="5B9BD5"/>
+      </a:accent1>
+      <a:accent2>
+        <a:srgbClr val="ED7D31"/>
+      </a:accent2>
+      <a:accent3>
+        <a:srgbClr val="A5A5A5"/>
+      </a:accent3>
+      <a:accent4>
+        <a:srgbClr val="FFC000"/>
+      </a:accent4>
+      <a:accent5>
+        <a:srgbClr val="4472C4"/>
+      </a:accent5>
+      <a:accent6>
+        <a:srgbClr val="70AD47"/>
+      </a:accent6>
+      <a:hlink>
+        <a:srgbClr val="0563C1"/>
+      </a:hlink>
+      <a:folHlink>
+        <a:srgbClr val="954F72"/>
+      </a:folHlink>
+    </a:clrScheme>
+    <a:fontScheme name="Office">
+      <a:majorFont>
+        <a:latin typeface="Calibri Light" panose="020F0302020204030204"/>
+        <a:ea typeface=""/>
+        <a:cs typeface=""/>
+        <a:font script="Jpan" typeface="游ゴシック Light"/>
+        <a:font script="Hang" typeface="맑은 고딕"/>
+        <a:font script="Hans" typeface="等线 Light"/>
+        <a:font script="Hant" typeface="新細明體"/>
+        <a:font script="Arab" typeface="Times New Roman"/>
+        <a:font script="Hebr" typeface="Times New Roman"/>
+        <a:font script="Thai" typeface="Angsana New"/>
+        <a:font script="Ethi" typeface="Nyala"/>
+        <a:font script="Beng" typeface="Vrinda"/>
+        <a:font script="Gujr" typeface="Shruti"/>
+        <a:font script="Khmr" typeface="MoolBoran"/>
+        <a:font script="Knda" typeface="Tunga"/>
+        <a:font script="Guru" typeface="Raavi"/>
+        <a:font script="Cans" typeface="Euphemia"/>
+        <a:font script="Cher" typeface="Plantagenet Cherokee"/>
+        <a:font script="Yiii" typeface="Microsoft Yi Baiti"/>
+        <a:font script="Tibt" typeface="Microsoft Himalaya"/>
+        <a:font script="Thaa" typeface="MV Boli"/>
+        <a:font script="Deva" typeface="Mangal"/>
+        <a:font script="Telu" typeface="Gautami"/>
+        <a:font script="Taml" typeface="Latha"/>
+        <a:font script="Syrc" typeface="Estrangelo Edessa"/>
+        <a:font script="Orya" typeface="Kalinga"/>
+        <a:font script="Mlym" typeface="Kartika"/>
+        <a:font script="Laoo" typeface="DokChampa"/>
+        <a:font script="Sinh" typeface="Iskoola Pota"/>
+        <a:font script="Mong" typeface="Mongolian Baiti"/>
+        <a:font script="Viet" typeface="Times New Roman"/>
+        <a:font script="Uigh" typeface="Microsoft Uighur"/>
+        <a:font script="Geor" typeface="Sylfaen"/>
+      </a:majorFont>
+      <a:minorFont>
+        <a:latin typeface="Calibri" panose="020F0502020204030204"/>
+        <a:ea typeface=""/>
+        <a:cs typeface=""/>
+        <a:font script="Jpan" typeface="游ゴシック"/>
+        <a:font script="Hang" typeface="맑은 고딕"/>
+        <a:font script="Hans" typeface="等线"/>
+        <a:font script="Hant" typeface="新細明體"/>
+        <a:font script="Arab" typeface="Arial"/>
+        <a:font script="Hebr" typeface="Arial"/>
+        <a:font script="Thai" typeface="Cordia New"/>
+        <a:font script="Ethi" typeface="Nyala"/>
+        <a:font script="Beng" typeface="Vrinda"/>
+        <a:font script="Gujr" typeface="Shruti"/>
+        <a:font script="Khmr" typeface="DaunPenh"/>
+        <a:font script="Knda" typeface="Tunga"/>
+        <a:font script="Guru" typeface="Raavi"/>
+        <a:font script="Cans" typeface="Euphemia"/>
+        <a:font script="Cher" typeface="Plantagenet Cherokee"/>
+        <a:font script="Yiii" typeface="Microsoft Yi Baiti"/>
+        <a:font script="Tibt" typeface="Microsoft Himalaya"/>
+        <a:font script="Thaa" typeface="MV Boli"/>
+        <a:font script="Deva" typeface="Mangal"/>
+        <a:font script="Telu" typeface="Gautami"/>
+        <a:font script="Taml" typeface="Latha"/>
+        <a:font script="Syrc" typeface="Estrangelo Edessa"/>
+        <a:font script="Orya" typeface="Kalinga"/>
+        <a:font script="Mlym" typeface="Kartika"/>
+        <a:font script="Laoo" typeface="DokChampa"/>
+        <a:font script="Sinh" typeface="Iskoola Pota"/>
+        <a:font script="Mong" typeface="Mongolian Baiti"/>
+        <a:font script="Viet" typeface="Arial"/>
+        <a:font script="Uigh" typeface="Microsoft Uighur"/>
+        <a:font script="Geor" typeface="Sylfaen"/>
+      </a:minorFont>
+    </a:fontScheme>
+    <a:fmtScheme name="Office">
+      <a:fillStyleLst>
+        <a:solidFill>
+          <a:schemeClr val="phClr"/>
+        </a:solidFill>
+        <a:gradFill rotWithShape="1">
+          <a:gsLst>
+            <a:gs pos="0">
+              <a:schemeClr val="phClr">
+                <a:lumMod val="110000"/>
+                <a:satMod val="105000"/>
+                <a:tint val="67000"/>
+              </a:schemeClr>
+            </a:gs>
+            <a:gs pos="50000">
+              <a:schemeClr val="phClr">
+                <a:lumMod val="105000"/>
+                <a:satMod val="103000"/>
+                <a:tint val="73000"/>
+              </a:schemeClr>
+            </a:gs>
+            <a:gs pos="100000">
+              <a:schemeClr val="phClr">
+                <a:lumMod val="105000"/>
+                <a:satMod val="109000"/>
+                <a:tint val="81000"/>
+              </a:schemeClr>
+            </a:gs>
+          </a:gsLst>
+          <a:lin ang="5400000" scaled="0"/>
+        </a:gradFill>
+        <a:gradFill rotWithShape="1">
+          <a:gsLst>
+            <a:gs pos="0">
+              <a:schemeClr val="phClr">
+                <a:satMod val="103000"/>
+                <a:lumMod val="102000"/>
+                <a:tint val="94000"/>
+              </a:schemeClr>
+            </a:gs>
+            <a:gs pos="50000">
+              <a:schemeClr val="phClr">
+                <a:satMod val="110000"/>
+                <a:lumMod val="100000"/>
+                <a:shade val="100000"/>
+              </a:schemeClr>
+            </a:gs>
+            <a:gs pos="100000">
+              <a:schemeClr val="phClr">
+                <a:lumMod val="99000"/>
+                <a:satMod val="120000"/>
+                <a:shade val="78000"/>
+              </a:schemeClr>
+            </a:gs>
+          </a:gsLst>
+          <a:lin ang="5400000" scaled="0"/>
+        </a:gradFill>
+      </a:fillStyleLst>
+      <a:lnStyleLst>
+        <a:ln w="6350" cap="flat" cmpd="sng" algn="ctr">
+          <a:solidFill>
+            <a:schemeClr val="phClr"/>
+          </a:solidFill>
+          <a:prstDash val="solid"/>
+          <a:miter lim="800000"/>
+        </a:ln>
+        <a:ln w="12700" cap="flat" cmpd="sng" algn="ctr">
+          <a:solidFill>
+            <a:schemeClr val="phClr"/>
+          </a:solidFill>
+          <a:prstDash val="solid"/>
+          <a:miter lim="800000"/>
+        </a:ln>
+        <a:ln w="19050" cap="flat" cmpd="sng" algn="ctr">
+          <a:solidFill>
+            <a:schemeClr val="phClr"/>
+          </a:solidFill>
+          <a:prstDash val="solid"/>
+          <a:miter lim="800000"/>
+        </a:ln>
+      </a:lnStyleLst>
+      <a:effectStyleLst>
+        <a:effectStyle>
+          <a:effectLst/>
+        </a:effectStyle>
+        <a:effectStyle>
+          <a:effectLst/>
+        </a:effectStyle>
+        <a:effectStyle>
+          <a:effectLst>
+            <a:outerShdw blurRad="57150" dist="19050" dir="5400000" algn="ctr" rotWithShape="0">
+              <a:srgbClr val="000000">
+                <a:alpha val="63000"/>
+              </a:srgbClr>
+            </a:outerShdw>
+          </a:effectLst>
+        </a:effectStyle>
+      </a:effectStyleLst>
+      <a:bgFillStyleLst>
+        <a:solidFill>
+          <a:schemeClr val="phClr"/>
+        </a:solidFill>
+        <a:solidFill>
+          <a:schemeClr val="phClr">
+            <a:tint val="95000"/>
+            <a:satMod val="170000"/>
+          </a:schemeClr>
+        </a:solidFill>
+        <a:gradFill rotWithShape="1">
+          <a:gsLst>
+            <a:gs pos="0">
+              <a:schemeClr val="phClr">
+                <a:tint val="93000"/>
+                <a:satMod val="150000"/>
+                <a:shade val="98000"/>
+                <a:lumMod val="102000"/>
+              </a:schemeClr>
+            </a:gs>
+            <a:gs pos="50000">
+              <a:schemeClr val="phClr">
+                <a:tint val="98000"/>
+                <a:satMod val="130000"/>
+                <a:shade val="90000"/>
+                <a:lumMod val="103000"/>
+              </a:schemeClr>
+            </a:gs>
+            <a:gs pos="100000">
+              <a:schemeClr val="phClr">
+                <a:shade val="63000"/>
+                <a:satMod val="120000"/>
+              </a:schemeClr>
+            </a:gs>
+          </a:gsLst>
+          <a:lin ang="5400000" scaled="0"/>
+        </a:gradFill>
+      </a:bgFillStyleLst>
+    </a:fmtScheme>
+  </a:themeElements>
+  <a:objectDefaults/>
+  <a:extraClrSchemeLst/>
+  <a:extLst>
+    <a:ext uri="{05A4C25C-085E-4340-85A3-A5531E510DB2}">
+      <thm15:themeFamily xmlns:thm15="http://schemas.microsoft.com/office/thememl/2012/main" name="Office Theme" id="{62F939B6-93AF-4DB8-9C6B-D6C7DFDC589F}" vid="{4A3C46E8-61CC-4603-A589-7422A47A8E4A}"/>
+    </a:ext>
+  </a:extLst>
+</a:theme>
 </file>
</xml_diff>

<commit_message>
Added narration notes to remaining slides.
</commit_message>
<xml_diff>
--- a/Team Deliverable 2/Technical Presentation - FHIRed Up.pptx
+++ b/Team Deliverable 2/Technical Presentation - FHIRed Up.pptx
@@ -4,11 +4,14 @@
   <p:sldMasterIdLst>
     <p:sldMasterId id="2147483684" r:id="rId1"/>
   </p:sldMasterIdLst>
+  <p:notesMasterIdLst>
+    <p:notesMasterId r:id="rId15"/>
+  </p:notesMasterIdLst>
   <p:sldIdLst>
     <p:sldId id="256" r:id="rId2"/>
     <p:sldId id="257" r:id="rId3"/>
-    <p:sldId id="258" r:id="rId4"/>
-    <p:sldId id="259" r:id="rId5"/>
+    <p:sldId id="259" r:id="rId4"/>
+    <p:sldId id="258" r:id="rId5"/>
     <p:sldId id="261" r:id="rId6"/>
     <p:sldId id="266" r:id="rId7"/>
     <p:sldId id="267" r:id="rId8"/>
@@ -131,6 +134,9 @@
         </p15:guide>
       </p15:sldGuideLst>
     </p:ext>
+    <p:ext uri="{2D200454-40CA-4A62-9FC3-DE9A4176ACB9}">
+      <p15:notesGuideLst xmlns:p15="http://schemas.microsoft.com/office/powerpoint/2012/main"/>
+    </p:ext>
   </p:extLst>
 </p:presentation>
 </file>
@@ -198,6 +204,7 @@
           <c:dLbls>
             <c:dLbl>
               <c:idx val="0"/>
+              <c:layout/>
               <c:tx>
                 <c:rich>
                   <a:bodyPr/>
@@ -228,14 +235,22 @@
               <c:showSerName val="1"/>
               <c:showPercent val="0"/>
               <c:showBubbleSize val="0"/>
-              <c:extLst>
-                <c:ext xmlns:c15="http://schemas.microsoft.com/office/drawing/2012/chart" uri="{CE6537A1-D6FC-4f65-9D91-7224C49458BB}"/>
+              <c:extLst xmlns:c16r2="http://schemas.microsoft.com/office/drawing/2015/06/chart">
+                <c:ext xmlns:c16="http://schemas.microsoft.com/office/drawing/2014/chart" uri="{C3380CC4-5D6E-409C-BE32-E72D297353CC}">
+                  <c16:uniqueId val="{00000000-CBD6-47AD-B68C-CF16D1E4DC04}"/>
+                </c:ext>
+                <c:ext xmlns:c15="http://schemas.microsoft.com/office/drawing/2012/chart" uri="{CE6537A1-D6FC-4f65-9D91-7224C49458BB}">
+                  <c15:layout/>
+                </c:ext>
               </c:extLst>
             </c:dLbl>
             <c:dLbl>
               <c:idx val="1"/>
               <c:delete val="1"/>
-              <c:extLst>
+              <c:extLst xmlns:c16r2="http://schemas.microsoft.com/office/drawing/2015/06/chart">
+                <c:ext xmlns:c16="http://schemas.microsoft.com/office/drawing/2014/chart" uri="{C3380CC4-5D6E-409C-BE32-E72D297353CC}">
+                  <c16:uniqueId val="{00000001-CBD6-47AD-B68C-CF16D1E4DC04}"/>
+                </c:ext>
                 <c:ext xmlns:c15="http://schemas.microsoft.com/office/drawing/2012/chart" uri="{CE6537A1-D6FC-4f65-9D91-7224C49458BB}"/>
               </c:extLst>
             </c:dLbl>
@@ -254,7 +269,7 @@
             <c:showPercent val="0"/>
             <c:showBubbleSize val="0"/>
             <c:showLeaderLines val="0"/>
-            <c:extLst>
+            <c:extLst xmlns:c16r2="http://schemas.microsoft.com/office/drawing/2015/06/chart">
               <c:ext xmlns:c15="http://schemas.microsoft.com/office/drawing/2012/chart" uri="{CE6537A1-D6FC-4f65-9D91-7224C49458BB}">
                 <c15:showLeaderLines val="0"/>
               </c:ext>
@@ -291,6 +306,11 @@
             </c:numRef>
           </c:yVal>
           <c:smooth val="0"/>
+          <c:extLst xmlns:c16r2="http://schemas.microsoft.com/office/drawing/2015/06/chart">
+            <c:ext xmlns:c16="http://schemas.microsoft.com/office/drawing/2014/chart" uri="{C3380CC4-5D6E-409C-BE32-E72D297353CC}">
+              <c16:uniqueId val="{00000002-CBD6-47AD-B68C-CF16D1E4DC04}"/>
+            </c:ext>
+          </c:extLst>
         </c:ser>
         <c:ser>
           <c:idx val="1"/>
@@ -355,14 +375,22 @@
               <c:showSerName val="1"/>
               <c:showPercent val="0"/>
               <c:showBubbleSize val="0"/>
-              <c:extLst>
-                <c:ext xmlns:c15="http://schemas.microsoft.com/office/drawing/2012/chart" uri="{CE6537A1-D6FC-4f65-9D91-7224C49458BB}"/>
+              <c:extLst xmlns:c16r2="http://schemas.microsoft.com/office/drawing/2015/06/chart">
+                <c:ext xmlns:c16="http://schemas.microsoft.com/office/drawing/2014/chart" uri="{C3380CC4-5D6E-409C-BE32-E72D297353CC}">
+                  <c16:uniqueId val="{00000003-CBD6-47AD-B68C-CF16D1E4DC04}"/>
+                </c:ext>
+                <c:ext xmlns:c15="http://schemas.microsoft.com/office/drawing/2012/chart" uri="{CE6537A1-D6FC-4f65-9D91-7224C49458BB}">
+                  <c15:layout/>
+                </c:ext>
               </c:extLst>
             </c:dLbl>
             <c:dLbl>
               <c:idx val="1"/>
               <c:delete val="1"/>
-              <c:extLst>
+              <c:extLst xmlns:c16r2="http://schemas.microsoft.com/office/drawing/2015/06/chart">
+                <c:ext xmlns:c16="http://schemas.microsoft.com/office/drawing/2014/chart" uri="{C3380CC4-5D6E-409C-BE32-E72D297353CC}">
+                  <c16:uniqueId val="{00000004-CBD6-47AD-B68C-CF16D1E4DC04}"/>
+                </c:ext>
                 <c:ext xmlns:c15="http://schemas.microsoft.com/office/drawing/2012/chart" uri="{CE6537A1-D6FC-4f65-9D91-7224C49458BB}"/>
               </c:extLst>
             </c:dLbl>
@@ -381,7 +409,7 @@
             <c:showPercent val="0"/>
             <c:showBubbleSize val="0"/>
             <c:showLeaderLines val="0"/>
-            <c:extLst>
+            <c:extLst xmlns:c16r2="http://schemas.microsoft.com/office/drawing/2015/06/chart">
               <c:ext xmlns:c15="http://schemas.microsoft.com/office/drawing/2012/chart" uri="{CE6537A1-D6FC-4f65-9D91-7224C49458BB}">
                 <c15:showLeaderLines val="0"/>
               </c:ext>
@@ -418,6 +446,11 @@
             </c:numRef>
           </c:yVal>
           <c:smooth val="0"/>
+          <c:extLst xmlns:c16r2="http://schemas.microsoft.com/office/drawing/2015/06/chart">
+            <c:ext xmlns:c16="http://schemas.microsoft.com/office/drawing/2014/chart" uri="{C3380CC4-5D6E-409C-BE32-E72D297353CC}">
+              <c16:uniqueId val="{00000005-CBD6-47AD-B68C-CF16D1E4DC04}"/>
+            </c:ext>
+          </c:extLst>
         </c:ser>
         <c:ser>
           <c:idx val="3"/>
@@ -447,7 +480,10 @@
             <c:dLbl>
               <c:idx val="0"/>
               <c:delete val="1"/>
-              <c:extLst>
+              <c:extLst xmlns:c16r2="http://schemas.microsoft.com/office/drawing/2015/06/chart">
+                <c:ext xmlns:c16="http://schemas.microsoft.com/office/drawing/2014/chart" uri="{C3380CC4-5D6E-409C-BE32-E72D297353CC}">
+                  <c16:uniqueId val="{00000006-CBD6-47AD-B68C-CF16D1E4DC04}"/>
+                </c:ext>
                 <c:ext xmlns:c15="http://schemas.microsoft.com/office/drawing/2012/chart" uri="{CE6537A1-D6FC-4f65-9D91-7224C49458BB}"/>
               </c:extLst>
             </c:dLbl>
@@ -489,8 +525,13 @@
               <c:showSerName val="1"/>
               <c:showPercent val="0"/>
               <c:showBubbleSize val="0"/>
-              <c:extLst>
-                <c:ext xmlns:c15="http://schemas.microsoft.com/office/drawing/2012/chart" uri="{CE6537A1-D6FC-4f65-9D91-7224C49458BB}"/>
+              <c:extLst xmlns:c16r2="http://schemas.microsoft.com/office/drawing/2015/06/chart">
+                <c:ext xmlns:c16="http://schemas.microsoft.com/office/drawing/2014/chart" uri="{C3380CC4-5D6E-409C-BE32-E72D297353CC}">
+                  <c16:uniqueId val="{00000007-CBD6-47AD-B68C-CF16D1E4DC04}"/>
+                </c:ext>
+                <c:ext xmlns:c15="http://schemas.microsoft.com/office/drawing/2012/chart" uri="{CE6537A1-D6FC-4f65-9D91-7224C49458BB}">
+                  <c15:layout/>
+                </c:ext>
               </c:extLst>
             </c:dLbl>
             <c:spPr>
@@ -508,7 +549,7 @@
             <c:showPercent val="0"/>
             <c:showBubbleSize val="0"/>
             <c:showLeaderLines val="0"/>
-            <c:extLst>
+            <c:extLst xmlns:c16r2="http://schemas.microsoft.com/office/drawing/2015/06/chart">
               <c:ext xmlns:c15="http://schemas.microsoft.com/office/drawing/2012/chart" uri="{CE6537A1-D6FC-4f65-9D91-7224C49458BB}">
                 <c15:showLeaderLines val="0"/>
               </c:ext>
@@ -545,6 +586,11 @@
             </c:numRef>
           </c:yVal>
           <c:smooth val="0"/>
+          <c:extLst xmlns:c16r2="http://schemas.microsoft.com/office/drawing/2015/06/chart">
+            <c:ext xmlns:c16="http://schemas.microsoft.com/office/drawing/2014/chart" uri="{C3380CC4-5D6E-409C-BE32-E72D297353CC}">
+              <c16:uniqueId val="{00000008-CBD6-47AD-B68C-CF16D1E4DC04}"/>
+            </c:ext>
+          </c:extLst>
         </c:ser>
         <c:ser>
           <c:idx val="5"/>
@@ -609,14 +655,22 @@
               <c:showSerName val="1"/>
               <c:showPercent val="0"/>
               <c:showBubbleSize val="0"/>
-              <c:extLst>
-                <c:ext xmlns:c15="http://schemas.microsoft.com/office/drawing/2012/chart" uri="{CE6537A1-D6FC-4f65-9D91-7224C49458BB}"/>
+              <c:extLst xmlns:c16r2="http://schemas.microsoft.com/office/drawing/2015/06/chart">
+                <c:ext xmlns:c16="http://schemas.microsoft.com/office/drawing/2014/chart" uri="{C3380CC4-5D6E-409C-BE32-E72D297353CC}">
+                  <c16:uniqueId val="{00000009-CBD6-47AD-B68C-CF16D1E4DC04}"/>
+                </c:ext>
+                <c:ext xmlns:c15="http://schemas.microsoft.com/office/drawing/2012/chart" uri="{CE6537A1-D6FC-4f65-9D91-7224C49458BB}">
+                  <c15:layout/>
+                </c:ext>
               </c:extLst>
             </c:dLbl>
             <c:dLbl>
               <c:idx val="1"/>
               <c:delete val="1"/>
-              <c:extLst>
+              <c:extLst xmlns:c16r2="http://schemas.microsoft.com/office/drawing/2015/06/chart">
+                <c:ext xmlns:c16="http://schemas.microsoft.com/office/drawing/2014/chart" uri="{C3380CC4-5D6E-409C-BE32-E72D297353CC}">
+                  <c16:uniqueId val="{0000000A-CBD6-47AD-B68C-CF16D1E4DC04}"/>
+                </c:ext>
                 <c:ext xmlns:c15="http://schemas.microsoft.com/office/drawing/2012/chart" uri="{CE6537A1-D6FC-4f65-9D91-7224C49458BB}"/>
               </c:extLst>
             </c:dLbl>
@@ -635,7 +689,7 @@
             <c:showPercent val="0"/>
             <c:showBubbleSize val="0"/>
             <c:showLeaderLines val="0"/>
-            <c:extLst>
+            <c:extLst xmlns:c16r2="http://schemas.microsoft.com/office/drawing/2015/06/chart">
               <c:ext xmlns:c15="http://schemas.microsoft.com/office/drawing/2012/chart" uri="{CE6537A1-D6FC-4f65-9D91-7224C49458BB}">
                 <c15:showLeaderLines val="0"/>
               </c:ext>
@@ -672,6 +726,11 @@
             </c:numRef>
           </c:yVal>
           <c:smooth val="0"/>
+          <c:extLst xmlns:c16r2="http://schemas.microsoft.com/office/drawing/2015/06/chart">
+            <c:ext xmlns:c16="http://schemas.microsoft.com/office/drawing/2014/chart" uri="{C3380CC4-5D6E-409C-BE32-E72D297353CC}">
+              <c16:uniqueId val="{0000000B-CBD6-47AD-B68C-CF16D1E4DC04}"/>
+            </c:ext>
+          </c:extLst>
         </c:ser>
         <c:ser>
           <c:idx val="7"/>
@@ -736,14 +795,22 @@
               <c:showSerName val="1"/>
               <c:showPercent val="0"/>
               <c:showBubbleSize val="0"/>
-              <c:extLst>
-                <c:ext xmlns:c15="http://schemas.microsoft.com/office/drawing/2012/chart" uri="{CE6537A1-D6FC-4f65-9D91-7224C49458BB}"/>
+              <c:extLst xmlns:c16r2="http://schemas.microsoft.com/office/drawing/2015/06/chart">
+                <c:ext xmlns:c16="http://schemas.microsoft.com/office/drawing/2014/chart" uri="{C3380CC4-5D6E-409C-BE32-E72D297353CC}">
+                  <c16:uniqueId val="{0000000C-CBD6-47AD-B68C-CF16D1E4DC04}"/>
+                </c:ext>
+                <c:ext xmlns:c15="http://schemas.microsoft.com/office/drawing/2012/chart" uri="{CE6537A1-D6FC-4f65-9D91-7224C49458BB}">
+                  <c15:layout/>
+                </c:ext>
               </c:extLst>
             </c:dLbl>
             <c:dLbl>
               <c:idx val="1"/>
               <c:delete val="1"/>
-              <c:extLst>
+              <c:extLst xmlns:c16r2="http://schemas.microsoft.com/office/drawing/2015/06/chart">
+                <c:ext xmlns:c16="http://schemas.microsoft.com/office/drawing/2014/chart" uri="{C3380CC4-5D6E-409C-BE32-E72D297353CC}">
+                  <c16:uniqueId val="{0000000D-CBD6-47AD-B68C-CF16D1E4DC04}"/>
+                </c:ext>
                 <c:ext xmlns:c15="http://schemas.microsoft.com/office/drawing/2012/chart" uri="{CE6537A1-D6FC-4f65-9D91-7224C49458BB}"/>
               </c:extLst>
             </c:dLbl>
@@ -762,7 +829,7 @@
             <c:showPercent val="0"/>
             <c:showBubbleSize val="0"/>
             <c:showLeaderLines val="0"/>
-            <c:extLst>
+            <c:extLst xmlns:c16r2="http://schemas.microsoft.com/office/drawing/2015/06/chart">
               <c:ext xmlns:c15="http://schemas.microsoft.com/office/drawing/2012/chart" uri="{CE6537A1-D6FC-4f65-9D91-7224C49458BB}">
                 <c15:showLeaderLines val="0"/>
               </c:ext>
@@ -799,6 +866,11 @@
             </c:numRef>
           </c:yVal>
           <c:smooth val="0"/>
+          <c:extLst xmlns:c16r2="http://schemas.microsoft.com/office/drawing/2015/06/chart">
+            <c:ext xmlns:c16="http://schemas.microsoft.com/office/drawing/2014/chart" uri="{C3380CC4-5D6E-409C-BE32-E72D297353CC}">
+              <c16:uniqueId val="{0000000E-CBD6-47AD-B68C-CF16D1E4DC04}"/>
+            </c:ext>
+          </c:extLst>
         </c:ser>
         <c:ser>
           <c:idx val="8"/>
@@ -828,12 +900,16 @@
             <c:dLbl>
               <c:idx val="0"/>
               <c:delete val="1"/>
-              <c:extLst>
+              <c:extLst xmlns:c16r2="http://schemas.microsoft.com/office/drawing/2015/06/chart">
+                <c:ext xmlns:c16="http://schemas.microsoft.com/office/drawing/2014/chart" uri="{C3380CC4-5D6E-409C-BE32-E72D297353CC}">
+                  <c16:uniqueId val="{0000000F-CBD6-47AD-B68C-CF16D1E4DC04}"/>
+                </c:ext>
                 <c:ext xmlns:c15="http://schemas.microsoft.com/office/drawing/2012/chart" uri="{CE6537A1-D6FC-4f65-9D91-7224C49458BB}"/>
               </c:extLst>
             </c:dLbl>
             <c:dLbl>
               <c:idx val="1"/>
+              <c:layout/>
               <c:tx>
                 <c:rich>
                   <a:bodyPr/>
@@ -864,8 +940,13 @@
               <c:showSerName val="1"/>
               <c:showPercent val="0"/>
               <c:showBubbleSize val="0"/>
-              <c:extLst>
-                <c:ext xmlns:c15="http://schemas.microsoft.com/office/drawing/2012/chart" uri="{CE6537A1-D6FC-4f65-9D91-7224C49458BB}"/>
+              <c:extLst xmlns:c16r2="http://schemas.microsoft.com/office/drawing/2015/06/chart">
+                <c:ext xmlns:c16="http://schemas.microsoft.com/office/drawing/2014/chart" uri="{C3380CC4-5D6E-409C-BE32-E72D297353CC}">
+                  <c16:uniqueId val="{00000010-CBD6-47AD-B68C-CF16D1E4DC04}"/>
+                </c:ext>
+                <c:ext xmlns:c15="http://schemas.microsoft.com/office/drawing/2012/chart" uri="{CE6537A1-D6FC-4f65-9D91-7224C49458BB}">
+                  <c15:layout/>
+                </c:ext>
               </c:extLst>
             </c:dLbl>
             <c:spPr>
@@ -883,7 +964,7 @@
             <c:showPercent val="0"/>
             <c:showBubbleSize val="0"/>
             <c:showLeaderLines val="0"/>
-            <c:extLst>
+            <c:extLst xmlns:c16r2="http://schemas.microsoft.com/office/drawing/2015/06/chart">
               <c:ext xmlns:c15="http://schemas.microsoft.com/office/drawing/2012/chart" uri="{CE6537A1-D6FC-4f65-9D91-7224C49458BB}">
                 <c15:showLeaderLines val="0"/>
               </c:ext>
@@ -920,6 +1001,11 @@
             </c:numRef>
           </c:yVal>
           <c:smooth val="0"/>
+          <c:extLst xmlns:c16r2="http://schemas.microsoft.com/office/drawing/2015/06/chart">
+            <c:ext xmlns:c16="http://schemas.microsoft.com/office/drawing/2014/chart" uri="{C3380CC4-5D6E-409C-BE32-E72D297353CC}">
+              <c16:uniqueId val="{00000011-CBD6-47AD-B68C-CF16D1E4DC04}"/>
+            </c:ext>
+          </c:extLst>
         </c:ser>
         <c:ser>
           <c:idx val="9"/>
@@ -988,14 +1074,22 @@
               <c:showSerName val="1"/>
               <c:showPercent val="0"/>
               <c:showBubbleSize val="0"/>
-              <c:extLst>
-                <c:ext xmlns:c15="http://schemas.microsoft.com/office/drawing/2012/chart" uri="{CE6537A1-D6FC-4f65-9D91-7224C49458BB}"/>
+              <c:extLst xmlns:c16r2="http://schemas.microsoft.com/office/drawing/2015/06/chart">
+                <c:ext xmlns:c16="http://schemas.microsoft.com/office/drawing/2014/chart" uri="{C3380CC4-5D6E-409C-BE32-E72D297353CC}">
+                  <c16:uniqueId val="{00000012-CBD6-47AD-B68C-CF16D1E4DC04}"/>
+                </c:ext>
+                <c:ext xmlns:c15="http://schemas.microsoft.com/office/drawing/2012/chart" uri="{CE6537A1-D6FC-4f65-9D91-7224C49458BB}">
+                  <c15:layout/>
+                </c:ext>
               </c:extLst>
             </c:dLbl>
             <c:dLbl>
               <c:idx val="1"/>
               <c:delete val="1"/>
-              <c:extLst>
+              <c:extLst xmlns:c16r2="http://schemas.microsoft.com/office/drawing/2015/06/chart">
+                <c:ext xmlns:c16="http://schemas.microsoft.com/office/drawing/2014/chart" uri="{C3380CC4-5D6E-409C-BE32-E72D297353CC}">
+                  <c16:uniqueId val="{00000013-CBD6-47AD-B68C-CF16D1E4DC04}"/>
+                </c:ext>
                 <c:ext xmlns:c15="http://schemas.microsoft.com/office/drawing/2012/chart" uri="{CE6537A1-D6FC-4f65-9D91-7224C49458BB}"/>
               </c:extLst>
             </c:dLbl>
@@ -1014,7 +1108,7 @@
             <c:showPercent val="0"/>
             <c:showBubbleSize val="0"/>
             <c:showLeaderLines val="0"/>
-            <c:extLst>
+            <c:extLst xmlns:c16r2="http://schemas.microsoft.com/office/drawing/2015/06/chart">
               <c:ext xmlns:c15="http://schemas.microsoft.com/office/drawing/2012/chart" uri="{CE6537A1-D6FC-4f65-9D91-7224C49458BB}">
                 <c15:showLeaderLines val="0"/>
               </c:ext>
@@ -1051,6 +1145,11 @@
             </c:numRef>
           </c:yVal>
           <c:smooth val="0"/>
+          <c:extLst xmlns:c16r2="http://schemas.microsoft.com/office/drawing/2015/06/chart">
+            <c:ext xmlns:c16="http://schemas.microsoft.com/office/drawing/2014/chart" uri="{C3380CC4-5D6E-409C-BE32-E72D297353CC}">
+              <c16:uniqueId val="{00000014-CBD6-47AD-B68C-CF16D1E4DC04}"/>
+            </c:ext>
+          </c:extLst>
         </c:ser>
         <c:ser>
           <c:idx val="10"/>
@@ -1110,6 +1209,11 @@
             </c:numRef>
           </c:yVal>
           <c:smooth val="0"/>
+          <c:extLst xmlns:c16r2="http://schemas.microsoft.com/office/drawing/2015/06/chart">
+            <c:ext xmlns:c16="http://schemas.microsoft.com/office/drawing/2014/chart" uri="{C3380CC4-5D6E-409C-BE32-E72D297353CC}">
+              <c16:uniqueId val="{00000015-CBD6-47AD-B68C-CF16D1E4DC04}"/>
+            </c:ext>
+          </c:extLst>
         </c:ser>
         <c:ser>
           <c:idx val="2"/>
@@ -1138,7 +1242,10 @@
             <c:dLbl>
               <c:idx val="0"/>
               <c:delete val="1"/>
-              <c:extLst>
+              <c:extLst xmlns:c16r2="http://schemas.microsoft.com/office/drawing/2015/06/chart">
+                <c:ext xmlns:c16="http://schemas.microsoft.com/office/drawing/2014/chart" uri="{C3380CC4-5D6E-409C-BE32-E72D297353CC}">
+                  <c16:uniqueId val="{00000016-CBD6-47AD-B68C-CF16D1E4DC04}"/>
+                </c:ext>
                 <c:ext xmlns:c15="http://schemas.microsoft.com/office/drawing/2012/chart" uri="{CE6537A1-D6FC-4f65-9D91-7224C49458BB}"/>
               </c:extLst>
             </c:dLbl>
@@ -1180,8 +1287,13 @@
               <c:showSerName val="1"/>
               <c:showPercent val="0"/>
               <c:showBubbleSize val="0"/>
-              <c:extLst>
-                <c:ext xmlns:c15="http://schemas.microsoft.com/office/drawing/2012/chart" uri="{CE6537A1-D6FC-4f65-9D91-7224C49458BB}"/>
+              <c:extLst xmlns:c16r2="http://schemas.microsoft.com/office/drawing/2015/06/chart">
+                <c:ext xmlns:c16="http://schemas.microsoft.com/office/drawing/2014/chart" uri="{C3380CC4-5D6E-409C-BE32-E72D297353CC}">
+                  <c16:uniqueId val="{00000017-CBD6-47AD-B68C-CF16D1E4DC04}"/>
+                </c:ext>
+                <c:ext xmlns:c15="http://schemas.microsoft.com/office/drawing/2012/chart" uri="{CE6537A1-D6FC-4f65-9D91-7224C49458BB}">
+                  <c15:layout/>
+                </c:ext>
               </c:extLst>
             </c:dLbl>
             <c:spPr>
@@ -1199,7 +1311,7 @@
             <c:showPercent val="0"/>
             <c:showBubbleSize val="0"/>
             <c:showLeaderLines val="0"/>
-            <c:extLst>
+            <c:extLst xmlns:c16r2="http://schemas.microsoft.com/office/drawing/2015/06/chart">
               <c:ext xmlns:c15="http://schemas.microsoft.com/office/drawing/2012/chart" uri="{CE6537A1-D6FC-4f65-9D91-7224C49458BB}">
                 <c15:showLeaderLines val="0"/>
               </c:ext>
@@ -1236,6 +1348,11 @@
             </c:numRef>
           </c:yVal>
           <c:smooth val="0"/>
+          <c:extLst xmlns:c16r2="http://schemas.microsoft.com/office/drawing/2015/06/chart">
+            <c:ext xmlns:c16="http://schemas.microsoft.com/office/drawing/2014/chart" uri="{C3380CC4-5D6E-409C-BE32-E72D297353CC}">
+              <c16:uniqueId val="{00000018-CBD6-47AD-B68C-CF16D1E4DC04}"/>
+            </c:ext>
+          </c:extLst>
         </c:ser>
         <c:ser>
           <c:idx val="11"/>
@@ -1295,6 +1412,11 @@
             </c:numRef>
           </c:yVal>
           <c:smooth val="0"/>
+          <c:extLst xmlns:c16r2="http://schemas.microsoft.com/office/drawing/2015/06/chart">
+            <c:ext xmlns:c16="http://schemas.microsoft.com/office/drawing/2014/chart" uri="{C3380CC4-5D6E-409C-BE32-E72D297353CC}">
+              <c16:uniqueId val="{00000019-CBD6-47AD-B68C-CF16D1E4DC04}"/>
+            </c:ext>
+          </c:extLst>
         </c:ser>
         <c:ser>
           <c:idx val="4"/>
@@ -1323,7 +1445,10 @@
             <c:dLbl>
               <c:idx val="0"/>
               <c:delete val="1"/>
-              <c:extLst>
+              <c:extLst xmlns:c16r2="http://schemas.microsoft.com/office/drawing/2015/06/chart">
+                <c:ext xmlns:c16="http://schemas.microsoft.com/office/drawing/2014/chart" uri="{C3380CC4-5D6E-409C-BE32-E72D297353CC}">
+                  <c16:uniqueId val="{0000001A-CBD6-47AD-B68C-CF16D1E4DC04}"/>
+                </c:ext>
                 <c:ext xmlns:c15="http://schemas.microsoft.com/office/drawing/2012/chart" uri="{CE6537A1-D6FC-4f65-9D91-7224C49458BB}"/>
               </c:extLst>
             </c:dLbl>
@@ -1365,8 +1490,13 @@
               <c:showSerName val="1"/>
               <c:showPercent val="0"/>
               <c:showBubbleSize val="0"/>
-              <c:extLst>
-                <c:ext xmlns:c15="http://schemas.microsoft.com/office/drawing/2012/chart" uri="{CE6537A1-D6FC-4f65-9D91-7224C49458BB}"/>
+              <c:extLst xmlns:c16r2="http://schemas.microsoft.com/office/drawing/2015/06/chart">
+                <c:ext xmlns:c16="http://schemas.microsoft.com/office/drawing/2014/chart" uri="{C3380CC4-5D6E-409C-BE32-E72D297353CC}">
+                  <c16:uniqueId val="{0000001B-CBD6-47AD-B68C-CF16D1E4DC04}"/>
+                </c:ext>
+                <c:ext xmlns:c15="http://schemas.microsoft.com/office/drawing/2012/chart" uri="{CE6537A1-D6FC-4f65-9D91-7224C49458BB}">
+                  <c15:layout/>
+                </c:ext>
               </c:extLst>
             </c:dLbl>
             <c:spPr>
@@ -1384,7 +1514,7 @@
             <c:showPercent val="0"/>
             <c:showBubbleSize val="0"/>
             <c:showLeaderLines val="0"/>
-            <c:extLst>
+            <c:extLst xmlns:c16r2="http://schemas.microsoft.com/office/drawing/2015/06/chart">
               <c:ext xmlns:c15="http://schemas.microsoft.com/office/drawing/2012/chart" uri="{CE6537A1-D6FC-4f65-9D91-7224C49458BB}">
                 <c15:showLeaderLines val="0"/>
               </c:ext>
@@ -1421,6 +1551,11 @@
             </c:numRef>
           </c:yVal>
           <c:smooth val="0"/>
+          <c:extLst xmlns:c16r2="http://schemas.microsoft.com/office/drawing/2015/06/chart">
+            <c:ext xmlns:c16="http://schemas.microsoft.com/office/drawing/2014/chart" uri="{C3380CC4-5D6E-409C-BE32-E72D297353CC}">
+              <c16:uniqueId val="{0000001C-CBD6-47AD-B68C-CF16D1E4DC04}"/>
+            </c:ext>
+          </c:extLst>
         </c:ser>
         <c:ser>
           <c:idx val="6"/>
@@ -1449,7 +1584,10 @@
             <c:dLbl>
               <c:idx val="0"/>
               <c:delete val="1"/>
-              <c:extLst>
+              <c:extLst xmlns:c16r2="http://schemas.microsoft.com/office/drawing/2015/06/chart">
+                <c:ext xmlns:c16="http://schemas.microsoft.com/office/drawing/2014/chart" uri="{C3380CC4-5D6E-409C-BE32-E72D297353CC}">
+                  <c16:uniqueId val="{0000001D-CBD6-47AD-B68C-CF16D1E4DC04}"/>
+                </c:ext>
                 <c:ext xmlns:c15="http://schemas.microsoft.com/office/drawing/2012/chart" uri="{CE6537A1-D6FC-4f65-9D91-7224C49458BB}"/>
               </c:extLst>
             </c:dLbl>
@@ -1491,8 +1629,13 @@
               <c:showSerName val="1"/>
               <c:showPercent val="0"/>
               <c:showBubbleSize val="0"/>
-              <c:extLst>
-                <c:ext xmlns:c15="http://schemas.microsoft.com/office/drawing/2012/chart" uri="{CE6537A1-D6FC-4f65-9D91-7224C49458BB}"/>
+              <c:extLst xmlns:c16r2="http://schemas.microsoft.com/office/drawing/2015/06/chart">
+                <c:ext xmlns:c16="http://schemas.microsoft.com/office/drawing/2014/chart" uri="{C3380CC4-5D6E-409C-BE32-E72D297353CC}">
+                  <c16:uniqueId val="{0000001E-CBD6-47AD-B68C-CF16D1E4DC04}"/>
+                </c:ext>
+                <c:ext xmlns:c15="http://schemas.microsoft.com/office/drawing/2012/chart" uri="{CE6537A1-D6FC-4f65-9D91-7224C49458BB}">
+                  <c15:layout/>
+                </c:ext>
               </c:extLst>
             </c:dLbl>
             <c:spPr>
@@ -1510,7 +1653,7 @@
             <c:showPercent val="0"/>
             <c:showBubbleSize val="0"/>
             <c:showLeaderLines val="0"/>
-            <c:extLst>
+            <c:extLst xmlns:c16r2="http://schemas.microsoft.com/office/drawing/2015/06/chart">
               <c:ext xmlns:c15="http://schemas.microsoft.com/office/drawing/2012/chart" uri="{CE6537A1-D6FC-4f65-9D91-7224C49458BB}">
                 <c15:showLeaderLines val="0"/>
               </c:ext>
@@ -1547,6 +1690,11 @@
             </c:numRef>
           </c:yVal>
           <c:smooth val="0"/>
+          <c:extLst xmlns:c16r2="http://schemas.microsoft.com/office/drawing/2015/06/chart">
+            <c:ext xmlns:c16="http://schemas.microsoft.com/office/drawing/2014/chart" uri="{C3380CC4-5D6E-409C-BE32-E72D297353CC}">
+              <c16:uniqueId val="{0000001F-CBD6-47AD-B68C-CF16D1E4DC04}"/>
+            </c:ext>
+          </c:extLst>
         </c:ser>
         <c:dLbls>
           <c:dLblPos val="t"/>
@@ -1557,11 +1705,11 @@
           <c:showPercent val="0"/>
           <c:showBubbleSize val="0"/>
         </c:dLbls>
-        <c:axId val="811628192"/>
-        <c:axId val="811639072"/>
+        <c:axId val="-1746931280"/>
+        <c:axId val="-1746930736"/>
       </c:scatterChart>
       <c:valAx>
-        <c:axId val="811628192"/>
+        <c:axId val="-1746931280"/>
         <c:scaling>
           <c:orientation val="minMax"/>
         </c:scaling>
@@ -1584,12 +1732,12 @@
             <a:endParaRPr lang="en-US"/>
           </a:p>
         </c:txPr>
-        <c:crossAx val="811639072"/>
+        <c:crossAx val="-1746930736"/>
         <c:crosses val="autoZero"/>
         <c:crossBetween val="midCat"/>
       </c:valAx>
       <c:valAx>
-        <c:axId val="811639072"/>
+        <c:axId val="-1746930736"/>
         <c:scaling>
           <c:orientation val="minMax"/>
         </c:scaling>
@@ -1606,7 +1754,7 @@
         <c:majorTickMark val="out"/>
         <c:minorTickMark val="none"/>
         <c:tickLblPos val="nextTo"/>
-        <c:crossAx val="811628192"/>
+        <c:crossAx val="-1746931280"/>
         <c:crosses val="autoZero"/>
         <c:crossBetween val="midCat"/>
       </c:valAx>
@@ -1639,13 +1787,1813 @@
 </c:chartSpace>
 </file>
 
-<file path=ppt/comments/comment1.xml><?xml version="1.0" encoding="utf-8"?>
-<p:cmLst xmlns:a="http://schemas.openxmlformats.org/drawingml/2006/main" xmlns:r="http://schemas.openxmlformats.org/officeDocument/2006/relationships" xmlns:p="http://schemas.openxmlformats.org/presentationml/2006/main">
-  <p:cm authorId="0" dt="2016-03-05T11:19:12.546" idx="2">
-    <p:pos x="10" y="10"/>
-    <p:text>add color to use diagram. I have visio 2013 which disables legacy features. </p:text>
-  </p:cm>
-</p:cmLst>
+<file path=ppt/notesMasters/notesMaster1.xml><?xml version="1.0" encoding="utf-8"?>
+<p:notesMaster xmlns:a="http://schemas.openxmlformats.org/drawingml/2006/main" xmlns:r="http://schemas.openxmlformats.org/officeDocument/2006/relationships" xmlns:p="http://schemas.openxmlformats.org/presentationml/2006/main">
+  <p:cSld>
+    <p:bg>
+      <p:bgRef idx="1001">
+        <a:schemeClr val="bg1"/>
+      </p:bgRef>
+    </p:bg>
+    <p:spTree>
+      <p:nvGrpSpPr>
+        <p:cNvPr id="1" name=""/>
+        <p:cNvGrpSpPr/>
+        <p:nvPr/>
+      </p:nvGrpSpPr>
+      <p:grpSpPr>
+        <a:xfrm>
+          <a:off x="0" y="0"/>
+          <a:ext cx="0" cy="0"/>
+          <a:chOff x="0" y="0"/>
+          <a:chExt cx="0" cy="0"/>
+        </a:xfrm>
+      </p:grpSpPr>
+      <p:sp>
+        <p:nvSpPr>
+          <p:cNvPr id="2" name="Header Placeholder 1"/>
+          <p:cNvSpPr>
+            <a:spLocks noGrp="1"/>
+          </p:cNvSpPr>
+          <p:nvPr>
+            <p:ph type="hdr" sz="quarter"/>
+          </p:nvPr>
+        </p:nvSpPr>
+        <p:spPr>
+          <a:xfrm>
+            <a:off x="0" y="0"/>
+            <a:ext cx="2971800" cy="458788"/>
+          </a:xfrm>
+          <a:prstGeom prst="rect">
+            <a:avLst/>
+          </a:prstGeom>
+        </p:spPr>
+        <p:txBody>
+          <a:bodyPr vert="horz" lIns="91440" tIns="45720" rIns="91440" bIns="45720" rtlCol="0"/>
+          <a:lstStyle>
+            <a:lvl1pPr algn="l">
+              <a:defRPr sz="1200"/>
+            </a:lvl1pPr>
+          </a:lstStyle>
+          <a:p>
+            <a:endParaRPr lang="en-US"/>
+          </a:p>
+        </p:txBody>
+      </p:sp>
+      <p:sp>
+        <p:nvSpPr>
+          <p:cNvPr id="3" name="Date Placeholder 2"/>
+          <p:cNvSpPr>
+            <a:spLocks noGrp="1"/>
+          </p:cNvSpPr>
+          <p:nvPr>
+            <p:ph type="dt" idx="1"/>
+          </p:nvPr>
+        </p:nvSpPr>
+        <p:spPr>
+          <a:xfrm>
+            <a:off x="3884613" y="0"/>
+            <a:ext cx="2971800" cy="458788"/>
+          </a:xfrm>
+          <a:prstGeom prst="rect">
+            <a:avLst/>
+          </a:prstGeom>
+        </p:spPr>
+        <p:txBody>
+          <a:bodyPr vert="horz" lIns="91440" tIns="45720" rIns="91440" bIns="45720" rtlCol="0"/>
+          <a:lstStyle>
+            <a:lvl1pPr algn="r">
+              <a:defRPr sz="1200"/>
+            </a:lvl1pPr>
+          </a:lstStyle>
+          <a:p>
+            <a:fld id="{82AF1EC4-0AE9-4ABA-827F-84879B727577}" type="datetimeFigureOut">
+              <a:rPr lang="en-US" smtClean="0"/>
+              <a:t>3/12/2016</a:t>
+            </a:fld>
+            <a:endParaRPr lang="en-US"/>
+          </a:p>
+        </p:txBody>
+      </p:sp>
+      <p:sp>
+        <p:nvSpPr>
+          <p:cNvPr id="4" name="Slide Image Placeholder 3"/>
+          <p:cNvSpPr>
+            <a:spLocks noGrp="1" noRot="1" noChangeAspect="1"/>
+          </p:cNvSpPr>
+          <p:nvPr>
+            <p:ph type="sldImg" idx="2"/>
+          </p:nvPr>
+        </p:nvSpPr>
+        <p:spPr>
+          <a:xfrm>
+            <a:off x="960438" y="1143000"/>
+            <a:ext cx="4937125" cy="3086100"/>
+          </a:xfrm>
+          <a:prstGeom prst="rect">
+            <a:avLst/>
+          </a:prstGeom>
+          <a:noFill/>
+          <a:ln w="12700">
+            <a:solidFill>
+              <a:prstClr val="black"/>
+            </a:solidFill>
+          </a:ln>
+        </p:spPr>
+        <p:txBody>
+          <a:bodyPr vert="horz" lIns="91440" tIns="45720" rIns="91440" bIns="45720" rtlCol="0" anchor="ctr"/>
+          <a:lstStyle/>
+          <a:p>
+            <a:endParaRPr lang="en-US"/>
+          </a:p>
+        </p:txBody>
+      </p:sp>
+      <p:sp>
+        <p:nvSpPr>
+          <p:cNvPr id="5" name="Notes Placeholder 4"/>
+          <p:cNvSpPr>
+            <a:spLocks noGrp="1"/>
+          </p:cNvSpPr>
+          <p:nvPr>
+            <p:ph type="body" sz="quarter" idx="3"/>
+          </p:nvPr>
+        </p:nvSpPr>
+        <p:spPr>
+          <a:xfrm>
+            <a:off x="685800" y="4400550"/>
+            <a:ext cx="5486400" cy="3600450"/>
+          </a:xfrm>
+          <a:prstGeom prst="rect">
+            <a:avLst/>
+          </a:prstGeom>
+        </p:spPr>
+        <p:txBody>
+          <a:bodyPr vert="horz" lIns="91440" tIns="45720" rIns="91440" bIns="45720" rtlCol="0"/>
+          <a:lstStyle/>
+          <a:p>
+            <a:pPr lvl="0"/>
+            <a:r>
+              <a:rPr lang="en-US" smtClean="0"/>
+              <a:t>Edit Master text styles</a:t>
+            </a:r>
+          </a:p>
+          <a:p>
+            <a:pPr lvl="1"/>
+            <a:r>
+              <a:rPr lang="en-US" smtClean="0"/>
+              <a:t>Second level</a:t>
+            </a:r>
+          </a:p>
+          <a:p>
+            <a:pPr lvl="2"/>
+            <a:r>
+              <a:rPr lang="en-US" smtClean="0"/>
+              <a:t>Third level</a:t>
+            </a:r>
+          </a:p>
+          <a:p>
+            <a:pPr lvl="3"/>
+            <a:r>
+              <a:rPr lang="en-US" smtClean="0"/>
+              <a:t>Fourth level</a:t>
+            </a:r>
+          </a:p>
+          <a:p>
+            <a:pPr lvl="4"/>
+            <a:r>
+              <a:rPr lang="en-US" smtClean="0"/>
+              <a:t>Fifth level</a:t>
+            </a:r>
+            <a:endParaRPr lang="en-US"/>
+          </a:p>
+        </p:txBody>
+      </p:sp>
+      <p:sp>
+        <p:nvSpPr>
+          <p:cNvPr id="6" name="Footer Placeholder 5"/>
+          <p:cNvSpPr>
+            <a:spLocks noGrp="1"/>
+          </p:cNvSpPr>
+          <p:nvPr>
+            <p:ph type="ftr" sz="quarter" idx="4"/>
+          </p:nvPr>
+        </p:nvSpPr>
+        <p:spPr>
+          <a:xfrm>
+            <a:off x="0" y="8685213"/>
+            <a:ext cx="2971800" cy="458787"/>
+          </a:xfrm>
+          <a:prstGeom prst="rect">
+            <a:avLst/>
+          </a:prstGeom>
+        </p:spPr>
+        <p:txBody>
+          <a:bodyPr vert="horz" lIns="91440" tIns="45720" rIns="91440" bIns="45720" rtlCol="0" anchor="b"/>
+          <a:lstStyle>
+            <a:lvl1pPr algn="l">
+              <a:defRPr sz="1200"/>
+            </a:lvl1pPr>
+          </a:lstStyle>
+          <a:p>
+            <a:endParaRPr lang="en-US"/>
+          </a:p>
+        </p:txBody>
+      </p:sp>
+      <p:sp>
+        <p:nvSpPr>
+          <p:cNvPr id="7" name="Slide Number Placeholder 6"/>
+          <p:cNvSpPr>
+            <a:spLocks noGrp="1"/>
+          </p:cNvSpPr>
+          <p:nvPr>
+            <p:ph type="sldNum" sz="quarter" idx="5"/>
+          </p:nvPr>
+        </p:nvSpPr>
+        <p:spPr>
+          <a:xfrm>
+            <a:off x="3884613" y="8685213"/>
+            <a:ext cx="2971800" cy="458787"/>
+          </a:xfrm>
+          <a:prstGeom prst="rect">
+            <a:avLst/>
+          </a:prstGeom>
+        </p:spPr>
+        <p:txBody>
+          <a:bodyPr vert="horz" lIns="91440" tIns="45720" rIns="91440" bIns="45720" rtlCol="0" anchor="b"/>
+          <a:lstStyle>
+            <a:lvl1pPr algn="r">
+              <a:defRPr sz="1200"/>
+            </a:lvl1pPr>
+          </a:lstStyle>
+          <a:p>
+            <a:fld id="{64DBF1C4-A8A4-46A4-960B-68980B6D50C1}" type="slidenum">
+              <a:rPr lang="en-US" smtClean="0"/>
+              <a:t>‹#›</a:t>
+            </a:fld>
+            <a:endParaRPr lang="en-US"/>
+          </a:p>
+        </p:txBody>
+      </p:sp>
+    </p:spTree>
+    <p:extLst>
+      <p:ext uri="{BB962C8B-B14F-4D97-AF65-F5344CB8AC3E}">
+        <p14:creationId xmlns:p14="http://schemas.microsoft.com/office/powerpoint/2010/main" val="2976403687"/>
+      </p:ext>
+    </p:extLst>
+  </p:cSld>
+  <p:clrMap bg1="lt1" tx1="dk1" bg2="lt2" tx2="dk2" accent1="accent1" accent2="accent2" accent3="accent3" accent4="accent4" accent5="accent5" accent6="accent6" hlink="hlink" folHlink="folHlink"/>
+  <p:notesStyle>
+    <a:lvl1pPr marL="0" algn="l" defTabSz="914400" rtl="0" eaLnBrk="1" latinLnBrk="0" hangingPunct="1">
+      <a:defRPr sz="1200" kern="1200">
+        <a:solidFill>
+          <a:schemeClr val="tx1"/>
+        </a:solidFill>
+        <a:latin typeface="+mn-lt"/>
+        <a:ea typeface="+mn-ea"/>
+        <a:cs typeface="+mn-cs"/>
+      </a:defRPr>
+    </a:lvl1pPr>
+    <a:lvl2pPr marL="457200" algn="l" defTabSz="914400" rtl="0" eaLnBrk="1" latinLnBrk="0" hangingPunct="1">
+      <a:defRPr sz="1200" kern="1200">
+        <a:solidFill>
+          <a:schemeClr val="tx1"/>
+        </a:solidFill>
+        <a:latin typeface="+mn-lt"/>
+        <a:ea typeface="+mn-ea"/>
+        <a:cs typeface="+mn-cs"/>
+      </a:defRPr>
+    </a:lvl2pPr>
+    <a:lvl3pPr marL="914400" algn="l" defTabSz="914400" rtl="0" eaLnBrk="1" latinLnBrk="0" hangingPunct="1">
+      <a:defRPr sz="1200" kern="1200">
+        <a:solidFill>
+          <a:schemeClr val="tx1"/>
+        </a:solidFill>
+        <a:latin typeface="+mn-lt"/>
+        <a:ea typeface="+mn-ea"/>
+        <a:cs typeface="+mn-cs"/>
+      </a:defRPr>
+    </a:lvl3pPr>
+    <a:lvl4pPr marL="1371600" algn="l" defTabSz="914400" rtl="0" eaLnBrk="1" latinLnBrk="0" hangingPunct="1">
+      <a:defRPr sz="1200" kern="1200">
+        <a:solidFill>
+          <a:schemeClr val="tx1"/>
+        </a:solidFill>
+        <a:latin typeface="+mn-lt"/>
+        <a:ea typeface="+mn-ea"/>
+        <a:cs typeface="+mn-cs"/>
+      </a:defRPr>
+    </a:lvl4pPr>
+    <a:lvl5pPr marL="1828800" algn="l" defTabSz="914400" rtl="0" eaLnBrk="1" latinLnBrk="0" hangingPunct="1">
+      <a:defRPr sz="1200" kern="1200">
+        <a:solidFill>
+          <a:schemeClr val="tx1"/>
+        </a:solidFill>
+        <a:latin typeface="+mn-lt"/>
+        <a:ea typeface="+mn-ea"/>
+        <a:cs typeface="+mn-cs"/>
+      </a:defRPr>
+    </a:lvl5pPr>
+    <a:lvl6pPr marL="2286000" algn="l" defTabSz="914400" rtl="0" eaLnBrk="1" latinLnBrk="0" hangingPunct="1">
+      <a:defRPr sz="1200" kern="1200">
+        <a:solidFill>
+          <a:schemeClr val="tx1"/>
+        </a:solidFill>
+        <a:latin typeface="+mn-lt"/>
+        <a:ea typeface="+mn-ea"/>
+        <a:cs typeface="+mn-cs"/>
+      </a:defRPr>
+    </a:lvl6pPr>
+    <a:lvl7pPr marL="2743200" algn="l" defTabSz="914400" rtl="0" eaLnBrk="1" latinLnBrk="0" hangingPunct="1">
+      <a:defRPr sz="1200" kern="1200">
+        <a:solidFill>
+          <a:schemeClr val="tx1"/>
+        </a:solidFill>
+        <a:latin typeface="+mn-lt"/>
+        <a:ea typeface="+mn-ea"/>
+        <a:cs typeface="+mn-cs"/>
+      </a:defRPr>
+    </a:lvl7pPr>
+    <a:lvl8pPr marL="3200400" algn="l" defTabSz="914400" rtl="0" eaLnBrk="1" latinLnBrk="0" hangingPunct="1">
+      <a:defRPr sz="1200" kern="1200">
+        <a:solidFill>
+          <a:schemeClr val="tx1"/>
+        </a:solidFill>
+        <a:latin typeface="+mn-lt"/>
+        <a:ea typeface="+mn-ea"/>
+        <a:cs typeface="+mn-cs"/>
+      </a:defRPr>
+    </a:lvl8pPr>
+    <a:lvl9pPr marL="3657600" algn="l" defTabSz="914400" rtl="0" eaLnBrk="1" latinLnBrk="0" hangingPunct="1">
+      <a:defRPr sz="1200" kern="1200">
+        <a:solidFill>
+          <a:schemeClr val="tx1"/>
+        </a:solidFill>
+        <a:latin typeface="+mn-lt"/>
+        <a:ea typeface="+mn-ea"/>
+        <a:cs typeface="+mn-cs"/>
+      </a:defRPr>
+    </a:lvl9pPr>
+  </p:notesStyle>
+</p:notesMaster>
+</file>
+
+<file path=ppt/notesSlides/notesSlide1.xml><?xml version="1.0" encoding="utf-8"?>
+<p:notes xmlns:a="http://schemas.openxmlformats.org/drawingml/2006/main" xmlns:r="http://schemas.openxmlformats.org/officeDocument/2006/relationships" xmlns:p="http://schemas.openxmlformats.org/presentationml/2006/main">
+  <p:cSld>
+    <p:spTree>
+      <p:nvGrpSpPr>
+        <p:cNvPr id="1" name=""/>
+        <p:cNvGrpSpPr/>
+        <p:nvPr/>
+      </p:nvGrpSpPr>
+      <p:grpSpPr>
+        <a:xfrm>
+          <a:off x="0" y="0"/>
+          <a:ext cx="0" cy="0"/>
+          <a:chOff x="0" y="0"/>
+          <a:chExt cx="0" cy="0"/>
+        </a:xfrm>
+      </p:grpSpPr>
+      <p:sp>
+        <p:nvSpPr>
+          <p:cNvPr id="2" name="Slide Image Placeholder 1"/>
+          <p:cNvSpPr>
+            <a:spLocks noGrp="1" noRot="1" noChangeAspect="1"/>
+          </p:cNvSpPr>
+          <p:nvPr>
+            <p:ph type="sldImg"/>
+          </p:nvPr>
+        </p:nvSpPr>
+        <p:spPr/>
+      </p:sp>
+      <p:sp>
+        <p:nvSpPr>
+          <p:cNvPr id="3" name="Notes Placeholder 2"/>
+          <p:cNvSpPr>
+            <a:spLocks noGrp="1"/>
+          </p:cNvSpPr>
+          <p:nvPr>
+            <p:ph type="body" idx="1"/>
+          </p:nvPr>
+        </p:nvSpPr>
+        <p:spPr/>
+        <p:txBody>
+          <a:bodyPr/>
+          <a:lstStyle/>
+          <a:p>
+            <a:r>
+              <a:rPr lang="en-US" dirty="0" smtClean="0"/>
+              <a:t>This presentation discusses the architecture</a:t>
+            </a:r>
+            <a:r>
+              <a:rPr lang="en-US" baseline="0" dirty="0" smtClean="0"/>
+              <a:t> and design of RADV, the risk adjustment data validation tool created by Team </a:t>
+            </a:r>
+            <a:r>
+              <a:rPr lang="en-US" baseline="0" dirty="0" err="1" smtClean="0"/>
+              <a:t>FHIRed</a:t>
+            </a:r>
+            <a:r>
+              <a:rPr lang="en-US" baseline="0" dirty="0" smtClean="0"/>
+              <a:t> Up.</a:t>
+            </a:r>
+            <a:endParaRPr lang="en-US" dirty="0"/>
+          </a:p>
+        </p:txBody>
+      </p:sp>
+      <p:sp>
+        <p:nvSpPr>
+          <p:cNvPr id="4" name="Slide Number Placeholder 3"/>
+          <p:cNvSpPr>
+            <a:spLocks noGrp="1"/>
+          </p:cNvSpPr>
+          <p:nvPr>
+            <p:ph type="sldNum" sz="quarter" idx="10"/>
+          </p:nvPr>
+        </p:nvSpPr>
+        <p:spPr/>
+        <p:txBody>
+          <a:bodyPr/>
+          <a:lstStyle/>
+          <a:p>
+            <a:fld id="{64DBF1C4-A8A4-46A4-960B-68980B6D50C1}" type="slidenum">
+              <a:rPr lang="en-US" smtClean="0"/>
+              <a:t>1</a:t>
+            </a:fld>
+            <a:endParaRPr lang="en-US"/>
+          </a:p>
+        </p:txBody>
+      </p:sp>
+    </p:spTree>
+    <p:extLst>
+      <p:ext uri="{BB962C8B-B14F-4D97-AF65-F5344CB8AC3E}">
+        <p14:creationId xmlns:p14="http://schemas.microsoft.com/office/powerpoint/2010/main" val="4127373235"/>
+      </p:ext>
+    </p:extLst>
+  </p:cSld>
+  <p:clrMapOvr>
+    <a:masterClrMapping/>
+  </p:clrMapOvr>
+</p:notes>
+</file>
+
+<file path=ppt/notesSlides/notesSlide10.xml><?xml version="1.0" encoding="utf-8"?>
+<p:notes xmlns:a="http://schemas.openxmlformats.org/drawingml/2006/main" xmlns:r="http://schemas.openxmlformats.org/officeDocument/2006/relationships" xmlns:p="http://schemas.openxmlformats.org/presentationml/2006/main">
+  <p:cSld>
+    <p:spTree>
+      <p:nvGrpSpPr>
+        <p:cNvPr id="1" name=""/>
+        <p:cNvGrpSpPr/>
+        <p:nvPr/>
+      </p:nvGrpSpPr>
+      <p:grpSpPr>
+        <a:xfrm>
+          <a:off x="0" y="0"/>
+          <a:ext cx="0" cy="0"/>
+          <a:chOff x="0" y="0"/>
+          <a:chExt cx="0" cy="0"/>
+        </a:xfrm>
+      </p:grpSpPr>
+      <p:sp>
+        <p:nvSpPr>
+          <p:cNvPr id="2" name="Slide Image Placeholder 1"/>
+          <p:cNvSpPr>
+            <a:spLocks noGrp="1" noRot="1" noChangeAspect="1"/>
+          </p:cNvSpPr>
+          <p:nvPr>
+            <p:ph type="sldImg"/>
+          </p:nvPr>
+        </p:nvSpPr>
+        <p:spPr/>
+      </p:sp>
+      <p:sp>
+        <p:nvSpPr>
+          <p:cNvPr id="3" name="Notes Placeholder 2"/>
+          <p:cNvSpPr>
+            <a:spLocks noGrp="1"/>
+          </p:cNvSpPr>
+          <p:nvPr>
+            <p:ph type="body" idx="1"/>
+          </p:nvPr>
+        </p:nvSpPr>
+        <p:spPr/>
+        <p:txBody>
+          <a:bodyPr/>
+          <a:lstStyle/>
+          <a:p>
+            <a:r>
+              <a:rPr lang="en-US" dirty="0" smtClean="0"/>
+              <a:t>The Candidate</a:t>
+            </a:r>
+            <a:r>
+              <a:rPr lang="en-US" baseline="0" dirty="0" smtClean="0"/>
+              <a:t> HCC risk score indicator </a:t>
+            </a:r>
+            <a:r>
+              <a:rPr lang="en-US" dirty="0" smtClean="0"/>
+              <a:t>allows</a:t>
+            </a:r>
+            <a:r>
+              <a:rPr lang="en-US" baseline="0" dirty="0" smtClean="0"/>
+              <a:t> the user to quickly determine whether a patient’s candidate HCCs, if added, would have a significant, moderate or minor impact on the risk adjustment score.</a:t>
+            </a:r>
+          </a:p>
+          <a:p>
+            <a:endParaRPr lang="en-US" baseline="0" dirty="0" smtClean="0"/>
+          </a:p>
+          <a:p>
+            <a:r>
+              <a:rPr lang="en-US" baseline="0" dirty="0" smtClean="0"/>
+              <a:t>The </a:t>
+            </a:r>
+            <a:r>
+              <a:rPr lang="en-US" baseline="0" dirty="0" err="1" smtClean="0"/>
+              <a:t>pareto</a:t>
+            </a:r>
+            <a:r>
+              <a:rPr lang="en-US" baseline="0" dirty="0" smtClean="0"/>
+              <a:t> chart will show the relative impact of each current HCC along with any selected candidate HCCs.</a:t>
+            </a:r>
+          </a:p>
+          <a:p>
+            <a:endParaRPr lang="en-US" baseline="0" dirty="0" smtClean="0"/>
+          </a:p>
+          <a:p>
+            <a:r>
+              <a:rPr lang="en-US" baseline="0" dirty="0" smtClean="0"/>
+              <a:t>The pie chart provides another perspective of the relative impact of each current HCC along with any selected candidate HCCs.</a:t>
+            </a:r>
+            <a:endParaRPr lang="en-US" dirty="0"/>
+          </a:p>
+        </p:txBody>
+      </p:sp>
+      <p:sp>
+        <p:nvSpPr>
+          <p:cNvPr id="4" name="Slide Number Placeholder 3"/>
+          <p:cNvSpPr>
+            <a:spLocks noGrp="1"/>
+          </p:cNvSpPr>
+          <p:nvPr>
+            <p:ph type="sldNum" sz="quarter" idx="10"/>
+          </p:nvPr>
+        </p:nvSpPr>
+        <p:spPr/>
+        <p:txBody>
+          <a:bodyPr/>
+          <a:lstStyle/>
+          <a:p>
+            <a:fld id="{64DBF1C4-A8A4-46A4-960B-68980B6D50C1}" type="slidenum">
+              <a:rPr lang="en-US" smtClean="0"/>
+              <a:t>10</a:t>
+            </a:fld>
+            <a:endParaRPr lang="en-US"/>
+          </a:p>
+        </p:txBody>
+      </p:sp>
+    </p:spTree>
+    <p:extLst>
+      <p:ext uri="{BB962C8B-B14F-4D97-AF65-F5344CB8AC3E}">
+        <p14:creationId xmlns:p14="http://schemas.microsoft.com/office/powerpoint/2010/main" val="3269226043"/>
+      </p:ext>
+    </p:extLst>
+  </p:cSld>
+  <p:clrMapOvr>
+    <a:masterClrMapping/>
+  </p:clrMapOvr>
+</p:notes>
+</file>
+
+<file path=ppt/notesSlides/notesSlide11.xml><?xml version="1.0" encoding="utf-8"?>
+<p:notes xmlns:a="http://schemas.openxmlformats.org/drawingml/2006/main" xmlns:r="http://schemas.openxmlformats.org/officeDocument/2006/relationships" xmlns:p="http://schemas.openxmlformats.org/presentationml/2006/main">
+  <p:cSld>
+    <p:spTree>
+      <p:nvGrpSpPr>
+        <p:cNvPr id="1" name=""/>
+        <p:cNvGrpSpPr/>
+        <p:nvPr/>
+      </p:nvGrpSpPr>
+      <p:grpSpPr>
+        <a:xfrm>
+          <a:off x="0" y="0"/>
+          <a:ext cx="0" cy="0"/>
+          <a:chOff x="0" y="0"/>
+          <a:chExt cx="0" cy="0"/>
+        </a:xfrm>
+      </p:grpSpPr>
+      <p:sp>
+        <p:nvSpPr>
+          <p:cNvPr id="2" name="Slide Image Placeholder 1"/>
+          <p:cNvSpPr>
+            <a:spLocks noGrp="1" noRot="1" noChangeAspect="1"/>
+          </p:cNvSpPr>
+          <p:nvPr>
+            <p:ph type="sldImg"/>
+          </p:nvPr>
+        </p:nvSpPr>
+        <p:spPr/>
+      </p:sp>
+      <p:sp>
+        <p:nvSpPr>
+          <p:cNvPr id="3" name="Notes Placeholder 2"/>
+          <p:cNvSpPr>
+            <a:spLocks noGrp="1"/>
+          </p:cNvSpPr>
+          <p:nvPr>
+            <p:ph type="body" idx="1"/>
+          </p:nvPr>
+        </p:nvSpPr>
+        <p:spPr/>
+        <p:txBody>
+          <a:bodyPr/>
+          <a:lstStyle/>
+          <a:p>
+            <a:r>
+              <a:rPr lang="en-US" dirty="0" smtClean="0"/>
+              <a:t>Items</a:t>
+            </a:r>
+            <a:r>
+              <a:rPr lang="en-US" baseline="0" dirty="0" smtClean="0"/>
+              <a:t> to discuss:</a:t>
+            </a:r>
+          </a:p>
+          <a:p>
+            <a:r>
+              <a:rPr lang="en-US" baseline="0" dirty="0" smtClean="0"/>
+              <a:t>Scope is set until we ensure we make the most of its current reach</a:t>
+            </a:r>
+          </a:p>
+          <a:p>
+            <a:r>
+              <a:rPr lang="en-US" baseline="0" dirty="0" smtClean="0"/>
+              <a:t>First  2-week sprint is complete thanks to Augusto, Spiro, and Anja. The second sprint focuses on in progress items and improvements. All team members are assisting in developing data visualizations for the next 2 week sprint</a:t>
+            </a:r>
+          </a:p>
+          <a:p>
+            <a:r>
+              <a:rPr lang="en-US" baseline="0" dirty="0" smtClean="0"/>
+              <a:t>Analysis for additional features within the scope is being done on a continual basis but only approved for each </a:t>
+            </a:r>
+            <a:r>
+              <a:rPr lang="en-US" baseline="0" dirty="0" smtClean="0"/>
+              <a:t>sprint </a:t>
+            </a:r>
+            <a:r>
+              <a:rPr lang="en-US" baseline="0" dirty="0" smtClean="0"/>
+              <a:t>in the middle of the preceding sprint. – mostly by Jamie and Tala </a:t>
+            </a:r>
+          </a:p>
+          <a:p>
+            <a:r>
+              <a:rPr lang="en-US" baseline="0" dirty="0" smtClean="0"/>
+              <a:t>Code testing is occurring on a continual basis by Dan and other team members.</a:t>
+            </a:r>
+          </a:p>
+          <a:p>
+            <a:r>
+              <a:rPr lang="en-US" baseline="0" dirty="0" smtClean="0"/>
+              <a:t>Documentation will start once product is close to complete at end of the 3</a:t>
+            </a:r>
+            <a:r>
+              <a:rPr lang="en-US" baseline="30000" dirty="0" smtClean="0"/>
+              <a:t>rd</a:t>
+            </a:r>
+            <a:r>
+              <a:rPr lang="en-US" baseline="0" dirty="0" smtClean="0"/>
+              <a:t> </a:t>
+            </a:r>
+            <a:r>
+              <a:rPr lang="en-US" baseline="0" dirty="0" smtClean="0"/>
+              <a:t>sprint </a:t>
+            </a:r>
+            <a:r>
+              <a:rPr lang="en-US" baseline="0" dirty="0" smtClean="0"/>
+              <a:t>and will </a:t>
+            </a:r>
+            <a:r>
+              <a:rPr lang="en-US" baseline="0" dirty="0" smtClean="0"/>
+              <a:t>be completed a </a:t>
+            </a:r>
+            <a:r>
+              <a:rPr lang="en-US" baseline="0" dirty="0" smtClean="0"/>
+              <a:t>week after the 4</a:t>
+            </a:r>
+            <a:r>
+              <a:rPr lang="en-US" baseline="30000" dirty="0" smtClean="0"/>
+              <a:t>th</a:t>
+            </a:r>
+            <a:r>
+              <a:rPr lang="en-US" baseline="0" dirty="0" smtClean="0"/>
+              <a:t> </a:t>
+            </a:r>
+            <a:r>
+              <a:rPr lang="en-US" baseline="0" dirty="0" smtClean="0"/>
+              <a:t>sprint.</a:t>
+            </a:r>
+            <a:endParaRPr lang="en-US" baseline="0" dirty="0" smtClean="0"/>
+          </a:p>
+          <a:p>
+            <a:endParaRPr lang="en-US" dirty="0"/>
+          </a:p>
+        </p:txBody>
+      </p:sp>
+      <p:sp>
+        <p:nvSpPr>
+          <p:cNvPr id="4" name="Slide Number Placeholder 3"/>
+          <p:cNvSpPr>
+            <a:spLocks noGrp="1"/>
+          </p:cNvSpPr>
+          <p:nvPr>
+            <p:ph type="sldNum" sz="quarter" idx="10"/>
+          </p:nvPr>
+        </p:nvSpPr>
+        <p:spPr/>
+        <p:txBody>
+          <a:bodyPr/>
+          <a:lstStyle/>
+          <a:p>
+            <a:fld id="{64DBF1C4-A8A4-46A4-960B-68980B6D50C1}" type="slidenum">
+              <a:rPr lang="en-US" smtClean="0"/>
+              <a:t>11</a:t>
+            </a:fld>
+            <a:endParaRPr lang="en-US"/>
+          </a:p>
+        </p:txBody>
+      </p:sp>
+    </p:spTree>
+    <p:extLst>
+      <p:ext uri="{BB962C8B-B14F-4D97-AF65-F5344CB8AC3E}">
+        <p14:creationId xmlns:p14="http://schemas.microsoft.com/office/powerpoint/2010/main" val="785281650"/>
+      </p:ext>
+    </p:extLst>
+  </p:cSld>
+  <p:clrMapOvr>
+    <a:masterClrMapping/>
+  </p:clrMapOvr>
+</p:notes>
+</file>
+
+<file path=ppt/notesSlides/notesSlide12.xml><?xml version="1.0" encoding="utf-8"?>
+<p:notes xmlns:a="http://schemas.openxmlformats.org/drawingml/2006/main" xmlns:r="http://schemas.openxmlformats.org/officeDocument/2006/relationships" xmlns:p="http://schemas.openxmlformats.org/presentationml/2006/main">
+  <p:cSld>
+    <p:spTree>
+      <p:nvGrpSpPr>
+        <p:cNvPr id="1" name=""/>
+        <p:cNvGrpSpPr/>
+        <p:nvPr/>
+      </p:nvGrpSpPr>
+      <p:grpSpPr>
+        <a:xfrm>
+          <a:off x="0" y="0"/>
+          <a:ext cx="0" cy="0"/>
+          <a:chOff x="0" y="0"/>
+          <a:chExt cx="0" cy="0"/>
+        </a:xfrm>
+      </p:grpSpPr>
+      <p:sp>
+        <p:nvSpPr>
+          <p:cNvPr id="2" name="Slide Image Placeholder 1"/>
+          <p:cNvSpPr>
+            <a:spLocks noGrp="1" noRot="1" noChangeAspect="1"/>
+          </p:cNvSpPr>
+          <p:nvPr>
+            <p:ph type="sldImg"/>
+          </p:nvPr>
+        </p:nvSpPr>
+        <p:spPr/>
+      </p:sp>
+      <p:sp>
+        <p:nvSpPr>
+          <p:cNvPr id="3" name="Notes Placeholder 2"/>
+          <p:cNvSpPr>
+            <a:spLocks noGrp="1"/>
+          </p:cNvSpPr>
+          <p:nvPr>
+            <p:ph type="body" idx="1"/>
+          </p:nvPr>
+        </p:nvSpPr>
+        <p:spPr/>
+        <p:txBody>
+          <a:bodyPr/>
+          <a:lstStyle/>
+          <a:p>
+            <a:endParaRPr lang="en-US" dirty="0"/>
+          </a:p>
+        </p:txBody>
+      </p:sp>
+      <p:sp>
+        <p:nvSpPr>
+          <p:cNvPr id="4" name="Slide Number Placeholder 3"/>
+          <p:cNvSpPr>
+            <a:spLocks noGrp="1"/>
+          </p:cNvSpPr>
+          <p:nvPr>
+            <p:ph type="sldNum" sz="quarter" idx="10"/>
+          </p:nvPr>
+        </p:nvSpPr>
+        <p:spPr/>
+        <p:txBody>
+          <a:bodyPr/>
+          <a:lstStyle/>
+          <a:p>
+            <a:fld id="{64DBF1C4-A8A4-46A4-960B-68980B6D50C1}" type="slidenum">
+              <a:rPr lang="en-US" smtClean="0"/>
+              <a:t>12</a:t>
+            </a:fld>
+            <a:endParaRPr lang="en-US"/>
+          </a:p>
+        </p:txBody>
+      </p:sp>
+    </p:spTree>
+    <p:extLst>
+      <p:ext uri="{BB962C8B-B14F-4D97-AF65-F5344CB8AC3E}">
+        <p14:creationId xmlns:p14="http://schemas.microsoft.com/office/powerpoint/2010/main" val="3225854499"/>
+      </p:ext>
+    </p:extLst>
+  </p:cSld>
+  <p:clrMapOvr>
+    <a:masterClrMapping/>
+  </p:clrMapOvr>
+</p:notes>
+</file>
+
+<file path=ppt/notesSlides/notesSlide13.xml><?xml version="1.0" encoding="utf-8"?>
+<p:notes xmlns:a="http://schemas.openxmlformats.org/drawingml/2006/main" xmlns:r="http://schemas.openxmlformats.org/officeDocument/2006/relationships" xmlns:p="http://schemas.openxmlformats.org/presentationml/2006/main">
+  <p:cSld>
+    <p:spTree>
+      <p:nvGrpSpPr>
+        <p:cNvPr id="1" name=""/>
+        <p:cNvGrpSpPr/>
+        <p:nvPr/>
+      </p:nvGrpSpPr>
+      <p:grpSpPr>
+        <a:xfrm>
+          <a:off x="0" y="0"/>
+          <a:ext cx="0" cy="0"/>
+          <a:chOff x="0" y="0"/>
+          <a:chExt cx="0" cy="0"/>
+        </a:xfrm>
+      </p:grpSpPr>
+      <p:sp>
+        <p:nvSpPr>
+          <p:cNvPr id="2" name="Slide Image Placeholder 1"/>
+          <p:cNvSpPr>
+            <a:spLocks noGrp="1" noRot="1" noChangeAspect="1"/>
+          </p:cNvSpPr>
+          <p:nvPr>
+            <p:ph type="sldImg"/>
+          </p:nvPr>
+        </p:nvSpPr>
+        <p:spPr/>
+      </p:sp>
+      <p:sp>
+        <p:nvSpPr>
+          <p:cNvPr id="3" name="Notes Placeholder 2"/>
+          <p:cNvSpPr>
+            <a:spLocks noGrp="1"/>
+          </p:cNvSpPr>
+          <p:nvPr>
+            <p:ph type="body" idx="1"/>
+          </p:nvPr>
+        </p:nvSpPr>
+        <p:spPr/>
+        <p:txBody>
+          <a:bodyPr/>
+          <a:lstStyle/>
+          <a:p>
+            <a:endParaRPr lang="en-US" dirty="0"/>
+          </a:p>
+        </p:txBody>
+      </p:sp>
+      <p:sp>
+        <p:nvSpPr>
+          <p:cNvPr id="4" name="Slide Number Placeholder 3"/>
+          <p:cNvSpPr>
+            <a:spLocks noGrp="1"/>
+          </p:cNvSpPr>
+          <p:nvPr>
+            <p:ph type="sldNum" sz="quarter" idx="10"/>
+          </p:nvPr>
+        </p:nvSpPr>
+        <p:spPr/>
+        <p:txBody>
+          <a:bodyPr/>
+          <a:lstStyle/>
+          <a:p>
+            <a:fld id="{64DBF1C4-A8A4-46A4-960B-68980B6D50C1}" type="slidenum">
+              <a:rPr lang="en-US" smtClean="0"/>
+              <a:t>13</a:t>
+            </a:fld>
+            <a:endParaRPr lang="en-US"/>
+          </a:p>
+        </p:txBody>
+      </p:sp>
+    </p:spTree>
+    <p:extLst>
+      <p:ext uri="{BB962C8B-B14F-4D97-AF65-F5344CB8AC3E}">
+        <p14:creationId xmlns:p14="http://schemas.microsoft.com/office/powerpoint/2010/main" val="3969157877"/>
+      </p:ext>
+    </p:extLst>
+  </p:cSld>
+  <p:clrMapOvr>
+    <a:masterClrMapping/>
+  </p:clrMapOvr>
+</p:notes>
+</file>
+
+<file path=ppt/notesSlides/notesSlide2.xml><?xml version="1.0" encoding="utf-8"?>
+<p:notes xmlns:a="http://schemas.openxmlformats.org/drawingml/2006/main" xmlns:r="http://schemas.openxmlformats.org/officeDocument/2006/relationships" xmlns:p="http://schemas.openxmlformats.org/presentationml/2006/main">
+  <p:cSld>
+    <p:spTree>
+      <p:nvGrpSpPr>
+        <p:cNvPr id="1" name=""/>
+        <p:cNvGrpSpPr/>
+        <p:nvPr/>
+      </p:nvGrpSpPr>
+      <p:grpSpPr>
+        <a:xfrm>
+          <a:off x="0" y="0"/>
+          <a:ext cx="0" cy="0"/>
+          <a:chOff x="0" y="0"/>
+          <a:chExt cx="0" cy="0"/>
+        </a:xfrm>
+      </p:grpSpPr>
+      <p:sp>
+        <p:nvSpPr>
+          <p:cNvPr id="2" name="Slide Image Placeholder 1"/>
+          <p:cNvSpPr>
+            <a:spLocks noGrp="1" noRot="1" noChangeAspect="1"/>
+          </p:cNvSpPr>
+          <p:nvPr>
+            <p:ph type="sldImg"/>
+          </p:nvPr>
+        </p:nvSpPr>
+        <p:spPr/>
+      </p:sp>
+      <p:sp>
+        <p:nvSpPr>
+          <p:cNvPr id="3" name="Notes Placeholder 2"/>
+          <p:cNvSpPr>
+            <a:spLocks noGrp="1"/>
+          </p:cNvSpPr>
+          <p:nvPr>
+            <p:ph type="body" idx="1"/>
+          </p:nvPr>
+        </p:nvSpPr>
+        <p:spPr/>
+        <p:txBody>
+          <a:bodyPr/>
+          <a:lstStyle/>
+          <a:p>
+            <a:r>
+              <a:rPr lang="en-US" dirty="0" smtClean="0"/>
+              <a:t>RADV is designed to help Doctor’s, Hospitals and Insurance Companies maximize</a:t>
+            </a:r>
+            <a:r>
+              <a:rPr lang="en-US" baseline="0" dirty="0" smtClean="0"/>
+              <a:t> their risk adjusted reimbursements.  Risk adjustment uses a patients medical history to determine their level of health.  Providers who are caring for “sicker than average populations” receive greater payments.  This use case diagram identifies users of the RADV system.  Doctors and patients use the system to review a patients medical history.  The doctor will then verify any existing diagnoses.  The system then provides medical coders with data required to identify missing diagnoses and update the insurance claims data.  Hospitals and insurance companies then use this corrected data to maximize their reimbursements.</a:t>
+            </a:r>
+            <a:endParaRPr lang="en-US" dirty="0"/>
+          </a:p>
+        </p:txBody>
+      </p:sp>
+      <p:sp>
+        <p:nvSpPr>
+          <p:cNvPr id="4" name="Slide Number Placeholder 3"/>
+          <p:cNvSpPr>
+            <a:spLocks noGrp="1"/>
+          </p:cNvSpPr>
+          <p:nvPr>
+            <p:ph type="sldNum" sz="quarter" idx="10"/>
+          </p:nvPr>
+        </p:nvSpPr>
+        <p:spPr/>
+        <p:txBody>
+          <a:bodyPr/>
+          <a:lstStyle/>
+          <a:p>
+            <a:fld id="{64DBF1C4-A8A4-46A4-960B-68980B6D50C1}" type="slidenum">
+              <a:rPr lang="en-US" smtClean="0"/>
+              <a:t>2</a:t>
+            </a:fld>
+            <a:endParaRPr lang="en-US"/>
+          </a:p>
+        </p:txBody>
+      </p:sp>
+    </p:spTree>
+    <p:extLst>
+      <p:ext uri="{BB962C8B-B14F-4D97-AF65-F5344CB8AC3E}">
+        <p14:creationId xmlns:p14="http://schemas.microsoft.com/office/powerpoint/2010/main" val="2941487035"/>
+      </p:ext>
+    </p:extLst>
+  </p:cSld>
+  <p:clrMapOvr>
+    <a:masterClrMapping/>
+  </p:clrMapOvr>
+</p:notes>
+</file>
+
+<file path=ppt/notesSlides/notesSlide3.xml><?xml version="1.0" encoding="utf-8"?>
+<p:notes xmlns:a="http://schemas.openxmlformats.org/drawingml/2006/main" xmlns:r="http://schemas.openxmlformats.org/officeDocument/2006/relationships" xmlns:p="http://schemas.openxmlformats.org/presentationml/2006/main">
+  <p:cSld>
+    <p:spTree>
+      <p:nvGrpSpPr>
+        <p:cNvPr id="1" name=""/>
+        <p:cNvGrpSpPr/>
+        <p:nvPr/>
+      </p:nvGrpSpPr>
+      <p:grpSpPr>
+        <a:xfrm>
+          <a:off x="0" y="0"/>
+          <a:ext cx="0" cy="0"/>
+          <a:chOff x="0" y="0"/>
+          <a:chExt cx="0" cy="0"/>
+        </a:xfrm>
+      </p:grpSpPr>
+      <p:sp>
+        <p:nvSpPr>
+          <p:cNvPr id="2" name="Slide Image Placeholder 1"/>
+          <p:cNvSpPr>
+            <a:spLocks noGrp="1" noRot="1" noChangeAspect="1"/>
+          </p:cNvSpPr>
+          <p:nvPr>
+            <p:ph type="sldImg"/>
+          </p:nvPr>
+        </p:nvSpPr>
+        <p:spPr/>
+      </p:sp>
+      <p:sp>
+        <p:nvSpPr>
+          <p:cNvPr id="3" name="Notes Placeholder 2"/>
+          <p:cNvSpPr>
+            <a:spLocks noGrp="1"/>
+          </p:cNvSpPr>
+          <p:nvPr>
+            <p:ph type="body" idx="1"/>
+          </p:nvPr>
+        </p:nvSpPr>
+        <p:spPr/>
+        <p:txBody>
+          <a:bodyPr/>
+          <a:lstStyle/>
+          <a:p>
+            <a:r>
+              <a:rPr lang="en-US" dirty="0" smtClean="0"/>
+              <a:t>The RADV tool follows the standard three-tier architecture.  The data tier is Georgia Tech’s </a:t>
+            </a:r>
+            <a:r>
+              <a:rPr lang="en-US" baseline="0" dirty="0" smtClean="0"/>
+              <a:t>FHIR server.  The application tier consists of business logic coded in the Python language.  The presentation tier is and HTML5 website hosted on the Google App Engine platform.  CSS was used to format the page, and JavaScript code was written to interact with the Application tier.</a:t>
+            </a:r>
+            <a:endParaRPr lang="en-US" dirty="0"/>
+          </a:p>
+        </p:txBody>
+      </p:sp>
+      <p:sp>
+        <p:nvSpPr>
+          <p:cNvPr id="4" name="Slide Number Placeholder 3"/>
+          <p:cNvSpPr>
+            <a:spLocks noGrp="1"/>
+          </p:cNvSpPr>
+          <p:nvPr>
+            <p:ph type="sldNum" sz="quarter" idx="10"/>
+          </p:nvPr>
+        </p:nvSpPr>
+        <p:spPr/>
+        <p:txBody>
+          <a:bodyPr/>
+          <a:lstStyle/>
+          <a:p>
+            <a:fld id="{64DBF1C4-A8A4-46A4-960B-68980B6D50C1}" type="slidenum">
+              <a:rPr lang="en-US" smtClean="0"/>
+              <a:t>3</a:t>
+            </a:fld>
+            <a:endParaRPr lang="en-US"/>
+          </a:p>
+        </p:txBody>
+      </p:sp>
+    </p:spTree>
+    <p:extLst>
+      <p:ext uri="{BB962C8B-B14F-4D97-AF65-F5344CB8AC3E}">
+        <p14:creationId xmlns:p14="http://schemas.microsoft.com/office/powerpoint/2010/main" val="1861773998"/>
+      </p:ext>
+    </p:extLst>
+  </p:cSld>
+  <p:clrMapOvr>
+    <a:masterClrMapping/>
+  </p:clrMapOvr>
+</p:notes>
+</file>
+
+<file path=ppt/notesSlides/notesSlide4.xml><?xml version="1.0" encoding="utf-8"?>
+<p:notes xmlns:a="http://schemas.openxmlformats.org/drawingml/2006/main" xmlns:r="http://schemas.openxmlformats.org/officeDocument/2006/relationships" xmlns:p="http://schemas.openxmlformats.org/presentationml/2006/main">
+  <p:cSld>
+    <p:spTree>
+      <p:nvGrpSpPr>
+        <p:cNvPr id="1" name=""/>
+        <p:cNvGrpSpPr/>
+        <p:nvPr/>
+      </p:nvGrpSpPr>
+      <p:grpSpPr>
+        <a:xfrm>
+          <a:off x="0" y="0"/>
+          <a:ext cx="0" cy="0"/>
+          <a:chOff x="0" y="0"/>
+          <a:chExt cx="0" cy="0"/>
+        </a:xfrm>
+      </p:grpSpPr>
+      <p:sp>
+        <p:nvSpPr>
+          <p:cNvPr id="2" name="Slide Image Placeholder 1"/>
+          <p:cNvSpPr>
+            <a:spLocks noGrp="1" noRot="1" noChangeAspect="1"/>
+          </p:cNvSpPr>
+          <p:nvPr>
+            <p:ph type="sldImg"/>
+          </p:nvPr>
+        </p:nvSpPr>
+        <p:spPr/>
+      </p:sp>
+      <p:sp>
+        <p:nvSpPr>
+          <p:cNvPr id="3" name="Notes Placeholder 2"/>
+          <p:cNvSpPr>
+            <a:spLocks noGrp="1"/>
+          </p:cNvSpPr>
+          <p:nvPr>
+            <p:ph type="body" idx="1"/>
+          </p:nvPr>
+        </p:nvSpPr>
+        <p:spPr/>
+        <p:txBody>
+          <a:bodyPr/>
+          <a:lstStyle/>
+          <a:p>
+            <a:r>
+              <a:rPr lang="en-US" dirty="0" smtClean="0"/>
+              <a:t>This slide provides more details about the architecture of the</a:t>
+            </a:r>
+            <a:r>
+              <a:rPr lang="en-US" baseline="0" dirty="0" smtClean="0"/>
+              <a:t> RADV system.  Data is stored and requested from Georgia Techs FHIR Server.  A web server merges the FHIR data with reference tables and business logic.  This produces information and data visualizations which are viewed by the end user through a website.</a:t>
+            </a:r>
+            <a:endParaRPr lang="en-US" dirty="0"/>
+          </a:p>
+        </p:txBody>
+      </p:sp>
+      <p:sp>
+        <p:nvSpPr>
+          <p:cNvPr id="4" name="Slide Number Placeholder 3"/>
+          <p:cNvSpPr>
+            <a:spLocks noGrp="1"/>
+          </p:cNvSpPr>
+          <p:nvPr>
+            <p:ph type="sldNum" sz="quarter" idx="10"/>
+          </p:nvPr>
+        </p:nvSpPr>
+        <p:spPr/>
+        <p:txBody>
+          <a:bodyPr/>
+          <a:lstStyle/>
+          <a:p>
+            <a:fld id="{64DBF1C4-A8A4-46A4-960B-68980B6D50C1}" type="slidenum">
+              <a:rPr lang="en-US" smtClean="0"/>
+              <a:t>4</a:t>
+            </a:fld>
+            <a:endParaRPr lang="en-US"/>
+          </a:p>
+        </p:txBody>
+      </p:sp>
+    </p:spTree>
+    <p:extLst>
+      <p:ext uri="{BB962C8B-B14F-4D97-AF65-F5344CB8AC3E}">
+        <p14:creationId xmlns:p14="http://schemas.microsoft.com/office/powerpoint/2010/main" val="3859383329"/>
+      </p:ext>
+    </p:extLst>
+  </p:cSld>
+  <p:clrMapOvr>
+    <a:masterClrMapping/>
+  </p:clrMapOvr>
+</p:notes>
+</file>
+
+<file path=ppt/notesSlides/notesSlide5.xml><?xml version="1.0" encoding="utf-8"?>
+<p:notes xmlns:a="http://schemas.openxmlformats.org/drawingml/2006/main" xmlns:r="http://schemas.openxmlformats.org/officeDocument/2006/relationships" xmlns:p="http://schemas.openxmlformats.org/presentationml/2006/main">
+  <p:cSld>
+    <p:spTree>
+      <p:nvGrpSpPr>
+        <p:cNvPr id="1" name=""/>
+        <p:cNvGrpSpPr/>
+        <p:nvPr/>
+      </p:nvGrpSpPr>
+      <p:grpSpPr>
+        <a:xfrm>
+          <a:off x="0" y="0"/>
+          <a:ext cx="0" cy="0"/>
+          <a:chOff x="0" y="0"/>
+          <a:chExt cx="0" cy="0"/>
+        </a:xfrm>
+      </p:grpSpPr>
+      <p:sp>
+        <p:nvSpPr>
+          <p:cNvPr id="2" name="Slide Image Placeholder 1"/>
+          <p:cNvSpPr>
+            <a:spLocks noGrp="1" noRot="1" noChangeAspect="1"/>
+          </p:cNvSpPr>
+          <p:nvPr>
+            <p:ph type="sldImg"/>
+          </p:nvPr>
+        </p:nvSpPr>
+        <p:spPr/>
+      </p:sp>
+      <p:sp>
+        <p:nvSpPr>
+          <p:cNvPr id="3" name="Notes Placeholder 2"/>
+          <p:cNvSpPr>
+            <a:spLocks noGrp="1"/>
+          </p:cNvSpPr>
+          <p:nvPr>
+            <p:ph type="body" idx="1"/>
+          </p:nvPr>
+        </p:nvSpPr>
+        <p:spPr/>
+        <p:txBody>
+          <a:bodyPr/>
+          <a:lstStyle/>
+          <a:p>
+            <a:r>
+              <a:rPr lang="en-US" dirty="0" smtClean="0"/>
+              <a:t>The next </a:t>
+            </a:r>
+            <a:r>
+              <a:rPr lang="en-US" baseline="0" dirty="0" smtClean="0"/>
+              <a:t>6 slides present the initial wireframe </a:t>
+            </a:r>
+            <a:r>
+              <a:rPr lang="en-US" baseline="0" dirty="0" smtClean="0"/>
+              <a:t>designs </a:t>
+            </a:r>
+            <a:r>
+              <a:rPr lang="en-US" baseline="0" dirty="0" smtClean="0"/>
+              <a:t>of the RADV tool highlighting the major pieces of functionality and user interaction.</a:t>
+            </a:r>
+          </a:p>
+          <a:p>
+            <a:r>
+              <a:rPr lang="en-US" baseline="0" dirty="0" smtClean="0"/>
+              <a:t>Not presented is the authentication step required by the user in order to access this tool.  Authentication and authorization of the user will be handled by existing </a:t>
+            </a:r>
+            <a:r>
+              <a:rPr lang="en-US" baseline="0" dirty="0" smtClean="0"/>
+              <a:t>well-defined protocols.</a:t>
+            </a:r>
+            <a:endParaRPr lang="en-US" baseline="0" dirty="0" smtClean="0"/>
+          </a:p>
+          <a:p>
+            <a:endParaRPr lang="en-US" baseline="0" dirty="0" smtClean="0"/>
+          </a:p>
+          <a:p>
+            <a:r>
+              <a:rPr lang="en-US" baseline="0" dirty="0" smtClean="0"/>
+              <a:t>This </a:t>
+            </a:r>
+            <a:r>
+              <a:rPr lang="en-US" baseline="0" dirty="0" smtClean="0"/>
+              <a:t>wireframe shows how a user will lookup an existing patient.  Users will be able to search by name or patient ID.  If multiple matches are found a list of those matches will be presented with additional patient data to assist in the selection of the correct patient.</a:t>
+            </a:r>
+          </a:p>
+          <a:p>
+            <a:endParaRPr lang="en-US" baseline="0" dirty="0" smtClean="0"/>
+          </a:p>
+          <a:p>
+            <a:r>
+              <a:rPr lang="en-US" baseline="0" dirty="0" smtClean="0"/>
+              <a:t>Additional search options may be added such as gender, DOB and address.</a:t>
+            </a:r>
+          </a:p>
+        </p:txBody>
+      </p:sp>
+      <p:sp>
+        <p:nvSpPr>
+          <p:cNvPr id="4" name="Slide Number Placeholder 3"/>
+          <p:cNvSpPr>
+            <a:spLocks noGrp="1"/>
+          </p:cNvSpPr>
+          <p:nvPr>
+            <p:ph type="sldNum" sz="quarter" idx="10"/>
+          </p:nvPr>
+        </p:nvSpPr>
+        <p:spPr/>
+        <p:txBody>
+          <a:bodyPr/>
+          <a:lstStyle/>
+          <a:p>
+            <a:fld id="{64DBF1C4-A8A4-46A4-960B-68980B6D50C1}" type="slidenum">
+              <a:rPr lang="en-US" smtClean="0"/>
+              <a:t>5</a:t>
+            </a:fld>
+            <a:endParaRPr lang="en-US"/>
+          </a:p>
+        </p:txBody>
+      </p:sp>
+    </p:spTree>
+    <p:extLst>
+      <p:ext uri="{BB962C8B-B14F-4D97-AF65-F5344CB8AC3E}">
+        <p14:creationId xmlns:p14="http://schemas.microsoft.com/office/powerpoint/2010/main" val="1392891120"/>
+      </p:ext>
+    </p:extLst>
+  </p:cSld>
+  <p:clrMapOvr>
+    <a:masterClrMapping/>
+  </p:clrMapOvr>
+</p:notes>
+</file>
+
+<file path=ppt/notesSlides/notesSlide6.xml><?xml version="1.0" encoding="utf-8"?>
+<p:notes xmlns:a="http://schemas.openxmlformats.org/drawingml/2006/main" xmlns:r="http://schemas.openxmlformats.org/officeDocument/2006/relationships" xmlns:p="http://schemas.openxmlformats.org/presentationml/2006/main">
+  <p:cSld>
+    <p:spTree>
+      <p:nvGrpSpPr>
+        <p:cNvPr id="1" name=""/>
+        <p:cNvGrpSpPr/>
+        <p:nvPr/>
+      </p:nvGrpSpPr>
+      <p:grpSpPr>
+        <a:xfrm>
+          <a:off x="0" y="0"/>
+          <a:ext cx="0" cy="0"/>
+          <a:chOff x="0" y="0"/>
+          <a:chExt cx="0" cy="0"/>
+        </a:xfrm>
+      </p:grpSpPr>
+      <p:sp>
+        <p:nvSpPr>
+          <p:cNvPr id="2" name="Slide Image Placeholder 1"/>
+          <p:cNvSpPr>
+            <a:spLocks noGrp="1" noRot="1" noChangeAspect="1"/>
+          </p:cNvSpPr>
+          <p:nvPr>
+            <p:ph type="sldImg"/>
+          </p:nvPr>
+        </p:nvSpPr>
+        <p:spPr/>
+      </p:sp>
+      <p:sp>
+        <p:nvSpPr>
+          <p:cNvPr id="3" name="Notes Placeholder 2"/>
+          <p:cNvSpPr>
+            <a:spLocks noGrp="1"/>
+          </p:cNvSpPr>
+          <p:nvPr>
+            <p:ph type="body" idx="1"/>
+          </p:nvPr>
+        </p:nvSpPr>
+        <p:spPr/>
+        <p:txBody>
+          <a:bodyPr/>
+          <a:lstStyle/>
+          <a:p>
+            <a:r>
+              <a:rPr lang="en-US" dirty="0" smtClean="0"/>
+              <a:t>This wireframe presents the user with a</a:t>
+            </a:r>
+            <a:r>
+              <a:rPr lang="en-US" baseline="0" dirty="0" smtClean="0"/>
+              <a:t> list of candidate HCCs for the selected patient.  This view consists of </a:t>
+            </a:r>
+            <a:r>
+              <a:rPr lang="en-US" dirty="0" smtClean="0"/>
+              <a:t>4 main sections.</a:t>
+            </a:r>
+            <a:endParaRPr lang="en-US" baseline="0" dirty="0" smtClean="0"/>
+          </a:p>
+          <a:p>
+            <a:endParaRPr lang="en-US" baseline="0" dirty="0" smtClean="0"/>
+          </a:p>
+          <a:p>
+            <a:r>
+              <a:rPr lang="en-US" baseline="0" dirty="0" smtClean="0"/>
+              <a:t>The top section lists the patient name, Id, DOB and other pertinent identifying information.  This section also shows the patient’s current risk adjust score along with an indicator displaying the potential impact of candidate HCCs not applied during the current year.</a:t>
+            </a:r>
+          </a:p>
+          <a:p>
+            <a:endParaRPr lang="en-US" baseline="0" dirty="0" smtClean="0"/>
+          </a:p>
+          <a:p>
+            <a:r>
+              <a:rPr lang="en-US" baseline="0" dirty="0" smtClean="0"/>
+              <a:t>The left pane lists the existing HCCs applied during the calendar year with the ability to view additional details of each.</a:t>
+            </a:r>
+          </a:p>
+          <a:p>
+            <a:endParaRPr lang="en-US" baseline="0" dirty="0" smtClean="0"/>
+          </a:p>
+          <a:p>
+            <a:r>
+              <a:rPr lang="en-US" baseline="0" dirty="0" smtClean="0"/>
+              <a:t>The middle pane lists candidate HCCs that meet the following three criteria: first) The HCC was applied to the patient in a prior year; second) The HCC has not already been applied to the current calendar year; and third) The HCC has not already been rejected for this calendar year.</a:t>
+            </a:r>
+          </a:p>
+          <a:p>
+            <a:r>
+              <a:rPr lang="en-US" baseline="0" dirty="0" smtClean="0"/>
+              <a:t>The list of HCCs will include the latest year it was applied and the risk adjustment score %.  Users will be able to Add, Reject or View the details of each HCC.  They will also be able to filter candidate HCCs based on number of years since they were last applied to the patient.</a:t>
+            </a:r>
+          </a:p>
+          <a:p>
+            <a:endParaRPr lang="en-US" baseline="0" dirty="0" smtClean="0"/>
+          </a:p>
+          <a:p>
+            <a:r>
+              <a:rPr lang="en-US" baseline="0" dirty="0" smtClean="0"/>
+              <a:t>Finally, the right pane presents the user with two different charts showing the relative impact of the current and candidate HCCs</a:t>
+            </a:r>
+            <a:r>
+              <a:rPr lang="en-US" sz="1200" b="0" i="0" u="none" strike="noStrike" kern="1200" baseline="0" dirty="0" smtClean="0">
+                <a:solidFill>
+                  <a:schemeClr val="tx1"/>
+                </a:solidFill>
+                <a:latin typeface="+mn-lt"/>
+                <a:ea typeface="+mn-ea"/>
+                <a:cs typeface="+mn-cs"/>
+              </a:rPr>
+              <a:t> on the patients overall risk adjustment score.  These are covered in more detail on slide 10</a:t>
+            </a:r>
+            <a:endParaRPr lang="en-US" baseline="0" dirty="0" smtClean="0"/>
+          </a:p>
+          <a:p>
+            <a:endParaRPr lang="en-US" baseline="0" dirty="0" smtClean="0"/>
+          </a:p>
+          <a:p>
+            <a:endParaRPr lang="en-US" baseline="0" dirty="0" smtClean="0"/>
+          </a:p>
+          <a:p>
+            <a:endParaRPr lang="en-US" dirty="0"/>
+          </a:p>
+        </p:txBody>
+      </p:sp>
+      <p:sp>
+        <p:nvSpPr>
+          <p:cNvPr id="4" name="Slide Number Placeholder 3"/>
+          <p:cNvSpPr>
+            <a:spLocks noGrp="1"/>
+          </p:cNvSpPr>
+          <p:nvPr>
+            <p:ph type="sldNum" sz="quarter" idx="10"/>
+          </p:nvPr>
+        </p:nvSpPr>
+        <p:spPr/>
+        <p:txBody>
+          <a:bodyPr/>
+          <a:lstStyle/>
+          <a:p>
+            <a:fld id="{64DBF1C4-A8A4-46A4-960B-68980B6D50C1}" type="slidenum">
+              <a:rPr lang="en-US" smtClean="0"/>
+              <a:t>6</a:t>
+            </a:fld>
+            <a:endParaRPr lang="en-US"/>
+          </a:p>
+        </p:txBody>
+      </p:sp>
+    </p:spTree>
+    <p:extLst>
+      <p:ext uri="{BB962C8B-B14F-4D97-AF65-F5344CB8AC3E}">
+        <p14:creationId xmlns:p14="http://schemas.microsoft.com/office/powerpoint/2010/main" val="2687240764"/>
+      </p:ext>
+    </p:extLst>
+  </p:cSld>
+  <p:clrMapOvr>
+    <a:masterClrMapping/>
+  </p:clrMapOvr>
+</p:notes>
+</file>
+
+<file path=ppt/notesSlides/notesSlide7.xml><?xml version="1.0" encoding="utf-8"?>
+<p:notes xmlns:a="http://schemas.openxmlformats.org/drawingml/2006/main" xmlns:r="http://schemas.openxmlformats.org/officeDocument/2006/relationships" xmlns:p="http://schemas.openxmlformats.org/presentationml/2006/main">
+  <p:cSld>
+    <p:spTree>
+      <p:nvGrpSpPr>
+        <p:cNvPr id="1" name=""/>
+        <p:cNvGrpSpPr/>
+        <p:nvPr/>
+      </p:nvGrpSpPr>
+      <p:grpSpPr>
+        <a:xfrm>
+          <a:off x="0" y="0"/>
+          <a:ext cx="0" cy="0"/>
+          <a:chOff x="0" y="0"/>
+          <a:chExt cx="0" cy="0"/>
+        </a:xfrm>
+      </p:grpSpPr>
+      <p:sp>
+        <p:nvSpPr>
+          <p:cNvPr id="2" name="Slide Image Placeholder 1"/>
+          <p:cNvSpPr>
+            <a:spLocks noGrp="1" noRot="1" noChangeAspect="1"/>
+          </p:cNvSpPr>
+          <p:nvPr>
+            <p:ph type="sldImg"/>
+          </p:nvPr>
+        </p:nvSpPr>
+        <p:spPr/>
+      </p:sp>
+      <p:sp>
+        <p:nvSpPr>
+          <p:cNvPr id="3" name="Notes Placeholder 2"/>
+          <p:cNvSpPr>
+            <a:spLocks noGrp="1"/>
+          </p:cNvSpPr>
+          <p:nvPr>
+            <p:ph type="body" idx="1"/>
+          </p:nvPr>
+        </p:nvSpPr>
+        <p:spPr/>
+        <p:txBody>
+          <a:bodyPr/>
+          <a:lstStyle/>
+          <a:p>
+            <a:r>
+              <a:rPr lang="en-US" dirty="0" smtClean="0"/>
+              <a:t>Clicking the view link on either a</a:t>
+            </a:r>
+            <a:r>
+              <a:rPr lang="en-US" baseline="0" dirty="0" smtClean="0"/>
+              <a:t> current HCC and candidate HCC will present the user with this page which lists the patient’s of the selected HCC including the  verification status, physician that submitted the HCC, notes and selected </a:t>
+            </a:r>
+            <a:r>
+              <a:rPr lang="en-US" baseline="0" dirty="0" err="1" smtClean="0"/>
+              <a:t>SnoMed</a:t>
+            </a:r>
+            <a:r>
+              <a:rPr lang="en-US" baseline="0" dirty="0" smtClean="0"/>
+              <a:t> codes.</a:t>
+            </a:r>
+          </a:p>
+          <a:p>
+            <a:endParaRPr lang="en-US" baseline="0" dirty="0" smtClean="0"/>
+          </a:p>
+          <a:p>
+            <a:r>
+              <a:rPr lang="en-US" baseline="0" dirty="0" smtClean="0"/>
+              <a:t>For convenience, if this is a candidate HCC then an “Add” button will be presented.</a:t>
+            </a:r>
+            <a:endParaRPr lang="en-US" dirty="0"/>
+          </a:p>
+        </p:txBody>
+      </p:sp>
+      <p:sp>
+        <p:nvSpPr>
+          <p:cNvPr id="4" name="Slide Number Placeholder 3"/>
+          <p:cNvSpPr>
+            <a:spLocks noGrp="1"/>
+          </p:cNvSpPr>
+          <p:nvPr>
+            <p:ph type="sldNum" sz="quarter" idx="10"/>
+          </p:nvPr>
+        </p:nvSpPr>
+        <p:spPr/>
+        <p:txBody>
+          <a:bodyPr/>
+          <a:lstStyle/>
+          <a:p>
+            <a:fld id="{64DBF1C4-A8A4-46A4-960B-68980B6D50C1}" type="slidenum">
+              <a:rPr lang="en-US" smtClean="0"/>
+              <a:t>7</a:t>
+            </a:fld>
+            <a:endParaRPr lang="en-US"/>
+          </a:p>
+        </p:txBody>
+      </p:sp>
+    </p:spTree>
+    <p:extLst>
+      <p:ext uri="{BB962C8B-B14F-4D97-AF65-F5344CB8AC3E}">
+        <p14:creationId xmlns:p14="http://schemas.microsoft.com/office/powerpoint/2010/main" val="422093379"/>
+      </p:ext>
+    </p:extLst>
+  </p:cSld>
+  <p:clrMapOvr>
+    <a:masterClrMapping/>
+  </p:clrMapOvr>
+</p:notes>
+</file>
+
+<file path=ppt/notesSlides/notesSlide8.xml><?xml version="1.0" encoding="utf-8"?>
+<p:notes xmlns:a="http://schemas.openxmlformats.org/drawingml/2006/main" xmlns:r="http://schemas.openxmlformats.org/officeDocument/2006/relationships" xmlns:p="http://schemas.openxmlformats.org/presentationml/2006/main">
+  <p:cSld>
+    <p:spTree>
+      <p:nvGrpSpPr>
+        <p:cNvPr id="1" name=""/>
+        <p:cNvGrpSpPr/>
+        <p:nvPr/>
+      </p:nvGrpSpPr>
+      <p:grpSpPr>
+        <a:xfrm>
+          <a:off x="0" y="0"/>
+          <a:ext cx="0" cy="0"/>
+          <a:chOff x="0" y="0"/>
+          <a:chExt cx="0" cy="0"/>
+        </a:xfrm>
+      </p:grpSpPr>
+      <p:sp>
+        <p:nvSpPr>
+          <p:cNvPr id="2" name="Slide Image Placeholder 1"/>
+          <p:cNvSpPr>
+            <a:spLocks noGrp="1" noRot="1" noChangeAspect="1"/>
+          </p:cNvSpPr>
+          <p:nvPr>
+            <p:ph type="sldImg"/>
+          </p:nvPr>
+        </p:nvSpPr>
+        <p:spPr/>
+      </p:sp>
+      <p:sp>
+        <p:nvSpPr>
+          <p:cNvPr id="3" name="Notes Placeholder 2"/>
+          <p:cNvSpPr>
+            <a:spLocks noGrp="1"/>
+          </p:cNvSpPr>
+          <p:nvPr>
+            <p:ph type="body" idx="1"/>
+          </p:nvPr>
+        </p:nvSpPr>
+        <p:spPr/>
+        <p:txBody>
+          <a:bodyPr/>
+          <a:lstStyle/>
+          <a:p>
+            <a:r>
+              <a:rPr lang="en-US" dirty="0" smtClean="0"/>
+              <a:t>Clicking the Add link on a </a:t>
+            </a:r>
+            <a:r>
+              <a:rPr lang="en-US" baseline="0" dirty="0" smtClean="0"/>
+              <a:t>candidate HCC will present the user with this form allowing them to select the verification status, applicable </a:t>
+            </a:r>
+            <a:r>
+              <a:rPr lang="en-US" baseline="0" dirty="0" err="1" smtClean="0"/>
+              <a:t>SnoMed</a:t>
+            </a:r>
+            <a:r>
+              <a:rPr lang="en-US" baseline="0" dirty="0" smtClean="0"/>
+              <a:t> codes and provide relevant notes.</a:t>
+            </a:r>
+          </a:p>
+          <a:p>
+            <a:endParaRPr lang="en-US" baseline="0" dirty="0" smtClean="0"/>
+          </a:p>
+          <a:p>
+            <a:r>
+              <a:rPr lang="en-US" baseline="0" dirty="0" smtClean="0"/>
+              <a:t>Clicking the Add button will add this HCC to the patients record in the FHIR database.</a:t>
+            </a:r>
+            <a:endParaRPr lang="en-US" baseline="0" dirty="0" smtClean="0"/>
+          </a:p>
+        </p:txBody>
+      </p:sp>
+      <p:sp>
+        <p:nvSpPr>
+          <p:cNvPr id="4" name="Slide Number Placeholder 3"/>
+          <p:cNvSpPr>
+            <a:spLocks noGrp="1"/>
+          </p:cNvSpPr>
+          <p:nvPr>
+            <p:ph type="sldNum" sz="quarter" idx="10"/>
+          </p:nvPr>
+        </p:nvSpPr>
+        <p:spPr/>
+        <p:txBody>
+          <a:bodyPr/>
+          <a:lstStyle/>
+          <a:p>
+            <a:fld id="{64DBF1C4-A8A4-46A4-960B-68980B6D50C1}" type="slidenum">
+              <a:rPr lang="en-US" smtClean="0"/>
+              <a:t>8</a:t>
+            </a:fld>
+            <a:endParaRPr lang="en-US"/>
+          </a:p>
+        </p:txBody>
+      </p:sp>
+    </p:spTree>
+    <p:extLst>
+      <p:ext uri="{BB962C8B-B14F-4D97-AF65-F5344CB8AC3E}">
+        <p14:creationId xmlns:p14="http://schemas.microsoft.com/office/powerpoint/2010/main" val="1131099348"/>
+      </p:ext>
+    </p:extLst>
+  </p:cSld>
+  <p:clrMapOvr>
+    <a:masterClrMapping/>
+  </p:clrMapOvr>
+</p:notes>
+</file>
+
+<file path=ppt/notesSlides/notesSlide9.xml><?xml version="1.0" encoding="utf-8"?>
+<p:notes xmlns:a="http://schemas.openxmlformats.org/drawingml/2006/main" xmlns:r="http://schemas.openxmlformats.org/officeDocument/2006/relationships" xmlns:p="http://schemas.openxmlformats.org/presentationml/2006/main">
+  <p:cSld>
+    <p:spTree>
+      <p:nvGrpSpPr>
+        <p:cNvPr id="1" name=""/>
+        <p:cNvGrpSpPr/>
+        <p:nvPr/>
+      </p:nvGrpSpPr>
+      <p:grpSpPr>
+        <a:xfrm>
+          <a:off x="0" y="0"/>
+          <a:ext cx="0" cy="0"/>
+          <a:chOff x="0" y="0"/>
+          <a:chExt cx="0" cy="0"/>
+        </a:xfrm>
+      </p:grpSpPr>
+      <p:sp>
+        <p:nvSpPr>
+          <p:cNvPr id="2" name="Slide Image Placeholder 1"/>
+          <p:cNvSpPr>
+            <a:spLocks noGrp="1" noRot="1" noChangeAspect="1"/>
+          </p:cNvSpPr>
+          <p:nvPr>
+            <p:ph type="sldImg"/>
+          </p:nvPr>
+        </p:nvSpPr>
+        <p:spPr/>
+      </p:sp>
+      <p:sp>
+        <p:nvSpPr>
+          <p:cNvPr id="3" name="Notes Placeholder 2"/>
+          <p:cNvSpPr>
+            <a:spLocks noGrp="1"/>
+          </p:cNvSpPr>
+          <p:nvPr>
+            <p:ph type="body" idx="1"/>
+          </p:nvPr>
+        </p:nvSpPr>
+        <p:spPr/>
+        <p:txBody>
+          <a:bodyPr/>
+          <a:lstStyle/>
+          <a:p>
+            <a:r>
+              <a:rPr lang="en-US" dirty="0" smtClean="0"/>
+              <a:t>Clicking the Reject link on a </a:t>
+            </a:r>
+            <a:r>
+              <a:rPr lang="en-US" baseline="0" dirty="0" smtClean="0"/>
+              <a:t>candidate HCC will present the user with this form allowing them to select the relevant verification status, applicable </a:t>
+            </a:r>
+            <a:r>
+              <a:rPr lang="en-US" baseline="0" dirty="0" err="1" smtClean="0"/>
+              <a:t>SnoMed</a:t>
+            </a:r>
+            <a:r>
+              <a:rPr lang="en-US" baseline="0" dirty="0" smtClean="0"/>
+              <a:t> codes and enter relevant notes regarding the rejection of this HCC.</a:t>
+            </a:r>
+          </a:p>
+          <a:p>
+            <a:endParaRPr lang="en-US" baseline="0" dirty="0" smtClean="0"/>
+          </a:p>
+          <a:p>
+            <a:r>
+              <a:rPr lang="en-US" baseline="0" dirty="0" smtClean="0"/>
+              <a:t>Clicking the Reject button will add this HCC to the patients record in the FHIR database as a rejected HCC and will exclude it from the list of candidate HCCs for the remainder of the calendar year.</a:t>
+            </a:r>
+          </a:p>
+          <a:p>
+            <a:endParaRPr lang="en-US" dirty="0"/>
+          </a:p>
+        </p:txBody>
+      </p:sp>
+      <p:sp>
+        <p:nvSpPr>
+          <p:cNvPr id="4" name="Slide Number Placeholder 3"/>
+          <p:cNvSpPr>
+            <a:spLocks noGrp="1"/>
+          </p:cNvSpPr>
+          <p:nvPr>
+            <p:ph type="sldNum" sz="quarter" idx="10"/>
+          </p:nvPr>
+        </p:nvSpPr>
+        <p:spPr/>
+        <p:txBody>
+          <a:bodyPr/>
+          <a:lstStyle/>
+          <a:p>
+            <a:fld id="{64DBF1C4-A8A4-46A4-960B-68980B6D50C1}" type="slidenum">
+              <a:rPr lang="en-US" smtClean="0"/>
+              <a:t>9</a:t>
+            </a:fld>
+            <a:endParaRPr lang="en-US"/>
+          </a:p>
+        </p:txBody>
+      </p:sp>
+    </p:spTree>
+    <p:extLst>
+      <p:ext uri="{BB962C8B-B14F-4D97-AF65-F5344CB8AC3E}">
+        <p14:creationId xmlns:p14="http://schemas.microsoft.com/office/powerpoint/2010/main" val="324657054"/>
+      </p:ext>
+    </p:extLst>
+  </p:cSld>
+  <p:clrMapOvr>
+    <a:masterClrMapping/>
+  </p:clrMapOvr>
+</p:notes>
 </file>
 
 <file path=ppt/slideLayouts/slideLayout1.xml><?xml version="1.0" encoding="utf-8"?>
@@ -1842,7 +3790,7 @@
           <a:p>
             <a:fld id="{3EAEFB75-4DE4-4DFC-B956-52D01254B927}" type="datetimeFigureOut">
               <a:rPr lang="en-US" smtClean="0"/>
-              <a:t>3/10/2016</a:t>
+              <a:t>3/12/2016</a:t>
             </a:fld>
             <a:endParaRPr lang="en-US"/>
           </a:p>
@@ -2195,7 +4143,7 @@
           <a:p>
             <a:fld id="{3EAEFB75-4DE4-4DFC-B956-52D01254B927}" type="datetimeFigureOut">
               <a:rPr lang="en-US" smtClean="0"/>
-              <a:t>3/10/2016</a:t>
+              <a:t>3/12/2016</a:t>
             </a:fld>
             <a:endParaRPr lang="en-US"/>
           </a:p>
@@ -2370,7 +4318,7 @@
           <a:p>
             <a:fld id="{3EAEFB75-4DE4-4DFC-B956-52D01254B927}" type="datetimeFigureOut">
               <a:rPr lang="en-US" smtClean="0"/>
-              <a:t>3/10/2016</a:t>
+              <a:t>3/12/2016</a:t>
             </a:fld>
             <a:endParaRPr lang="en-US"/>
           </a:p>
@@ -2483,7 +4431,7 @@
           <a:p>
             <a:fld id="{3EAEFB75-4DE4-4DFC-B956-52D01254B927}" type="datetimeFigureOut">
               <a:rPr lang="en-US" smtClean="0"/>
-              <a:t>3/10/2016</a:t>
+              <a:t>3/12/2016</a:t>
             </a:fld>
             <a:endParaRPr lang="en-US"/>
           </a:p>
@@ -2841,7 +4789,7 @@
           <a:p>
             <a:fld id="{3EAEFB75-4DE4-4DFC-B956-52D01254B927}" type="datetimeFigureOut">
               <a:rPr lang="en-US" smtClean="0"/>
-              <a:t>3/10/2016</a:t>
+              <a:t>3/12/2016</a:t>
             </a:fld>
             <a:endParaRPr lang="en-US"/>
           </a:p>
@@ -3106,7 +5054,7 @@
           <a:p>
             <a:fld id="{3EAEFB75-4DE4-4DFC-B956-52D01254B927}" type="datetimeFigureOut">
               <a:rPr lang="en-US" smtClean="0"/>
-              <a:t>3/10/2016</a:t>
+              <a:t>3/12/2016</a:t>
             </a:fld>
             <a:endParaRPr lang="en-US"/>
           </a:p>
@@ -3468,7 +5416,7 @@
           <a:p>
             <a:fld id="{3EAEFB75-4DE4-4DFC-B956-52D01254B927}" type="datetimeFigureOut">
               <a:rPr lang="en-US" smtClean="0"/>
-              <a:t>3/10/2016</a:t>
+              <a:t>3/12/2016</a:t>
             </a:fld>
             <a:endParaRPr lang="en-US"/>
           </a:p>
@@ -3695,7 +5643,7 @@
           <a:p>
             <a:fld id="{3EAEFB75-4DE4-4DFC-B956-52D01254B927}" type="datetimeFigureOut">
               <a:rPr lang="en-US" smtClean="0"/>
-              <a:t>3/10/2016</a:t>
+              <a:t>3/12/2016</a:t>
             </a:fld>
             <a:endParaRPr lang="en-US"/>
           </a:p>
@@ -3785,7 +5733,7 @@
           <a:p>
             <a:fld id="{3EAEFB75-4DE4-4DFC-B956-52D01254B927}" type="datetimeFigureOut">
               <a:rPr lang="en-US" smtClean="0"/>
-              <a:t>3/10/2016</a:t>
+              <a:t>3/12/2016</a:t>
             </a:fld>
             <a:endParaRPr lang="en-US"/>
           </a:p>
@@ -4052,7 +6000,7 @@
           <a:p>
             <a:fld id="{3EAEFB75-4DE4-4DFC-B956-52D01254B927}" type="datetimeFigureOut">
               <a:rPr lang="en-US" smtClean="0"/>
-              <a:t>3/10/2016</a:t>
+              <a:t>3/12/2016</a:t>
             </a:fld>
             <a:endParaRPr lang="en-US"/>
           </a:p>
@@ -4280,7 +6228,7 @@
           <a:p>
             <a:fld id="{3EAEFB75-4DE4-4DFC-B956-52D01254B927}" type="datetimeFigureOut">
               <a:rPr lang="en-US" smtClean="0"/>
-              <a:t>3/10/2016</a:t>
+              <a:t>3/12/2016</a:t>
             </a:fld>
             <a:endParaRPr lang="en-US"/>
           </a:p>
@@ -4779,7 +6727,7 @@
           <a:p>
             <a:fld id="{3EAEFB75-4DE4-4DFC-B956-52D01254B927}" type="datetimeFigureOut">
               <a:rPr lang="en-US" smtClean="0"/>
-              <a:t>3/10/2016</a:t>
+              <a:t>3/12/2016</a:t>
             </a:fld>
             <a:endParaRPr lang="en-US"/>
           </a:p>
@@ -5225,7 +7173,7 @@
             </a:r>
             <a:r>
               <a:rPr lang="en-US" dirty="0" smtClean="0">
-                <a:hlinkClick r:id="rId2"/>
+                <a:hlinkClick r:id="rId5"/>
               </a:rPr>
               <a:t>aburgos3@gatech.edu</a:t>
             </a:r>
@@ -5246,7 +7194,7 @@
             </a:r>
             <a:r>
               <a:rPr lang="en-US" dirty="0" smtClean="0">
-                <a:hlinkClick r:id="rId3"/>
+                <a:hlinkClick r:id="rId6"/>
               </a:rPr>
               <a:t>spiroganas@gmail.com</a:t>
             </a:r>
@@ -5267,7 +7215,7 @@
             </a:r>
             <a:r>
               <a:rPr lang="en-US" dirty="0" smtClean="0">
-                <a:hlinkClick r:id="rId4"/>
+                <a:hlinkClick r:id="rId7"/>
               </a:rPr>
               <a:t>anjag1993@gmail.com</a:t>
             </a:r>
@@ -5292,7 +7240,7 @@
             </a:r>
             <a:r>
               <a:rPr lang="en-US" dirty="0" smtClean="0">
-                <a:hlinkClick r:id="rId5"/>
+                <a:hlinkClick r:id="rId8"/>
               </a:rPr>
               <a:t>jrichgels3@gatech.edu</a:t>
             </a:r>
@@ -5317,7 +7265,7 @@
             </a:r>
             <a:r>
               <a:rPr lang="en-US" dirty="0" smtClean="0">
-                <a:hlinkClick r:id="rId6"/>
+                <a:hlinkClick r:id="rId9"/>
               </a:rPr>
               <a:t>dstoneburner3@gatech.edu</a:t>
             </a:r>
@@ -5342,7 +7290,7 @@
             </a:r>
             <a:r>
               <a:rPr lang="en-US" dirty="0" smtClean="0">
-                <a:hlinkClick r:id="rId7"/>
+                <a:hlinkClick r:id="rId10"/>
               </a:rPr>
               <a:t>tmsuidan@gatech.edu</a:t>
             </a:r>
@@ -5394,6 +7342,39 @@
           </a:p>
         </p:txBody>
       </p:sp>
+      <p:pic>
+        <p:nvPicPr>
+          <p:cNvPr id="5" name="Audio 4">
+            <a:hlinkClick r:id="" action="ppaction://media"/>
+          </p:cNvPr>
+          <p:cNvPicPr>
+            <a:picLocks noChangeAspect="1"/>
+          </p:cNvPicPr>
+          <p:nvPr>
+            <a:audioFile r:link="rId2"/>
+            <p:extLst>
+              <p:ext uri="{DAA4B4D4-6D71-4841-9C94-3DE7FCFB9230}">
+                <p14:media xmlns:p14="http://schemas.microsoft.com/office/powerpoint/2010/main" r:embed="rId1"/>
+              </p:ext>
+            </p:extLst>
+          </p:nvPr>
+        </p:nvPicPr>
+        <p:blipFill>
+          <a:blip r:embed="rId11"/>
+          <a:stretch>
+            <a:fillRect/>
+          </a:stretch>
+        </p:blipFill>
+        <p:spPr>
+          <a:xfrm>
+            <a:off x="9372600" y="4991100"/>
+            <a:ext cx="609600" cy="609600"/>
+          </a:xfrm>
+          <a:prstGeom prst="rect">
+            <a:avLst/>
+          </a:prstGeom>
+        </p:spPr>
+      </p:pic>
     </p:spTree>
     <p:extLst>
       <p:ext uri="{BB962C8B-B14F-4D97-AF65-F5344CB8AC3E}">
@@ -5404,10 +7385,98 @@
   <p:clrMapOvr>
     <a:masterClrMapping/>
   </p:clrMapOvr>
+  <mc:AlternateContent xmlns:mc="http://schemas.openxmlformats.org/markup-compatibility/2006" xmlns:p14="http://schemas.microsoft.com/office/powerpoint/2010/main">
+    <mc:Choice Requires="p14">
+      <p:transition spd="slow" p14:dur="2000" advTm="10873"/>
+    </mc:Choice>
+    <mc:Fallback xmlns="">
+      <p:transition spd="slow" advTm="10873"/>
+    </mc:Fallback>
+  </mc:AlternateContent>
   <p:timing>
     <p:tnLst>
       <p:par>
-        <p:cTn id="1" dur="indefinite" restart="never" nodeType="tmRoot"/>
+        <p:cTn id="1" dur="indefinite" restart="never" nodeType="tmRoot">
+          <p:childTnLst>
+            <p:seq concurrent="1" nextAc="seek">
+              <p:cTn id="2" dur="indefinite" nodeType="mainSeq">
+                <p:childTnLst>
+                  <p:par>
+                    <p:cTn id="3" fill="hold">
+                      <p:stCondLst>
+                        <p:cond delay="indefinite"/>
+                        <p:cond evt="onBegin" delay="0">
+                          <p:tn val="2"/>
+                        </p:cond>
+                      </p:stCondLst>
+                      <p:childTnLst>
+                        <p:par>
+                          <p:cTn id="4" fill="hold">
+                            <p:stCondLst>
+                              <p:cond delay="0"/>
+                            </p:stCondLst>
+                            <p:childTnLst>
+                              <p:par>
+                                <p:cTn id="5" presetID="1" presetClass="mediacall" presetSubtype="0" fill="hold" nodeType="afterEffect">
+                                  <p:stCondLst>
+                                    <p:cond delay="0"/>
+                                  </p:stCondLst>
+                                  <p:childTnLst>
+                                    <p:cmd type="call" cmd="playFrom(0.0)">
+                                      <p:cBhvr>
+                                        <p:cTn id="6" dur="1" fill="hold"/>
+                                        <p:tgtEl>
+                                          <p:spTgt spid="5"/>
+                                        </p:tgtEl>
+                                      </p:cBhvr>
+                                    </p:cmd>
+                                  </p:childTnLst>
+                                </p:cTn>
+                              </p:par>
+                            </p:childTnLst>
+                          </p:cTn>
+                        </p:par>
+                      </p:childTnLst>
+                    </p:cTn>
+                  </p:par>
+                </p:childTnLst>
+              </p:cTn>
+              <p:prevCondLst>
+                <p:cond evt="onPrev" delay="0">
+                  <p:tgtEl>
+                    <p:sldTgt/>
+                  </p:tgtEl>
+                </p:cond>
+              </p:prevCondLst>
+              <p:nextCondLst>
+                <p:cond evt="onNext" delay="0">
+                  <p:tgtEl>
+                    <p:sldTgt/>
+                  </p:tgtEl>
+                </p:cond>
+              </p:nextCondLst>
+            </p:seq>
+            <p:audio isNarration="1">
+              <p:cMediaNode vol="80000" showWhenStopped="0">
+                <p:cTn id="7" fill="hold" display="0">
+                  <p:stCondLst>
+                    <p:cond delay="indefinite"/>
+                  </p:stCondLst>
+                  <p:endCondLst>
+                    <p:cond evt="onStopAudio" delay="0">
+                      <p:tgtEl>
+                        <p:sldTgt/>
+                      </p:tgtEl>
+                    </p:cond>
+                  </p:endCondLst>
+                </p:cTn>
+                <p:tgtEl>
+                  <p:spTgt spid="5"/>
+                </p:tgtEl>
+              </p:cMediaNode>
+            </p:audio>
+          </p:childTnLst>
+        </p:cTn>
       </p:par>
     </p:tnLst>
   </p:timing>
@@ -5440,7 +7509,7 @@
           <p:nvPr/>
         </p:nvPicPr>
         <p:blipFill>
-          <a:blip r:embed="rId2"/>
+          <a:blip r:embed="rId3"/>
           <a:stretch>
             <a:fillRect/>
           </a:stretch>
@@ -5464,7 +7533,7 @@
           <p:nvPr/>
         </p:nvPicPr>
         <p:blipFill>
-          <a:blip r:embed="rId3"/>
+          <a:blip r:embed="rId4"/>
           <a:stretch>
             <a:fillRect/>
           </a:stretch>
@@ -5488,7 +7557,7 @@
           <p:nvPr/>
         </p:nvPicPr>
         <p:blipFill>
-          <a:blip r:embed="rId4"/>
+          <a:blip r:embed="rId5"/>
           <a:stretch>
             <a:fillRect/>
           </a:stretch>
@@ -5841,7 +7910,7 @@
         </p:xfrm>
         <a:graphic>
           <a:graphicData uri="http://schemas.openxmlformats.org/drawingml/2006/chart">
-            <c:chart xmlns:c="http://schemas.openxmlformats.org/drawingml/2006/chart" xmlns:r="http://schemas.openxmlformats.org/officeDocument/2006/relationships" r:id="rId2"/>
+            <c:chart xmlns:c="http://schemas.openxmlformats.org/drawingml/2006/chart" xmlns:r="http://schemas.openxmlformats.org/officeDocument/2006/relationships" r:id="rId3"/>
           </a:graphicData>
         </a:graphic>
       </p:graphicFrame>
@@ -5950,7 +8019,17 @@
           <a:bodyPr/>
           <a:lstStyle/>
           <a:p>
-            <a:endParaRPr lang="en-US"/>
+            <a:r>
+              <a:rPr lang="en-US" dirty="0" smtClean="0"/>
+              <a:t>Data Visualizations – enough to impact but not overwhelm</a:t>
+            </a:r>
+          </a:p>
+          <a:p>
+            <a:r>
+              <a:rPr lang="en-US" dirty="0" smtClean="0"/>
+              <a:t>How to ensure doctor confirms candidate HCCs</a:t>
+            </a:r>
+            <a:endParaRPr lang="en-US" dirty="0"/>
           </a:p>
         </p:txBody>
       </p:sp>
@@ -6091,18 +8170,8 @@
           <a:p>
             <a:r>
               <a:rPr lang="en-US" sz="1800" dirty="0"/>
-              <a:t>Slide 3 images are from: </a:t>
-            </a:r>
-          </a:p>
-          <a:p>
-            <a:pPr lvl="1"/>
-            <a:r>
-              <a:rPr lang="en-US" sz="1600" dirty="0">
-                <a:hlinkClick r:id="rId2"/>
-              </a:rPr>
-              <a:t>http://decompressionprosmarketing.com/blogs/decompression-pros/16891112-how-to-ask-for-referrals-from-medical-doctors</a:t>
-            </a:r>
-            <a:endParaRPr lang="en-US" sz="1600" dirty="0"/>
+              <a:t>Slide 3 Image from:</a:t>
+            </a:r>
           </a:p>
           <a:p>
             <a:pPr lvl="1"/>
@@ -6110,7 +8179,7 @@
               <a:rPr lang="en-US" sz="1600" dirty="0">
                 <a:hlinkClick r:id="rId3"/>
               </a:rPr>
-              <a:t>http://www.libertynursingagency.com/</a:t>
+              <a:t>https://www.hl7.org/fhir/</a:t>
             </a:r>
             <a:endParaRPr lang="en-US" sz="1600" dirty="0"/>
           </a:p>
@@ -6120,7 +8189,7 @@
               <a:rPr lang="en-US" sz="1600" dirty="0">
                 <a:hlinkClick r:id="rId4"/>
               </a:rPr>
-              <a:t>http://allhealthcare.monster.com/training/articles/1822-5-steps-to-becoming-a-medical-assistant</a:t>
+              <a:t>https://www.python.org/</a:t>
             </a:r>
             <a:endParaRPr lang="en-US" sz="1600" dirty="0"/>
           </a:p>
@@ -6130,51 +8199,77 @@
               <a:rPr lang="en-US" sz="1600" dirty="0">
                 <a:hlinkClick r:id="rId5"/>
               </a:rPr>
-              <a:t>http://greenfieldcc.3dcartstores.com/Medical-Coding-and-Billing_p_1058.html</a:t>
-            </a:r>
-            <a:endParaRPr lang="en-US" sz="1600" dirty="0"/>
-          </a:p>
-          <a:p>
+              <a:t>https://</a:t>
+            </a:r>
+            <a:r>
+              <a:rPr lang="en-US" sz="1600" dirty="0" smtClean="0">
+                <a:hlinkClick r:id="rId5"/>
+              </a:rPr>
+              <a:t>cloud.google.com/appengine</a:t>
+            </a:r>
+            <a:endParaRPr lang="en-US" sz="1600" dirty="0" smtClean="0"/>
+          </a:p>
+          <a:p>
+            <a:r>
+              <a:rPr lang="en-US" sz="1800" dirty="0" smtClean="0"/>
+              <a:t>Slide 4 </a:t>
+            </a:r>
             <a:r>
               <a:rPr lang="en-US" sz="1800" dirty="0"/>
-              <a:t>Slide 4 Image from:</a:t>
+              <a:t>images </a:t>
+            </a:r>
+            <a:r>
+              <a:rPr lang="en-US" sz="1800" dirty="0" smtClean="0"/>
+              <a:t>from</a:t>
+            </a:r>
+            <a:r>
+              <a:rPr lang="en-US" sz="1800" dirty="0"/>
+              <a:t>: </a:t>
             </a:r>
           </a:p>
           <a:p>
             <a:pPr lvl="1"/>
             <a:r>
-              <a:rPr lang="en-US" dirty="0">
+              <a:rPr lang="en-US" sz="1600" dirty="0">
                 <a:hlinkClick r:id="rId6"/>
               </a:rPr>
-              <a:t>https://www.hl7.org/fhir</a:t>
-            </a:r>
-            <a:r>
-              <a:rPr lang="en-US" dirty="0" smtClean="0">
-                <a:hlinkClick r:id="rId6"/>
-              </a:rPr>
-              <a:t>/</a:t>
-            </a:r>
-            <a:endParaRPr lang="en-US" dirty="0" smtClean="0"/>
+              <a:t>http://decompressionprosmarketing.com/blogs/decompression-pros/16891112-how-to-ask-for-referrals-from-medical-doctors</a:t>
+            </a:r>
+            <a:endParaRPr lang="en-US" sz="1600" dirty="0"/>
           </a:p>
           <a:p>
             <a:pPr lvl="1"/>
             <a:r>
-              <a:rPr lang="en-US" dirty="0">
+              <a:rPr lang="en-US" sz="1600" dirty="0">
                 <a:hlinkClick r:id="rId7"/>
               </a:rPr>
-              <a:t>https://www.python.org</a:t>
-            </a:r>
-            <a:r>
-              <a:rPr lang="en-US" dirty="0" smtClean="0">
-                <a:hlinkClick r:id="rId7"/>
+              <a:t>http://www.libertynursingagency.com/</a:t>
+            </a:r>
+            <a:endParaRPr lang="en-US" sz="1600" dirty="0"/>
+          </a:p>
+          <a:p>
+            <a:pPr lvl="1"/>
+            <a:r>
+              <a:rPr lang="en-US" sz="1600" dirty="0">
+                <a:hlinkClick r:id="rId8"/>
               </a:rPr>
-              <a:t>/</a:t>
-            </a:r>
-            <a:endParaRPr lang="en-US" dirty="0" smtClean="0"/>
+              <a:t>http://allhealthcare.monster.com/training/articles/1822-5-steps-to-becoming-a-medical-assistant</a:t>
+            </a:r>
+            <a:endParaRPr lang="en-US" sz="1600" dirty="0"/>
           </a:p>
           <a:p>
             <a:pPr lvl="1"/>
-            <a:endParaRPr lang="en-US" dirty="0" smtClean="0"/>
+            <a:r>
+              <a:rPr lang="en-US" sz="1600" dirty="0">
+                <a:hlinkClick r:id="rId9"/>
+              </a:rPr>
+              <a:t>http://greenfieldcc.3dcartstores.com/Medical-Coding-and-Billing_p_1058.html</a:t>
+            </a:r>
+            <a:endParaRPr lang="en-US" sz="1600" dirty="0"/>
+          </a:p>
+          <a:p>
+            <a:pPr lvl="1"/>
+            <a:endParaRPr lang="en-US" sz="1600" dirty="0"/>
           </a:p>
           <a:p>
             <a:endParaRPr lang="en-US" dirty="0"/>
@@ -6218,87 +8313,16 @@
           <a:chExt cx="0" cy="0"/>
         </a:xfrm>
       </p:grpSpPr>
-      <p:sp>
-        <p:nvSpPr>
-          <p:cNvPr id="5" name="TextBox 4"/>
-          <p:cNvSpPr txBox="1"/>
-          <p:nvPr/>
-        </p:nvSpPr>
-        <p:spPr>
-          <a:xfrm>
-            <a:off x="304800" y="1257300"/>
-            <a:ext cx="3200400" cy="2862322"/>
-          </a:xfrm>
-          <a:prstGeom prst="rect">
-            <a:avLst/>
-          </a:prstGeom>
-          <a:noFill/>
-        </p:spPr>
-        <p:txBody>
-          <a:bodyPr wrap="square" rtlCol="0">
-            <a:spAutoFit/>
-          </a:bodyPr>
-          <a:lstStyle/>
-          <a:p>
-            <a:r>
-              <a:rPr lang="en-US" dirty="0"/>
-              <a:t>Key Goals:</a:t>
-            </a:r>
-          </a:p>
-          <a:p>
-            <a:endParaRPr lang="en-US" dirty="0"/>
-          </a:p>
-          <a:p>
-            <a:pPr marL="342900" indent="-342900">
-              <a:buAutoNum type="arabicPeriod"/>
-            </a:pPr>
-            <a:r>
-              <a:rPr lang="en-US" dirty="0"/>
-              <a:t>Verify diagnoses </a:t>
-            </a:r>
-          </a:p>
-          <a:p>
-            <a:pPr marL="342900" indent="-342900">
-              <a:buAutoNum type="arabicPeriod"/>
-            </a:pPr>
-            <a:r>
-              <a:rPr lang="en-US" dirty="0"/>
-              <a:t>Identify past conditions that need to be reviewed</a:t>
-            </a:r>
-          </a:p>
-          <a:p>
-            <a:pPr marL="342900" indent="-342900">
-              <a:buAutoNum type="arabicPeriod"/>
-            </a:pPr>
-            <a:r>
-              <a:rPr lang="en-US" dirty="0"/>
-              <a:t>Improve payments from the ACA risk adjustment process</a:t>
-            </a:r>
-          </a:p>
-          <a:p>
-            <a:pPr marL="342900" indent="-342900">
-              <a:buAutoNum type="arabicPeriod"/>
-            </a:pPr>
-            <a:r>
-              <a:rPr lang="en-US" dirty="0"/>
-              <a:t>Improve medical record data quality</a:t>
-            </a:r>
-          </a:p>
-          <a:p>
-            <a:endParaRPr lang="en-US" dirty="0"/>
-          </a:p>
-        </p:txBody>
-      </p:sp>
       <p:pic>
         <p:nvPicPr>
-          <p:cNvPr id="7" name="Picture 6"/>
+          <p:cNvPr id="3" name="Picture 2"/>
           <p:cNvPicPr>
             <a:picLocks noChangeAspect="1"/>
           </p:cNvPicPr>
           <p:nvPr/>
         </p:nvPicPr>
         <p:blipFill>
-          <a:blip r:embed="rId2">
+          <a:blip r:embed="rId5">
             <a:extLst>
               <a:ext uri="{28A0092B-C50C-407E-A947-70E740481C1C}">
                 <a14:useLocalDpi xmlns:a14="http://schemas.microsoft.com/office/drawing/2010/main" val="0"/>
@@ -6311,63 +8335,47 @@
         </p:blipFill>
         <p:spPr>
           <a:xfrm>
-            <a:off x="3317631" y="1562101"/>
-            <a:ext cx="5568990" cy="3154463"/>
+            <a:off x="1371600" y="114300"/>
+            <a:ext cx="6781800" cy="5395334"/>
           </a:xfrm>
           <a:prstGeom prst="rect">
             <a:avLst/>
           </a:prstGeom>
         </p:spPr>
       </p:pic>
-      <p:sp>
-        <p:nvSpPr>
-          <p:cNvPr id="8" name="Title 1"/>
-          <p:cNvSpPr txBox="1">
-            <a:spLocks/>
-          </p:cNvSpPr>
-          <p:nvPr/>
-        </p:nvSpPr>
+      <p:pic>
+        <p:nvPicPr>
+          <p:cNvPr id="2" name="Audio 1">
+            <a:hlinkClick r:id="" action="ppaction://media"/>
+          </p:cNvPr>
+          <p:cNvPicPr>
+            <a:picLocks noChangeAspect="1"/>
+          </p:cNvPicPr>
+          <p:nvPr>
+            <a:audioFile r:link="rId2"/>
+            <p:extLst>
+              <p:ext uri="{DAA4B4D4-6D71-4841-9C94-3DE7FCFB9230}">
+                <p14:media xmlns:p14="http://schemas.microsoft.com/office/powerpoint/2010/main" r:embed="rId1"/>
+              </p:ext>
+            </p:extLst>
+          </p:nvPr>
+        </p:nvPicPr>
+        <p:blipFill>
+          <a:blip r:embed="rId6"/>
+          <a:stretch>
+            <a:fillRect/>
+          </a:stretch>
+        </p:blipFill>
         <p:spPr>
           <a:xfrm>
-            <a:off x="762000" y="190500"/>
-            <a:ext cx="8153400" cy="609600"/>
+            <a:off x="9372600" y="4899684"/>
+            <a:ext cx="609600" cy="609600"/>
           </a:xfrm>
           <a:prstGeom prst="rect">
             <a:avLst/>
           </a:prstGeom>
-          <a:solidFill>
-            <a:schemeClr val="bg1"/>
-          </a:solidFill>
         </p:spPr>
-        <p:txBody>
-          <a:bodyPr bIns="91440" anchor="b" anchorCtr="0">
-            <a:noAutofit/>
-          </a:bodyPr>
-          <a:lstStyle>
-            <a:lvl1pPr algn="l" rtl="0" eaLnBrk="1" latinLnBrk="0" hangingPunct="1">
-              <a:spcBef>
-                <a:spcPct val="0"/>
-              </a:spcBef>
-              <a:buNone/>
-              <a:defRPr kumimoji="0" sz="4000" kern="1200">
-                <a:solidFill>
-                  <a:schemeClr val="tx2"/>
-                </a:solidFill>
-                <a:latin typeface="+mj-lt"/>
-                <a:ea typeface="+mj-ea"/>
-                <a:cs typeface="+mj-cs"/>
-              </a:defRPr>
-            </a:lvl1pPr>
-          </a:lstStyle>
-          <a:p>
-            <a:r>
-              <a:rPr lang="en-US" sz="3600" dirty="0" smtClean="0"/>
-              <a:t>Use Case Diagram</a:t>
-            </a:r>
-            <a:endParaRPr lang="en-US" sz="3600" dirty="0"/>
-          </a:p>
-        </p:txBody>
-      </p:sp>
+      </p:pic>
     </p:spTree>
     <p:extLst>
       <p:ext uri="{BB962C8B-B14F-4D97-AF65-F5344CB8AC3E}">
@@ -6378,10 +8386,98 @@
   <p:clrMapOvr>
     <a:masterClrMapping/>
   </p:clrMapOvr>
+  <mc:AlternateContent xmlns:mc="http://schemas.openxmlformats.org/markup-compatibility/2006" xmlns:p14="http://schemas.microsoft.com/office/powerpoint/2010/main">
+    <mc:Choice Requires="p14">
+      <p:transition spd="slow" p14:dur="2000" advTm="56674"/>
+    </mc:Choice>
+    <mc:Fallback xmlns="">
+      <p:transition spd="slow" advTm="56674"/>
+    </mc:Fallback>
+  </mc:AlternateContent>
   <p:timing>
     <p:tnLst>
       <p:par>
-        <p:cTn id="1" dur="indefinite" restart="never" nodeType="tmRoot"/>
+        <p:cTn id="1" dur="indefinite" restart="never" nodeType="tmRoot">
+          <p:childTnLst>
+            <p:seq concurrent="1" nextAc="seek">
+              <p:cTn id="2" dur="indefinite" nodeType="mainSeq">
+                <p:childTnLst>
+                  <p:par>
+                    <p:cTn id="3" fill="hold">
+                      <p:stCondLst>
+                        <p:cond delay="indefinite"/>
+                        <p:cond evt="onBegin" delay="0">
+                          <p:tn val="2"/>
+                        </p:cond>
+                      </p:stCondLst>
+                      <p:childTnLst>
+                        <p:par>
+                          <p:cTn id="4" fill="hold">
+                            <p:stCondLst>
+                              <p:cond delay="0"/>
+                            </p:stCondLst>
+                            <p:childTnLst>
+                              <p:par>
+                                <p:cTn id="5" presetID="1" presetClass="mediacall" presetSubtype="0" fill="hold" nodeType="afterEffect">
+                                  <p:stCondLst>
+                                    <p:cond delay="0"/>
+                                  </p:stCondLst>
+                                  <p:childTnLst>
+                                    <p:cmd type="call" cmd="playFrom(0.0)">
+                                      <p:cBhvr>
+                                        <p:cTn id="6" dur="1" fill="hold"/>
+                                        <p:tgtEl>
+                                          <p:spTgt spid="2"/>
+                                        </p:tgtEl>
+                                      </p:cBhvr>
+                                    </p:cmd>
+                                  </p:childTnLst>
+                                </p:cTn>
+                              </p:par>
+                            </p:childTnLst>
+                          </p:cTn>
+                        </p:par>
+                      </p:childTnLst>
+                    </p:cTn>
+                  </p:par>
+                </p:childTnLst>
+              </p:cTn>
+              <p:prevCondLst>
+                <p:cond evt="onPrev" delay="0">
+                  <p:tgtEl>
+                    <p:sldTgt/>
+                  </p:tgtEl>
+                </p:cond>
+              </p:prevCondLst>
+              <p:nextCondLst>
+                <p:cond evt="onNext" delay="0">
+                  <p:tgtEl>
+                    <p:sldTgt/>
+                  </p:tgtEl>
+                </p:cond>
+              </p:nextCondLst>
+            </p:seq>
+            <p:audio isNarration="1">
+              <p:cMediaNode vol="80000" showWhenStopped="0">
+                <p:cTn id="7" fill="hold" display="0">
+                  <p:stCondLst>
+                    <p:cond delay="indefinite"/>
+                  </p:stCondLst>
+                  <p:endCondLst>
+                    <p:cond evt="onStopAudio" delay="0">
+                      <p:tgtEl>
+                        <p:sldTgt/>
+                      </p:tgtEl>
+                    </p:cond>
+                  </p:endCondLst>
+                </p:cTn>
+                <p:tgtEl>
+                  <p:spTgt spid="2"/>
+                </p:tgtEl>
+              </p:cMediaNode>
+            </p:audio>
+          </p:childTnLst>
+        </p:cTn>
       </p:par>
     </p:tnLst>
   </p:timing>
@@ -6407,100 +8503,6 @@
       </p:grpSpPr>
       <p:sp>
         <p:nvSpPr>
-          <p:cNvPr id="4" name="Title 1"/>
-          <p:cNvSpPr>
-            <a:spLocks noGrp="1"/>
-          </p:cNvSpPr>
-          <p:nvPr>
-            <p:ph type="title"/>
-          </p:nvPr>
-        </p:nvSpPr>
-        <p:spPr>
-          <a:xfrm>
-            <a:off x="762000" y="190500"/>
-            <a:ext cx="8153400" cy="609600"/>
-          </a:xfrm>
-          <a:solidFill>
-            <a:schemeClr val="bg1"/>
-          </a:solidFill>
-        </p:spPr>
-        <p:txBody>
-          <a:bodyPr>
-            <a:noAutofit/>
-          </a:bodyPr>
-          <a:lstStyle/>
-          <a:p>
-            <a:r>
-              <a:rPr lang="en-US" sz="3600" dirty="0" smtClean="0"/>
-              <a:t>RADV Architecture</a:t>
-            </a:r>
-            <a:endParaRPr lang="en-US" sz="3600" dirty="0"/>
-          </a:p>
-        </p:txBody>
-      </p:sp>
-      <p:pic>
-        <p:nvPicPr>
-          <p:cNvPr id="5" name="Picture 4"/>
-          <p:cNvPicPr>
-            <a:picLocks noChangeAspect="1"/>
-          </p:cNvPicPr>
-          <p:nvPr/>
-        </p:nvPicPr>
-        <p:blipFill>
-          <a:blip r:embed="rId2"/>
-          <a:stretch>
-            <a:fillRect/>
-          </a:stretch>
-        </p:blipFill>
-        <p:spPr>
-          <a:xfrm>
-            <a:off x="1524000" y="1028700"/>
-            <a:ext cx="6303864" cy="4494660"/>
-          </a:xfrm>
-          <a:prstGeom prst="rect">
-            <a:avLst/>
-          </a:prstGeom>
-        </p:spPr>
-      </p:pic>
-    </p:spTree>
-    <p:extLst>
-      <p:ext uri="{BB962C8B-B14F-4D97-AF65-F5344CB8AC3E}">
-        <p14:creationId xmlns:p14="http://schemas.microsoft.com/office/powerpoint/2010/main" val="767505757"/>
-      </p:ext>
-    </p:extLst>
-  </p:cSld>
-  <p:clrMapOvr>
-    <a:masterClrMapping/>
-  </p:clrMapOvr>
-  <p:timing>
-    <p:tnLst>
-      <p:par>
-        <p:cTn id="1" dur="indefinite" restart="never" nodeType="tmRoot"/>
-      </p:par>
-    </p:tnLst>
-  </p:timing>
-</p:sld>
-</file>
-
-<file path=ppt/slides/slide4.xml><?xml version="1.0" encoding="utf-8"?>
-<p:sld xmlns:a="http://schemas.openxmlformats.org/drawingml/2006/main" xmlns:r="http://schemas.openxmlformats.org/officeDocument/2006/relationships" xmlns:p="http://schemas.openxmlformats.org/presentationml/2006/main">
-  <p:cSld>
-    <p:spTree>
-      <p:nvGrpSpPr>
-        <p:cNvPr id="1" name=""/>
-        <p:cNvGrpSpPr/>
-        <p:nvPr/>
-      </p:nvGrpSpPr>
-      <p:grpSpPr>
-        <a:xfrm>
-          <a:off x="0" y="0"/>
-          <a:ext cx="0" cy="0"/>
-          <a:chOff x="0" y="0"/>
-          <a:chExt cx="0" cy="0"/>
-        </a:xfrm>
-      </p:grpSpPr>
-      <p:sp>
-        <p:nvSpPr>
           <p:cNvPr id="4" name="TextBox 3"/>
           <p:cNvSpPr txBox="1"/>
           <p:nvPr/>
@@ -6639,7 +8641,7 @@
           <p:nvPr/>
         </p:nvPicPr>
         <p:blipFill>
-          <a:blip r:embed="rId2">
+          <a:blip r:embed="rId5">
             <a:extLst>
               <a:ext uri="{28A0092B-C50C-407E-A947-70E740481C1C}">
                 <a14:useLocalDpi xmlns:a14="http://schemas.microsoft.com/office/drawing/2010/main" val="0"/>
@@ -6653,7 +8655,7 @@
         </p:blipFill>
         <p:spPr bwMode="auto">
           <a:xfrm>
-            <a:off x="4114801" y="1400839"/>
+            <a:off x="3963729" y="1400839"/>
             <a:ext cx="1685925" cy="742950"/>
           </a:xfrm>
           <a:prstGeom prst="rect">
@@ -6693,7 +8695,7 @@
           <p:nvPr/>
         </p:nvPicPr>
         <p:blipFill>
-          <a:blip r:embed="rId3">
+          <a:blip r:embed="rId6">
             <a:extLst>
               <a:ext uri="{28A0092B-C50C-407E-A947-70E740481C1C}">
                 <a14:useLocalDpi xmlns:a14="http://schemas.microsoft.com/office/drawing/2010/main" val="0"/>
@@ -6707,7 +8709,7 @@
         </p:blipFill>
         <p:spPr bwMode="auto">
           <a:xfrm>
-            <a:off x="3628141" y="2400301"/>
+            <a:off x="3963729" y="2400300"/>
             <a:ext cx="2209799" cy="670465"/>
           </a:xfrm>
           <a:prstGeom prst="rect">
@@ -6747,7 +8749,7 @@
           <p:nvPr/>
         </p:nvPicPr>
         <p:blipFill>
-          <a:blip r:embed="rId4">
+          <a:blip r:embed="rId7">
             <a:extLst>
               <a:ext uri="{28A0092B-C50C-407E-A947-70E740481C1C}">
                 <a14:useLocalDpi xmlns:a14="http://schemas.microsoft.com/office/drawing/2010/main" val="0"/>
@@ -6761,7 +8763,7 @@
         </p:blipFill>
         <p:spPr bwMode="auto">
           <a:xfrm>
-            <a:off x="3827721" y="3449093"/>
+            <a:off x="3981450" y="3449093"/>
             <a:ext cx="4705350" cy="746366"/>
           </a:xfrm>
           <a:prstGeom prst="rect">
@@ -6841,6 +8843,39 @@
           </a:p>
         </p:txBody>
       </p:sp>
+      <p:pic>
+        <p:nvPicPr>
+          <p:cNvPr id="3" name="Audio 2">
+            <a:hlinkClick r:id="" action="ppaction://media"/>
+          </p:cNvPr>
+          <p:cNvPicPr>
+            <a:picLocks noChangeAspect="1"/>
+          </p:cNvPicPr>
+          <p:nvPr>
+            <a:audioFile r:link="rId2"/>
+            <p:extLst>
+              <p:ext uri="{DAA4B4D4-6D71-4841-9C94-3DE7FCFB9230}">
+                <p14:media xmlns:p14="http://schemas.microsoft.com/office/powerpoint/2010/main" r:embed="rId1"/>
+              </p:ext>
+            </p:extLst>
+          </p:nvPr>
+        </p:nvPicPr>
+        <p:blipFill>
+          <a:blip r:embed="rId8"/>
+          <a:stretch>
+            <a:fillRect/>
+          </a:stretch>
+        </p:blipFill>
+        <p:spPr>
+          <a:xfrm>
+            <a:off x="9525000" y="4914900"/>
+            <a:ext cx="609600" cy="609600"/>
+          </a:xfrm>
+          <a:prstGeom prst="rect">
+            <a:avLst/>
+          </a:prstGeom>
+        </p:spPr>
+      </p:pic>
     </p:spTree>
     <p:extLst>
       <p:ext uri="{BB962C8B-B14F-4D97-AF65-F5344CB8AC3E}">
@@ -6851,10 +8886,286 @@
   <p:clrMapOvr>
     <a:masterClrMapping/>
   </p:clrMapOvr>
+  <mc:AlternateContent xmlns:mc="http://schemas.openxmlformats.org/markup-compatibility/2006" xmlns:p14="http://schemas.microsoft.com/office/powerpoint/2010/main">
+    <mc:Choice Requires="p14">
+      <p:transition spd="slow" p14:dur="2000" advTm="30565"/>
+    </mc:Choice>
+    <mc:Fallback xmlns="">
+      <p:transition spd="slow" advTm="30565"/>
+    </mc:Fallback>
+  </mc:AlternateContent>
   <p:timing>
     <p:tnLst>
       <p:par>
-        <p:cTn id="1" dur="indefinite" restart="never" nodeType="tmRoot"/>
+        <p:cTn id="1" dur="indefinite" restart="never" nodeType="tmRoot">
+          <p:childTnLst>
+            <p:seq concurrent="1" nextAc="seek">
+              <p:cTn id="2" dur="indefinite" nodeType="mainSeq">
+                <p:childTnLst>
+                  <p:par>
+                    <p:cTn id="3" fill="hold">
+                      <p:stCondLst>
+                        <p:cond delay="indefinite"/>
+                        <p:cond evt="onBegin" delay="0">
+                          <p:tn val="2"/>
+                        </p:cond>
+                      </p:stCondLst>
+                      <p:childTnLst>
+                        <p:par>
+                          <p:cTn id="4" fill="hold">
+                            <p:stCondLst>
+                              <p:cond delay="0"/>
+                            </p:stCondLst>
+                            <p:childTnLst>
+                              <p:par>
+                                <p:cTn id="5" presetID="1" presetClass="mediacall" presetSubtype="0" fill="hold" nodeType="afterEffect">
+                                  <p:stCondLst>
+                                    <p:cond delay="0"/>
+                                  </p:stCondLst>
+                                  <p:childTnLst>
+                                    <p:cmd type="call" cmd="playFrom(0.0)">
+                                      <p:cBhvr>
+                                        <p:cTn id="6" dur="1" fill="hold"/>
+                                        <p:tgtEl>
+                                          <p:spTgt spid="3"/>
+                                        </p:tgtEl>
+                                      </p:cBhvr>
+                                    </p:cmd>
+                                  </p:childTnLst>
+                                </p:cTn>
+                              </p:par>
+                            </p:childTnLst>
+                          </p:cTn>
+                        </p:par>
+                      </p:childTnLst>
+                    </p:cTn>
+                  </p:par>
+                </p:childTnLst>
+              </p:cTn>
+              <p:prevCondLst>
+                <p:cond evt="onPrev" delay="0">
+                  <p:tgtEl>
+                    <p:sldTgt/>
+                  </p:tgtEl>
+                </p:cond>
+              </p:prevCondLst>
+              <p:nextCondLst>
+                <p:cond evt="onNext" delay="0">
+                  <p:tgtEl>
+                    <p:sldTgt/>
+                  </p:tgtEl>
+                </p:cond>
+              </p:nextCondLst>
+            </p:seq>
+            <p:audio isNarration="1">
+              <p:cMediaNode vol="80000" showWhenStopped="0">
+                <p:cTn id="7" fill="hold" display="0">
+                  <p:stCondLst>
+                    <p:cond delay="indefinite"/>
+                  </p:stCondLst>
+                  <p:endCondLst>
+                    <p:cond evt="onStopAudio" delay="0">
+                      <p:tgtEl>
+                        <p:sldTgt/>
+                      </p:tgtEl>
+                    </p:cond>
+                  </p:endCondLst>
+                </p:cTn>
+                <p:tgtEl>
+                  <p:spTgt spid="3"/>
+                </p:tgtEl>
+              </p:cMediaNode>
+            </p:audio>
+          </p:childTnLst>
+        </p:cTn>
+      </p:par>
+    </p:tnLst>
+  </p:timing>
+</p:sld>
+</file>
+
+<file path=ppt/slides/slide4.xml><?xml version="1.0" encoding="utf-8"?>
+<p:sld xmlns:a="http://schemas.openxmlformats.org/drawingml/2006/main" xmlns:r="http://schemas.openxmlformats.org/officeDocument/2006/relationships" xmlns:p="http://schemas.openxmlformats.org/presentationml/2006/main">
+  <p:cSld>
+    <p:spTree>
+      <p:nvGrpSpPr>
+        <p:cNvPr id="1" name=""/>
+        <p:cNvGrpSpPr/>
+        <p:nvPr/>
+      </p:nvGrpSpPr>
+      <p:grpSpPr>
+        <a:xfrm>
+          <a:off x="0" y="0"/>
+          <a:ext cx="0" cy="0"/>
+          <a:chOff x="0" y="0"/>
+          <a:chExt cx="0" cy="0"/>
+        </a:xfrm>
+      </p:grpSpPr>
+      <p:pic>
+        <p:nvPicPr>
+          <p:cNvPr id="2" name="Picture 1"/>
+          <p:cNvPicPr>
+            <a:picLocks noChangeAspect="1"/>
+          </p:cNvPicPr>
+          <p:nvPr/>
+        </p:nvPicPr>
+        <p:blipFill>
+          <a:blip r:embed="rId5">
+            <a:extLst>
+              <a:ext uri="{28A0092B-C50C-407E-A947-70E740481C1C}">
+                <a14:useLocalDpi xmlns:a14="http://schemas.microsoft.com/office/drawing/2010/main" val="0"/>
+              </a:ext>
+            </a:extLst>
+          </a:blip>
+          <a:stretch>
+            <a:fillRect/>
+          </a:stretch>
+        </p:blipFill>
+        <p:spPr>
+          <a:xfrm>
+            <a:off x="762000" y="114300"/>
+            <a:ext cx="7199419" cy="5418712"/>
+          </a:xfrm>
+          <a:prstGeom prst="rect">
+            <a:avLst/>
+          </a:prstGeom>
+        </p:spPr>
+      </p:pic>
+      <p:pic>
+        <p:nvPicPr>
+          <p:cNvPr id="4" name="Audio 3">
+            <a:hlinkClick r:id="" action="ppaction://media"/>
+          </p:cNvPr>
+          <p:cNvPicPr>
+            <a:picLocks noChangeAspect="1"/>
+          </p:cNvPicPr>
+          <p:nvPr>
+            <a:audioFile r:link="rId2"/>
+            <p:extLst>
+              <p:ext uri="{DAA4B4D4-6D71-4841-9C94-3DE7FCFB9230}">
+                <p14:media xmlns:p14="http://schemas.microsoft.com/office/powerpoint/2010/main" r:embed="rId1"/>
+              </p:ext>
+            </p:extLst>
+          </p:nvPr>
+        </p:nvPicPr>
+        <p:blipFill>
+          <a:blip r:embed="rId6"/>
+          <a:stretch>
+            <a:fillRect/>
+          </a:stretch>
+        </p:blipFill>
+        <p:spPr>
+          <a:xfrm>
+            <a:off x="9448800" y="4838700"/>
+            <a:ext cx="609600" cy="609600"/>
+          </a:xfrm>
+          <a:prstGeom prst="rect">
+            <a:avLst/>
+          </a:prstGeom>
+        </p:spPr>
+      </p:pic>
+    </p:spTree>
+    <p:extLst>
+      <p:ext uri="{BB962C8B-B14F-4D97-AF65-F5344CB8AC3E}">
+        <p14:creationId xmlns:p14="http://schemas.microsoft.com/office/powerpoint/2010/main" val="767505757"/>
+      </p:ext>
+    </p:extLst>
+  </p:cSld>
+  <p:clrMapOvr>
+    <a:masterClrMapping/>
+  </p:clrMapOvr>
+  <mc:AlternateContent xmlns:mc="http://schemas.openxmlformats.org/markup-compatibility/2006" xmlns:p14="http://schemas.microsoft.com/office/powerpoint/2010/main">
+    <mc:Choice Requires="p14">
+      <p:transition spd="slow" p14:dur="2000" advTm="46683"/>
+    </mc:Choice>
+    <mc:Fallback xmlns="">
+      <p:transition spd="slow" advTm="46683"/>
+    </mc:Fallback>
+  </mc:AlternateContent>
+  <p:timing>
+    <p:tnLst>
+      <p:par>
+        <p:cTn id="1" dur="indefinite" restart="never" nodeType="tmRoot">
+          <p:childTnLst>
+            <p:seq concurrent="1" nextAc="seek">
+              <p:cTn id="2" dur="indefinite" nodeType="mainSeq">
+                <p:childTnLst>
+                  <p:par>
+                    <p:cTn id="3" fill="hold">
+                      <p:stCondLst>
+                        <p:cond delay="indefinite"/>
+                        <p:cond evt="onBegin" delay="0">
+                          <p:tn val="2"/>
+                        </p:cond>
+                      </p:stCondLst>
+                      <p:childTnLst>
+                        <p:par>
+                          <p:cTn id="4" fill="hold">
+                            <p:stCondLst>
+                              <p:cond delay="0"/>
+                            </p:stCondLst>
+                            <p:childTnLst>
+                              <p:par>
+                                <p:cTn id="5" presetID="1" presetClass="mediacall" presetSubtype="0" fill="hold" nodeType="afterEffect">
+                                  <p:stCondLst>
+                                    <p:cond delay="0"/>
+                                  </p:stCondLst>
+                                  <p:childTnLst>
+                                    <p:cmd type="call" cmd="playFrom(0.0)">
+                                      <p:cBhvr>
+                                        <p:cTn id="6" dur="1" fill="hold"/>
+                                        <p:tgtEl>
+                                          <p:spTgt spid="4"/>
+                                        </p:tgtEl>
+                                      </p:cBhvr>
+                                    </p:cmd>
+                                  </p:childTnLst>
+                                </p:cTn>
+                              </p:par>
+                            </p:childTnLst>
+                          </p:cTn>
+                        </p:par>
+                      </p:childTnLst>
+                    </p:cTn>
+                  </p:par>
+                </p:childTnLst>
+              </p:cTn>
+              <p:prevCondLst>
+                <p:cond evt="onPrev" delay="0">
+                  <p:tgtEl>
+                    <p:sldTgt/>
+                  </p:tgtEl>
+                </p:cond>
+              </p:prevCondLst>
+              <p:nextCondLst>
+                <p:cond evt="onNext" delay="0">
+                  <p:tgtEl>
+                    <p:sldTgt/>
+                  </p:tgtEl>
+                </p:cond>
+              </p:nextCondLst>
+            </p:seq>
+            <p:audio isNarration="1">
+              <p:cMediaNode vol="80000" showWhenStopped="0">
+                <p:cTn id="7" fill="hold" display="0">
+                  <p:stCondLst>
+                    <p:cond delay="indefinite"/>
+                  </p:stCondLst>
+                  <p:endCondLst>
+                    <p:cond evt="onStopAudio" delay="0">
+                      <p:tgtEl>
+                        <p:sldTgt/>
+                      </p:tgtEl>
+                    </p:cond>
+                  </p:endCondLst>
+                </p:cTn>
+                <p:tgtEl>
+                  <p:spTgt spid="4"/>
+                </p:tgtEl>
+              </p:cMediaNode>
+            </p:audio>
+          </p:childTnLst>
+        </p:cTn>
       </p:par>
     </p:tnLst>
   </p:timing>
@@ -6887,7 +9198,7 @@
           <p:nvPr/>
         </p:nvPicPr>
         <p:blipFill>
-          <a:blip r:embed="rId2">
+          <a:blip r:embed="rId3">
             <a:extLst>
               <a:ext uri="{28A0092B-C50C-407E-A947-70E740481C1C}">
                 <a14:useLocalDpi xmlns:a14="http://schemas.microsoft.com/office/drawing/2010/main" val="0"/>
@@ -6955,6 +9266,14 @@
   <p:clrMapOvr>
     <a:masterClrMapping/>
   </p:clrMapOvr>
+  <mc:AlternateContent xmlns:mc="http://schemas.openxmlformats.org/markup-compatibility/2006" xmlns:p14="http://schemas.microsoft.com/office/powerpoint/2010/main">
+    <mc:Choice Requires="p14">
+      <p:transition spd="slow" p14:dur="2000" advTm="1309"/>
+    </mc:Choice>
+    <mc:Fallback xmlns="">
+      <p:transition spd="slow" advTm="1309"/>
+    </mc:Fallback>
+  </mc:AlternateContent>
   <p:timing>
     <p:tnLst>
       <p:par>
@@ -6991,7 +9310,7 @@
           <p:nvPr/>
         </p:nvPicPr>
         <p:blipFill>
-          <a:blip r:embed="rId2">
+          <a:blip r:embed="rId3">
             <a:extLst>
               <a:ext uri="{28A0092B-C50C-407E-A947-70E740481C1C}">
                 <a14:useLocalDpi xmlns:a14="http://schemas.microsoft.com/office/drawing/2010/main" val="0"/>
@@ -7059,6 +9378,14 @@
   <p:clrMapOvr>
     <a:masterClrMapping/>
   </p:clrMapOvr>
+  <mc:AlternateContent xmlns:mc="http://schemas.openxmlformats.org/markup-compatibility/2006" xmlns:p14="http://schemas.microsoft.com/office/powerpoint/2010/main">
+    <mc:Choice Requires="p14">
+      <p:transition spd="slow" p14:dur="2000" advTm="1180"/>
+    </mc:Choice>
+    <mc:Fallback xmlns="">
+      <p:transition spd="slow" advTm="1180"/>
+    </mc:Fallback>
+  </mc:AlternateContent>
   <p:timing>
     <p:tnLst>
       <p:par>
@@ -7095,7 +9422,7 @@
           <p:nvPr/>
         </p:nvPicPr>
         <p:blipFill>
-          <a:blip r:embed="rId2">
+          <a:blip r:embed="rId3">
             <a:extLst>
               <a:ext uri="{28A0092B-C50C-407E-A947-70E740481C1C}">
                 <a14:useLocalDpi xmlns:a14="http://schemas.microsoft.com/office/drawing/2010/main" val="0"/>
@@ -7199,7 +9526,7 @@
           <p:nvPr/>
         </p:nvPicPr>
         <p:blipFill>
-          <a:blip r:embed="rId2">
+          <a:blip r:embed="rId3">
             <a:extLst>
               <a:ext uri="{28A0092B-C50C-407E-A947-70E740481C1C}">
                 <a14:useLocalDpi xmlns:a14="http://schemas.microsoft.com/office/drawing/2010/main" val="0"/>
@@ -7303,7 +9630,7 @@
           <p:nvPr/>
         </p:nvPicPr>
         <p:blipFill>
-          <a:blip r:embed="rId2">
+          <a:blip r:embed="rId3">
             <a:extLst>
               <a:ext uri="{28A0092B-C50C-407E-A947-70E740481C1C}">
                 <a14:useLocalDpi xmlns:a14="http://schemas.microsoft.com/office/drawing/2010/main" val="0"/>
@@ -7651,4 +9978,265 @@
   <a:objectDefaults/>
   <a:extraClrSchemeLst/>
 </a:theme>
+</file>
+
+<file path=ppt/theme/theme2.xml><?xml version="1.0" encoding="utf-8"?>
+<a:theme xmlns:a="http://schemas.openxmlformats.org/drawingml/2006/main" name="Office Theme">
+  <a:themeElements>
+    <a:clrScheme name="Office">
+      <a:dk1>
+        <a:sysClr val="windowText" lastClr="000000"/>
+      </a:dk1>
+      <a:lt1>
+        <a:sysClr val="window" lastClr="FFFFFF"/>
+      </a:lt1>
+      <a:dk2>
+        <a:srgbClr val="44546A"/>
+      </a:dk2>
+      <a:lt2>
+        <a:srgbClr val="E7E6E6"/>
+      </a:lt2>
+      <a:accent1>
+        <a:srgbClr val="5B9BD5"/>
+      </a:accent1>
+      <a:accent2>
+        <a:srgbClr val="ED7D31"/>
+      </a:accent2>
+      <a:accent3>
+        <a:srgbClr val="A5A5A5"/>
+      </a:accent3>
+      <a:accent4>
+        <a:srgbClr val="FFC000"/>
+      </a:accent4>
+      <a:accent5>
+        <a:srgbClr val="4472C4"/>
+      </a:accent5>
+      <a:accent6>
+        <a:srgbClr val="70AD47"/>
+      </a:accent6>
+      <a:hlink>
+        <a:srgbClr val="0563C1"/>
+      </a:hlink>
+      <a:folHlink>
+        <a:srgbClr val="954F72"/>
+      </a:folHlink>
+    </a:clrScheme>
+    <a:fontScheme name="Office">
+      <a:majorFont>
+        <a:latin typeface="Calibri Light" panose="020F0302020204030204"/>
+        <a:ea typeface=""/>
+        <a:cs typeface=""/>
+        <a:font script="Jpan" typeface="游ゴシック Light"/>
+        <a:font script="Hang" typeface="맑은 고딕"/>
+        <a:font script="Hans" typeface="等线 Light"/>
+        <a:font script="Hant" typeface="新細明體"/>
+        <a:font script="Arab" typeface="Times New Roman"/>
+        <a:font script="Hebr" typeface="Times New Roman"/>
+        <a:font script="Thai" typeface="Angsana New"/>
+        <a:font script="Ethi" typeface="Nyala"/>
+        <a:font script="Beng" typeface="Vrinda"/>
+        <a:font script="Gujr" typeface="Shruti"/>
+        <a:font script="Khmr" typeface="MoolBoran"/>
+        <a:font script="Knda" typeface="Tunga"/>
+        <a:font script="Guru" typeface="Raavi"/>
+        <a:font script="Cans" typeface="Euphemia"/>
+        <a:font script="Cher" typeface="Plantagenet Cherokee"/>
+        <a:font script="Yiii" typeface="Microsoft Yi Baiti"/>
+        <a:font script="Tibt" typeface="Microsoft Himalaya"/>
+        <a:font script="Thaa" typeface="MV Boli"/>
+        <a:font script="Deva" typeface="Mangal"/>
+        <a:font script="Telu" typeface="Gautami"/>
+        <a:font script="Taml" typeface="Latha"/>
+        <a:font script="Syrc" typeface="Estrangelo Edessa"/>
+        <a:font script="Orya" typeface="Kalinga"/>
+        <a:font script="Mlym" typeface="Kartika"/>
+        <a:font script="Laoo" typeface="DokChampa"/>
+        <a:font script="Sinh" typeface="Iskoola Pota"/>
+        <a:font script="Mong" typeface="Mongolian Baiti"/>
+        <a:font script="Viet" typeface="Times New Roman"/>
+        <a:font script="Uigh" typeface="Microsoft Uighur"/>
+        <a:font script="Geor" typeface="Sylfaen"/>
+      </a:majorFont>
+      <a:minorFont>
+        <a:latin typeface="Calibri" panose="020F0502020204030204"/>
+        <a:ea typeface=""/>
+        <a:cs typeface=""/>
+        <a:font script="Jpan" typeface="游ゴシック"/>
+        <a:font script="Hang" typeface="맑은 고딕"/>
+        <a:font script="Hans" typeface="等线"/>
+        <a:font script="Hant" typeface="新細明體"/>
+        <a:font script="Arab" typeface="Arial"/>
+        <a:font script="Hebr" typeface="Arial"/>
+        <a:font script="Thai" typeface="Cordia New"/>
+        <a:font script="Ethi" typeface="Nyala"/>
+        <a:font script="Beng" typeface="Vrinda"/>
+        <a:font script="Gujr" typeface="Shruti"/>
+        <a:font script="Khmr" typeface="DaunPenh"/>
+        <a:font script="Knda" typeface="Tunga"/>
+        <a:font script="Guru" typeface="Raavi"/>
+        <a:font script="Cans" typeface="Euphemia"/>
+        <a:font script="Cher" typeface="Plantagenet Cherokee"/>
+        <a:font script="Yiii" typeface="Microsoft Yi Baiti"/>
+        <a:font script="Tibt" typeface="Microsoft Himalaya"/>
+        <a:font script="Thaa" typeface="MV Boli"/>
+        <a:font script="Deva" typeface="Mangal"/>
+        <a:font script="Telu" typeface="Gautami"/>
+        <a:font script="Taml" typeface="Latha"/>
+        <a:font script="Syrc" typeface="Estrangelo Edessa"/>
+        <a:font script="Orya" typeface="Kalinga"/>
+        <a:font script="Mlym" typeface="Kartika"/>
+        <a:font script="Laoo" typeface="DokChampa"/>
+        <a:font script="Sinh" typeface="Iskoola Pota"/>
+        <a:font script="Mong" typeface="Mongolian Baiti"/>
+        <a:font script="Viet" typeface="Arial"/>
+        <a:font script="Uigh" typeface="Microsoft Uighur"/>
+        <a:font script="Geor" typeface="Sylfaen"/>
+      </a:minorFont>
+    </a:fontScheme>
+    <a:fmtScheme name="Office">
+      <a:fillStyleLst>
+        <a:solidFill>
+          <a:schemeClr val="phClr"/>
+        </a:solidFill>
+        <a:gradFill rotWithShape="1">
+          <a:gsLst>
+            <a:gs pos="0">
+              <a:schemeClr val="phClr">
+                <a:lumMod val="110000"/>
+                <a:satMod val="105000"/>
+                <a:tint val="67000"/>
+              </a:schemeClr>
+            </a:gs>
+            <a:gs pos="50000">
+              <a:schemeClr val="phClr">
+                <a:lumMod val="105000"/>
+                <a:satMod val="103000"/>
+                <a:tint val="73000"/>
+              </a:schemeClr>
+            </a:gs>
+            <a:gs pos="100000">
+              <a:schemeClr val="phClr">
+                <a:lumMod val="105000"/>
+                <a:satMod val="109000"/>
+                <a:tint val="81000"/>
+              </a:schemeClr>
+            </a:gs>
+          </a:gsLst>
+          <a:lin ang="5400000" scaled="0"/>
+        </a:gradFill>
+        <a:gradFill rotWithShape="1">
+          <a:gsLst>
+            <a:gs pos="0">
+              <a:schemeClr val="phClr">
+                <a:satMod val="103000"/>
+                <a:lumMod val="102000"/>
+                <a:tint val="94000"/>
+              </a:schemeClr>
+            </a:gs>
+            <a:gs pos="50000">
+              <a:schemeClr val="phClr">
+                <a:satMod val="110000"/>
+                <a:lumMod val="100000"/>
+                <a:shade val="100000"/>
+              </a:schemeClr>
+            </a:gs>
+            <a:gs pos="100000">
+              <a:schemeClr val="phClr">
+                <a:lumMod val="99000"/>
+                <a:satMod val="120000"/>
+                <a:shade val="78000"/>
+              </a:schemeClr>
+            </a:gs>
+          </a:gsLst>
+          <a:lin ang="5400000" scaled="0"/>
+        </a:gradFill>
+      </a:fillStyleLst>
+      <a:lnStyleLst>
+        <a:ln w="6350" cap="flat" cmpd="sng" algn="ctr">
+          <a:solidFill>
+            <a:schemeClr val="phClr"/>
+          </a:solidFill>
+          <a:prstDash val="solid"/>
+          <a:miter lim="800000"/>
+        </a:ln>
+        <a:ln w="12700" cap="flat" cmpd="sng" algn="ctr">
+          <a:solidFill>
+            <a:schemeClr val="phClr"/>
+          </a:solidFill>
+          <a:prstDash val="solid"/>
+          <a:miter lim="800000"/>
+        </a:ln>
+        <a:ln w="19050" cap="flat" cmpd="sng" algn="ctr">
+          <a:solidFill>
+            <a:schemeClr val="phClr"/>
+          </a:solidFill>
+          <a:prstDash val="solid"/>
+          <a:miter lim="800000"/>
+        </a:ln>
+      </a:lnStyleLst>
+      <a:effectStyleLst>
+        <a:effectStyle>
+          <a:effectLst/>
+        </a:effectStyle>
+        <a:effectStyle>
+          <a:effectLst/>
+        </a:effectStyle>
+        <a:effectStyle>
+          <a:effectLst>
+            <a:outerShdw blurRad="57150" dist="19050" dir="5400000" algn="ctr" rotWithShape="0">
+              <a:srgbClr val="000000">
+                <a:alpha val="63000"/>
+              </a:srgbClr>
+            </a:outerShdw>
+          </a:effectLst>
+        </a:effectStyle>
+      </a:effectStyleLst>
+      <a:bgFillStyleLst>
+        <a:solidFill>
+          <a:schemeClr val="phClr"/>
+        </a:solidFill>
+        <a:solidFill>
+          <a:schemeClr val="phClr">
+            <a:tint val="95000"/>
+            <a:satMod val="170000"/>
+          </a:schemeClr>
+        </a:solidFill>
+        <a:gradFill rotWithShape="1">
+          <a:gsLst>
+            <a:gs pos="0">
+              <a:schemeClr val="phClr">
+                <a:tint val="93000"/>
+                <a:satMod val="150000"/>
+                <a:shade val="98000"/>
+                <a:lumMod val="102000"/>
+              </a:schemeClr>
+            </a:gs>
+            <a:gs pos="50000">
+              <a:schemeClr val="phClr">
+                <a:tint val="98000"/>
+                <a:satMod val="130000"/>
+                <a:shade val="90000"/>
+                <a:lumMod val="103000"/>
+              </a:schemeClr>
+            </a:gs>
+            <a:gs pos="100000">
+              <a:schemeClr val="phClr">
+                <a:shade val="63000"/>
+                <a:satMod val="120000"/>
+              </a:schemeClr>
+            </a:gs>
+          </a:gsLst>
+          <a:lin ang="5400000" scaled="0"/>
+        </a:gradFill>
+      </a:bgFillStyleLst>
+    </a:fmtScheme>
+  </a:themeElements>
+  <a:objectDefaults/>
+  <a:extraClrSchemeLst/>
+  <a:extLst>
+    <a:ext uri="{05A4C25C-085E-4340-85A3-A5531E510DB2}">
+      <thm15:themeFamily xmlns:thm15="http://schemas.microsoft.com/office/thememl/2012/main" name="Office Theme" id="{62F939B6-93AF-4DB8-9C6B-D6C7DFDC589F}" vid="{4A3C46E8-61CC-4603-A589-7422A47A8E4A}"/>
+    </a:ext>
+  </a:extLst>
+</a:theme>
 </file>
</xml_diff>